<commit_message>
Just added a title, borders to presentation material
</commit_message>
<xml_diff>
--- a/PresentationMaterial/lastname-firstname_poster.pptx
+++ b/PresentationMaterial/lastname-firstname_poster.pptx
@@ -36,7 +36,7 @@
             <a:spLocks noGrp="1"/>
           </p:cNvSpPr>
           <p:nvPr>
-            <p:ph type="ftr" idx="2"/>
+            <p:ph type="ftr" idx="1"/>
           </p:nvPr>
         </p:nvSpPr>
         <p:spPr/>
@@ -56,14 +56,14 @@
             <a:spLocks noGrp="1"/>
           </p:cNvSpPr>
           <p:nvPr>
-            <p:ph type="sldNum" idx="3"/>
-          </p:nvPr>
-        </p:nvSpPr>
-        <p:spPr/>
-        <p:txBody>
-          <a:bodyPr/>
-          <a:p>
-            <a:fld id="{6B0BFFBD-D876-459E-A6C3-9A41F70B150F}" type="slidenum">
+            <p:ph type="sldNum" idx="2"/>
+          </p:nvPr>
+        </p:nvSpPr>
+        <p:spPr/>
+        <p:txBody>
+          <a:bodyPr/>
+          <a:p>
+            <a:fld id="{98331270-39A7-4196-8482-22B8214D3B1D}" type="slidenum">
               <a:t>&lt;#&gt;</a:t>
             </a:fld>
           </a:p>
@@ -76,7 +76,7 @@
             <a:spLocks noGrp="1"/>
           </p:cNvSpPr>
           <p:nvPr>
-            <p:ph type="dt" idx="1"/>
+            <p:ph type="dt" idx="3"/>
           </p:nvPr>
         </p:nvSpPr>
         <p:spPr/>
@@ -125,7 +125,7 @@
         <p:spPr>
           <a:xfrm>
             <a:off x="1920240" y="11361960"/>
-            <a:ext cx="21762360" cy="7840080"/>
+            <a:ext cx="21762000" cy="7839720"/>
           </a:xfrm>
           <a:prstGeom prst="rect">
             <a:avLst/>
@@ -140,11 +140,11 @@
             <a:noAutofit/>
           </a:bodyPr>
           <a:p>
-            <a:endParaRPr b="0" lang="en-US" sz="8190" spc="-1" strike="noStrike">
-              <a:solidFill>
-                <a:srgbClr val="000000"/>
-              </a:solidFill>
-              <a:latin typeface="Calibri"/>
+            <a:pPr algn="ctr">
+              <a:buNone/>
+            </a:pPr>
+            <a:endParaRPr b="0" lang="en-US" sz="4400" spc="-1" strike="noStrike">
+              <a:latin typeface="Arial"/>
             </a:endParaRPr>
           </a:p>
         </p:txBody>
@@ -161,7 +161,7 @@
         </p:nvSpPr>
         <p:spPr>
           <a:xfrm>
-            <a:off x="1280160" y="8558280"/>
+            <a:off x="1280160" y="8558640"/>
             <a:ext cx="23042520" cy="10118520"/>
           </a:xfrm>
           <a:prstGeom prst="rect">
@@ -177,11 +177,8 @@
             <a:normAutofit/>
           </a:bodyPr>
           <a:p>
-            <a:endParaRPr b="0" lang="en-US" sz="15789" spc="-1" strike="noStrike">
-              <a:solidFill>
-                <a:srgbClr val="000000"/>
-              </a:solidFill>
-              <a:latin typeface="Calibri"/>
+            <a:endParaRPr b="0" lang="en-US" sz="3200" spc="-1" strike="noStrike">
+              <a:latin typeface="Arial"/>
             </a:endParaRPr>
           </a:p>
         </p:txBody>
@@ -198,7 +195,7 @@
         </p:nvSpPr>
         <p:spPr>
           <a:xfrm>
-            <a:off x="1280160" y="19638360"/>
+            <a:off x="1280160" y="19638720"/>
             <a:ext cx="23042520" cy="10118520"/>
           </a:xfrm>
           <a:prstGeom prst="rect">
@@ -214,11 +211,8 @@
             <a:normAutofit/>
           </a:bodyPr>
           <a:p>
-            <a:endParaRPr b="0" lang="en-US" sz="15789" spc="-1" strike="noStrike">
-              <a:solidFill>
-                <a:srgbClr val="000000"/>
-              </a:solidFill>
-              <a:latin typeface="Calibri"/>
+            <a:endParaRPr b="0" lang="en-US" sz="3200" spc="-1" strike="noStrike">
+              <a:latin typeface="Arial"/>
             </a:endParaRPr>
           </a:p>
         </p:txBody>
@@ -230,7 +224,7 @@
             <a:spLocks noGrp="1"/>
           </p:cNvSpPr>
           <p:nvPr>
-            <p:ph type="ftr" idx="2"/>
+            <p:ph type="ftr" idx="1"/>
           </p:nvPr>
         </p:nvSpPr>
         <p:spPr/>
@@ -250,14 +244,14 @@
             <a:spLocks noGrp="1"/>
           </p:cNvSpPr>
           <p:nvPr>
-            <p:ph type="sldNum" idx="3"/>
-          </p:nvPr>
-        </p:nvSpPr>
-        <p:spPr/>
-        <p:txBody>
-          <a:bodyPr/>
-          <a:p>
-            <a:fld id="{9715DEF6-1ED2-4D29-B632-72A4B9B7D7E3}" type="slidenum">
+            <p:ph type="sldNum" idx="2"/>
+          </p:nvPr>
+        </p:nvSpPr>
+        <p:spPr/>
+        <p:txBody>
+          <a:bodyPr/>
+          <a:p>
+            <a:fld id="{1B020310-6CE1-4F4F-9351-49C61E3ED40A}" type="slidenum">
               <a:t>&lt;#&gt;</a:t>
             </a:fld>
           </a:p>
@@ -270,7 +264,7 @@
             <a:spLocks noGrp="1"/>
           </p:cNvSpPr>
           <p:nvPr>
-            <p:ph type="dt" idx="1"/>
+            <p:ph type="dt" idx="3"/>
           </p:nvPr>
         </p:nvSpPr>
         <p:spPr/>
@@ -319,7 +313,7 @@
         <p:spPr>
           <a:xfrm>
             <a:off x="1920240" y="11361960"/>
-            <a:ext cx="21762360" cy="7840080"/>
+            <a:ext cx="21762000" cy="7839720"/>
           </a:xfrm>
           <a:prstGeom prst="rect">
             <a:avLst/>
@@ -334,11 +328,11 @@
             <a:noAutofit/>
           </a:bodyPr>
           <a:p>
-            <a:endParaRPr b="0" lang="en-US" sz="8190" spc="-1" strike="noStrike">
-              <a:solidFill>
-                <a:srgbClr val="000000"/>
-              </a:solidFill>
-              <a:latin typeface="Calibri"/>
+            <a:pPr algn="ctr">
+              <a:buNone/>
+            </a:pPr>
+            <a:endParaRPr b="0" lang="en-US" sz="4400" spc="-1" strike="noStrike">
+              <a:latin typeface="Arial"/>
             </a:endParaRPr>
           </a:p>
         </p:txBody>
@@ -355,7 +349,7 @@
         </p:nvSpPr>
         <p:spPr>
           <a:xfrm>
-            <a:off x="1280160" y="8558280"/>
+            <a:off x="1280160" y="8558640"/>
             <a:ext cx="11244600" cy="10118520"/>
           </a:xfrm>
           <a:prstGeom prst="rect">
@@ -371,11 +365,8 @@
             <a:normAutofit/>
           </a:bodyPr>
           <a:p>
-            <a:endParaRPr b="0" lang="en-US" sz="15789" spc="-1" strike="noStrike">
-              <a:solidFill>
-                <a:srgbClr val="000000"/>
-              </a:solidFill>
-              <a:latin typeface="Calibri"/>
+            <a:endParaRPr b="0" lang="en-US" sz="3200" spc="-1" strike="noStrike">
+              <a:latin typeface="Arial"/>
             </a:endParaRPr>
           </a:p>
         </p:txBody>
@@ -392,7 +383,7 @@
         </p:nvSpPr>
         <p:spPr>
           <a:xfrm>
-            <a:off x="13087440" y="8558280"/>
+            <a:off x="13087440" y="8558640"/>
             <a:ext cx="11244600" cy="10118520"/>
           </a:xfrm>
           <a:prstGeom prst="rect">
@@ -408,11 +399,8 @@
             <a:normAutofit/>
           </a:bodyPr>
           <a:p>
-            <a:endParaRPr b="0" lang="en-US" sz="15789" spc="-1" strike="noStrike">
-              <a:solidFill>
-                <a:srgbClr val="000000"/>
-              </a:solidFill>
-              <a:latin typeface="Calibri"/>
+            <a:endParaRPr b="0" lang="en-US" sz="3200" spc="-1" strike="noStrike">
+              <a:latin typeface="Arial"/>
             </a:endParaRPr>
           </a:p>
         </p:txBody>
@@ -429,7 +417,7 @@
         </p:nvSpPr>
         <p:spPr>
           <a:xfrm>
-            <a:off x="1280160" y="19638360"/>
+            <a:off x="1280160" y="19638720"/>
             <a:ext cx="11244600" cy="10118520"/>
           </a:xfrm>
           <a:prstGeom prst="rect">
@@ -445,11 +433,8 @@
             <a:normAutofit/>
           </a:bodyPr>
           <a:p>
-            <a:endParaRPr b="0" lang="en-US" sz="15789" spc="-1" strike="noStrike">
-              <a:solidFill>
-                <a:srgbClr val="000000"/>
-              </a:solidFill>
-              <a:latin typeface="Calibri"/>
+            <a:endParaRPr b="0" lang="en-US" sz="3200" spc="-1" strike="noStrike">
+              <a:latin typeface="Arial"/>
             </a:endParaRPr>
           </a:p>
         </p:txBody>
@@ -466,7 +451,7 @@
         </p:nvSpPr>
         <p:spPr>
           <a:xfrm>
-            <a:off x="13087440" y="19638360"/>
+            <a:off x="13087440" y="19638720"/>
             <a:ext cx="11244600" cy="10118520"/>
           </a:xfrm>
           <a:prstGeom prst="rect">
@@ -482,11 +467,8 @@
             <a:normAutofit/>
           </a:bodyPr>
           <a:p>
-            <a:endParaRPr b="0" lang="en-US" sz="15789" spc="-1" strike="noStrike">
-              <a:solidFill>
-                <a:srgbClr val="000000"/>
-              </a:solidFill>
-              <a:latin typeface="Calibri"/>
+            <a:endParaRPr b="0" lang="en-US" sz="3200" spc="-1" strike="noStrike">
+              <a:latin typeface="Arial"/>
             </a:endParaRPr>
           </a:p>
         </p:txBody>
@@ -498,7 +480,7 @@
             <a:spLocks noGrp="1"/>
           </p:cNvSpPr>
           <p:nvPr>
-            <p:ph type="ftr" idx="2"/>
+            <p:ph type="ftr" idx="1"/>
           </p:nvPr>
         </p:nvSpPr>
         <p:spPr/>
@@ -518,14 +500,14 @@
             <a:spLocks noGrp="1"/>
           </p:cNvSpPr>
           <p:nvPr>
-            <p:ph type="sldNum" idx="3"/>
-          </p:nvPr>
-        </p:nvSpPr>
-        <p:spPr/>
-        <p:txBody>
-          <a:bodyPr/>
-          <a:p>
-            <a:fld id="{6EFBCA13-AC2C-4479-8C37-8749693C7E48}" type="slidenum">
+            <p:ph type="sldNum" idx="2"/>
+          </p:nvPr>
+        </p:nvSpPr>
+        <p:spPr/>
+        <p:txBody>
+          <a:bodyPr/>
+          <a:p>
+            <a:fld id="{921E1758-B432-46D6-A859-57EA75A73E9C}" type="slidenum">
               <a:t>&lt;#&gt;</a:t>
             </a:fld>
           </a:p>
@@ -538,7 +520,7 @@
             <a:spLocks noGrp="1"/>
           </p:cNvSpPr>
           <p:nvPr>
-            <p:ph type="dt" idx="1"/>
+            <p:ph type="dt" idx="3"/>
           </p:nvPr>
         </p:nvSpPr>
         <p:spPr/>
@@ -587,7 +569,7 @@
         <p:spPr>
           <a:xfrm>
             <a:off x="1920240" y="11361960"/>
-            <a:ext cx="21762360" cy="7840080"/>
+            <a:ext cx="21762000" cy="7839720"/>
           </a:xfrm>
           <a:prstGeom prst="rect">
             <a:avLst/>
@@ -602,11 +584,11 @@
             <a:noAutofit/>
           </a:bodyPr>
           <a:p>
-            <a:endParaRPr b="0" lang="en-US" sz="8190" spc="-1" strike="noStrike">
-              <a:solidFill>
-                <a:srgbClr val="000000"/>
-              </a:solidFill>
-              <a:latin typeface="Calibri"/>
+            <a:pPr algn="ctr">
+              <a:buNone/>
+            </a:pPr>
+            <a:endParaRPr b="0" lang="en-US" sz="4400" spc="-1" strike="noStrike">
+              <a:latin typeface="Arial"/>
             </a:endParaRPr>
           </a:p>
         </p:txBody>
@@ -623,7 +605,7 @@
         </p:nvSpPr>
         <p:spPr>
           <a:xfrm>
-            <a:off x="1280160" y="8558280"/>
+            <a:off x="1280160" y="8558640"/>
             <a:ext cx="7419600" cy="10118520"/>
           </a:xfrm>
           <a:prstGeom prst="rect">
@@ -639,11 +621,8 @@
             <a:normAutofit/>
           </a:bodyPr>
           <a:p>
-            <a:endParaRPr b="0" lang="en-US" sz="15789" spc="-1" strike="noStrike">
-              <a:solidFill>
-                <a:srgbClr val="000000"/>
-              </a:solidFill>
-              <a:latin typeface="Calibri"/>
+            <a:endParaRPr b="0" lang="en-US" sz="3200" spc="-1" strike="noStrike">
+              <a:latin typeface="Arial"/>
             </a:endParaRPr>
           </a:p>
         </p:txBody>
@@ -660,7 +639,7 @@
         </p:nvSpPr>
         <p:spPr>
           <a:xfrm>
-            <a:off x="9071280" y="8558280"/>
+            <a:off x="9071280" y="8558640"/>
             <a:ext cx="7419600" cy="10118520"/>
           </a:xfrm>
           <a:prstGeom prst="rect">
@@ -676,11 +655,8 @@
             <a:normAutofit/>
           </a:bodyPr>
           <a:p>
-            <a:endParaRPr b="0" lang="en-US" sz="15789" spc="-1" strike="noStrike">
-              <a:solidFill>
-                <a:srgbClr val="000000"/>
-              </a:solidFill>
-              <a:latin typeface="Calibri"/>
+            <a:endParaRPr b="0" lang="en-US" sz="3200" spc="-1" strike="noStrike">
+              <a:latin typeface="Arial"/>
             </a:endParaRPr>
           </a:p>
         </p:txBody>
@@ -697,7 +673,7 @@
         </p:nvSpPr>
         <p:spPr>
           <a:xfrm>
-            <a:off x="16862040" y="8558280"/>
+            <a:off x="16862040" y="8558640"/>
             <a:ext cx="7419600" cy="10118520"/>
           </a:xfrm>
           <a:prstGeom prst="rect">
@@ -713,11 +689,8 @@
             <a:normAutofit/>
           </a:bodyPr>
           <a:p>
-            <a:endParaRPr b="0" lang="en-US" sz="15789" spc="-1" strike="noStrike">
-              <a:solidFill>
-                <a:srgbClr val="000000"/>
-              </a:solidFill>
-              <a:latin typeface="Calibri"/>
+            <a:endParaRPr b="0" lang="en-US" sz="3200" spc="-1" strike="noStrike">
+              <a:latin typeface="Arial"/>
             </a:endParaRPr>
           </a:p>
         </p:txBody>
@@ -734,7 +707,7 @@
         </p:nvSpPr>
         <p:spPr>
           <a:xfrm>
-            <a:off x="1280160" y="19638360"/>
+            <a:off x="1280160" y="19638720"/>
             <a:ext cx="7419600" cy="10118520"/>
           </a:xfrm>
           <a:prstGeom prst="rect">
@@ -750,11 +723,8 @@
             <a:normAutofit/>
           </a:bodyPr>
           <a:p>
-            <a:endParaRPr b="0" lang="en-US" sz="15789" spc="-1" strike="noStrike">
-              <a:solidFill>
-                <a:srgbClr val="000000"/>
-              </a:solidFill>
-              <a:latin typeface="Calibri"/>
+            <a:endParaRPr b="0" lang="en-US" sz="3200" spc="-1" strike="noStrike">
+              <a:latin typeface="Arial"/>
             </a:endParaRPr>
           </a:p>
         </p:txBody>
@@ -771,7 +741,7 @@
         </p:nvSpPr>
         <p:spPr>
           <a:xfrm>
-            <a:off x="9071280" y="19638360"/>
+            <a:off x="9071280" y="19638720"/>
             <a:ext cx="7419600" cy="10118520"/>
           </a:xfrm>
           <a:prstGeom prst="rect">
@@ -787,11 +757,8 @@
             <a:normAutofit/>
           </a:bodyPr>
           <a:p>
-            <a:endParaRPr b="0" lang="en-US" sz="15789" spc="-1" strike="noStrike">
-              <a:solidFill>
-                <a:srgbClr val="000000"/>
-              </a:solidFill>
-              <a:latin typeface="Calibri"/>
+            <a:endParaRPr b="0" lang="en-US" sz="3200" spc="-1" strike="noStrike">
+              <a:latin typeface="Arial"/>
             </a:endParaRPr>
           </a:p>
         </p:txBody>
@@ -808,7 +775,7 @@
         </p:nvSpPr>
         <p:spPr>
           <a:xfrm>
-            <a:off x="16862040" y="19638360"/>
+            <a:off x="16862040" y="19638720"/>
             <a:ext cx="7419600" cy="10118520"/>
           </a:xfrm>
           <a:prstGeom prst="rect">
@@ -824,11 +791,8 @@
             <a:normAutofit/>
           </a:bodyPr>
           <a:p>
-            <a:endParaRPr b="0" lang="en-US" sz="15789" spc="-1" strike="noStrike">
-              <a:solidFill>
-                <a:srgbClr val="000000"/>
-              </a:solidFill>
-              <a:latin typeface="Calibri"/>
+            <a:endParaRPr b="0" lang="en-US" sz="3200" spc="-1" strike="noStrike">
+              <a:latin typeface="Arial"/>
             </a:endParaRPr>
           </a:p>
         </p:txBody>
@@ -840,7 +804,7 @@
             <a:spLocks noGrp="1"/>
           </p:cNvSpPr>
           <p:nvPr>
-            <p:ph type="ftr" idx="2"/>
+            <p:ph type="ftr" idx="1"/>
           </p:nvPr>
         </p:nvSpPr>
         <p:spPr/>
@@ -860,14 +824,14 @@
             <a:spLocks noGrp="1"/>
           </p:cNvSpPr>
           <p:nvPr>
-            <p:ph type="sldNum" idx="3"/>
-          </p:nvPr>
-        </p:nvSpPr>
-        <p:spPr/>
-        <p:txBody>
-          <a:bodyPr/>
-          <a:p>
-            <a:fld id="{C900DB75-965A-4B95-A8E0-2B20F7BDB1DA}" type="slidenum">
+            <p:ph type="sldNum" idx="2"/>
+          </p:nvPr>
+        </p:nvSpPr>
+        <p:spPr/>
+        <p:txBody>
+          <a:bodyPr/>
+          <a:p>
+            <a:fld id="{7E590C8E-0F9C-404D-BC61-E5C2AB2F5748}" type="slidenum">
               <a:t>&lt;#&gt;</a:t>
             </a:fld>
           </a:p>
@@ -880,7 +844,7 @@
             <a:spLocks noGrp="1"/>
           </p:cNvSpPr>
           <p:nvPr>
-            <p:ph type="dt" idx="1"/>
+            <p:ph type="dt" idx="3"/>
           </p:nvPr>
         </p:nvSpPr>
         <p:spPr/>
@@ -929,7 +893,7 @@
         <p:spPr>
           <a:xfrm>
             <a:off x="1920240" y="11361960"/>
-            <a:ext cx="21762360" cy="7840080"/>
+            <a:ext cx="21762000" cy="7839720"/>
           </a:xfrm>
           <a:prstGeom prst="rect">
             <a:avLst/>
@@ -944,11 +908,11 @@
             <a:noAutofit/>
           </a:bodyPr>
           <a:p>
-            <a:endParaRPr b="0" lang="en-US" sz="8190" spc="-1" strike="noStrike">
-              <a:solidFill>
-                <a:srgbClr val="000000"/>
-              </a:solidFill>
-              <a:latin typeface="Calibri"/>
+            <a:pPr algn="ctr">
+              <a:buNone/>
+            </a:pPr>
+            <a:endParaRPr b="0" lang="en-US" sz="4400" spc="-1" strike="noStrike">
+              <a:latin typeface="Arial"/>
             </a:endParaRPr>
           </a:p>
         </p:txBody>
@@ -965,7 +929,7 @@
         </p:nvSpPr>
         <p:spPr>
           <a:xfrm>
-            <a:off x="1280160" y="8558280"/>
+            <a:off x="1280160" y="8558640"/>
             <a:ext cx="23042520" cy="21213360"/>
           </a:xfrm>
           <a:prstGeom prst="rect">
@@ -997,7 +961,7 @@
             <a:spLocks noGrp="1"/>
           </p:cNvSpPr>
           <p:nvPr>
-            <p:ph type="ftr" idx="2"/>
+            <p:ph type="ftr" idx="1"/>
           </p:nvPr>
         </p:nvSpPr>
         <p:spPr/>
@@ -1017,14 +981,14 @@
             <a:spLocks noGrp="1"/>
           </p:cNvSpPr>
           <p:nvPr>
-            <p:ph type="sldNum" idx="3"/>
-          </p:nvPr>
-        </p:nvSpPr>
-        <p:spPr/>
-        <p:txBody>
-          <a:bodyPr/>
-          <a:p>
-            <a:fld id="{1904763E-DBB1-4D00-B04F-0A99F4270A9B}" type="slidenum">
+            <p:ph type="sldNum" idx="2"/>
+          </p:nvPr>
+        </p:nvSpPr>
+        <p:spPr/>
+        <p:txBody>
+          <a:bodyPr/>
+          <a:p>
+            <a:fld id="{EE5AAB6A-EEFA-44F4-AEFE-8B80E1E3B610}" type="slidenum">
               <a:t>&lt;#&gt;</a:t>
             </a:fld>
           </a:p>
@@ -1037,7 +1001,7 @@
             <a:spLocks noGrp="1"/>
           </p:cNvSpPr>
           <p:nvPr>
-            <p:ph type="dt" idx="1"/>
+            <p:ph type="dt" idx="3"/>
           </p:nvPr>
         </p:nvSpPr>
         <p:spPr/>
@@ -1086,7 +1050,7 @@
         <p:spPr>
           <a:xfrm>
             <a:off x="1920240" y="11361960"/>
-            <a:ext cx="21762360" cy="7840080"/>
+            <a:ext cx="21762000" cy="7839720"/>
           </a:xfrm>
           <a:prstGeom prst="rect">
             <a:avLst/>
@@ -1101,11 +1065,11 @@
             <a:noAutofit/>
           </a:bodyPr>
           <a:p>
-            <a:endParaRPr b="0" lang="en-US" sz="8190" spc="-1" strike="noStrike">
-              <a:solidFill>
-                <a:srgbClr val="000000"/>
-              </a:solidFill>
-              <a:latin typeface="Calibri"/>
+            <a:pPr algn="ctr">
+              <a:buNone/>
+            </a:pPr>
+            <a:endParaRPr b="0" lang="en-US" sz="4400" spc="-1" strike="noStrike">
+              <a:latin typeface="Arial"/>
             </a:endParaRPr>
           </a:p>
         </p:txBody>
@@ -1122,7 +1086,7 @@
         </p:nvSpPr>
         <p:spPr>
           <a:xfrm>
-            <a:off x="1280160" y="8558280"/>
+            <a:off x="1280160" y="8558640"/>
             <a:ext cx="23042520" cy="21213360"/>
           </a:xfrm>
           <a:prstGeom prst="rect">
@@ -1138,11 +1102,8 @@
             <a:normAutofit/>
           </a:bodyPr>
           <a:p>
-            <a:endParaRPr b="0" lang="en-US" sz="15789" spc="-1" strike="noStrike">
-              <a:solidFill>
-                <a:srgbClr val="000000"/>
-              </a:solidFill>
-              <a:latin typeface="Calibri"/>
+            <a:endParaRPr b="0" lang="en-US" sz="3200" spc="-1" strike="noStrike">
+              <a:latin typeface="Arial"/>
             </a:endParaRPr>
           </a:p>
         </p:txBody>
@@ -1154,7 +1115,7 @@
             <a:spLocks noGrp="1"/>
           </p:cNvSpPr>
           <p:nvPr>
-            <p:ph type="ftr" idx="2"/>
+            <p:ph type="ftr" idx="1"/>
           </p:nvPr>
         </p:nvSpPr>
         <p:spPr/>
@@ -1174,14 +1135,14 @@
             <a:spLocks noGrp="1"/>
           </p:cNvSpPr>
           <p:nvPr>
-            <p:ph type="sldNum" idx="3"/>
-          </p:nvPr>
-        </p:nvSpPr>
-        <p:spPr/>
-        <p:txBody>
-          <a:bodyPr/>
-          <a:p>
-            <a:fld id="{2B47B90C-A588-442E-AC18-BCF2F75EC329}" type="slidenum">
+            <p:ph type="sldNum" idx="2"/>
+          </p:nvPr>
+        </p:nvSpPr>
+        <p:spPr/>
+        <p:txBody>
+          <a:bodyPr/>
+          <a:p>
+            <a:fld id="{71B3D6D9-BD7E-4996-8CA6-297DB879AB79}" type="slidenum">
               <a:t>&lt;#&gt;</a:t>
             </a:fld>
           </a:p>
@@ -1194,7 +1155,7 @@
             <a:spLocks noGrp="1"/>
           </p:cNvSpPr>
           <p:nvPr>
-            <p:ph type="dt" idx="1"/>
+            <p:ph type="dt" idx="3"/>
           </p:nvPr>
         </p:nvSpPr>
         <p:spPr/>
@@ -1243,7 +1204,7 @@
         <p:spPr>
           <a:xfrm>
             <a:off x="1920240" y="11361960"/>
-            <a:ext cx="21762360" cy="7840080"/>
+            <a:ext cx="21762000" cy="7839720"/>
           </a:xfrm>
           <a:prstGeom prst="rect">
             <a:avLst/>
@@ -1258,11 +1219,11 @@
             <a:noAutofit/>
           </a:bodyPr>
           <a:p>
-            <a:endParaRPr b="0" lang="en-US" sz="8190" spc="-1" strike="noStrike">
-              <a:solidFill>
-                <a:srgbClr val="000000"/>
-              </a:solidFill>
-              <a:latin typeface="Calibri"/>
+            <a:pPr algn="ctr">
+              <a:buNone/>
+            </a:pPr>
+            <a:endParaRPr b="0" lang="en-US" sz="4400" spc="-1" strike="noStrike">
+              <a:latin typeface="Arial"/>
             </a:endParaRPr>
           </a:p>
         </p:txBody>
@@ -1279,7 +1240,7 @@
         </p:nvSpPr>
         <p:spPr>
           <a:xfrm>
-            <a:off x="1280160" y="8558280"/>
+            <a:off x="1280160" y="8558640"/>
             <a:ext cx="11244600" cy="21213360"/>
           </a:xfrm>
           <a:prstGeom prst="rect">
@@ -1295,11 +1256,8 @@
             <a:normAutofit/>
           </a:bodyPr>
           <a:p>
-            <a:endParaRPr b="0" lang="en-US" sz="15789" spc="-1" strike="noStrike">
-              <a:solidFill>
-                <a:srgbClr val="000000"/>
-              </a:solidFill>
-              <a:latin typeface="Calibri"/>
+            <a:endParaRPr b="0" lang="en-US" sz="3200" spc="-1" strike="noStrike">
+              <a:latin typeface="Arial"/>
             </a:endParaRPr>
           </a:p>
         </p:txBody>
@@ -1316,7 +1274,7 @@
         </p:nvSpPr>
         <p:spPr>
           <a:xfrm>
-            <a:off x="13087440" y="8558280"/>
+            <a:off x="13087440" y="8558640"/>
             <a:ext cx="11244600" cy="21213360"/>
           </a:xfrm>
           <a:prstGeom prst="rect">
@@ -1332,11 +1290,8 @@
             <a:normAutofit/>
           </a:bodyPr>
           <a:p>
-            <a:endParaRPr b="0" lang="en-US" sz="15789" spc="-1" strike="noStrike">
-              <a:solidFill>
-                <a:srgbClr val="000000"/>
-              </a:solidFill>
-              <a:latin typeface="Calibri"/>
+            <a:endParaRPr b="0" lang="en-US" sz="3200" spc="-1" strike="noStrike">
+              <a:latin typeface="Arial"/>
             </a:endParaRPr>
           </a:p>
         </p:txBody>
@@ -1348,7 +1303,7 @@
             <a:spLocks noGrp="1"/>
           </p:cNvSpPr>
           <p:nvPr>
-            <p:ph type="ftr" idx="2"/>
+            <p:ph type="ftr" idx="1"/>
           </p:nvPr>
         </p:nvSpPr>
         <p:spPr/>
@@ -1368,14 +1323,14 @@
             <a:spLocks noGrp="1"/>
           </p:cNvSpPr>
           <p:nvPr>
-            <p:ph type="sldNum" idx="3"/>
-          </p:nvPr>
-        </p:nvSpPr>
-        <p:spPr/>
-        <p:txBody>
-          <a:bodyPr/>
-          <a:p>
-            <a:fld id="{B24E09EF-DA6D-4F2A-9C9C-9C5835C0062D}" type="slidenum">
+            <p:ph type="sldNum" idx="2"/>
+          </p:nvPr>
+        </p:nvSpPr>
+        <p:spPr/>
+        <p:txBody>
+          <a:bodyPr/>
+          <a:p>
+            <a:fld id="{A2C3E2A8-4432-40BD-ABB7-DC07DEF6DAA3}" type="slidenum">
               <a:t>&lt;#&gt;</a:t>
             </a:fld>
           </a:p>
@@ -1388,7 +1343,7 @@
             <a:spLocks noGrp="1"/>
           </p:cNvSpPr>
           <p:nvPr>
-            <p:ph type="dt" idx="1"/>
+            <p:ph type="dt" idx="3"/>
           </p:nvPr>
         </p:nvSpPr>
         <p:spPr/>
@@ -1437,7 +1392,7 @@
         <p:spPr>
           <a:xfrm>
             <a:off x="1920240" y="11361960"/>
-            <a:ext cx="21762360" cy="7840080"/>
+            <a:ext cx="21762000" cy="7839720"/>
           </a:xfrm>
           <a:prstGeom prst="rect">
             <a:avLst/>
@@ -1452,11 +1407,11 @@
             <a:noAutofit/>
           </a:bodyPr>
           <a:p>
-            <a:endParaRPr b="0" lang="en-US" sz="8190" spc="-1" strike="noStrike">
-              <a:solidFill>
-                <a:srgbClr val="000000"/>
-              </a:solidFill>
-              <a:latin typeface="Calibri"/>
+            <a:pPr algn="ctr">
+              <a:buNone/>
+            </a:pPr>
+            <a:endParaRPr b="0" lang="en-US" sz="4400" spc="-1" strike="noStrike">
+              <a:latin typeface="Arial"/>
             </a:endParaRPr>
           </a:p>
         </p:txBody>
@@ -1468,7 +1423,7 @@
             <a:spLocks noGrp="1"/>
           </p:cNvSpPr>
           <p:nvPr>
-            <p:ph type="ftr" idx="2"/>
+            <p:ph type="ftr" idx="1"/>
           </p:nvPr>
         </p:nvSpPr>
         <p:spPr/>
@@ -1488,14 +1443,14 @@
             <a:spLocks noGrp="1"/>
           </p:cNvSpPr>
           <p:nvPr>
-            <p:ph type="sldNum" idx="3"/>
-          </p:nvPr>
-        </p:nvSpPr>
-        <p:spPr/>
-        <p:txBody>
-          <a:bodyPr/>
-          <a:p>
-            <a:fld id="{FE5D2755-A065-4359-913F-2C563130C4E6}" type="slidenum">
+            <p:ph type="sldNum" idx="2"/>
+          </p:nvPr>
+        </p:nvSpPr>
+        <p:spPr/>
+        <p:txBody>
+          <a:bodyPr/>
+          <a:p>
+            <a:fld id="{947C7BD5-8A61-4A05-9C1E-ED90FC69404A}" type="slidenum">
               <a:t>&lt;#&gt;</a:t>
             </a:fld>
           </a:p>
@@ -1508,7 +1463,7 @@
             <a:spLocks noGrp="1"/>
           </p:cNvSpPr>
           <p:nvPr>
-            <p:ph type="dt" idx="1"/>
+            <p:ph type="dt" idx="3"/>
           </p:nvPr>
         </p:nvSpPr>
         <p:spPr/>
@@ -1557,7 +1512,7 @@
         <p:spPr>
           <a:xfrm>
             <a:off x="1920240" y="11361960"/>
-            <a:ext cx="21762360" cy="36343080"/>
+            <a:ext cx="21762000" cy="36341640"/>
           </a:xfrm>
           <a:prstGeom prst="rect">
             <a:avLst/>
@@ -1588,7 +1543,7 @@
             <a:spLocks noGrp="1"/>
           </p:cNvSpPr>
           <p:nvPr>
-            <p:ph type="ftr" idx="2"/>
+            <p:ph type="ftr" idx="1"/>
           </p:nvPr>
         </p:nvSpPr>
         <p:spPr/>
@@ -1608,14 +1563,14 @@
             <a:spLocks noGrp="1"/>
           </p:cNvSpPr>
           <p:nvPr>
-            <p:ph type="sldNum" idx="3"/>
-          </p:nvPr>
-        </p:nvSpPr>
-        <p:spPr/>
-        <p:txBody>
-          <a:bodyPr/>
-          <a:p>
-            <a:fld id="{C2640780-4EA7-4B95-B881-28A4CAB57ABA}" type="slidenum">
+            <p:ph type="sldNum" idx="2"/>
+          </p:nvPr>
+        </p:nvSpPr>
+        <p:spPr/>
+        <p:txBody>
+          <a:bodyPr/>
+          <a:p>
+            <a:fld id="{6EFE0D7C-30AB-492B-B17F-6A26D4F5FC92}" type="slidenum">
               <a:t>&lt;#&gt;</a:t>
             </a:fld>
           </a:p>
@@ -1628,7 +1583,7 @@
             <a:spLocks noGrp="1"/>
           </p:cNvSpPr>
           <p:nvPr>
-            <p:ph type="dt" idx="1"/>
+            <p:ph type="dt" idx="3"/>
           </p:nvPr>
         </p:nvSpPr>
         <p:spPr/>
@@ -1677,7 +1632,7 @@
         <p:spPr>
           <a:xfrm>
             <a:off x="1920240" y="11361960"/>
-            <a:ext cx="21762360" cy="7840080"/>
+            <a:ext cx="21762000" cy="7839720"/>
           </a:xfrm>
           <a:prstGeom prst="rect">
             <a:avLst/>
@@ -1692,11 +1647,11 @@
             <a:noAutofit/>
           </a:bodyPr>
           <a:p>
-            <a:endParaRPr b="0" lang="en-US" sz="8190" spc="-1" strike="noStrike">
-              <a:solidFill>
-                <a:srgbClr val="000000"/>
-              </a:solidFill>
-              <a:latin typeface="Calibri"/>
+            <a:pPr algn="ctr">
+              <a:buNone/>
+            </a:pPr>
+            <a:endParaRPr b="0" lang="en-US" sz="4400" spc="-1" strike="noStrike">
+              <a:latin typeface="Arial"/>
             </a:endParaRPr>
           </a:p>
         </p:txBody>
@@ -1713,7 +1668,7 @@
         </p:nvSpPr>
         <p:spPr>
           <a:xfrm>
-            <a:off x="1280160" y="8558280"/>
+            <a:off x="1280160" y="8558640"/>
             <a:ext cx="11244600" cy="10118520"/>
           </a:xfrm>
           <a:prstGeom prst="rect">
@@ -1729,11 +1684,8 @@
             <a:normAutofit/>
           </a:bodyPr>
           <a:p>
-            <a:endParaRPr b="0" lang="en-US" sz="15789" spc="-1" strike="noStrike">
-              <a:solidFill>
-                <a:srgbClr val="000000"/>
-              </a:solidFill>
-              <a:latin typeface="Calibri"/>
+            <a:endParaRPr b="0" lang="en-US" sz="3200" spc="-1" strike="noStrike">
+              <a:latin typeface="Arial"/>
             </a:endParaRPr>
           </a:p>
         </p:txBody>
@@ -1750,7 +1702,7 @@
         </p:nvSpPr>
         <p:spPr>
           <a:xfrm>
-            <a:off x="13087440" y="8558280"/>
+            <a:off x="13087440" y="8558640"/>
             <a:ext cx="11244600" cy="21213360"/>
           </a:xfrm>
           <a:prstGeom prst="rect">
@@ -1766,11 +1718,8 @@
             <a:normAutofit/>
           </a:bodyPr>
           <a:p>
-            <a:endParaRPr b="0" lang="en-US" sz="15789" spc="-1" strike="noStrike">
-              <a:solidFill>
-                <a:srgbClr val="000000"/>
-              </a:solidFill>
-              <a:latin typeface="Calibri"/>
+            <a:endParaRPr b="0" lang="en-US" sz="3200" spc="-1" strike="noStrike">
+              <a:latin typeface="Arial"/>
             </a:endParaRPr>
           </a:p>
         </p:txBody>
@@ -1787,7 +1736,7 @@
         </p:nvSpPr>
         <p:spPr>
           <a:xfrm>
-            <a:off x="1280160" y="19638360"/>
+            <a:off x="1280160" y="19638720"/>
             <a:ext cx="11244600" cy="10118520"/>
           </a:xfrm>
           <a:prstGeom prst="rect">
@@ -1803,11 +1752,8 @@
             <a:normAutofit/>
           </a:bodyPr>
           <a:p>
-            <a:endParaRPr b="0" lang="en-US" sz="15789" spc="-1" strike="noStrike">
-              <a:solidFill>
-                <a:srgbClr val="000000"/>
-              </a:solidFill>
-              <a:latin typeface="Calibri"/>
+            <a:endParaRPr b="0" lang="en-US" sz="3200" spc="-1" strike="noStrike">
+              <a:latin typeface="Arial"/>
             </a:endParaRPr>
           </a:p>
         </p:txBody>
@@ -1819,7 +1765,7 @@
             <a:spLocks noGrp="1"/>
           </p:cNvSpPr>
           <p:nvPr>
-            <p:ph type="ftr" idx="2"/>
+            <p:ph type="ftr" idx="1"/>
           </p:nvPr>
         </p:nvSpPr>
         <p:spPr/>
@@ -1839,14 +1785,14 @@
             <a:spLocks noGrp="1"/>
           </p:cNvSpPr>
           <p:nvPr>
-            <p:ph type="sldNum" idx="3"/>
-          </p:nvPr>
-        </p:nvSpPr>
-        <p:spPr/>
-        <p:txBody>
-          <a:bodyPr/>
-          <a:p>
-            <a:fld id="{F1CF1C27-398E-447E-A247-40382F0C6618}" type="slidenum">
+            <p:ph type="sldNum" idx="2"/>
+          </p:nvPr>
+        </p:nvSpPr>
+        <p:spPr/>
+        <p:txBody>
+          <a:bodyPr/>
+          <a:p>
+            <a:fld id="{F0095052-D0AE-46D6-948A-EAE81AD9DAB5}" type="slidenum">
               <a:t>&lt;#&gt;</a:t>
             </a:fld>
           </a:p>
@@ -1859,7 +1805,7 @@
             <a:spLocks noGrp="1"/>
           </p:cNvSpPr>
           <p:nvPr>
-            <p:ph type="dt" idx="1"/>
+            <p:ph type="dt" idx="3"/>
           </p:nvPr>
         </p:nvSpPr>
         <p:spPr/>
@@ -1908,7 +1854,7 @@
         <p:spPr>
           <a:xfrm>
             <a:off x="1920240" y="11361960"/>
-            <a:ext cx="21762360" cy="7840080"/>
+            <a:ext cx="21762000" cy="7839720"/>
           </a:xfrm>
           <a:prstGeom prst="rect">
             <a:avLst/>
@@ -1923,11 +1869,11 @@
             <a:noAutofit/>
           </a:bodyPr>
           <a:p>
-            <a:endParaRPr b="0" lang="en-US" sz="8190" spc="-1" strike="noStrike">
-              <a:solidFill>
-                <a:srgbClr val="000000"/>
-              </a:solidFill>
-              <a:latin typeface="Calibri"/>
+            <a:pPr algn="ctr">
+              <a:buNone/>
+            </a:pPr>
+            <a:endParaRPr b="0" lang="en-US" sz="4400" spc="-1" strike="noStrike">
+              <a:latin typeface="Arial"/>
             </a:endParaRPr>
           </a:p>
         </p:txBody>
@@ -1944,7 +1890,7 @@
         </p:nvSpPr>
         <p:spPr>
           <a:xfrm>
-            <a:off x="1280160" y="8558280"/>
+            <a:off x="1280160" y="8558640"/>
             <a:ext cx="11244600" cy="21213360"/>
           </a:xfrm>
           <a:prstGeom prst="rect">
@@ -1960,11 +1906,8 @@
             <a:normAutofit/>
           </a:bodyPr>
           <a:p>
-            <a:endParaRPr b="0" lang="en-US" sz="15789" spc="-1" strike="noStrike">
-              <a:solidFill>
-                <a:srgbClr val="000000"/>
-              </a:solidFill>
-              <a:latin typeface="Calibri"/>
+            <a:endParaRPr b="0" lang="en-US" sz="3200" spc="-1" strike="noStrike">
+              <a:latin typeface="Arial"/>
             </a:endParaRPr>
           </a:p>
         </p:txBody>
@@ -1981,7 +1924,7 @@
         </p:nvSpPr>
         <p:spPr>
           <a:xfrm>
-            <a:off x="13087440" y="8558280"/>
+            <a:off x="13087440" y="8558640"/>
             <a:ext cx="11244600" cy="10118520"/>
           </a:xfrm>
           <a:prstGeom prst="rect">
@@ -1997,11 +1940,8 @@
             <a:normAutofit/>
           </a:bodyPr>
           <a:p>
-            <a:endParaRPr b="0" lang="en-US" sz="15789" spc="-1" strike="noStrike">
-              <a:solidFill>
-                <a:srgbClr val="000000"/>
-              </a:solidFill>
-              <a:latin typeface="Calibri"/>
+            <a:endParaRPr b="0" lang="en-US" sz="3200" spc="-1" strike="noStrike">
+              <a:latin typeface="Arial"/>
             </a:endParaRPr>
           </a:p>
         </p:txBody>
@@ -2018,7 +1958,7 @@
         </p:nvSpPr>
         <p:spPr>
           <a:xfrm>
-            <a:off x="13087440" y="19638360"/>
+            <a:off x="13087440" y="19638720"/>
             <a:ext cx="11244600" cy="10118520"/>
           </a:xfrm>
           <a:prstGeom prst="rect">
@@ -2034,11 +1974,8 @@
             <a:normAutofit/>
           </a:bodyPr>
           <a:p>
-            <a:endParaRPr b="0" lang="en-US" sz="15789" spc="-1" strike="noStrike">
-              <a:solidFill>
-                <a:srgbClr val="000000"/>
-              </a:solidFill>
-              <a:latin typeface="Calibri"/>
+            <a:endParaRPr b="0" lang="en-US" sz="3200" spc="-1" strike="noStrike">
+              <a:latin typeface="Arial"/>
             </a:endParaRPr>
           </a:p>
         </p:txBody>
@@ -2050,7 +1987,7 @@
             <a:spLocks noGrp="1"/>
           </p:cNvSpPr>
           <p:nvPr>
-            <p:ph type="ftr" idx="2"/>
+            <p:ph type="ftr" idx="1"/>
           </p:nvPr>
         </p:nvSpPr>
         <p:spPr/>
@@ -2070,14 +2007,14 @@
             <a:spLocks noGrp="1"/>
           </p:cNvSpPr>
           <p:nvPr>
-            <p:ph type="sldNum" idx="3"/>
-          </p:nvPr>
-        </p:nvSpPr>
-        <p:spPr/>
-        <p:txBody>
-          <a:bodyPr/>
-          <a:p>
-            <a:fld id="{6ACA6893-EF8E-4CE9-9830-8059B7F8DA0B}" type="slidenum">
+            <p:ph type="sldNum" idx="2"/>
+          </p:nvPr>
+        </p:nvSpPr>
+        <p:spPr/>
+        <p:txBody>
+          <a:bodyPr/>
+          <a:p>
+            <a:fld id="{2A2C75EE-AB36-4F3C-974E-F1388E339C3F}" type="slidenum">
               <a:t>&lt;#&gt;</a:t>
             </a:fld>
           </a:p>
@@ -2090,7 +2027,7 @@
             <a:spLocks noGrp="1"/>
           </p:cNvSpPr>
           <p:nvPr>
-            <p:ph type="dt" idx="1"/>
+            <p:ph type="dt" idx="3"/>
           </p:nvPr>
         </p:nvSpPr>
         <p:spPr/>
@@ -2139,7 +2076,7 @@
         <p:spPr>
           <a:xfrm>
             <a:off x="1920240" y="11361960"/>
-            <a:ext cx="21762360" cy="7840080"/>
+            <a:ext cx="21762000" cy="7839720"/>
           </a:xfrm>
           <a:prstGeom prst="rect">
             <a:avLst/>
@@ -2154,11 +2091,11 @@
             <a:noAutofit/>
           </a:bodyPr>
           <a:p>
-            <a:endParaRPr b="0" lang="en-US" sz="8190" spc="-1" strike="noStrike">
-              <a:solidFill>
-                <a:srgbClr val="000000"/>
-              </a:solidFill>
-              <a:latin typeface="Calibri"/>
+            <a:pPr algn="ctr">
+              <a:buNone/>
+            </a:pPr>
+            <a:endParaRPr b="0" lang="en-US" sz="4400" spc="-1" strike="noStrike">
+              <a:latin typeface="Arial"/>
             </a:endParaRPr>
           </a:p>
         </p:txBody>
@@ -2175,7 +2112,7 @@
         </p:nvSpPr>
         <p:spPr>
           <a:xfrm>
-            <a:off x="1280160" y="8558280"/>
+            <a:off x="1280160" y="8558640"/>
             <a:ext cx="11244600" cy="10118520"/>
           </a:xfrm>
           <a:prstGeom prst="rect">
@@ -2191,11 +2128,8 @@
             <a:normAutofit/>
           </a:bodyPr>
           <a:p>
-            <a:endParaRPr b="0" lang="en-US" sz="15789" spc="-1" strike="noStrike">
-              <a:solidFill>
-                <a:srgbClr val="000000"/>
-              </a:solidFill>
-              <a:latin typeface="Calibri"/>
+            <a:endParaRPr b="0" lang="en-US" sz="3200" spc="-1" strike="noStrike">
+              <a:latin typeface="Arial"/>
             </a:endParaRPr>
           </a:p>
         </p:txBody>
@@ -2212,7 +2146,7 @@
         </p:nvSpPr>
         <p:spPr>
           <a:xfrm>
-            <a:off x="13087440" y="8558280"/>
+            <a:off x="13087440" y="8558640"/>
             <a:ext cx="11244600" cy="10118520"/>
           </a:xfrm>
           <a:prstGeom prst="rect">
@@ -2228,11 +2162,8 @@
             <a:normAutofit/>
           </a:bodyPr>
           <a:p>
-            <a:endParaRPr b="0" lang="en-US" sz="15789" spc="-1" strike="noStrike">
-              <a:solidFill>
-                <a:srgbClr val="000000"/>
-              </a:solidFill>
-              <a:latin typeface="Calibri"/>
+            <a:endParaRPr b="0" lang="en-US" sz="3200" spc="-1" strike="noStrike">
+              <a:latin typeface="Arial"/>
             </a:endParaRPr>
           </a:p>
         </p:txBody>
@@ -2249,7 +2180,7 @@
         </p:nvSpPr>
         <p:spPr>
           <a:xfrm>
-            <a:off x="1280160" y="19638360"/>
+            <a:off x="1280160" y="19638720"/>
             <a:ext cx="23042520" cy="10118520"/>
           </a:xfrm>
           <a:prstGeom prst="rect">
@@ -2265,11 +2196,8 @@
             <a:normAutofit/>
           </a:bodyPr>
           <a:p>
-            <a:endParaRPr b="0" lang="en-US" sz="15789" spc="-1" strike="noStrike">
-              <a:solidFill>
-                <a:srgbClr val="000000"/>
-              </a:solidFill>
-              <a:latin typeface="Calibri"/>
+            <a:endParaRPr b="0" lang="en-US" sz="3200" spc="-1" strike="noStrike">
+              <a:latin typeface="Arial"/>
             </a:endParaRPr>
           </a:p>
         </p:txBody>
@@ -2281,7 +2209,7 @@
             <a:spLocks noGrp="1"/>
           </p:cNvSpPr>
           <p:nvPr>
-            <p:ph type="ftr" idx="2"/>
+            <p:ph type="ftr" idx="1"/>
           </p:nvPr>
         </p:nvSpPr>
         <p:spPr/>
@@ -2301,14 +2229,14 @@
             <a:spLocks noGrp="1"/>
           </p:cNvSpPr>
           <p:nvPr>
-            <p:ph type="sldNum" idx="3"/>
-          </p:nvPr>
-        </p:nvSpPr>
-        <p:spPr/>
-        <p:txBody>
-          <a:bodyPr/>
-          <a:p>
-            <a:fld id="{B9847E5B-EDD8-4348-AC81-6AADA6351CDB}" type="slidenum">
+            <p:ph type="sldNum" idx="2"/>
+          </p:nvPr>
+        </p:nvSpPr>
+        <p:spPr/>
+        <p:txBody>
+          <a:bodyPr/>
+          <a:p>
+            <a:fld id="{9D1B777B-3470-49E9-8FF8-4B43EA38344A}" type="slidenum">
               <a:t>&lt;#&gt;</a:t>
             </a:fld>
           </a:p>
@@ -2321,7 +2249,7 @@
             <a:spLocks noGrp="1"/>
           </p:cNvSpPr>
           <p:nvPr>
-            <p:ph type="dt" idx="1"/>
+            <p:ph type="dt" idx="3"/>
           </p:nvPr>
         </p:nvSpPr>
         <p:spPr/>
@@ -2377,7 +2305,47 @@
         <p:spPr>
           <a:xfrm>
             <a:off x="1920240" y="11361960"/>
-            <a:ext cx="21762360" cy="7840080"/>
+            <a:ext cx="21762000" cy="7839720"/>
+          </a:xfrm>
+          <a:prstGeom prst="rect">
+            <a:avLst/>
+          </a:prstGeom>
+          <a:noFill/>
+          <a:ln w="0">
+            <a:noFill/>
+          </a:ln>
+        </p:spPr>
+        <p:txBody>
+          <a:bodyPr lIns="0" rIns="0" tIns="0" bIns="0" anchor="ctr">
+            <a:noAutofit/>
+          </a:bodyPr>
+          <a:p>
+            <a:r>
+              <a:rPr b="0" lang="en-US" sz="1800" spc="-1" strike="noStrike">
+                <a:latin typeface="Arial"/>
+              </a:rPr>
+              <a:t>Click to edit the title text format</a:t>
+            </a:r>
+            <a:endParaRPr b="0" lang="en-US" sz="1800" spc="-1" strike="noStrike">
+              <a:latin typeface="Arial"/>
+            </a:endParaRPr>
+          </a:p>
+        </p:txBody>
+      </p:sp>
+      <p:sp>
+        <p:nvSpPr>
+          <p:cNvPr id="1" name="PlaceHolder 2"/>
+          <p:cNvSpPr>
+            <a:spLocks noGrp="1"/>
+          </p:cNvSpPr>
+          <p:nvPr>
+            <p:ph type="ftr" idx="1"/>
+          </p:nvPr>
+        </p:nvSpPr>
+        <p:spPr>
+          <a:xfrm>
+            <a:off x="8747280" y="33900120"/>
+            <a:ext cx="8107200" cy="1946160"/>
           </a:xfrm>
           <a:prstGeom prst="rect">
             <a:avLst/>
@@ -2391,6 +2359,17 @@
           <a:bodyPr lIns="428400" rIns="428400" tIns="214200" bIns="214200" anchor="ctr">
             <a:noAutofit/>
           </a:bodyPr>
+          <a:lstStyle>
+            <a:lvl1pPr algn="ctr">
+              <a:lnSpc>
+                <a:spcPct val="100000"/>
+              </a:lnSpc>
+              <a:buNone/>
+              <a:defRPr b="0" lang="en-US" sz="1400" spc="-1" strike="noStrike">
+                <a:latin typeface="Times New Roman"/>
+              </a:defRPr>
+            </a:lvl1pPr>
+          </a:lstStyle>
           <a:p>
             <a:pPr algn="ctr">
               <a:lnSpc>
@@ -2399,126 +2378,6 @@
               <a:buNone/>
             </a:pPr>
             <a:r>
-              <a:rPr b="0" lang="en-US" sz="20600" spc="-1" strike="noStrike">
-                <a:solidFill>
-                  <a:srgbClr val="000000"/>
-                </a:solidFill>
-                <a:latin typeface="Calibri"/>
-              </a:rPr>
-              <a:t>Click to edit Master title style</a:t>
-            </a:r>
-            <a:endParaRPr b="0" lang="en-US" sz="20600" spc="-1" strike="noStrike">
-              <a:solidFill>
-                <a:srgbClr val="000000"/>
-              </a:solidFill>
-              <a:latin typeface="Calibri"/>
-            </a:endParaRPr>
-          </a:p>
-        </p:txBody>
-      </p:sp>
-      <p:sp>
-        <p:nvSpPr>
-          <p:cNvPr id="1" name="PlaceHolder 2"/>
-          <p:cNvSpPr>
-            <a:spLocks noGrp="1"/>
-          </p:cNvSpPr>
-          <p:nvPr>
-            <p:ph type="dt" idx="1"/>
-          </p:nvPr>
-        </p:nvSpPr>
-        <p:spPr>
-          <a:xfrm>
-            <a:off x="1280160" y="33900120"/>
-            <a:ext cx="5973840" cy="1946520"/>
-          </a:xfrm>
-          <a:prstGeom prst="rect">
-            <a:avLst/>
-          </a:prstGeom>
-          <a:noFill/>
-          <a:ln w="0">
-            <a:noFill/>
-          </a:ln>
-        </p:spPr>
-        <p:txBody>
-          <a:bodyPr lIns="428400" rIns="428400" tIns="214200" bIns="214200" anchor="ctr">
-            <a:noAutofit/>
-          </a:bodyPr>
-          <a:lstStyle>
-            <a:lvl1pPr>
-              <a:lnSpc>
-                <a:spcPct val="100000"/>
-              </a:lnSpc>
-              <a:buNone/>
-              <a:defRPr b="0" lang="en-US" sz="5600" spc="-1" strike="noStrike">
-                <a:solidFill>
-                  <a:srgbClr val="8b8b8b"/>
-                </a:solidFill>
-                <a:latin typeface="Calibri"/>
-              </a:defRPr>
-            </a:lvl1pPr>
-          </a:lstStyle>
-          <a:p>
-            <a:pPr>
-              <a:lnSpc>
-                <a:spcPct val="100000"/>
-              </a:lnSpc>
-              <a:buNone/>
-            </a:pPr>
-            <a:r>
-              <a:rPr b="0" lang="en-US" sz="5600" spc="-1" strike="noStrike">
-                <a:solidFill>
-                  <a:srgbClr val="8b8b8b"/>
-                </a:solidFill>
-                <a:latin typeface="Calibri"/>
-              </a:rPr>
-              <a:t>&lt;date/time&gt;</a:t>
-            </a:r>
-            <a:endParaRPr b="0" lang="en-US" sz="5600" spc="-1" strike="noStrike">
-              <a:latin typeface="Times New Roman"/>
-            </a:endParaRPr>
-          </a:p>
-        </p:txBody>
-      </p:sp>
-      <p:sp>
-        <p:nvSpPr>
-          <p:cNvPr id="2" name="PlaceHolder 3"/>
-          <p:cNvSpPr>
-            <a:spLocks noGrp="1"/>
-          </p:cNvSpPr>
-          <p:nvPr>
-            <p:ph type="ftr" idx="2"/>
-          </p:nvPr>
-        </p:nvSpPr>
-        <p:spPr>
-          <a:xfrm>
-            <a:off x="8747280" y="33900120"/>
-            <a:ext cx="8107560" cy="1946520"/>
-          </a:xfrm>
-          <a:prstGeom prst="rect">
-            <a:avLst/>
-          </a:prstGeom>
-          <a:noFill/>
-          <a:ln w="0">
-            <a:noFill/>
-          </a:ln>
-        </p:spPr>
-        <p:txBody>
-          <a:bodyPr lIns="428400" rIns="428400" tIns="214200" bIns="214200" anchor="ctr">
-            <a:noAutofit/>
-          </a:bodyPr>
-          <a:lstStyle>
-            <a:lvl1pPr algn="ctr">
-              <a:buNone/>
-              <a:defRPr b="0" lang="en-US" sz="1400" spc="-1" strike="noStrike">
-                <a:latin typeface="Times New Roman"/>
-              </a:defRPr>
-            </a:lvl1pPr>
-          </a:lstStyle>
-          <a:p>
-            <a:pPr algn="ctr">
-              <a:buNone/>
-            </a:pPr>
-            <a:r>
               <a:rPr b="0" lang="en-US" sz="1400" spc="-1" strike="noStrike">
                 <a:latin typeface="Times New Roman"/>
               </a:rPr>
@@ -2532,18 +2391,18 @@
       </p:sp>
       <p:sp>
         <p:nvSpPr>
-          <p:cNvPr id="3" name="PlaceHolder 4"/>
-          <p:cNvSpPr>
-            <a:spLocks noGrp="1"/>
-          </p:cNvSpPr>
-          <p:nvPr>
-            <p:ph type="sldNum" idx="3"/>
+          <p:cNvPr id="2" name="PlaceHolder 3"/>
+          <p:cNvSpPr>
+            <a:spLocks noGrp="1"/>
+          </p:cNvSpPr>
+          <p:nvPr>
+            <p:ph type="sldNum" idx="2"/>
           </p:nvPr>
         </p:nvSpPr>
         <p:spPr>
           <a:xfrm>
             <a:off x="18348480" y="33900120"/>
-            <a:ext cx="5973840" cy="1946520"/>
+            <a:ext cx="5973480" cy="1946160"/>
           </a:xfrm>
           <a:prstGeom prst="rect">
             <a:avLst/>
@@ -2578,7 +2437,7 @@
               </a:lnSpc>
               <a:buNone/>
             </a:pPr>
-            <a:fld id="{B9896EDA-0A21-4798-A2E3-A849527B47C3}" type="slidenum">
+            <a:fld id="{4EC2F15B-8FA1-4F39-850A-A613D7A888A0}" type="slidenum">
               <a:rPr b="0" lang="en-US" sz="5600" spc="-1" strike="noStrike">
                 <a:solidFill>
                   <a:srgbClr val="8b8b8b"/>
@@ -2595,6 +2454,53 @@
       </p:sp>
       <p:sp>
         <p:nvSpPr>
+          <p:cNvPr id="3" name="PlaceHolder 4"/>
+          <p:cNvSpPr>
+            <a:spLocks noGrp="1"/>
+          </p:cNvSpPr>
+          <p:nvPr>
+            <p:ph type="dt" idx="3"/>
+          </p:nvPr>
+        </p:nvSpPr>
+        <p:spPr>
+          <a:xfrm>
+            <a:off x="1280160" y="33900120"/>
+            <a:ext cx="5973480" cy="1946160"/>
+          </a:xfrm>
+          <a:prstGeom prst="rect">
+            <a:avLst/>
+          </a:prstGeom>
+          <a:noFill/>
+          <a:ln w="0">
+            <a:noFill/>
+          </a:ln>
+        </p:spPr>
+        <p:txBody>
+          <a:bodyPr lIns="428400" rIns="428400" tIns="214200" bIns="214200" anchor="ctr">
+            <a:noAutofit/>
+          </a:bodyPr>
+          <a:lstStyle>
+            <a:lvl1pPr>
+              <a:defRPr b="0" lang="en-US" sz="1400" spc="-1" strike="noStrike">
+                <a:latin typeface="Times New Roman"/>
+              </a:defRPr>
+            </a:lvl1pPr>
+          </a:lstStyle>
+          <a:p>
+            <a:r>
+              <a:rPr b="0" lang="en-US" sz="1400" spc="-1" strike="noStrike">
+                <a:latin typeface="Times New Roman"/>
+              </a:rPr>
+              <a:t>&lt;date/time&gt;</a:t>
+            </a:r>
+            <a:endParaRPr b="0" lang="en-US" sz="1400" spc="-1" strike="noStrike">
+              <a:latin typeface="Times New Roman"/>
+            </a:endParaRPr>
+          </a:p>
+        </p:txBody>
+      </p:sp>
+      <p:sp>
+        <p:nvSpPr>
           <p:cNvPr id="4" name="PlaceHolder 5"/>
           <p:cNvSpPr>
             <a:spLocks noGrp="1"/>
@@ -2605,7 +2511,7 @@
         </p:nvSpPr>
         <p:spPr>
           <a:xfrm>
-            <a:off x="1280160" y="8558280"/>
+            <a:off x="1280160" y="8558640"/>
             <a:ext cx="23042520" cy="21213360"/>
           </a:xfrm>
           <a:prstGeom prst="rect">
@@ -2623,7 +2529,7 @@
           <a:p>
             <a:pPr marL="432000" indent="-324000">
               <a:spcBef>
-                <a:spcPts val="1491"/>
+                <a:spcPts val="1417"/>
               </a:spcBef>
               <a:buClr>
                 <a:srgbClr val="000000"/>
@@ -2633,25 +2539,19 @@
               <a:buChar char=""/>
             </a:pPr>
             <a:r>
-              <a:rPr b="0" lang="en-US" sz="15789" spc="-1" strike="noStrike">
-                <a:solidFill>
-                  <a:srgbClr val="000000"/>
-                </a:solidFill>
-                <a:latin typeface="Calibri"/>
+              <a:rPr b="0" lang="en-US" sz="3200" spc="-1" strike="noStrike">
+                <a:latin typeface="Arial"/>
               </a:rPr>
               <a:t>Click to edit the outline text format</a:t>
             </a:r>
-            <a:endParaRPr b="0" lang="en-US" sz="15789" spc="-1" strike="noStrike">
-              <a:solidFill>
-                <a:srgbClr val="000000"/>
-              </a:solidFill>
-              <a:latin typeface="Calibri"/>
+            <a:endParaRPr b="0" lang="en-US" sz="3200" spc="-1" strike="noStrike">
+              <a:latin typeface="Arial"/>
             </a:endParaRPr>
           </a:p>
           <a:p>
             <a:pPr lvl="1" marL="864000" indent="-324000">
               <a:spcBef>
-                <a:spcPts val="1191"/>
+                <a:spcPts val="1134"/>
               </a:spcBef>
               <a:buClr>
                 <a:srgbClr val="000000"/>
@@ -2661,25 +2561,19 @@
               <a:buChar char=""/>
             </a:pPr>
             <a:r>
-              <a:rPr b="0" lang="en-US" sz="11790" spc="-1" strike="noStrike">
-                <a:solidFill>
-                  <a:srgbClr val="000000"/>
-                </a:solidFill>
-                <a:latin typeface="Calibri"/>
+              <a:rPr b="0" lang="en-US" sz="2800" spc="-1" strike="noStrike">
+                <a:latin typeface="Arial"/>
               </a:rPr>
               <a:t>Second Outline Level</a:t>
             </a:r>
-            <a:endParaRPr b="0" lang="en-US" sz="11790" spc="-1" strike="noStrike">
-              <a:solidFill>
-                <a:srgbClr val="000000"/>
-              </a:solidFill>
-              <a:latin typeface="Calibri"/>
+            <a:endParaRPr b="0" lang="en-US" sz="2800" spc="-1" strike="noStrike">
+              <a:latin typeface="Arial"/>
             </a:endParaRPr>
           </a:p>
           <a:p>
             <a:pPr lvl="2" marL="1296000" indent="-288000">
               <a:spcBef>
-                <a:spcPts val="893"/>
+                <a:spcPts val="850"/>
               </a:spcBef>
               <a:buClr>
                 <a:srgbClr val="000000"/>
@@ -2689,25 +2583,19 @@
               <a:buChar char=""/>
             </a:pPr>
             <a:r>
-              <a:rPr b="0" lang="en-US" sz="9890" spc="-1" strike="noStrike">
-                <a:solidFill>
-                  <a:srgbClr val="000000"/>
-                </a:solidFill>
-                <a:latin typeface="Calibri"/>
+              <a:rPr b="0" lang="en-US" sz="2400" spc="-1" strike="noStrike">
+                <a:latin typeface="Arial"/>
               </a:rPr>
               <a:t>Third Outline Level</a:t>
             </a:r>
-            <a:endParaRPr b="0" lang="en-US" sz="9890" spc="-1" strike="noStrike">
-              <a:solidFill>
-                <a:srgbClr val="000000"/>
-              </a:solidFill>
-              <a:latin typeface="Calibri"/>
+            <a:endParaRPr b="0" lang="en-US" sz="2400" spc="-1" strike="noStrike">
+              <a:latin typeface="Arial"/>
             </a:endParaRPr>
           </a:p>
           <a:p>
             <a:pPr lvl="3" marL="1728000" indent="-216000">
               <a:spcBef>
-                <a:spcPts val="595"/>
+                <a:spcPts val="567"/>
               </a:spcBef>
               <a:buClr>
                 <a:srgbClr val="000000"/>
@@ -2717,25 +2605,19 @@
               <a:buChar char=""/>
             </a:pPr>
             <a:r>
-              <a:rPr b="0" lang="en-US" sz="9890" spc="-1" strike="noStrike">
-                <a:solidFill>
-                  <a:srgbClr val="000000"/>
-                </a:solidFill>
-                <a:latin typeface="Calibri"/>
+              <a:rPr b="0" lang="en-US" sz="2000" spc="-1" strike="noStrike">
+                <a:latin typeface="Arial"/>
               </a:rPr>
               <a:t>Fourth Outline Level</a:t>
             </a:r>
-            <a:endParaRPr b="0" lang="en-US" sz="9890" spc="-1" strike="noStrike">
-              <a:solidFill>
-                <a:srgbClr val="000000"/>
-              </a:solidFill>
-              <a:latin typeface="Calibri"/>
+            <a:endParaRPr b="0" lang="en-US" sz="2000" spc="-1" strike="noStrike">
+              <a:latin typeface="Arial"/>
             </a:endParaRPr>
           </a:p>
           <a:p>
             <a:pPr lvl="4" marL="2160000" indent="-216000">
               <a:spcBef>
-                <a:spcPts val="298"/>
+                <a:spcPts val="283"/>
               </a:spcBef>
               <a:buClr>
                 <a:srgbClr val="000000"/>
@@ -2745,25 +2627,19 @@
               <a:buChar char=""/>
             </a:pPr>
             <a:r>
-              <a:rPr b="0" lang="en-US" sz="2110" spc="-1" strike="noStrike">
-                <a:solidFill>
-                  <a:srgbClr val="000000"/>
-                </a:solidFill>
-                <a:latin typeface="Calibri"/>
+              <a:rPr b="0" lang="en-US" sz="2000" spc="-1" strike="noStrike">
+                <a:latin typeface="Arial"/>
               </a:rPr>
               <a:t>Fifth Outline Level</a:t>
             </a:r>
-            <a:endParaRPr b="0" lang="en-US" sz="2110" spc="-1" strike="noStrike">
-              <a:solidFill>
-                <a:srgbClr val="000000"/>
-              </a:solidFill>
-              <a:latin typeface="Calibri"/>
+            <a:endParaRPr b="0" lang="en-US" sz="2000" spc="-1" strike="noStrike">
+              <a:latin typeface="Arial"/>
             </a:endParaRPr>
           </a:p>
           <a:p>
             <a:pPr lvl="5" marL="2592000" indent="-216000">
               <a:spcBef>
-                <a:spcPts val="298"/>
+                <a:spcPts val="283"/>
               </a:spcBef>
               <a:buClr>
                 <a:srgbClr val="000000"/>
@@ -2773,25 +2649,19 @@
               <a:buChar char=""/>
             </a:pPr>
             <a:r>
-              <a:rPr b="0" lang="en-US" sz="2110" spc="-1" strike="noStrike">
-                <a:solidFill>
-                  <a:srgbClr val="000000"/>
-                </a:solidFill>
-                <a:latin typeface="Calibri"/>
+              <a:rPr b="0" lang="en-US" sz="2000" spc="-1" strike="noStrike">
+                <a:latin typeface="Arial"/>
               </a:rPr>
               <a:t>Sixth Outline Level</a:t>
             </a:r>
-            <a:endParaRPr b="0" lang="en-US" sz="2110" spc="-1" strike="noStrike">
-              <a:solidFill>
-                <a:srgbClr val="000000"/>
-              </a:solidFill>
-              <a:latin typeface="Calibri"/>
+            <a:endParaRPr b="0" lang="en-US" sz="2000" spc="-1" strike="noStrike">
+              <a:latin typeface="Arial"/>
             </a:endParaRPr>
           </a:p>
           <a:p>
             <a:pPr lvl="6" marL="3024000" indent="-216000">
               <a:spcBef>
-                <a:spcPts val="298"/>
+                <a:spcPts val="283"/>
               </a:spcBef>
               <a:buClr>
                 <a:srgbClr val="000000"/>
@@ -2801,19 +2671,13 @@
               <a:buChar char=""/>
             </a:pPr>
             <a:r>
-              <a:rPr b="0" lang="en-US" sz="2110" spc="-1" strike="noStrike">
-                <a:solidFill>
-                  <a:srgbClr val="000000"/>
-                </a:solidFill>
-                <a:latin typeface="Calibri"/>
+              <a:rPr b="0" lang="en-US" sz="2000" spc="-1" strike="noStrike">
+                <a:latin typeface="Arial"/>
               </a:rPr>
               <a:t>Seventh Outline Level</a:t>
             </a:r>
-            <a:endParaRPr b="0" lang="en-US" sz="2110" spc="-1" strike="noStrike">
-              <a:solidFill>
-                <a:srgbClr val="000000"/>
-              </a:solidFill>
-              <a:latin typeface="Calibri"/>
+            <a:endParaRPr b="0" lang="en-US" sz="2000" spc="-1" strike="noStrike">
+              <a:latin typeface="Arial"/>
             </a:endParaRPr>
           </a:p>
         </p:txBody>
@@ -2862,6 +2726,126 @@
           <a:chExt cx="0" cy="0"/>
         </a:xfrm>
       </p:grpSpPr>
+      <p:sp>
+        <p:nvSpPr>
+          <p:cNvPr id="41" name=""/>
+          <p:cNvSpPr/>
+          <p:nvPr/>
+        </p:nvSpPr>
+        <p:spPr>
+          <a:xfrm>
+            <a:off x="457200" y="457200"/>
+            <a:ext cx="24688800" cy="35661600"/>
+          </a:xfrm>
+          <a:prstGeom prst="rect">
+            <a:avLst/>
+          </a:prstGeom>
+          <a:noFill/>
+          <a:ln w="0">
+            <a:solidFill>
+              <a:srgbClr val="3465a4"/>
+            </a:solidFill>
+          </a:ln>
+        </p:spPr>
+        <p:style>
+          <a:lnRef idx="0"/>
+          <a:fillRef idx="0"/>
+          <a:effectRef idx="0"/>
+          <a:fontRef idx="minor"/>
+        </p:style>
+      </p:sp>
+      <p:sp>
+        <p:nvSpPr>
+          <p:cNvPr id="42" name=""/>
+          <p:cNvSpPr txBox="1"/>
+          <p:nvPr/>
+        </p:nvSpPr>
+        <p:spPr>
+          <a:xfrm>
+            <a:off x="457200" y="457200"/>
+            <a:ext cx="24688800" cy="2133000"/>
+          </a:xfrm>
+          <a:prstGeom prst="rect">
+            <a:avLst/>
+          </a:prstGeom>
+          <a:noFill/>
+          <a:ln w="0">
+            <a:noFill/>
+          </a:ln>
+        </p:spPr>
+        <p:txBody>
+          <a:bodyPr lIns="90000" rIns="90000" tIns="45000" bIns="45000" anchor="t">
+            <a:noAutofit/>
+          </a:bodyPr>
+          <a:p>
+            <a:pPr algn="ctr">
+              <a:buNone/>
+            </a:pPr>
+            <a:r>
+              <a:rPr b="0" lang="en-US" sz="7200" spc="-1" strike="noStrike">
+                <a:latin typeface="Arial"/>
+              </a:rPr>
+              <a:t>Motorized Robotic Hand Controlled by Surface </a:t>
+            </a:r>
+            <a:r>
+              <a:rPr b="0" lang="en-US" sz="7200" spc="-1" strike="noStrike">
+                <a:latin typeface="Arial"/>
+              </a:rPr>
+              <a:t>Electromyography (sEMG)</a:t>
+            </a:r>
+            <a:endParaRPr b="0" lang="en-US" sz="7200" spc="-1" strike="noStrike">
+              <a:latin typeface="Arial"/>
+            </a:endParaRPr>
+          </a:p>
+        </p:txBody>
+      </p:sp>
+      <p:sp>
+        <p:nvSpPr>
+          <p:cNvPr id="43" name=""/>
+          <p:cNvSpPr txBox="1"/>
+          <p:nvPr/>
+        </p:nvSpPr>
+        <p:spPr>
+          <a:xfrm>
+            <a:off x="457200" y="2658960"/>
+            <a:ext cx="24688800" cy="770040"/>
+          </a:xfrm>
+          <a:prstGeom prst="rect">
+            <a:avLst/>
+          </a:prstGeom>
+          <a:noFill/>
+          <a:ln w="0">
+            <a:noFill/>
+          </a:ln>
+        </p:spPr>
+        <p:txBody>
+          <a:bodyPr lIns="90000" rIns="90000" tIns="45000" bIns="45000" anchor="t">
+            <a:noAutofit/>
+          </a:bodyPr>
+          <a:p>
+            <a:r>
+              <a:rPr b="0" lang="en-US" sz="2400" spc="-1" strike="noStrike">
+                <a:latin typeface="Arial"/>
+              </a:rPr>
+              <a:t>Jay E. Bernstein, David J. Mora, Juan R. Ortiz</a:t>
+            </a:r>
+            <a:endParaRPr b="0" lang="en-US" sz="2400" spc="-1" strike="noStrike">
+              <a:latin typeface="Arial"/>
+            </a:endParaRPr>
+          </a:p>
+          <a:p>
+            <a:r>
+              <a:rPr b="0" lang="en-US" sz="2400" spc="-1" strike="noStrike">
+                <a:latin typeface="Arial"/>
+              </a:rPr>
+              <a:t>Advised by Dr. Norali Pernalete</a:t>
+            </a:r>
+            <a:endParaRPr b="0" lang="en-US" sz="2400" spc="-1" strike="noStrike">
+              <a:latin typeface="Arial"/>
+            </a:endParaRPr>
+          </a:p>
+        </p:txBody>
+      </p:sp>
     </p:spTree>
   </p:cSld>
   <mc:AlternateContent>

</xml_diff>

<commit_message>
Adding images and charts to presentation, generating presentation schematics
</commit_message>
<xml_diff>
--- a/PresentationMaterial/lastname-firstname_poster.pptx
+++ b/PresentationMaterial/lastname-firstname_poster.pptx
@@ -63,7 +63,7 @@
         <p:txBody>
           <a:bodyPr/>
           <a:p>
-            <a:fld id="{98331270-39A7-4196-8482-22B8214D3B1D}" type="slidenum">
+            <a:fld id="{D0018AAE-6D34-49B0-8FFB-648A5911DAB2}" type="slidenum">
               <a:t>&lt;#&gt;</a:t>
             </a:fld>
           </a:p>
@@ -125,7 +125,7 @@
         <p:spPr>
           <a:xfrm>
             <a:off x="1920240" y="11361960"/>
-            <a:ext cx="21762000" cy="7839720"/>
+            <a:ext cx="21761640" cy="7839360"/>
           </a:xfrm>
           <a:prstGeom prst="rect">
             <a:avLst/>
@@ -162,7 +162,7 @@
         <p:spPr>
           <a:xfrm>
             <a:off x="1280160" y="8558640"/>
-            <a:ext cx="23042520" cy="10118520"/>
+            <a:ext cx="23042160" cy="10118520"/>
           </a:xfrm>
           <a:prstGeom prst="rect">
             <a:avLst/>
@@ -196,7 +196,7 @@
         <p:spPr>
           <a:xfrm>
             <a:off x="1280160" y="19638720"/>
-            <a:ext cx="23042520" cy="10118520"/>
+            <a:ext cx="23042160" cy="10118520"/>
           </a:xfrm>
           <a:prstGeom prst="rect">
             <a:avLst/>
@@ -251,7 +251,7 @@
         <p:txBody>
           <a:bodyPr/>
           <a:p>
-            <a:fld id="{1B020310-6CE1-4F4F-9351-49C61E3ED40A}" type="slidenum">
+            <a:fld id="{819B10FC-0FF6-466E-8499-0CC13DC36C82}" type="slidenum">
               <a:t>&lt;#&gt;</a:t>
             </a:fld>
           </a:p>
@@ -313,7 +313,7 @@
         <p:spPr>
           <a:xfrm>
             <a:off x="1920240" y="11361960"/>
-            <a:ext cx="21762000" cy="7839720"/>
+            <a:ext cx="21761640" cy="7839360"/>
           </a:xfrm>
           <a:prstGeom prst="rect">
             <a:avLst/>
@@ -350,7 +350,7 @@
         <p:spPr>
           <a:xfrm>
             <a:off x="1280160" y="8558640"/>
-            <a:ext cx="11244600" cy="10118520"/>
+            <a:ext cx="11244240" cy="10118520"/>
           </a:xfrm>
           <a:prstGeom prst="rect">
             <a:avLst/>
@@ -383,8 +383,8 @@
         </p:nvSpPr>
         <p:spPr>
           <a:xfrm>
-            <a:off x="13087440" y="8558640"/>
-            <a:ext cx="11244600" cy="10118520"/>
+            <a:off x="13087080" y="8558640"/>
+            <a:ext cx="11244240" cy="10118520"/>
           </a:xfrm>
           <a:prstGeom prst="rect">
             <a:avLst/>
@@ -418,7 +418,7 @@
         <p:spPr>
           <a:xfrm>
             <a:off x="1280160" y="19638720"/>
-            <a:ext cx="11244600" cy="10118520"/>
+            <a:ext cx="11244240" cy="10118520"/>
           </a:xfrm>
           <a:prstGeom prst="rect">
             <a:avLst/>
@@ -451,8 +451,8 @@
         </p:nvSpPr>
         <p:spPr>
           <a:xfrm>
-            <a:off x="13087440" y="19638720"/>
-            <a:ext cx="11244600" cy="10118520"/>
+            <a:off x="13087080" y="19638720"/>
+            <a:ext cx="11244240" cy="10118520"/>
           </a:xfrm>
           <a:prstGeom prst="rect">
             <a:avLst/>
@@ -507,7 +507,7 @@
         <p:txBody>
           <a:bodyPr/>
           <a:p>
-            <a:fld id="{921E1758-B432-46D6-A859-57EA75A73E9C}" type="slidenum">
+            <a:fld id="{8DCA1DEC-A3E9-465E-B618-26EFCD8D339D}" type="slidenum">
               <a:t>&lt;#&gt;</a:t>
             </a:fld>
           </a:p>
@@ -569,7 +569,7 @@
         <p:spPr>
           <a:xfrm>
             <a:off x="1920240" y="11361960"/>
-            <a:ext cx="21762000" cy="7839720"/>
+            <a:ext cx="21761640" cy="7839360"/>
           </a:xfrm>
           <a:prstGeom prst="rect">
             <a:avLst/>
@@ -606,7 +606,7 @@
         <p:spPr>
           <a:xfrm>
             <a:off x="1280160" y="8558640"/>
-            <a:ext cx="7419600" cy="10118520"/>
+            <a:ext cx="7419240" cy="10118520"/>
           </a:xfrm>
           <a:prstGeom prst="rect">
             <a:avLst/>
@@ -639,8 +639,8 @@
         </p:nvSpPr>
         <p:spPr>
           <a:xfrm>
-            <a:off x="9071280" y="8558640"/>
-            <a:ext cx="7419600" cy="10118520"/>
+            <a:off x="9070920" y="8558640"/>
+            <a:ext cx="7419240" cy="10118520"/>
           </a:xfrm>
           <a:prstGeom prst="rect">
             <a:avLst/>
@@ -673,8 +673,8 @@
         </p:nvSpPr>
         <p:spPr>
           <a:xfrm>
-            <a:off x="16862040" y="8558640"/>
-            <a:ext cx="7419600" cy="10118520"/>
+            <a:off x="16861320" y="8558640"/>
+            <a:ext cx="7419240" cy="10118520"/>
           </a:xfrm>
           <a:prstGeom prst="rect">
             <a:avLst/>
@@ -708,7 +708,7 @@
         <p:spPr>
           <a:xfrm>
             <a:off x="1280160" y="19638720"/>
-            <a:ext cx="7419600" cy="10118520"/>
+            <a:ext cx="7419240" cy="10118520"/>
           </a:xfrm>
           <a:prstGeom prst="rect">
             <a:avLst/>
@@ -741,8 +741,8 @@
         </p:nvSpPr>
         <p:spPr>
           <a:xfrm>
-            <a:off x="9071280" y="19638720"/>
-            <a:ext cx="7419600" cy="10118520"/>
+            <a:off x="9070920" y="19638720"/>
+            <a:ext cx="7419240" cy="10118520"/>
           </a:xfrm>
           <a:prstGeom prst="rect">
             <a:avLst/>
@@ -775,8 +775,8 @@
         </p:nvSpPr>
         <p:spPr>
           <a:xfrm>
-            <a:off x="16862040" y="19638720"/>
-            <a:ext cx="7419600" cy="10118520"/>
+            <a:off x="16861320" y="19638720"/>
+            <a:ext cx="7419240" cy="10118520"/>
           </a:xfrm>
           <a:prstGeom prst="rect">
             <a:avLst/>
@@ -831,7 +831,7 @@
         <p:txBody>
           <a:bodyPr/>
           <a:p>
-            <a:fld id="{7E590C8E-0F9C-404D-BC61-E5C2AB2F5748}" type="slidenum">
+            <a:fld id="{9955BE08-A86C-4624-8F2B-5785EC1B92F9}" type="slidenum">
               <a:t>&lt;#&gt;</a:t>
             </a:fld>
           </a:p>
@@ -893,7 +893,7 @@
         <p:spPr>
           <a:xfrm>
             <a:off x="1920240" y="11361960"/>
-            <a:ext cx="21762000" cy="7839720"/>
+            <a:ext cx="21761640" cy="7839360"/>
           </a:xfrm>
           <a:prstGeom prst="rect">
             <a:avLst/>
@@ -930,7 +930,7 @@
         <p:spPr>
           <a:xfrm>
             <a:off x="1280160" y="8558640"/>
-            <a:ext cx="23042520" cy="21213360"/>
+            <a:ext cx="23042160" cy="21213000"/>
           </a:xfrm>
           <a:prstGeom prst="rect">
             <a:avLst/>
@@ -988,7 +988,7 @@
         <p:txBody>
           <a:bodyPr/>
           <a:p>
-            <a:fld id="{EE5AAB6A-EEFA-44F4-AEFE-8B80E1E3B610}" type="slidenum">
+            <a:fld id="{24C975A0-44A0-43EB-84D9-B91FE84D18A0}" type="slidenum">
               <a:t>&lt;#&gt;</a:t>
             </a:fld>
           </a:p>
@@ -1050,7 +1050,7 @@
         <p:spPr>
           <a:xfrm>
             <a:off x="1920240" y="11361960"/>
-            <a:ext cx="21762000" cy="7839720"/>
+            <a:ext cx="21761640" cy="7839360"/>
           </a:xfrm>
           <a:prstGeom prst="rect">
             <a:avLst/>
@@ -1087,7 +1087,7 @@
         <p:spPr>
           <a:xfrm>
             <a:off x="1280160" y="8558640"/>
-            <a:ext cx="23042520" cy="21213360"/>
+            <a:ext cx="23042160" cy="21213000"/>
           </a:xfrm>
           <a:prstGeom prst="rect">
             <a:avLst/>
@@ -1142,7 +1142,7 @@
         <p:txBody>
           <a:bodyPr/>
           <a:p>
-            <a:fld id="{71B3D6D9-BD7E-4996-8CA6-297DB879AB79}" type="slidenum">
+            <a:fld id="{50FBE67E-BF9D-4EFC-9F03-7A020A4B90D1}" type="slidenum">
               <a:t>&lt;#&gt;</a:t>
             </a:fld>
           </a:p>
@@ -1204,7 +1204,7 @@
         <p:spPr>
           <a:xfrm>
             <a:off x="1920240" y="11361960"/>
-            <a:ext cx="21762000" cy="7839720"/>
+            <a:ext cx="21761640" cy="7839360"/>
           </a:xfrm>
           <a:prstGeom prst="rect">
             <a:avLst/>
@@ -1241,7 +1241,7 @@
         <p:spPr>
           <a:xfrm>
             <a:off x="1280160" y="8558640"/>
-            <a:ext cx="11244600" cy="21213360"/>
+            <a:ext cx="11244240" cy="21213000"/>
           </a:xfrm>
           <a:prstGeom prst="rect">
             <a:avLst/>
@@ -1274,8 +1274,8 @@
         </p:nvSpPr>
         <p:spPr>
           <a:xfrm>
-            <a:off x="13087440" y="8558640"/>
-            <a:ext cx="11244600" cy="21213360"/>
+            <a:off x="13087080" y="8558640"/>
+            <a:ext cx="11244240" cy="21213000"/>
           </a:xfrm>
           <a:prstGeom prst="rect">
             <a:avLst/>
@@ -1330,7 +1330,7 @@
         <p:txBody>
           <a:bodyPr/>
           <a:p>
-            <a:fld id="{A2C3E2A8-4432-40BD-ABB7-DC07DEF6DAA3}" type="slidenum">
+            <a:fld id="{4D60D3DD-3067-4B4D-9B98-D276DDA2262C}" type="slidenum">
               <a:t>&lt;#&gt;</a:t>
             </a:fld>
           </a:p>
@@ -1392,7 +1392,7 @@
         <p:spPr>
           <a:xfrm>
             <a:off x="1920240" y="11361960"/>
-            <a:ext cx="21762000" cy="7839720"/>
+            <a:ext cx="21761640" cy="7839360"/>
           </a:xfrm>
           <a:prstGeom prst="rect">
             <a:avLst/>
@@ -1450,7 +1450,7 @@
         <p:txBody>
           <a:bodyPr/>
           <a:p>
-            <a:fld id="{947C7BD5-8A61-4A05-9C1E-ED90FC69404A}" type="slidenum">
+            <a:fld id="{583F169C-6AD8-4CCB-95B2-20B237F7618B}" type="slidenum">
               <a:t>&lt;#&gt;</a:t>
             </a:fld>
           </a:p>
@@ -1512,7 +1512,7 @@
         <p:spPr>
           <a:xfrm>
             <a:off x="1920240" y="11361960"/>
-            <a:ext cx="21762000" cy="36341640"/>
+            <a:ext cx="21761640" cy="36339840"/>
           </a:xfrm>
           <a:prstGeom prst="rect">
             <a:avLst/>
@@ -1570,7 +1570,7 @@
         <p:txBody>
           <a:bodyPr/>
           <a:p>
-            <a:fld id="{6EFE0D7C-30AB-492B-B17F-6A26D4F5FC92}" type="slidenum">
+            <a:fld id="{12D17D44-088C-434B-965D-0A169628E099}" type="slidenum">
               <a:t>&lt;#&gt;</a:t>
             </a:fld>
           </a:p>
@@ -1632,7 +1632,7 @@
         <p:spPr>
           <a:xfrm>
             <a:off x="1920240" y="11361960"/>
-            <a:ext cx="21762000" cy="7839720"/>
+            <a:ext cx="21761640" cy="7839360"/>
           </a:xfrm>
           <a:prstGeom prst="rect">
             <a:avLst/>
@@ -1669,7 +1669,7 @@
         <p:spPr>
           <a:xfrm>
             <a:off x="1280160" y="8558640"/>
-            <a:ext cx="11244600" cy="10118520"/>
+            <a:ext cx="11244240" cy="10118520"/>
           </a:xfrm>
           <a:prstGeom prst="rect">
             <a:avLst/>
@@ -1702,8 +1702,8 @@
         </p:nvSpPr>
         <p:spPr>
           <a:xfrm>
-            <a:off x="13087440" y="8558640"/>
-            <a:ext cx="11244600" cy="21213360"/>
+            <a:off x="13087080" y="8558640"/>
+            <a:ext cx="11244240" cy="21213000"/>
           </a:xfrm>
           <a:prstGeom prst="rect">
             <a:avLst/>
@@ -1737,7 +1737,7 @@
         <p:spPr>
           <a:xfrm>
             <a:off x="1280160" y="19638720"/>
-            <a:ext cx="11244600" cy="10118520"/>
+            <a:ext cx="11244240" cy="10118520"/>
           </a:xfrm>
           <a:prstGeom prst="rect">
             <a:avLst/>
@@ -1792,7 +1792,7 @@
         <p:txBody>
           <a:bodyPr/>
           <a:p>
-            <a:fld id="{F0095052-D0AE-46D6-948A-EAE81AD9DAB5}" type="slidenum">
+            <a:fld id="{52AF2ADC-7E02-4FFA-ABCC-A3EA31F039A4}" type="slidenum">
               <a:t>&lt;#&gt;</a:t>
             </a:fld>
           </a:p>
@@ -1854,7 +1854,7 @@
         <p:spPr>
           <a:xfrm>
             <a:off x="1920240" y="11361960"/>
-            <a:ext cx="21762000" cy="7839720"/>
+            <a:ext cx="21761640" cy="7839360"/>
           </a:xfrm>
           <a:prstGeom prst="rect">
             <a:avLst/>
@@ -1891,7 +1891,7 @@
         <p:spPr>
           <a:xfrm>
             <a:off x="1280160" y="8558640"/>
-            <a:ext cx="11244600" cy="21213360"/>
+            <a:ext cx="11244240" cy="21213000"/>
           </a:xfrm>
           <a:prstGeom prst="rect">
             <a:avLst/>
@@ -1924,8 +1924,8 @@
         </p:nvSpPr>
         <p:spPr>
           <a:xfrm>
-            <a:off x="13087440" y="8558640"/>
-            <a:ext cx="11244600" cy="10118520"/>
+            <a:off x="13087080" y="8558640"/>
+            <a:ext cx="11244240" cy="10118520"/>
           </a:xfrm>
           <a:prstGeom prst="rect">
             <a:avLst/>
@@ -1958,8 +1958,8 @@
         </p:nvSpPr>
         <p:spPr>
           <a:xfrm>
-            <a:off x="13087440" y="19638720"/>
-            <a:ext cx="11244600" cy="10118520"/>
+            <a:off x="13087080" y="19638720"/>
+            <a:ext cx="11244240" cy="10118520"/>
           </a:xfrm>
           <a:prstGeom prst="rect">
             <a:avLst/>
@@ -2014,7 +2014,7 @@
         <p:txBody>
           <a:bodyPr/>
           <a:p>
-            <a:fld id="{2A2C75EE-AB36-4F3C-974E-F1388E339C3F}" type="slidenum">
+            <a:fld id="{D484C83A-476C-48CB-AE13-D4C95E78A16A}" type="slidenum">
               <a:t>&lt;#&gt;</a:t>
             </a:fld>
           </a:p>
@@ -2076,7 +2076,7 @@
         <p:spPr>
           <a:xfrm>
             <a:off x="1920240" y="11361960"/>
-            <a:ext cx="21762000" cy="7839720"/>
+            <a:ext cx="21761640" cy="7839360"/>
           </a:xfrm>
           <a:prstGeom prst="rect">
             <a:avLst/>
@@ -2113,7 +2113,7 @@
         <p:spPr>
           <a:xfrm>
             <a:off x="1280160" y="8558640"/>
-            <a:ext cx="11244600" cy="10118520"/>
+            <a:ext cx="11244240" cy="10118520"/>
           </a:xfrm>
           <a:prstGeom prst="rect">
             <a:avLst/>
@@ -2146,8 +2146,8 @@
         </p:nvSpPr>
         <p:spPr>
           <a:xfrm>
-            <a:off x="13087440" y="8558640"/>
-            <a:ext cx="11244600" cy="10118520"/>
+            <a:off x="13087080" y="8558640"/>
+            <a:ext cx="11244240" cy="10118520"/>
           </a:xfrm>
           <a:prstGeom prst="rect">
             <a:avLst/>
@@ -2181,7 +2181,7 @@
         <p:spPr>
           <a:xfrm>
             <a:off x="1280160" y="19638720"/>
-            <a:ext cx="23042520" cy="10118520"/>
+            <a:ext cx="23042160" cy="10118520"/>
           </a:xfrm>
           <a:prstGeom prst="rect">
             <a:avLst/>
@@ -2236,7 +2236,7 @@
         <p:txBody>
           <a:bodyPr/>
           <a:p>
-            <a:fld id="{9D1B777B-3470-49E9-8FF8-4B43EA38344A}" type="slidenum">
+            <a:fld id="{EBB166DF-E20A-460C-A845-AAB73CDAEB40}" type="slidenum">
               <a:t>&lt;#&gt;</a:t>
             </a:fld>
           </a:p>
@@ -2305,7 +2305,7 @@
         <p:spPr>
           <a:xfrm>
             <a:off x="1920240" y="11361960"/>
-            <a:ext cx="21762000" cy="7839720"/>
+            <a:ext cx="21761640" cy="7839360"/>
           </a:xfrm>
           <a:prstGeom prst="rect">
             <a:avLst/>
@@ -2324,7 +2324,211 @@
               <a:rPr b="0" lang="en-US" sz="1800" spc="-1" strike="noStrike">
                 <a:latin typeface="Arial"/>
               </a:rPr>
-              <a:t>Click to edit the title text format</a:t>
+              <a:t>C</a:t>
+            </a:r>
+            <a:r>
+              <a:rPr b="0" lang="en-US" sz="1800" spc="-1" strike="noStrike">
+                <a:latin typeface="Arial"/>
+              </a:rPr>
+              <a:t>l</a:t>
+            </a:r>
+            <a:r>
+              <a:rPr b="0" lang="en-US" sz="1800" spc="-1" strike="noStrike">
+                <a:latin typeface="Arial"/>
+              </a:rPr>
+              <a:t>i</a:t>
+            </a:r>
+            <a:r>
+              <a:rPr b="0" lang="en-US" sz="1800" spc="-1" strike="noStrike">
+                <a:latin typeface="Arial"/>
+              </a:rPr>
+              <a:t>c</a:t>
+            </a:r>
+            <a:r>
+              <a:rPr b="0" lang="en-US" sz="1800" spc="-1" strike="noStrike">
+                <a:latin typeface="Arial"/>
+              </a:rPr>
+              <a:t>k</a:t>
+            </a:r>
+            <a:r>
+              <a:rPr b="0" lang="en-US" sz="1800" spc="-1" strike="noStrike">
+                <a:latin typeface="Arial"/>
+              </a:rPr>
+              <a:t> </a:t>
+            </a:r>
+            <a:r>
+              <a:rPr b="0" lang="en-US" sz="1800" spc="-1" strike="noStrike">
+                <a:latin typeface="Arial"/>
+              </a:rPr>
+              <a:t>t</a:t>
+            </a:r>
+            <a:r>
+              <a:rPr b="0" lang="en-US" sz="1800" spc="-1" strike="noStrike">
+                <a:latin typeface="Arial"/>
+              </a:rPr>
+              <a:t>o</a:t>
+            </a:r>
+            <a:r>
+              <a:rPr b="0" lang="en-US" sz="1800" spc="-1" strike="noStrike">
+                <a:latin typeface="Arial"/>
+              </a:rPr>
+              <a:t> </a:t>
+            </a:r>
+            <a:r>
+              <a:rPr b="0" lang="en-US" sz="1800" spc="-1" strike="noStrike">
+                <a:latin typeface="Arial"/>
+              </a:rPr>
+              <a:t>e</a:t>
+            </a:r>
+            <a:r>
+              <a:rPr b="0" lang="en-US" sz="1800" spc="-1" strike="noStrike">
+                <a:latin typeface="Arial"/>
+              </a:rPr>
+              <a:t>d</a:t>
+            </a:r>
+            <a:r>
+              <a:rPr b="0" lang="en-US" sz="1800" spc="-1" strike="noStrike">
+                <a:latin typeface="Arial"/>
+              </a:rPr>
+              <a:t>i</a:t>
+            </a:r>
+            <a:r>
+              <a:rPr b="0" lang="en-US" sz="1800" spc="-1" strike="noStrike">
+                <a:latin typeface="Arial"/>
+              </a:rPr>
+              <a:t>t</a:t>
+            </a:r>
+            <a:r>
+              <a:rPr b="0" lang="en-US" sz="1800" spc="-1" strike="noStrike">
+                <a:latin typeface="Arial"/>
+              </a:rPr>
+              <a:t> </a:t>
+            </a:r>
+            <a:r>
+              <a:rPr b="0" lang="en-US" sz="1800" spc="-1" strike="noStrike">
+                <a:latin typeface="Arial"/>
+              </a:rPr>
+              <a:t>t</a:t>
+            </a:r>
+            <a:r>
+              <a:rPr b="0" lang="en-US" sz="1800" spc="-1" strike="noStrike">
+                <a:latin typeface="Arial"/>
+              </a:rPr>
+              <a:t>h</a:t>
+            </a:r>
+            <a:r>
+              <a:rPr b="0" lang="en-US" sz="1800" spc="-1" strike="noStrike">
+                <a:latin typeface="Arial"/>
+              </a:rPr>
+              <a:t>e</a:t>
+            </a:r>
+            <a:r>
+              <a:rPr b="0" lang="en-US" sz="1800" spc="-1" strike="noStrike">
+                <a:latin typeface="Arial"/>
+              </a:rPr>
+              <a:t> </a:t>
+            </a:r>
+            <a:r>
+              <a:rPr b="0" lang="en-US" sz="1800" spc="-1" strike="noStrike">
+                <a:latin typeface="Arial"/>
+              </a:rPr>
+              <a:t>t</a:t>
+            </a:r>
+            <a:r>
+              <a:rPr b="0" lang="en-US" sz="1800" spc="-1" strike="noStrike">
+                <a:latin typeface="Arial"/>
+              </a:rPr>
+              <a:t>i</a:t>
+            </a:r>
+            <a:r>
+              <a:rPr b="0" lang="en-US" sz="1800" spc="-1" strike="noStrike">
+                <a:latin typeface="Arial"/>
+              </a:rPr>
+              <a:t>t</a:t>
+            </a:r>
+            <a:r>
+              <a:rPr b="0" lang="en-US" sz="1800" spc="-1" strike="noStrike">
+                <a:latin typeface="Arial"/>
+              </a:rPr>
+              <a:t>l</a:t>
+            </a:r>
+            <a:r>
+              <a:rPr b="0" lang="en-US" sz="1800" spc="-1" strike="noStrike">
+                <a:latin typeface="Arial"/>
+              </a:rPr>
+              <a:t>e</a:t>
+            </a:r>
+            <a:r>
+              <a:rPr b="0" lang="en-US" sz="1800" spc="-1" strike="noStrike">
+                <a:latin typeface="Arial"/>
+              </a:rPr>
+              <a:t> </a:t>
+            </a:r>
+            <a:r>
+              <a:rPr b="0" lang="en-US" sz="1800" spc="-1" strike="noStrike">
+                <a:latin typeface="Arial"/>
+              </a:rPr>
+              <a:t>t</a:t>
+            </a:r>
+            <a:r>
+              <a:rPr b="0" lang="en-US" sz="1800" spc="-1" strike="noStrike">
+                <a:latin typeface="Arial"/>
+              </a:rPr>
+              <a:t>e</a:t>
+            </a:r>
+            <a:r>
+              <a:rPr b="0" lang="en-US" sz="1800" spc="-1" strike="noStrike">
+                <a:latin typeface="Arial"/>
+              </a:rPr>
+              <a:t>x</a:t>
+            </a:r>
+            <a:r>
+              <a:rPr b="0" lang="en-US" sz="1800" spc="-1" strike="noStrike">
+                <a:latin typeface="Arial"/>
+              </a:rPr>
+              <a:t>t</a:t>
+            </a:r>
+            <a:r>
+              <a:rPr b="0" lang="en-US" sz="1800" spc="-1" strike="noStrike">
+                <a:latin typeface="Arial"/>
+              </a:rPr>
+              <a:t> </a:t>
+            </a:r>
+            <a:r>
+              <a:rPr b="0" lang="en-US" sz="1800" spc="-1" strike="noStrike">
+                <a:latin typeface="Arial"/>
+              </a:rPr>
+              <a:t>f</a:t>
+            </a:r>
+            <a:r>
+              <a:rPr b="0" lang="en-US" sz="1800" spc="-1" strike="noStrike">
+                <a:latin typeface="Arial"/>
+              </a:rPr>
+              <a:t>o</a:t>
+            </a:r>
+            <a:r>
+              <a:rPr b="0" lang="en-US" sz="1800" spc="-1" strike="noStrike">
+                <a:latin typeface="Arial"/>
+              </a:rPr>
+              <a:t>r</a:t>
+            </a:r>
+            <a:r>
+              <a:rPr b="0" lang="en-US" sz="1800" spc="-1" strike="noStrike">
+                <a:latin typeface="Arial"/>
+              </a:rPr>
+              <a:t>m</a:t>
+            </a:r>
+            <a:r>
+              <a:rPr b="0" lang="en-US" sz="1800" spc="-1" strike="noStrike">
+                <a:latin typeface="Arial"/>
+              </a:rPr>
+              <a:t>a</a:t>
+            </a:r>
+            <a:r>
+              <a:rPr b="0" lang="en-US" sz="1800" spc="-1" strike="noStrike">
+                <a:latin typeface="Arial"/>
+              </a:rPr>
+              <a:t>t</a:t>
             </a:r>
             <a:endParaRPr b="0" lang="en-US" sz="1800" spc="-1" strike="noStrike">
               <a:latin typeface="Arial"/>
@@ -2339,13 +2543,196 @@
             <a:spLocks noGrp="1"/>
           </p:cNvSpPr>
           <p:nvPr>
+            <p:ph type="body"/>
+          </p:nvPr>
+        </p:nvSpPr>
+        <p:spPr>
+          <a:xfrm>
+            <a:off x="1280160" y="8558640"/>
+            <a:ext cx="23042160" cy="21213000"/>
+          </a:xfrm>
+          <a:prstGeom prst="rect">
+            <a:avLst/>
+          </a:prstGeom>
+          <a:noFill/>
+          <a:ln w="0">
+            <a:noFill/>
+          </a:ln>
+        </p:spPr>
+        <p:txBody>
+          <a:bodyPr lIns="0" rIns="0" tIns="0" bIns="0" anchor="t">
+            <a:normAutofit/>
+          </a:bodyPr>
+          <a:p>
+            <a:pPr marL="432000" indent="-324000">
+              <a:spcBef>
+                <a:spcPts val="1417"/>
+              </a:spcBef>
+              <a:buClr>
+                <a:srgbClr val="000000"/>
+              </a:buClr>
+              <a:buSzPct val="45000"/>
+              <a:buFont typeface="Wingdings" charset="2"/>
+              <a:buChar char=""/>
+            </a:pPr>
+            <a:r>
+              <a:rPr b="0" lang="en-US" sz="1800" spc="-1" strike="noStrike">
+                <a:latin typeface="Arial"/>
+              </a:rPr>
+              <a:t>Click to edit the outline text format</a:t>
+            </a:r>
+            <a:endParaRPr b="0" lang="en-US" sz="1800" spc="-1" strike="noStrike">
+              <a:latin typeface="Arial"/>
+            </a:endParaRPr>
+          </a:p>
+          <a:p>
+            <a:pPr lvl="1" marL="864000" indent="-324000">
+              <a:spcBef>
+                <a:spcPts val="1134"/>
+              </a:spcBef>
+              <a:buClr>
+                <a:srgbClr val="000000"/>
+              </a:buClr>
+              <a:buSzPct val="75000"/>
+              <a:buFont typeface="Symbol" charset="2"/>
+              <a:buChar char=""/>
+            </a:pPr>
+            <a:r>
+              <a:rPr b="0" lang="en-US" sz="1800" spc="-1" strike="noStrike">
+                <a:latin typeface="Arial"/>
+              </a:rPr>
+              <a:t>Second Outline Level</a:t>
+            </a:r>
+            <a:endParaRPr b="0" lang="en-US" sz="1800" spc="-1" strike="noStrike">
+              <a:latin typeface="Arial"/>
+            </a:endParaRPr>
+          </a:p>
+          <a:p>
+            <a:pPr lvl="2" marL="1296000" indent="-288000">
+              <a:spcBef>
+                <a:spcPts val="850"/>
+              </a:spcBef>
+              <a:buClr>
+                <a:srgbClr val="000000"/>
+              </a:buClr>
+              <a:buSzPct val="45000"/>
+              <a:buFont typeface="Wingdings" charset="2"/>
+              <a:buChar char=""/>
+            </a:pPr>
+            <a:r>
+              <a:rPr b="0" lang="en-US" sz="1800" spc="-1" strike="noStrike">
+                <a:latin typeface="Arial"/>
+              </a:rPr>
+              <a:t>Third Outline Level</a:t>
+            </a:r>
+            <a:endParaRPr b="0" lang="en-US" sz="1800" spc="-1" strike="noStrike">
+              <a:latin typeface="Arial"/>
+            </a:endParaRPr>
+          </a:p>
+          <a:p>
+            <a:pPr lvl="3" marL="1728000" indent="-216000">
+              <a:spcBef>
+                <a:spcPts val="567"/>
+              </a:spcBef>
+              <a:buClr>
+                <a:srgbClr val="000000"/>
+              </a:buClr>
+              <a:buSzPct val="75000"/>
+              <a:buFont typeface="Symbol" charset="2"/>
+              <a:buChar char=""/>
+            </a:pPr>
+            <a:r>
+              <a:rPr b="0" lang="en-US" sz="1800" spc="-1" strike="noStrike">
+                <a:latin typeface="Arial"/>
+              </a:rPr>
+              <a:t>Fourth Outline Level</a:t>
+            </a:r>
+            <a:endParaRPr b="0" lang="en-US" sz="1800" spc="-1" strike="noStrike">
+              <a:latin typeface="Arial"/>
+            </a:endParaRPr>
+          </a:p>
+          <a:p>
+            <a:pPr lvl="4" marL="2160000" indent="-216000">
+              <a:spcBef>
+                <a:spcPts val="283"/>
+              </a:spcBef>
+              <a:buClr>
+                <a:srgbClr val="000000"/>
+              </a:buClr>
+              <a:buSzPct val="45000"/>
+              <a:buFont typeface="Wingdings" charset="2"/>
+              <a:buChar char=""/>
+            </a:pPr>
+            <a:r>
+              <a:rPr b="0" lang="en-US" sz="1800" spc="-1" strike="noStrike">
+                <a:latin typeface="Arial"/>
+              </a:rPr>
+              <a:t>Fifth Outline Level</a:t>
+            </a:r>
+            <a:endParaRPr b="0" lang="en-US" sz="1800" spc="-1" strike="noStrike">
+              <a:latin typeface="Arial"/>
+            </a:endParaRPr>
+          </a:p>
+          <a:p>
+            <a:pPr lvl="5" marL="2592000" indent="-216000">
+              <a:spcBef>
+                <a:spcPts val="283"/>
+              </a:spcBef>
+              <a:buClr>
+                <a:srgbClr val="000000"/>
+              </a:buClr>
+              <a:buSzPct val="45000"/>
+              <a:buFont typeface="Wingdings" charset="2"/>
+              <a:buChar char=""/>
+            </a:pPr>
+            <a:r>
+              <a:rPr b="0" lang="en-US" sz="1800" spc="-1" strike="noStrike">
+                <a:latin typeface="Arial"/>
+              </a:rPr>
+              <a:t>Sixth Outline Level</a:t>
+            </a:r>
+            <a:endParaRPr b="0" lang="en-US" sz="1800" spc="-1" strike="noStrike">
+              <a:latin typeface="Arial"/>
+            </a:endParaRPr>
+          </a:p>
+          <a:p>
+            <a:pPr lvl="6" marL="3024000" indent="-216000">
+              <a:spcBef>
+                <a:spcPts val="283"/>
+              </a:spcBef>
+              <a:buClr>
+                <a:srgbClr val="000000"/>
+              </a:buClr>
+              <a:buSzPct val="45000"/>
+              <a:buFont typeface="Wingdings" charset="2"/>
+              <a:buChar char=""/>
+            </a:pPr>
+            <a:r>
+              <a:rPr b="0" lang="en-US" sz="1800" spc="-1" strike="noStrike">
+                <a:latin typeface="Arial"/>
+              </a:rPr>
+              <a:t>Seventh Outline Level</a:t>
+            </a:r>
+            <a:endParaRPr b="0" lang="en-US" sz="1800" spc="-1" strike="noStrike">
+              <a:latin typeface="Arial"/>
+            </a:endParaRPr>
+          </a:p>
+        </p:txBody>
+      </p:sp>
+      <p:sp>
+        <p:nvSpPr>
+          <p:cNvPr id="2" name="PlaceHolder 3"/>
+          <p:cNvSpPr>
+            <a:spLocks noGrp="1"/>
+          </p:cNvSpPr>
+          <p:nvPr>
             <p:ph type="ftr" idx="1"/>
           </p:nvPr>
         </p:nvSpPr>
         <p:spPr>
           <a:xfrm>
             <a:off x="8747280" y="33900120"/>
-            <a:ext cx="8107200" cy="1946160"/>
+            <a:ext cx="8106840" cy="1945800"/>
           </a:xfrm>
           <a:prstGeom prst="rect">
             <a:avLst/>
@@ -2391,7 +2778,7 @@
       </p:sp>
       <p:sp>
         <p:nvSpPr>
-          <p:cNvPr id="2" name="PlaceHolder 3"/>
+          <p:cNvPr id="3" name="PlaceHolder 4"/>
           <p:cNvSpPr>
             <a:spLocks noGrp="1"/>
           </p:cNvSpPr>
@@ -2402,7 +2789,7 @@
         <p:spPr>
           <a:xfrm>
             <a:off x="18348480" y="33900120"/>
-            <a:ext cx="5973480" cy="1946160"/>
+            <a:ext cx="5973120" cy="1945800"/>
           </a:xfrm>
           <a:prstGeom prst="rect">
             <a:avLst/>
@@ -2437,7 +2824,7 @@
               </a:lnSpc>
               <a:buNone/>
             </a:pPr>
-            <a:fld id="{4EC2F15B-8FA1-4F39-850A-A613D7A888A0}" type="slidenum">
+            <a:fld id="{3BAC8594-2C2D-4D65-8824-C2512E750C64}" type="slidenum">
               <a:rPr b="0" lang="en-US" sz="5600" spc="-1" strike="noStrike">
                 <a:solidFill>
                   <a:srgbClr val="8b8b8b"/>
@@ -2454,7 +2841,7 @@
       </p:sp>
       <p:sp>
         <p:nvSpPr>
-          <p:cNvPr id="3" name="PlaceHolder 4"/>
+          <p:cNvPr id="4" name="PlaceHolder 5"/>
           <p:cNvSpPr>
             <a:spLocks noGrp="1"/>
           </p:cNvSpPr>
@@ -2465,7 +2852,7 @@
         <p:spPr>
           <a:xfrm>
             <a:off x="1280160" y="33900120"/>
-            <a:ext cx="5973480" cy="1946160"/>
+            <a:ext cx="5973120" cy="1945800"/>
           </a:xfrm>
           <a:prstGeom prst="rect">
             <a:avLst/>
@@ -2495,189 +2882,6 @@
             </a:r>
             <a:endParaRPr b="0" lang="en-US" sz="1400" spc="-1" strike="noStrike">
               <a:latin typeface="Times New Roman"/>
-            </a:endParaRPr>
-          </a:p>
-        </p:txBody>
-      </p:sp>
-      <p:sp>
-        <p:nvSpPr>
-          <p:cNvPr id="4" name="PlaceHolder 5"/>
-          <p:cNvSpPr>
-            <a:spLocks noGrp="1"/>
-          </p:cNvSpPr>
-          <p:nvPr>
-            <p:ph type="body"/>
-          </p:nvPr>
-        </p:nvSpPr>
-        <p:spPr>
-          <a:xfrm>
-            <a:off x="1280160" y="8558640"/>
-            <a:ext cx="23042520" cy="21213360"/>
-          </a:xfrm>
-          <a:prstGeom prst="rect">
-            <a:avLst/>
-          </a:prstGeom>
-          <a:noFill/>
-          <a:ln w="0">
-            <a:noFill/>
-          </a:ln>
-        </p:spPr>
-        <p:txBody>
-          <a:bodyPr lIns="0" rIns="0" tIns="0" bIns="0" anchor="t">
-            <a:normAutofit/>
-          </a:bodyPr>
-          <a:p>
-            <a:pPr marL="432000" indent="-324000">
-              <a:spcBef>
-                <a:spcPts val="1417"/>
-              </a:spcBef>
-              <a:buClr>
-                <a:srgbClr val="000000"/>
-              </a:buClr>
-              <a:buSzPct val="45000"/>
-              <a:buFont typeface="Wingdings" charset="2"/>
-              <a:buChar char=""/>
-            </a:pPr>
-            <a:r>
-              <a:rPr b="0" lang="en-US" sz="3200" spc="-1" strike="noStrike">
-                <a:latin typeface="Arial"/>
-              </a:rPr>
-              <a:t>Click to edit the outline text format</a:t>
-            </a:r>
-            <a:endParaRPr b="0" lang="en-US" sz="3200" spc="-1" strike="noStrike">
-              <a:latin typeface="Arial"/>
-            </a:endParaRPr>
-          </a:p>
-          <a:p>
-            <a:pPr lvl="1" marL="864000" indent="-324000">
-              <a:spcBef>
-                <a:spcPts val="1134"/>
-              </a:spcBef>
-              <a:buClr>
-                <a:srgbClr val="000000"/>
-              </a:buClr>
-              <a:buSzPct val="75000"/>
-              <a:buFont typeface="Symbol" charset="2"/>
-              <a:buChar char=""/>
-            </a:pPr>
-            <a:r>
-              <a:rPr b="0" lang="en-US" sz="2800" spc="-1" strike="noStrike">
-                <a:latin typeface="Arial"/>
-              </a:rPr>
-              <a:t>Second Outline Level</a:t>
-            </a:r>
-            <a:endParaRPr b="0" lang="en-US" sz="2800" spc="-1" strike="noStrike">
-              <a:latin typeface="Arial"/>
-            </a:endParaRPr>
-          </a:p>
-          <a:p>
-            <a:pPr lvl="2" marL="1296000" indent="-288000">
-              <a:spcBef>
-                <a:spcPts val="850"/>
-              </a:spcBef>
-              <a:buClr>
-                <a:srgbClr val="000000"/>
-              </a:buClr>
-              <a:buSzPct val="45000"/>
-              <a:buFont typeface="Wingdings" charset="2"/>
-              <a:buChar char=""/>
-            </a:pPr>
-            <a:r>
-              <a:rPr b="0" lang="en-US" sz="2400" spc="-1" strike="noStrike">
-                <a:latin typeface="Arial"/>
-              </a:rPr>
-              <a:t>Third Outline Level</a:t>
-            </a:r>
-            <a:endParaRPr b="0" lang="en-US" sz="2400" spc="-1" strike="noStrike">
-              <a:latin typeface="Arial"/>
-            </a:endParaRPr>
-          </a:p>
-          <a:p>
-            <a:pPr lvl="3" marL="1728000" indent="-216000">
-              <a:spcBef>
-                <a:spcPts val="567"/>
-              </a:spcBef>
-              <a:buClr>
-                <a:srgbClr val="000000"/>
-              </a:buClr>
-              <a:buSzPct val="75000"/>
-              <a:buFont typeface="Symbol" charset="2"/>
-              <a:buChar char=""/>
-            </a:pPr>
-            <a:r>
-              <a:rPr b="0" lang="en-US" sz="2000" spc="-1" strike="noStrike">
-                <a:latin typeface="Arial"/>
-              </a:rPr>
-              <a:t>Fourth Outline Level</a:t>
-            </a:r>
-            <a:endParaRPr b="0" lang="en-US" sz="2000" spc="-1" strike="noStrike">
-              <a:latin typeface="Arial"/>
-            </a:endParaRPr>
-          </a:p>
-          <a:p>
-            <a:pPr lvl="4" marL="2160000" indent="-216000">
-              <a:spcBef>
-                <a:spcPts val="283"/>
-              </a:spcBef>
-              <a:buClr>
-                <a:srgbClr val="000000"/>
-              </a:buClr>
-              <a:buSzPct val="45000"/>
-              <a:buFont typeface="Wingdings" charset="2"/>
-              <a:buChar char=""/>
-            </a:pPr>
-            <a:r>
-              <a:rPr b="0" lang="en-US" sz="2000" spc="-1" strike="noStrike">
-                <a:latin typeface="Arial"/>
-              </a:rPr>
-              <a:t>Fifth Outline Level</a:t>
-            </a:r>
-            <a:endParaRPr b="0" lang="en-US" sz="2000" spc="-1" strike="noStrike">
-              <a:latin typeface="Arial"/>
-            </a:endParaRPr>
-          </a:p>
-          <a:p>
-            <a:pPr lvl="5" marL="2592000" indent="-216000">
-              <a:spcBef>
-                <a:spcPts val="283"/>
-              </a:spcBef>
-              <a:buClr>
-                <a:srgbClr val="000000"/>
-              </a:buClr>
-              <a:buSzPct val="45000"/>
-              <a:buFont typeface="Wingdings" charset="2"/>
-              <a:buChar char=""/>
-            </a:pPr>
-            <a:r>
-              <a:rPr b="0" lang="en-US" sz="2000" spc="-1" strike="noStrike">
-                <a:latin typeface="Arial"/>
-              </a:rPr>
-              <a:t>Sixth Outline Level</a:t>
-            </a:r>
-            <a:endParaRPr b="0" lang="en-US" sz="2000" spc="-1" strike="noStrike">
-              <a:latin typeface="Arial"/>
-            </a:endParaRPr>
-          </a:p>
-          <a:p>
-            <a:pPr lvl="6" marL="3024000" indent="-216000">
-              <a:spcBef>
-                <a:spcPts val="283"/>
-              </a:spcBef>
-              <a:buClr>
-                <a:srgbClr val="000000"/>
-              </a:buClr>
-              <a:buSzPct val="45000"/>
-              <a:buFont typeface="Wingdings" charset="2"/>
-              <a:buChar char=""/>
-            </a:pPr>
-            <a:r>
-              <a:rPr b="0" lang="en-US" sz="2000" spc="-1" strike="noStrike">
-                <a:latin typeface="Arial"/>
-              </a:rPr>
-              <a:t>Seventh Outline Level</a:t>
-            </a:r>
-            <a:endParaRPr b="0" lang="en-US" sz="2000" spc="-1" strike="noStrike">
-              <a:latin typeface="Arial"/>
             </a:endParaRPr>
           </a:p>
         </p:txBody>
@@ -2735,7 +2939,7 @@
         <p:spPr>
           <a:xfrm>
             <a:off x="457200" y="457200"/>
-            <a:ext cx="24688800" cy="35661600"/>
+            <a:ext cx="24688440" cy="35661240"/>
           </a:xfrm>
           <a:prstGeom prst="rect">
             <a:avLst/>
@@ -2757,13 +2961,149 @@
       <p:sp>
         <p:nvSpPr>
           <p:cNvPr id="42" name=""/>
+          <p:cNvSpPr/>
+          <p:nvPr/>
+        </p:nvSpPr>
+        <p:spPr>
+          <a:xfrm>
+            <a:off x="457200" y="457200"/>
+            <a:ext cx="24688440" cy="2132640"/>
+          </a:xfrm>
+          <a:prstGeom prst="rect">
+            <a:avLst/>
+          </a:prstGeom>
+          <a:noFill/>
+          <a:ln w="0">
+            <a:noFill/>
+          </a:ln>
+        </p:spPr>
+        <p:style>
+          <a:lnRef idx="0"/>
+          <a:fillRef idx="0"/>
+          <a:effectRef idx="0"/>
+          <a:fontRef idx="minor"/>
+        </p:style>
+        <p:txBody>
+          <a:bodyPr lIns="90000" rIns="90000" tIns="45000" bIns="45000" anchor="t">
+            <a:noAutofit/>
+          </a:bodyPr>
+          <a:p>
+            <a:pPr algn="ctr">
+              <a:lnSpc>
+                <a:spcPct val="100000"/>
+              </a:lnSpc>
+              <a:buNone/>
+            </a:pPr>
+            <a:r>
+              <a:rPr b="0" lang="en-US" sz="7200" spc="-1" strike="noStrike">
+                <a:latin typeface="Arial"/>
+              </a:rPr>
+              <a:t>Motorized Robotic Hand Controlled by Surface Electromyography (sEMG)</a:t>
+            </a:r>
+            <a:endParaRPr b="0" lang="en-US" sz="7200" spc="-1" strike="noStrike">
+              <a:latin typeface="Arial"/>
+            </a:endParaRPr>
+          </a:p>
+        </p:txBody>
+      </p:sp>
+      <p:sp>
+        <p:nvSpPr>
+          <p:cNvPr id="43" name=""/>
+          <p:cNvSpPr/>
+          <p:nvPr/>
+        </p:nvSpPr>
+        <p:spPr>
+          <a:xfrm>
+            <a:off x="457200" y="2658960"/>
+            <a:ext cx="24688440" cy="769680"/>
+          </a:xfrm>
+          <a:prstGeom prst="rect">
+            <a:avLst/>
+          </a:prstGeom>
+          <a:noFill/>
+          <a:ln w="0">
+            <a:noFill/>
+          </a:ln>
+        </p:spPr>
+        <p:style>
+          <a:lnRef idx="0"/>
+          <a:fillRef idx="0"/>
+          <a:effectRef idx="0"/>
+          <a:fontRef idx="minor"/>
+        </p:style>
+        <p:txBody>
+          <a:bodyPr lIns="90000" rIns="90000" tIns="45000" bIns="45000" anchor="t">
+            <a:noAutofit/>
+          </a:bodyPr>
+          <a:p>
+            <a:pPr>
+              <a:lnSpc>
+                <a:spcPct val="100000"/>
+              </a:lnSpc>
+              <a:buNone/>
+            </a:pPr>
+            <a:r>
+              <a:rPr b="0" lang="en-US" sz="2400" spc="-1" strike="noStrike">
+                <a:latin typeface="Arial"/>
+              </a:rPr>
+              <a:t>Jay E. Bernstein, David J. Mora, Juan R. Ortiz</a:t>
+            </a:r>
+            <a:endParaRPr b="0" lang="en-US" sz="2400" spc="-1" strike="noStrike">
+              <a:latin typeface="Arial"/>
+            </a:endParaRPr>
+          </a:p>
+          <a:p>
+            <a:pPr>
+              <a:lnSpc>
+                <a:spcPct val="100000"/>
+              </a:lnSpc>
+              <a:buNone/>
+            </a:pPr>
+            <a:r>
+              <a:rPr b="0" lang="en-US" sz="2400" spc="-1" strike="noStrike">
+                <a:latin typeface="Arial"/>
+              </a:rPr>
+              <a:t>Advised by Dr. Norali Pernalete</a:t>
+            </a:r>
+            <a:endParaRPr b="0" lang="en-US" sz="2400" spc="-1" strike="noStrike">
+              <a:latin typeface="Arial"/>
+            </a:endParaRPr>
+          </a:p>
+        </p:txBody>
+      </p:sp>
+      <p:pic>
+        <p:nvPicPr>
+          <p:cNvPr id="44" name="" descr=""/>
+          <p:cNvPicPr/>
+          <p:nvPr/>
+        </p:nvPicPr>
+        <p:blipFill>
+          <a:blip r:embed="rId1"/>
+          <a:stretch/>
+        </p:blipFill>
+        <p:spPr>
+          <a:xfrm>
+            <a:off x="457560" y="23317200"/>
+            <a:ext cx="16001640" cy="8001000"/>
+          </a:xfrm>
+          <a:prstGeom prst="rect">
+            <a:avLst/>
+          </a:prstGeom>
+          <a:ln w="0">
+            <a:noFill/>
+          </a:ln>
+        </p:spPr>
+      </p:pic>
+      <p:sp>
+        <p:nvSpPr>
+          <p:cNvPr id="45" name=""/>
           <p:cNvSpPr txBox="1"/>
           <p:nvPr/>
         </p:nvSpPr>
         <p:spPr>
           <a:xfrm>
-            <a:off x="457200" y="457200"/>
-            <a:ext cx="24688800" cy="2133000"/>
+            <a:off x="9601200" y="4343400"/>
+            <a:ext cx="9372600" cy="2219760"/>
           </a:xfrm>
           <a:prstGeom prst="rect">
             <a:avLst/>
@@ -2778,74 +3118,167 @@
             <a:noAutofit/>
           </a:bodyPr>
           <a:p>
-            <a:pPr algn="ctr">
-              <a:buNone/>
-            </a:pPr>
-            <a:r>
-              <a:rPr b="0" lang="en-US" sz="7200" spc="-1" strike="noStrike">
-                <a:latin typeface="Arial"/>
-              </a:rPr>
-              <a:t>Motorized Robotic Hand Controlled by Surface </a:t>
-            </a:r>
-            <a:r>
-              <a:rPr b="0" lang="en-US" sz="7200" spc="-1" strike="noStrike">
-                <a:latin typeface="Arial"/>
-              </a:rPr>
-              <a:t>Electromyography (sEMG)</a:t>
-            </a:r>
-            <a:endParaRPr b="0" lang="en-US" sz="7200" spc="-1" strike="noStrike">
-              <a:latin typeface="Arial"/>
-            </a:endParaRPr>
-          </a:p>
-        </p:txBody>
-      </p:sp>
-      <p:sp>
-        <p:nvSpPr>
-          <p:cNvPr id="43" name=""/>
-          <p:cNvSpPr txBox="1"/>
+            <a:r>
+              <a:rPr b="0" lang="en-US" sz="1800" spc="-1" strike="noStrike">
+                <a:latin typeface="Arial"/>
+              </a:rPr>
+              <a:t>6</a:t>
+            </a:r>
+            <a:r>
+              <a:rPr b="0" lang="en-US" sz="1800" spc="-1" strike="noStrike">
+                <a:latin typeface="Arial"/>
+              </a:rPr>
+              <a:t>m</a:t>
+            </a:r>
+            <a:r>
+              <a:rPr b="0" lang="en-US" sz="1800" spc="-1" strike="noStrike">
+                <a:latin typeface="Arial"/>
+              </a:rPr>
+              <a:t>m</a:t>
+            </a:r>
+            <a:r>
+              <a:rPr b="0" lang="en-US" sz="1800" spc="-1" strike="noStrike">
+                <a:latin typeface="Arial"/>
+              </a:rPr>
+              <a:t> </a:t>
+            </a:r>
+            <a:r>
+              <a:rPr b="0" lang="en-US" sz="2400" spc="-1" strike="noStrike">
+                <a:latin typeface="Arial"/>
+              </a:rPr>
+              <a:t>8</a:t>
+            </a:r>
+            <a:r>
+              <a:rPr b="0" lang="en-US" sz="2400" spc="-1" strike="noStrike">
+                <a:latin typeface="Arial"/>
+              </a:rPr>
+              <a:t>m</a:t>
+            </a:r>
+            <a:r>
+              <a:rPr b="0" lang="en-US" sz="2400" spc="-1" strike="noStrike">
+                <a:latin typeface="Arial"/>
+              </a:rPr>
+              <a:t>m</a:t>
+            </a:r>
+            <a:r>
+              <a:rPr b="0" lang="en-US" sz="1800" spc="-1" strike="noStrike">
+                <a:latin typeface="Arial"/>
+              </a:rPr>
+              <a:t> </a:t>
+            </a:r>
+            <a:r>
+              <a:rPr b="0" lang="en-US" sz="3000" spc="-1" strike="noStrike">
+                <a:latin typeface="Arial"/>
+              </a:rPr>
+              <a:t>1</a:t>
+            </a:r>
+            <a:r>
+              <a:rPr b="0" lang="en-US" sz="3000" spc="-1" strike="noStrike">
+                <a:latin typeface="Arial"/>
+              </a:rPr>
+              <a:t>0</a:t>
+            </a:r>
+            <a:r>
+              <a:rPr b="0" lang="en-US" sz="3000" spc="-1" strike="noStrike">
+                <a:latin typeface="Arial"/>
+              </a:rPr>
+              <a:t>m</a:t>
+            </a:r>
+            <a:r>
+              <a:rPr b="0" lang="en-US" sz="3000" spc="-1" strike="noStrike">
+                <a:latin typeface="Arial"/>
+              </a:rPr>
+              <a:t>m</a:t>
+            </a:r>
+            <a:r>
+              <a:rPr b="0" lang="en-US" sz="1800" spc="-1" strike="noStrike">
+                <a:latin typeface="Arial"/>
+              </a:rPr>
+              <a:t> </a:t>
+            </a:r>
+            <a:r>
+              <a:rPr b="0" lang="en-US" sz="6000" spc="-1" strike="noStrike">
+                <a:latin typeface="Arial"/>
+              </a:rPr>
+              <a:t>2</a:t>
+            </a:r>
+            <a:r>
+              <a:rPr b="0" lang="en-US" sz="6000" spc="-1" strike="noStrike">
+                <a:latin typeface="Arial"/>
+              </a:rPr>
+              <a:t>0</a:t>
+            </a:r>
+            <a:r>
+              <a:rPr b="0" lang="en-US" sz="6000" spc="-1" strike="noStrike">
+                <a:latin typeface="Arial"/>
+              </a:rPr>
+              <a:t>m</a:t>
+            </a:r>
+            <a:r>
+              <a:rPr b="0" lang="en-US" sz="6000" spc="-1" strike="noStrike">
+                <a:latin typeface="Arial"/>
+              </a:rPr>
+              <a:t>m</a:t>
+            </a:r>
+            <a:r>
+              <a:rPr b="0" lang="en-US" sz="1800" spc="-1" strike="noStrike">
+                <a:latin typeface="Arial"/>
+              </a:rPr>
+              <a:t> </a:t>
+            </a:r>
+            <a:r>
+              <a:rPr b="0" lang="en-US" sz="9000" spc="-1" strike="noStrike">
+                <a:latin typeface="Arial"/>
+              </a:rPr>
+              <a:t>3</a:t>
+            </a:r>
+            <a:r>
+              <a:rPr b="0" lang="en-US" sz="9000" spc="-1" strike="noStrike">
+                <a:latin typeface="Arial"/>
+              </a:rPr>
+              <a:t>0</a:t>
+            </a:r>
+            <a:r>
+              <a:rPr b="0" lang="en-US" sz="9000" spc="-1" strike="noStrike">
+                <a:latin typeface="Arial"/>
+              </a:rPr>
+              <a:t>m</a:t>
+            </a:r>
+            <a:r>
+              <a:rPr b="0" lang="en-US" sz="9000" spc="-1" strike="noStrike">
+                <a:latin typeface="Arial"/>
+              </a:rPr>
+              <a:t>m</a:t>
+            </a:r>
+            <a:endParaRPr b="0" lang="en-US" sz="9000" spc="-1" strike="noStrike">
+              <a:latin typeface="Arial"/>
+            </a:endParaRPr>
+          </a:p>
+        </p:txBody>
+      </p:sp>
+      <p:pic>
+        <p:nvPicPr>
+          <p:cNvPr id="46" name="" descr=""/>
+          <p:cNvPicPr/>
           <p:nvPr/>
-        </p:nvSpPr>
-        <p:spPr>
-          <a:xfrm>
-            <a:off x="457200" y="2658960"/>
-            <a:ext cx="24688800" cy="770040"/>
-          </a:xfrm>
-          <a:prstGeom prst="rect">
-            <a:avLst/>
-          </a:prstGeom>
-          <a:noFill/>
-          <a:ln w="0">
-            <a:noFill/>
-          </a:ln>
-        </p:spPr>
-        <p:txBody>
-          <a:bodyPr lIns="90000" rIns="90000" tIns="45000" bIns="45000" anchor="t">
-            <a:noAutofit/>
-          </a:bodyPr>
-          <a:p>
-            <a:r>
-              <a:rPr b="0" lang="en-US" sz="2400" spc="-1" strike="noStrike">
-                <a:latin typeface="Arial"/>
-              </a:rPr>
-              <a:t>Jay E. Bernstein, David J. Mora, Juan R. Ortiz</a:t>
-            </a:r>
-            <a:endParaRPr b="0" lang="en-US" sz="2400" spc="-1" strike="noStrike">
-              <a:latin typeface="Arial"/>
-            </a:endParaRPr>
-          </a:p>
-          <a:p>
-            <a:r>
-              <a:rPr b="0" lang="en-US" sz="2400" spc="-1" strike="noStrike">
-                <a:latin typeface="Arial"/>
-              </a:rPr>
-              <a:t>Advised by Dr. Norali Pernalete</a:t>
-            </a:r>
-            <a:endParaRPr b="0" lang="en-US" sz="2400" spc="-1" strike="noStrike">
-              <a:latin typeface="Arial"/>
-            </a:endParaRPr>
-          </a:p>
-        </p:txBody>
-      </p:sp>
+        </p:nvPicPr>
+        <p:blipFill>
+          <a:blip r:embed="rId2"/>
+          <a:stretch/>
+        </p:blipFill>
+        <p:spPr>
+          <a:xfrm>
+            <a:off x="2743200" y="7543800"/>
+            <a:ext cx="10828800" cy="7086600"/>
+          </a:xfrm>
+          <a:prstGeom prst="rect">
+            <a:avLst/>
+          </a:prstGeom>
+          <a:ln w="0">
+            <a:noFill/>
+          </a:ln>
+        </p:spPr>
+      </p:pic>
     </p:spTree>
   </p:cSld>
   <mc:AlternateContent>

</xml_diff>

<commit_message>
Added a preliminary block diagram to powerpoint
</commit_message>
<xml_diff>
--- a/PresentationMaterial/lastname-firstname_poster.pptx
+++ b/PresentationMaterial/lastname-firstname_poster.pptx
@@ -12,7 +12,7 @@
 </p:presentation>
 </file>
 
-<file path=ppt/charts/chart11.xml><?xml version="1.0" encoding="utf-8"?>
+<file path=ppt/charts/chart12.xml><?xml version="1.0" encoding="utf-8"?>
 <c:chartSpace xmlns:c="http://schemas.openxmlformats.org/drawingml/2006/chart" xmlns:a="http://schemas.openxmlformats.org/drawingml/2006/main" xmlns:r="http://schemas.openxmlformats.org/officeDocument/2006/relationships">
   <c:lang val="en-US"/>
   <c:roundedCorners val="0"/>
@@ -25,12 +25,20 @@
           <a:p>
             <a:pPr>
               <a:defRPr b="0" sz="3200" spc="-1" strike="noStrike">
+                <a:solidFill>
+                  <a:srgbClr val="000000"/>
+                </a:solidFill>
                 <a:latin typeface="Arial"/>
+                <a:ea typeface="DejaVu Sans"/>
               </a:defRPr>
             </a:pPr>
             <a:r>
               <a:rPr b="0" sz="3200" spc="-1" strike="noStrike">
+                <a:solidFill>
+                  <a:srgbClr val="000000"/>
+                </a:solidFill>
                 <a:latin typeface="Arial"/>
+                <a:ea typeface="DejaVu Sans"/>
               </a:rPr>
               <a:t>Recorded Vs Processed Signal From Probe</a:t>
             </a:r>
@@ -41,8 +49,8 @@
         <c:manualLayout>
           <c:xMode val="edge"/>
           <c:yMode val="edge"/>
-          <c:x val="0.15397134264992"/>
-          <c:y val="0.0113745143307619"/>
+          <c:x val="0.153976790263232"/>
+          <c:y val="0.0114314675076022"/>
         </c:manualLayout>
       </c:layout>
       <c:overlay val="0"/>
@@ -60,10 +68,10 @@
           <c:layoutTarget val="inner"/>
           <c:xMode val="edge"/>
           <c:yMode val="edge"/>
-          <c:x val="0.0938700574575868"/>
-          <c:y val="0.115422077922078"/>
-          <c:w val="0.879339067759154"/>
-          <c:h val="0.745616883116883"/>
+          <c:x val="0.0938649872629493"/>
+          <c:y val="0.115440928032436"/>
+          <c:w val="0.879316444947637"/>
+          <c:h val="0.745579457146075"/>
         </c:manualLayout>
       </c:layout>
       <c:scatterChart>
@@ -74,7 +82,7 @@
           <c:order val="0"/>
           <c:tx>
             <c:strRef>
-              <c:f>label 1</c:f>
+              <c:f>label 0</c:f>
               <c:strCache>
                 <c:ptCount val="1"/>
                 <c:pt idx="0">
@@ -104,7 +112,11 @@
               <a:p>
                 <a:pPr>
                   <a:defRPr b="0" sz="1000" spc="-1" strike="noStrike">
+                    <a:solidFill>
+                      <a:srgbClr val="000000"/>
+                    </a:solidFill>
                     <a:latin typeface="Arial"/>
+                    <a:ea typeface="DejaVu Sans"/>
                   </a:defRPr>
                 </a:pPr>
               </a:p>
@@ -125,7 +137,7 @@
           </c:dLbls>
           <c:xVal>
             <c:numRef>
-              <c:f>0</c:f>
+              <c:f>1</c:f>
               <c:numCache>
                 <c:formatCode>General</c:formatCode>
                 <c:ptCount val="1998"/>
@@ -6128,7 +6140,7 @@
           </c:xVal>
           <c:yVal>
             <c:numRef>
-              <c:f>1</c:f>
+              <c:f>0</c:f>
               <c:numCache>
                 <c:formatCode>General</c:formatCode>
                 <c:ptCount val="1998"/>
@@ -12166,7 +12178,11 @@
               <a:p>
                 <a:pPr>
                   <a:defRPr b="0" sz="1000" spc="-1" strike="noStrike">
+                    <a:solidFill>
+                      <a:srgbClr val="000000"/>
+                    </a:solidFill>
                     <a:latin typeface="Arial"/>
+                    <a:ea typeface="DejaVu Sans"/>
                   </a:defRPr>
                 </a:pPr>
               </a:p>
@@ -12187,7 +12203,7 @@
           </c:dLbls>
           <c:xVal>
             <c:numRef>
-              <c:f>0</c:f>
+              <c:f>3</c:f>
               <c:numCache>
                 <c:formatCode>General</c:formatCode>
                 <c:ptCount val="1998"/>
@@ -24193,11 +24209,11 @@
           </c:yVal>
           <c:smooth val="0"/>
         </c:ser>
-        <c:axId val="52770954"/>
-        <c:axId val="49982511"/>
+        <c:axId val="93712990"/>
+        <c:axId val="71920705"/>
       </c:scatterChart>
       <c:valAx>
-        <c:axId val="52770954"/>
+        <c:axId val="93712990"/>
         <c:scaling>
           <c:orientation val="minMax"/>
           <c:max val="5"/>
@@ -24212,12 +24228,20 @@
               <a:p>
                 <a:pPr>
                   <a:defRPr b="0" sz="2400" spc="-1" strike="noStrike">
+                    <a:solidFill>
+                      <a:srgbClr val="000000"/>
+                    </a:solidFill>
                     <a:latin typeface="Arial"/>
+                    <a:ea typeface="DejaVu Sans"/>
                   </a:defRPr>
                 </a:pPr>
                 <a:r>
                   <a:rPr b="0" sz="2400" spc="-1" strike="noStrike">
+                    <a:solidFill>
+                      <a:srgbClr val="000000"/>
+                    </a:solidFill>
                     <a:latin typeface="Arial"/>
+                    <a:ea typeface="DejaVu Sans"/>
                   </a:rPr>
                   <a:t>Time (s)</a:t>
                 </a:r>
@@ -24249,17 +24273,21 @@
           <a:p>
             <a:pPr>
               <a:defRPr b="0" sz="1800" spc="-1" strike="noStrike">
+                <a:solidFill>
+                  <a:srgbClr val="000000"/>
+                </a:solidFill>
                 <a:latin typeface="Arial"/>
+                <a:ea typeface="DejaVu Sans"/>
               </a:defRPr>
             </a:pPr>
           </a:p>
         </c:txPr>
-        <c:crossAx val="49982511"/>
+        <c:crossAx val="71920705"/>
         <c:crosses val="max"/>
         <c:crossBetween val="midCat"/>
       </c:valAx>
       <c:valAx>
-        <c:axId val="49982511"/>
+        <c:axId val="71920705"/>
         <c:scaling>
           <c:orientation val="minMax"/>
         </c:scaling>
@@ -24282,12 +24310,20 @@
               <a:p>
                 <a:pPr>
                   <a:defRPr b="0" sz="2400" spc="-1" strike="noStrike">
+                    <a:solidFill>
+                      <a:srgbClr val="000000"/>
+                    </a:solidFill>
                     <a:latin typeface="Arial"/>
+                    <a:ea typeface="DejaVu Sans"/>
                   </a:defRPr>
                 </a:pPr>
                 <a:r>
                   <a:rPr b="0" sz="2400" spc="-1" strike="noStrike">
+                    <a:solidFill>
+                      <a:srgbClr val="000000"/>
+                    </a:solidFill>
                     <a:latin typeface="Arial"/>
+                    <a:ea typeface="DejaVu Sans"/>
                   </a:rPr>
                   <a:t>Voltage Reading (V)</a:t>
                 </a:r>
@@ -24319,12 +24355,16 @@
           <a:p>
             <a:pPr>
               <a:defRPr b="0" sz="1800" spc="-1" strike="noStrike">
+                <a:solidFill>
+                  <a:srgbClr val="000000"/>
+                </a:solidFill>
                 <a:latin typeface="Arial"/>
+                <a:ea typeface="DejaVu Sans"/>
               </a:defRPr>
             </a:pPr>
           </a:p>
         </c:txPr>
-        <c:crossAx val="52770954"/>
+        <c:crossAx val="93712990"/>
         <c:crosses val="autoZero"/>
         <c:crossBetween val="midCat"/>
       </c:valAx>
@@ -24362,7 +24402,11 @@
         <a:p>
           <a:pPr>
             <a:defRPr b="0" sz="2400" spc="-1" strike="noStrike">
+              <a:solidFill>
+                <a:srgbClr val="000000"/>
+              </a:solidFill>
               <a:latin typeface="Arial"/>
+              <a:ea typeface="DejaVu Sans"/>
             </a:defRPr>
           </a:pPr>
         </a:p>
@@ -24433,7 +24477,7 @@
         <p:txBody>
           <a:bodyPr/>
           <a:p>
-            <a:fld id="{E81D0EEE-0D49-445A-B274-4FB3E3828D29}" type="slidenum">
+            <a:fld id="{03DEA916-EA41-4871-99FC-C32447BD133F}" type="slidenum">
               <a:t>&lt;#&gt;</a:t>
             </a:fld>
           </a:p>
@@ -24621,7 +24665,7 @@
         <p:txBody>
           <a:bodyPr/>
           <a:p>
-            <a:fld id="{157179C3-FC3B-4FED-A8A4-9C4BCCE17DF2}" type="slidenum">
+            <a:fld id="{7625C787-D345-4079-936D-C7D8497059D2}" type="slidenum">
               <a:t>&lt;#&gt;</a:t>
             </a:fld>
           </a:p>
@@ -24877,7 +24921,7 @@
         <p:txBody>
           <a:bodyPr/>
           <a:p>
-            <a:fld id="{902D972C-FA97-4D0C-80AB-FE0FEF6E478A}" type="slidenum">
+            <a:fld id="{B57A220A-EE41-44FA-ABAD-747C4A0203EF}" type="slidenum">
               <a:t>&lt;#&gt;</a:t>
             </a:fld>
           </a:p>
@@ -25201,7 +25245,7 @@
         <p:txBody>
           <a:bodyPr/>
           <a:p>
-            <a:fld id="{3A1ACAAE-874E-4A0D-A714-3F7D8F6A4951}" type="slidenum">
+            <a:fld id="{798E7ABB-C32D-4C39-BD56-80BE7DE7732D}" type="slidenum">
               <a:t>&lt;#&gt;</a:t>
             </a:fld>
           </a:p>
@@ -25358,7 +25402,7 @@
         <p:txBody>
           <a:bodyPr/>
           <a:p>
-            <a:fld id="{CEDFF941-9DE0-48C2-A9DC-721F5FA50907}" type="slidenum">
+            <a:fld id="{E5A7E60C-B1EC-45F8-8710-DE3E87DEA7B6}" type="slidenum">
               <a:t>&lt;#&gt;</a:t>
             </a:fld>
           </a:p>
@@ -25512,7 +25556,7 @@
         <p:txBody>
           <a:bodyPr/>
           <a:p>
-            <a:fld id="{1E528660-534F-461B-B3E9-386CF8AE52DE}" type="slidenum">
+            <a:fld id="{DC82E44A-8F9E-48B0-B166-CBF95243E401}" type="slidenum">
               <a:t>&lt;#&gt;</a:t>
             </a:fld>
           </a:p>
@@ -25700,7 +25744,7 @@
         <p:txBody>
           <a:bodyPr/>
           <a:p>
-            <a:fld id="{0D6B6CB1-97A4-48FC-9330-5914596CDBA0}" type="slidenum">
+            <a:fld id="{DAA4BF7F-F404-4115-9F22-EC222E60B759}" type="slidenum">
               <a:t>&lt;#&gt;</a:t>
             </a:fld>
           </a:p>
@@ -25820,7 +25864,7 @@
         <p:txBody>
           <a:bodyPr/>
           <a:p>
-            <a:fld id="{DF466056-4A00-4F4A-BEC7-CCA277AE3427}" type="slidenum">
+            <a:fld id="{3FC7DE2C-FBBE-4359-9212-81589DFDAD76}" type="slidenum">
               <a:t>&lt;#&gt;</a:t>
             </a:fld>
           </a:p>
@@ -25940,7 +25984,7 @@
         <p:txBody>
           <a:bodyPr/>
           <a:p>
-            <a:fld id="{4357F311-EFD6-4B5E-BFBC-7F675B2D79F4}" type="slidenum">
+            <a:fld id="{FAAEF790-9CD8-43DA-918E-2A632111B2E7}" type="slidenum">
               <a:t>&lt;#&gt;</a:t>
             </a:fld>
           </a:p>
@@ -26162,7 +26206,7 @@
         <p:txBody>
           <a:bodyPr/>
           <a:p>
-            <a:fld id="{0265E873-2CC7-4E8E-AEE0-D9C3388C9CD9}" type="slidenum">
+            <a:fld id="{63B25327-1AFC-4F26-A6FF-767C7777538A}" type="slidenum">
               <a:t>&lt;#&gt;</a:t>
             </a:fld>
           </a:p>
@@ -26384,7 +26428,7 @@
         <p:txBody>
           <a:bodyPr/>
           <a:p>
-            <a:fld id="{A383E820-12A9-4CA8-AB4B-908E3BA7B264}" type="slidenum">
+            <a:fld id="{DE88F236-693E-456A-9AD1-53078F949A8D}" type="slidenum">
               <a:t>&lt;#&gt;</a:t>
             </a:fld>
           </a:p>
@@ -26606,7 +26650,7 @@
         <p:txBody>
           <a:bodyPr/>
           <a:p>
-            <a:fld id="{43B3720F-384E-40B4-9BBC-691771B07EA0}" type="slidenum">
+            <a:fld id="{C6545A6B-E646-47CB-B6C9-8EBB3F7E6115}" type="slidenum">
               <a:t>&lt;#&gt;</a:t>
             </a:fld>
           </a:p>
@@ -26674,8 +26718,8 @@
         </p:nvSpPr>
         <p:spPr>
           <a:xfrm>
-            <a:off x="8747280" y="33900120"/>
-            <a:ext cx="8106480" cy="1945440"/>
+            <a:off x="8746920" y="33900120"/>
+            <a:ext cx="8106120" cy="1945080"/>
           </a:xfrm>
           <a:prstGeom prst="rect">
             <a:avLst/>
@@ -26711,7 +26755,7 @@
               <a:rPr b="0" lang="en-US" sz="1400" spc="-1" strike="noStrike">
                 <a:latin typeface="Times New Roman"/>
               </a:rPr>
-              <a:t> </a:t>
+              <a:t>&lt;footer&gt;</a:t>
             </a:r>
             <a:endParaRPr b="0" lang="en-US" sz="1400" spc="-1" strike="noStrike">
               <a:latin typeface="Times New Roman"/>
@@ -26731,8 +26775,8 @@
         </p:nvSpPr>
         <p:spPr>
           <a:xfrm>
-            <a:off x="18348480" y="33900120"/>
-            <a:ext cx="5972760" cy="1945440"/>
+            <a:off x="18348120" y="33900120"/>
+            <a:ext cx="5972400" cy="1945080"/>
           </a:xfrm>
           <a:prstGeom prst="rect">
             <a:avLst/>
@@ -26767,14 +26811,14 @@
               </a:lnSpc>
               <a:buNone/>
             </a:pPr>
-            <a:fld id="{9B74ED53-1582-4BD7-B955-84DB68B5ADFC}" type="slidenum">
+            <a:fld id="{1F5F3D13-35F3-4319-9AB8-1E8B468A3F0C}" type="slidenum">
               <a:rPr b="0" lang="en-US" sz="5600" spc="-1" strike="noStrike">
                 <a:solidFill>
                   <a:srgbClr val="8b8b8b"/>
                 </a:solidFill>
                 <a:latin typeface="Calibri"/>
               </a:rPr>
-              <a:t>1</a:t>
+              <a:t>&lt;number&gt;</a:t>
             </a:fld>
             <a:endParaRPr b="0" lang="en-US" sz="5600" spc="-1" strike="noStrike">
               <a:latin typeface="Times New Roman"/>
@@ -26795,7 +26839,7 @@
         <p:spPr>
           <a:xfrm>
             <a:off x="1280160" y="33900120"/>
-            <a:ext cx="5972760" cy="1945440"/>
+            <a:ext cx="5972400" cy="1945080"/>
           </a:xfrm>
           <a:prstGeom prst="rect">
             <a:avLst/>
@@ -26821,7 +26865,7 @@
               <a:rPr b="0" lang="en-US" sz="1400" spc="-1" strike="noStrike">
                 <a:latin typeface="Times New Roman"/>
               </a:rPr>
-              <a:t> </a:t>
+              <a:t>&lt;date/time&gt;</a:t>
             </a:r>
             <a:endParaRPr b="0" lang="en-US" sz="1400" spc="-1" strike="noStrike">
               <a:latin typeface="Times New Roman"/>
@@ -27107,8 +27151,8 @@
         </p:nvSpPr>
         <p:spPr>
           <a:xfrm>
-            <a:off x="457200" y="457200"/>
-            <a:ext cx="24688080" cy="35660880"/>
+            <a:off x="456840" y="457200"/>
+            <a:ext cx="24687720" cy="35660520"/>
           </a:xfrm>
           <a:prstGeom prst="rect">
             <a:avLst/>
@@ -27135,8 +27179,8 @@
         </p:nvSpPr>
         <p:spPr>
           <a:xfrm>
-            <a:off x="457200" y="457200"/>
-            <a:ext cx="24688080" cy="2132280"/>
+            <a:off x="456840" y="457200"/>
+            <a:ext cx="24688080" cy="2131920"/>
           </a:xfrm>
           <a:prstGeom prst="rect">
             <a:avLst/>
@@ -27187,8 +27231,8 @@
         </p:nvSpPr>
         <p:spPr>
           <a:xfrm>
-            <a:off x="457200" y="2658960"/>
-            <a:ext cx="24688080" cy="998640"/>
+            <a:off x="456840" y="2658960"/>
+            <a:ext cx="24688080" cy="998280"/>
           </a:xfrm>
           <a:prstGeom prst="rect">
             <a:avLst/>
@@ -27264,8 +27308,8 @@
         </p:blipFill>
         <p:spPr>
           <a:xfrm>
-            <a:off x="9144000" y="27432000"/>
-            <a:ext cx="15544080" cy="8229600"/>
+            <a:off x="9143640" y="27432000"/>
+            <a:ext cx="15543720" cy="8229240"/>
           </a:xfrm>
           <a:prstGeom prst="rect">
             <a:avLst/>
@@ -27283,8 +27327,8 @@
         </p:nvSpPr>
         <p:spPr>
           <a:xfrm>
-            <a:off x="15773400" y="15087600"/>
-            <a:ext cx="9372240" cy="2219400"/>
+            <a:off x="15773040" y="15087600"/>
+            <a:ext cx="9371880" cy="2219040"/>
           </a:xfrm>
           <a:prstGeom prst="rect">
             <a:avLst/>
@@ -27313,55 +27357,91 @@
             </a:pPr>
             <a:r>
               <a:rPr b="0" lang="en-US" sz="1800" spc="-1" strike="noStrike">
+                <a:solidFill>
+                  <a:srgbClr val="000000"/>
+                </a:solidFill>
                 <a:latin typeface="Arial"/>
+                <a:ea typeface="DejaVu Sans"/>
               </a:rPr>
               <a:t>6mm </a:t>
             </a:r>
             <a:r>
               <a:rPr b="0" lang="en-US" sz="2400" spc="-1" strike="noStrike">
+                <a:solidFill>
+                  <a:srgbClr val="000000"/>
+                </a:solidFill>
                 <a:latin typeface="Arial"/>
+                <a:ea typeface="DejaVu Sans"/>
               </a:rPr>
               <a:t>8mm</a:t>
             </a:r>
             <a:r>
               <a:rPr b="0" lang="en-US" sz="1800" spc="-1" strike="noStrike">
+                <a:solidFill>
+                  <a:srgbClr val="000000"/>
+                </a:solidFill>
                 <a:latin typeface="Arial"/>
+                <a:ea typeface="DejaVu Sans"/>
               </a:rPr>
               <a:t> </a:t>
             </a:r>
             <a:r>
               <a:rPr b="0" lang="en-US" sz="3000" spc="-1" strike="noStrike">
+                <a:solidFill>
+                  <a:srgbClr val="000000"/>
+                </a:solidFill>
                 <a:latin typeface="Arial"/>
+                <a:ea typeface="DejaVu Sans"/>
               </a:rPr>
               <a:t>10mm</a:t>
             </a:r>
             <a:r>
               <a:rPr b="0" lang="en-US" sz="1800" spc="-1" strike="noStrike">
+                <a:solidFill>
+                  <a:srgbClr val="000000"/>
+                </a:solidFill>
                 <a:latin typeface="Arial"/>
+                <a:ea typeface="DejaVu Sans"/>
               </a:rPr>
               <a:t> </a:t>
             </a:r>
             <a:r>
               <a:rPr b="0" lang="en-US" sz="6000" spc="-1" strike="noStrike">
+                <a:solidFill>
+                  <a:srgbClr val="000000"/>
+                </a:solidFill>
                 <a:latin typeface="Arial"/>
+                <a:ea typeface="DejaVu Sans"/>
               </a:rPr>
               <a:t>20mm</a:t>
             </a:r>
             <a:r>
               <a:rPr b="0" lang="en-US" sz="1800" spc="-1" strike="noStrike">
+                <a:solidFill>
+                  <a:srgbClr val="000000"/>
+                </a:solidFill>
                 <a:latin typeface="Arial"/>
+                <a:ea typeface="DejaVu Sans"/>
               </a:rPr>
               <a:t> </a:t>
             </a:r>
             <a:r>
               <a:rPr b="0" lang="en-US" sz="9000" spc="-1" strike="noStrike">
+                <a:solidFill>
+                  <a:srgbClr val="000000"/>
+                </a:solidFill>
                 <a:latin typeface="Arial"/>
+                <a:ea typeface="DejaVu Sans"/>
               </a:rPr>
               <a:t>30mm. </a:t>
             </a:r>
             <a:r>
               <a:rPr b="0" lang="en-US" sz="3200" spc="-1" strike="noStrike">
+                <a:solidFill>
+                  <a:srgbClr val="000000"/>
+                </a:solidFill>
                 <a:latin typeface="Arial"/>
+                <a:ea typeface="DejaVu Sans"/>
               </a:rPr>
               <a:t>32Point = 0.5 inch High</a:t>
             </a:r>
@@ -27380,7 +27460,7 @@
         <p:spPr>
           <a:xfrm>
             <a:off x="457200" y="18288360"/>
-            <a:ext cx="11887200" cy="8229240"/>
+            <a:ext cx="11886840" cy="8228880"/>
           </a:xfrm>
           <a:prstGeom prst="rect">
             <a:avLst/>
@@ -27406,11 +27486,18 @@
           </a:bodyPr>
           <a:p>
             <a:pPr algn="ctr">
+              <a:lnSpc>
+                <a:spcPct val="100000"/>
+              </a:lnSpc>
               <a:buNone/>
             </a:pPr>
             <a:r>
               <a:rPr b="0" lang="en-US" sz="4800" spc="-1" strike="noStrike">
+                <a:solidFill>
+                  <a:srgbClr val="000000"/>
+                </a:solidFill>
                 <a:latin typeface="Arial"/>
+                <a:ea typeface="DejaVu Sans"/>
               </a:rPr>
               <a:t>Picture of Complete Project Here</a:t>
             </a:r>
@@ -27423,13 +27510,13 @@
       <p:sp>
         <p:nvSpPr>
           <p:cNvPr id="47" name=""/>
-          <p:cNvSpPr txBox="1"/>
+          <p:cNvSpPr/>
           <p:nvPr/>
         </p:nvSpPr>
         <p:spPr>
           <a:xfrm>
-            <a:off x="914400" y="3657600"/>
-            <a:ext cx="13258800" cy="3605760"/>
+            <a:off x="914040" y="3657600"/>
+            <a:ext cx="13258440" cy="3605400"/>
           </a:xfrm>
           <a:prstGeom prst="rect">
             <a:avLst/>
@@ -27441,6 +27528,12 @@
             <a:noFill/>
           </a:ln>
         </p:spPr>
+        <p:style>
+          <a:lnRef idx="0"/>
+          <a:fillRef idx="0"/>
+          <a:effectRef idx="0"/>
+          <a:fontRef idx="minor"/>
+        </p:style>
         <p:txBody>
           <a:bodyPr lIns="90000" rIns="90000" tIns="45000" bIns="45000" anchor="t">
             <a:noAutofit/>
@@ -27490,7 +27583,7 @@
         <p:spPr>
           <a:xfrm>
             <a:off x="457200" y="9144360"/>
-            <a:ext cx="11887200" cy="8229240"/>
+            <a:ext cx="11886840" cy="8228880"/>
           </a:xfrm>
           <a:prstGeom prst="rect">
             <a:avLst/>
@@ -27516,11 +27609,18 @@
           </a:bodyPr>
           <a:p>
             <a:pPr algn="ctr">
+              <a:lnSpc>
+                <a:spcPct val="100000"/>
+              </a:lnSpc>
               <a:buNone/>
             </a:pPr>
             <a:r>
               <a:rPr b="0" lang="en-US" sz="4800" spc="-1" strike="noStrike">
+                <a:solidFill>
+                  <a:srgbClr val="000000"/>
+                </a:solidFill>
                 <a:latin typeface="Arial"/>
+                <a:ea typeface="DejaVu Sans"/>
               </a:rPr>
               <a:t>Picture Showing Conductive Paths through Human tissue, juxtaposed with LTSPICE model</a:t>
             </a:r>
@@ -27537,8 +27637,8 @@
           <p:nvPr/>
         </p:nvGraphicFramePr>
         <p:xfrm>
-          <a:off x="14630400" y="8237520"/>
-          <a:ext cx="10175040" cy="6392880"/>
+          <a:off x="14630040" y="8237520"/>
+          <a:ext cx="10174680" cy="6392520"/>
         </p:xfrm>
         <a:graphic>
           <a:graphicData uri="http://schemas.openxmlformats.org/drawingml/2006/chart">
@@ -27554,19 +27654,18 @@
         </p:nvSpPr>
         <p:spPr>
           <a:xfrm>
-            <a:off x="14630400" y="2743200"/>
-            <a:ext cx="10058400" cy="5494320"/>
+            <a:off x="14630040" y="2743200"/>
+            <a:ext cx="10058400" cy="5493960"/>
           </a:xfrm>
           <a:prstGeom prst="rect">
             <a:avLst/>
           </a:prstGeom>
-          <a:solidFill>
-            <a:srgbClr val="729fcf"/>
-          </a:solidFill>
-          <a:ln w="0">
+          <a:noFill/>
+          <a:ln w="76320">
             <a:solidFill>
               <a:srgbClr val="3465a4"/>
             </a:solidFill>
+            <a:round/>
           </a:ln>
         </p:spPr>
         <p:style>
@@ -27576,24 +27675,610 @@
           <a:fontRef idx="minor"/>
         </p:style>
         <p:txBody>
-          <a:bodyPr lIns="90000" rIns="90000" tIns="45000" bIns="45000" anchor="ctr">
+          <a:bodyPr lIns="127800" rIns="127800" tIns="82800" bIns="82800" anchor="t">
             <a:noAutofit/>
           </a:bodyPr>
           <a:p>
-            <a:pPr algn="ctr">
+            <a:pPr>
+              <a:lnSpc>
+                <a:spcPct val="100000"/>
+              </a:lnSpc>
               <a:buNone/>
             </a:pPr>
+            <a:r>
+              <a:rPr b="0" lang="en-US" sz="3200" spc="-1" strike="noStrike">
+                <a:solidFill>
+                  <a:srgbClr val="000000"/>
+                </a:solidFill>
+                <a:latin typeface="Arial"/>
+                <a:ea typeface="DejaVu Sans"/>
+              </a:rPr>
+              <a:t>Block Diagram</a:t>
+            </a:r>
+            <a:endParaRPr b="0" lang="en-US" sz="3200" spc="-1" strike="noStrike">
+              <a:latin typeface="Arial"/>
+            </a:endParaRPr>
+          </a:p>
+        </p:txBody>
+      </p:sp>
+      <p:sp>
+        <p:nvSpPr>
+          <p:cNvPr id="51" name=""/>
+          <p:cNvSpPr/>
+          <p:nvPr/>
+        </p:nvSpPr>
+        <p:spPr>
+          <a:xfrm>
+            <a:off x="14859000" y="4800600"/>
+            <a:ext cx="1371600" cy="1371600"/>
+          </a:xfrm>
+          <a:prstGeom prst="rect">
+            <a:avLst/>
+          </a:prstGeom>
+          <a:noFill/>
+          <a:ln w="57240">
+            <a:solidFill>
+              <a:srgbClr val="3465a4"/>
+            </a:solidFill>
+            <a:round/>
+          </a:ln>
+        </p:spPr>
+        <p:style>
+          <a:lnRef idx="0"/>
+          <a:fillRef idx="0"/>
+          <a:effectRef idx="0"/>
+          <a:fontRef idx="minor"/>
+        </p:style>
+        <p:txBody>
+          <a:bodyPr lIns="118440" rIns="118440" tIns="73440" bIns="73440" anchor="t">
+            <a:noAutofit/>
+          </a:bodyPr>
+          <a:p>
+            <a:r>
+              <a:rPr b="0" lang="en-US" sz="2400" spc="-1" strike="noStrike">
+                <a:latin typeface="Arial"/>
+              </a:rPr>
+              <a:t>Surface EMG Pads</a:t>
+            </a:r>
+            <a:endParaRPr b="0" lang="en-US" sz="2400" spc="-1" strike="noStrike">
+              <a:latin typeface="Arial"/>
+            </a:endParaRPr>
+          </a:p>
+        </p:txBody>
+      </p:sp>
+      <p:sp>
+        <p:nvSpPr>
+          <p:cNvPr id="52" name=""/>
+          <p:cNvSpPr/>
+          <p:nvPr/>
+        </p:nvSpPr>
+        <p:spPr>
+          <a:xfrm>
+            <a:off x="16687800" y="3657600"/>
+            <a:ext cx="2286000" cy="3886200"/>
+          </a:xfrm>
+          <a:prstGeom prst="rect">
+            <a:avLst/>
+          </a:prstGeom>
+          <a:noFill/>
+          <a:ln w="57240">
+            <a:solidFill>
+              <a:srgbClr val="3465a4"/>
+            </a:solidFill>
+            <a:round/>
+          </a:ln>
+        </p:spPr>
+        <p:style>
+          <a:lnRef idx="0"/>
+          <a:fillRef idx="0"/>
+          <a:effectRef idx="0"/>
+          <a:fontRef idx="minor"/>
+        </p:style>
+        <p:txBody>
+          <a:bodyPr lIns="118440" rIns="118440" tIns="73440" bIns="73440" anchor="t">
+            <a:noAutofit/>
+          </a:bodyPr>
+          <a:p>
+            <a:r>
+              <a:rPr b="0" lang="en-US" sz="2400" spc="-1" strike="noStrike">
+                <a:latin typeface="Arial"/>
+              </a:rPr>
+              <a:t>Amplifier</a:t>
+            </a:r>
+            <a:endParaRPr b="0" lang="en-US" sz="2400" spc="-1" strike="noStrike">
+              <a:latin typeface="Arial"/>
+            </a:endParaRPr>
+          </a:p>
+        </p:txBody>
+      </p:sp>
+      <p:sp>
+        <p:nvSpPr>
+          <p:cNvPr id="53" name=""/>
+          <p:cNvSpPr/>
+          <p:nvPr/>
+        </p:nvSpPr>
+        <p:spPr>
+          <a:xfrm>
+            <a:off x="19659600" y="2971800"/>
+            <a:ext cx="2286000" cy="5029200"/>
+          </a:xfrm>
+          <a:prstGeom prst="rect">
+            <a:avLst/>
+          </a:prstGeom>
+          <a:noFill/>
+          <a:ln w="57240">
+            <a:solidFill>
+              <a:srgbClr val="3465a4"/>
+            </a:solidFill>
+            <a:round/>
+          </a:ln>
+        </p:spPr>
+        <p:style>
+          <a:lnRef idx="0"/>
+          <a:fillRef idx="0"/>
+          <a:effectRef idx="0"/>
+          <a:fontRef idx="minor"/>
+        </p:style>
+        <p:txBody>
+          <a:bodyPr lIns="118080" rIns="118080" tIns="73080" bIns="73080" anchor="t">
+            <a:noAutofit/>
+          </a:bodyPr>
+          <a:p>
+            <a:r>
+              <a:rPr b="0" lang="en-US" sz="2400" spc="-1" strike="noStrike">
+                <a:latin typeface="Arial"/>
+              </a:rPr>
+              <a:t>Microcontroller (Teensy 4.1)</a:t>
+            </a:r>
+            <a:endParaRPr b="0" lang="en-US" sz="2400" spc="-1" strike="noStrike">
+              <a:latin typeface="Arial"/>
+            </a:endParaRPr>
+          </a:p>
+        </p:txBody>
+      </p:sp>
+      <p:sp>
+        <p:nvSpPr>
+          <p:cNvPr id="54" name=""/>
+          <p:cNvSpPr/>
+          <p:nvPr/>
+        </p:nvSpPr>
+        <p:spPr>
+          <a:xfrm>
+            <a:off x="23088600" y="4800600"/>
+            <a:ext cx="1371600" cy="1371600"/>
+          </a:xfrm>
+          <a:prstGeom prst="rect">
+            <a:avLst/>
+          </a:prstGeom>
+          <a:noFill/>
+          <a:ln w="57240">
+            <a:solidFill>
+              <a:srgbClr val="3465a4"/>
+            </a:solidFill>
+            <a:round/>
+          </a:ln>
+        </p:spPr>
+        <p:style>
+          <a:lnRef idx="0"/>
+          <a:fillRef idx="0"/>
+          <a:effectRef idx="0"/>
+          <a:fontRef idx="minor"/>
+        </p:style>
+        <p:txBody>
+          <a:bodyPr lIns="118800" rIns="118800" tIns="73800" bIns="73800" anchor="t">
+            <a:noAutofit/>
+          </a:bodyPr>
+          <a:p>
+            <a:r>
+              <a:rPr b="0" lang="en-US" sz="2400" spc="-1" strike="noStrike">
+                <a:latin typeface="Arial"/>
+              </a:rPr>
+              <a:t>Robotic Hand</a:t>
+            </a:r>
+            <a:endParaRPr b="0" lang="en-US" sz="2400" spc="-1" strike="noStrike">
+              <a:latin typeface="Arial"/>
+            </a:endParaRPr>
+          </a:p>
+        </p:txBody>
+      </p:sp>
+      <p:sp>
+        <p:nvSpPr>
+          <p:cNvPr id="55" name=""/>
+          <p:cNvSpPr/>
+          <p:nvPr/>
+        </p:nvSpPr>
+        <p:spPr>
+          <a:xfrm>
+            <a:off x="19888200" y="5257800"/>
+            <a:ext cx="1828800" cy="1143000"/>
+          </a:xfrm>
+          <a:prstGeom prst="rect">
+            <a:avLst/>
+          </a:prstGeom>
+          <a:noFill/>
+          <a:ln w="38160">
+            <a:solidFill>
+              <a:srgbClr val="3465a4"/>
+            </a:solidFill>
+            <a:round/>
+          </a:ln>
+        </p:spPr>
+        <p:style>
+          <a:lnRef idx="0"/>
+          <a:fillRef idx="0"/>
+          <a:effectRef idx="0"/>
+          <a:fontRef idx="minor"/>
+        </p:style>
+        <p:txBody>
+          <a:bodyPr lIns="109080" rIns="109080" tIns="64080" bIns="64080" anchor="t">
+            <a:noAutofit/>
+          </a:bodyPr>
+          <a:p>
             <a:r>
               <a:rPr b="0" lang="en-US" sz="1800" spc="-1" strike="noStrike">
                 <a:latin typeface="Arial"/>
               </a:rPr>
-              <a:t>Signal Processing Chain here</a:t>
+              <a:t>Normalize, Rectify, and Amplify ADC Input</a:t>
             </a:r>
             <a:endParaRPr b="0" lang="en-US" sz="1800" spc="-1" strike="noStrike">
               <a:latin typeface="Arial"/>
             </a:endParaRPr>
           </a:p>
         </p:txBody>
+      </p:sp>
+      <p:sp>
+        <p:nvSpPr>
+          <p:cNvPr id="56" name=""/>
+          <p:cNvSpPr/>
+          <p:nvPr/>
+        </p:nvSpPr>
+        <p:spPr>
+          <a:xfrm>
+            <a:off x="19888200" y="6629400"/>
+            <a:ext cx="1828800" cy="1143000"/>
+          </a:xfrm>
+          <a:prstGeom prst="rect">
+            <a:avLst/>
+          </a:prstGeom>
+          <a:noFill/>
+          <a:ln w="38160">
+            <a:solidFill>
+              <a:srgbClr val="3465a4"/>
+            </a:solidFill>
+            <a:round/>
+          </a:ln>
+        </p:spPr>
+        <p:style>
+          <a:lnRef idx="0"/>
+          <a:fillRef idx="0"/>
+          <a:effectRef idx="0"/>
+          <a:fontRef idx="minor"/>
+        </p:style>
+        <p:txBody>
+          <a:bodyPr lIns="109080" rIns="109080" tIns="64080" bIns="64080" anchor="t">
+            <a:noAutofit/>
+          </a:bodyPr>
+          <a:p>
+            <a:r>
+              <a:rPr b="0" lang="en-US" sz="1800" spc="-1" strike="noStrike">
+                <a:latin typeface="Arial"/>
+              </a:rPr>
+              <a:t>Detect Peaks and Compare to Known Positions</a:t>
+            </a:r>
+            <a:endParaRPr b="0" lang="en-US" sz="1800" spc="-1" strike="noStrike">
+              <a:latin typeface="Arial"/>
+            </a:endParaRPr>
+          </a:p>
+        </p:txBody>
+      </p:sp>
+      <p:sp>
+        <p:nvSpPr>
+          <p:cNvPr id="57" name=""/>
+          <p:cNvSpPr/>
+          <p:nvPr/>
+        </p:nvSpPr>
+        <p:spPr>
+          <a:xfrm>
+            <a:off x="19888200" y="3886200"/>
+            <a:ext cx="1828800" cy="1143000"/>
+          </a:xfrm>
+          <a:prstGeom prst="rect">
+            <a:avLst/>
+          </a:prstGeom>
+          <a:noFill/>
+          <a:ln w="38160">
+            <a:solidFill>
+              <a:srgbClr val="3465a4"/>
+            </a:solidFill>
+            <a:round/>
+          </a:ln>
+        </p:spPr>
+        <p:style>
+          <a:lnRef idx="0"/>
+          <a:fillRef idx="0"/>
+          <a:effectRef idx="0"/>
+          <a:fontRef idx="minor"/>
+        </p:style>
+        <p:txBody>
+          <a:bodyPr lIns="109080" rIns="109080" tIns="64080" bIns="64080" anchor="t">
+            <a:noAutofit/>
+          </a:bodyPr>
+          <a:p>
+            <a:r>
+              <a:rPr b="0" lang="en-US" sz="1800" spc="-1" strike="noStrike">
+                <a:latin typeface="Arial"/>
+              </a:rPr>
+              <a:t>Capture 1000 </a:t>
+            </a:r>
+            <a:r>
+              <a:rPr b="0" lang="en-US" sz="1800" spc="-1" strike="noStrike">
+                <a:latin typeface="Arial"/>
+              </a:rPr>
+              <a:t>Samples at 40kHz </a:t>
+            </a:r>
+            <a:r>
+              <a:rPr b="0" lang="en-US" sz="1800" spc="-1" strike="noStrike">
+                <a:latin typeface="Arial"/>
+              </a:rPr>
+              <a:t>with ADC</a:t>
+            </a:r>
+            <a:endParaRPr b="0" lang="en-US" sz="1800" spc="-1" strike="noStrike">
+              <a:latin typeface="Arial"/>
+            </a:endParaRPr>
+          </a:p>
+        </p:txBody>
+      </p:sp>
+      <p:sp>
+        <p:nvSpPr>
+          <p:cNvPr id="58" name=""/>
+          <p:cNvSpPr/>
+          <p:nvPr/>
+        </p:nvSpPr>
+        <p:spPr>
+          <a:xfrm>
+            <a:off x="20802600" y="6400800"/>
+            <a:ext cx="0" cy="228600"/>
+          </a:xfrm>
+          <a:prstGeom prst="line">
+            <a:avLst/>
+          </a:prstGeom>
+          <a:ln w="38160">
+            <a:solidFill>
+              <a:srgbClr val="3465a4"/>
+            </a:solidFill>
+            <a:round/>
+            <a:tailEnd len="med" type="triangle" w="med"/>
+          </a:ln>
+        </p:spPr>
+        <p:style>
+          <a:lnRef idx="0"/>
+          <a:fillRef idx="0"/>
+          <a:effectRef idx="0"/>
+          <a:fontRef idx="minor"/>
+        </p:style>
+      </p:sp>
+      <p:sp>
+        <p:nvSpPr>
+          <p:cNvPr id="59" name=""/>
+          <p:cNvSpPr/>
+          <p:nvPr/>
+        </p:nvSpPr>
+        <p:spPr>
+          <a:xfrm>
+            <a:off x="20802600" y="5029200"/>
+            <a:ext cx="0" cy="228600"/>
+          </a:xfrm>
+          <a:prstGeom prst="line">
+            <a:avLst/>
+          </a:prstGeom>
+          <a:ln w="38160">
+            <a:solidFill>
+              <a:srgbClr val="3465a4"/>
+            </a:solidFill>
+            <a:round/>
+            <a:tailEnd len="med" type="triangle" w="med"/>
+          </a:ln>
+        </p:spPr>
+        <p:style>
+          <a:lnRef idx="0"/>
+          <a:fillRef idx="0"/>
+          <a:effectRef idx="0"/>
+          <a:fontRef idx="minor"/>
+        </p:style>
+      </p:sp>
+      <p:sp>
+        <p:nvSpPr>
+          <p:cNvPr id="60" name=""/>
+          <p:cNvSpPr/>
+          <p:nvPr/>
+        </p:nvSpPr>
+        <p:spPr>
+          <a:xfrm>
+            <a:off x="16230600" y="5486400"/>
+            <a:ext cx="457200" cy="0"/>
+          </a:xfrm>
+          <a:prstGeom prst="line">
+            <a:avLst/>
+          </a:prstGeom>
+          <a:ln w="38160">
+            <a:solidFill>
+              <a:srgbClr val="3465a4"/>
+            </a:solidFill>
+            <a:round/>
+            <a:tailEnd len="med" type="triangle" w="med"/>
+          </a:ln>
+        </p:spPr>
+        <p:style>
+          <a:lnRef idx="0"/>
+          <a:fillRef idx="0"/>
+          <a:effectRef idx="0"/>
+          <a:fontRef idx="minor"/>
+        </p:style>
+      </p:sp>
+      <p:cxnSp>
+        <p:nvCxnSpPr>
+          <p:cNvPr id="61" name=""/>
+          <p:cNvCxnSpPr/>
+          <p:nvPr/>
+        </p:nvCxnSpPr>
+        <p:spPr>
+          <a:xfrm>
+            <a:off x="0" y="0"/>
+            <a:ext cx="360" cy="360"/>
+          </a:xfrm>
+          <a:prstGeom prst="line">
+            <a:avLst/>
+          </a:prstGeom>
+          <a:ln w="38160">
+            <a:solidFill>
+              <a:srgbClr val="3465a4"/>
+            </a:solidFill>
+            <a:round/>
+            <a:tailEnd len="med" type="triangle" w="med"/>
+          </a:ln>
+        </p:spPr>
+      </p:cxnSp>
+      <p:cxnSp>
+        <p:nvCxnSpPr>
+          <p:cNvPr id="62" name=""/>
+          <p:cNvCxnSpPr/>
+          <p:nvPr/>
+        </p:nvCxnSpPr>
+        <p:spPr>
+          <a:xfrm>
+            <a:off x="0" y="0"/>
+            <a:ext cx="360" cy="360"/>
+          </a:xfrm>
+          <a:prstGeom prst="line">
+            <a:avLst/>
+          </a:prstGeom>
+          <a:ln w="57240">
+            <a:solidFill>
+              <a:srgbClr val="3465a4"/>
+            </a:solidFill>
+            <a:round/>
+            <a:tailEnd len="med" type="triangle" w="med"/>
+          </a:ln>
+        </p:spPr>
+      </p:cxnSp>
+      <p:sp>
+        <p:nvSpPr>
+          <p:cNvPr id="63" name=""/>
+          <p:cNvSpPr/>
+          <p:nvPr/>
+        </p:nvSpPr>
+        <p:spPr>
+          <a:xfrm>
+            <a:off x="16916400" y="4343400"/>
+            <a:ext cx="1828800" cy="1143000"/>
+          </a:xfrm>
+          <a:prstGeom prst="rect">
+            <a:avLst/>
+          </a:prstGeom>
+          <a:noFill/>
+          <a:ln w="38160">
+            <a:solidFill>
+              <a:srgbClr val="3465a4"/>
+            </a:solidFill>
+            <a:round/>
+          </a:ln>
+        </p:spPr>
+        <p:style>
+          <a:lnRef idx="0"/>
+          <a:fillRef idx="0"/>
+          <a:effectRef idx="0"/>
+          <a:fontRef idx="minor"/>
+        </p:style>
+        <p:txBody>
+          <a:bodyPr lIns="109080" rIns="109080" tIns="64080" bIns="64080" anchor="t">
+            <a:noAutofit/>
+          </a:bodyPr>
+          <a:p>
+            <a:r>
+              <a:rPr b="0" lang="en-US" sz="1800" spc="-1" strike="noStrike">
+                <a:latin typeface="Arial"/>
+              </a:rPr>
+              <a:t>Protected Inputs to Instrumentation Amplifier IC</a:t>
+            </a:r>
+            <a:endParaRPr b="0" lang="en-US" sz="1800" spc="-1" strike="noStrike">
+              <a:latin typeface="Arial"/>
+            </a:endParaRPr>
+          </a:p>
+        </p:txBody>
+      </p:sp>
+      <p:sp>
+        <p:nvSpPr>
+          <p:cNvPr id="64" name=""/>
+          <p:cNvSpPr/>
+          <p:nvPr/>
+        </p:nvSpPr>
+        <p:spPr>
+          <a:xfrm>
+            <a:off x="16892280" y="5791320"/>
+            <a:ext cx="1828800" cy="1143000"/>
+          </a:xfrm>
+          <a:prstGeom prst="rect">
+            <a:avLst/>
+          </a:prstGeom>
+          <a:noFill/>
+          <a:ln w="38160">
+            <a:solidFill>
+              <a:srgbClr val="3465a4"/>
+            </a:solidFill>
+            <a:round/>
+          </a:ln>
+        </p:spPr>
+        <p:style>
+          <a:lnRef idx="0"/>
+          <a:fillRef idx="0"/>
+          <a:effectRef idx="0"/>
+          <a:fontRef idx="minor"/>
+        </p:style>
+        <p:txBody>
+          <a:bodyPr lIns="109080" rIns="109080" tIns="64080" bIns="64080" anchor="t">
+            <a:noAutofit/>
+          </a:bodyPr>
+          <a:p>
+            <a:r>
+              <a:rPr b="0" lang="en-US" sz="1800" spc="-1" strike="noStrike">
+                <a:latin typeface="Arial"/>
+              </a:rPr>
+              <a:t>AC Coupled and Buffered Output</a:t>
+            </a:r>
+            <a:endParaRPr b="0" lang="en-US" sz="1800" spc="-1" strike="noStrike">
+              <a:latin typeface="Arial"/>
+            </a:endParaRPr>
+          </a:p>
+        </p:txBody>
+      </p:sp>
+      <p:sp>
+        <p:nvSpPr>
+          <p:cNvPr id="65" name=""/>
+          <p:cNvSpPr/>
+          <p:nvPr/>
+        </p:nvSpPr>
+        <p:spPr>
+          <a:xfrm>
+            <a:off x="17830800" y="5486400"/>
+            <a:ext cx="0" cy="304920"/>
+          </a:xfrm>
+          <a:prstGeom prst="line">
+            <a:avLst/>
+          </a:prstGeom>
+          <a:ln w="38160">
+            <a:solidFill>
+              <a:srgbClr val="3465a4"/>
+            </a:solidFill>
+            <a:round/>
+            <a:tailEnd len="med" type="triangle" w="med"/>
+          </a:ln>
+        </p:spPr>
+        <p:style>
+          <a:lnRef idx="0"/>
+          <a:fillRef idx="0"/>
+          <a:effectRef idx="0"/>
+          <a:fontRef idx="minor"/>
+        </p:style>
       </p:sp>
     </p:spTree>
   </p:cSld>

</xml_diff>

<commit_message>
Changed simulation slightly for presentation material, made distance calculation affect whole hand
</commit_message>
<xml_diff>
--- a/PresentationMaterial/lastname-firstname_poster.pptx
+++ b/PresentationMaterial/lastname-firstname_poster.pptx
@@ -12,7 +12,7 @@
 </p:presentation>
 </file>
 
-<file path=ppt/charts/chart12.xml><?xml version="1.0" encoding="utf-8"?>
+<file path=ppt/charts/chart5.xml><?xml version="1.0" encoding="utf-8"?>
 <c:chartSpace xmlns:c="http://schemas.openxmlformats.org/drawingml/2006/chart" xmlns:a="http://schemas.openxmlformats.org/drawingml/2006/main" xmlns:r="http://schemas.openxmlformats.org/officeDocument/2006/relationships">
   <c:lang val="en-US"/>
   <c:roundedCorners val="0"/>
@@ -49,8 +49,8 @@
         <c:manualLayout>
           <c:xMode val="edge"/>
           <c:yMode val="edge"/>
-          <c:x val="0.153976790263232"/>
-          <c:y val="0.0114314675076022"/>
+          <c:x val="0.153982238262039"/>
+          <c:y val="0.0114884270991722"/>
         </c:manualLayout>
       </c:layout>
       <c:overlay val="0"/>
@@ -68,10 +68,10 @@
           <c:layoutTarget val="inner"/>
           <c:xMode val="edge"/>
           <c:yMode val="edge"/>
-          <c:x val="0.0938649872629493"/>
-          <c:y val="0.115440928032436"/>
-          <c:w val="0.879316444947637"/>
-          <c:h val="0.745579457146075"/>
+          <c:x val="0.0938683083890599"/>
+          <c:y val="0.115447429182857"/>
+          <c:w val="0.879276792980222"/>
+          <c:h val="0.745565129244805"/>
         </c:manualLayout>
       </c:layout>
       <c:scatterChart>
@@ -24209,11 +24209,11 @@
           </c:yVal>
           <c:smooth val="0"/>
         </c:ser>
-        <c:axId val="93712990"/>
-        <c:axId val="71920705"/>
+        <c:axId val="326879"/>
+        <c:axId val="75212568"/>
       </c:scatterChart>
       <c:valAx>
-        <c:axId val="93712990"/>
+        <c:axId val="326879"/>
         <c:scaling>
           <c:orientation val="minMax"/>
           <c:max val="5"/>
@@ -24282,12 +24282,12 @@
             </a:pPr>
           </a:p>
         </c:txPr>
-        <c:crossAx val="71920705"/>
+        <c:crossAx val="75212568"/>
         <c:crosses val="max"/>
         <c:crossBetween val="midCat"/>
       </c:valAx>
       <c:valAx>
-        <c:axId val="71920705"/>
+        <c:axId val="75212568"/>
         <c:scaling>
           <c:orientation val="minMax"/>
         </c:scaling>
@@ -24364,7 +24364,7 @@
             </a:pPr>
           </a:p>
         </c:txPr>
-        <c:crossAx val="93712990"/>
+        <c:crossAx val="326879"/>
         <c:crosses val="autoZero"/>
         <c:crossBetween val="midCat"/>
       </c:valAx>
@@ -24477,7 +24477,7 @@
         <p:txBody>
           <a:bodyPr/>
           <a:p>
-            <a:fld id="{03DEA916-EA41-4871-99FC-C32447BD133F}" type="slidenum">
+            <a:fld id="{7AF58379-2C68-4F27-846F-735F044034F9}" type="slidenum">
               <a:t>&lt;#&gt;</a:t>
             </a:fld>
           </a:p>
@@ -24665,7 +24665,7 @@
         <p:txBody>
           <a:bodyPr/>
           <a:p>
-            <a:fld id="{7625C787-D345-4079-936D-C7D8497059D2}" type="slidenum">
+            <a:fld id="{32ACD39E-2151-4A19-8CB5-53C5658A40BB}" type="slidenum">
               <a:t>&lt;#&gt;</a:t>
             </a:fld>
           </a:p>
@@ -24921,7 +24921,7 @@
         <p:txBody>
           <a:bodyPr/>
           <a:p>
-            <a:fld id="{B57A220A-EE41-44FA-ABAD-747C4A0203EF}" type="slidenum">
+            <a:fld id="{4BA37677-B9D8-4CF1-8F7E-F2607641BC2E}" type="slidenum">
               <a:t>&lt;#&gt;</a:t>
             </a:fld>
           </a:p>
@@ -25245,7 +25245,7 @@
         <p:txBody>
           <a:bodyPr/>
           <a:p>
-            <a:fld id="{798E7ABB-C32D-4C39-BD56-80BE7DE7732D}" type="slidenum">
+            <a:fld id="{AC9981DA-DE8B-4E70-B08B-E46B4ED4F275}" type="slidenum">
               <a:t>&lt;#&gt;</a:t>
             </a:fld>
           </a:p>
@@ -25402,7 +25402,7 @@
         <p:txBody>
           <a:bodyPr/>
           <a:p>
-            <a:fld id="{E5A7E60C-B1EC-45F8-8710-DE3E87DEA7B6}" type="slidenum">
+            <a:fld id="{88AFADC8-1BF3-48CA-B21A-C6A654058717}" type="slidenum">
               <a:t>&lt;#&gt;</a:t>
             </a:fld>
           </a:p>
@@ -25556,7 +25556,7 @@
         <p:txBody>
           <a:bodyPr/>
           <a:p>
-            <a:fld id="{DC82E44A-8F9E-48B0-B166-CBF95243E401}" type="slidenum">
+            <a:fld id="{A898D03A-B410-4292-AC9E-39EA909B1310}" type="slidenum">
               <a:t>&lt;#&gt;</a:t>
             </a:fld>
           </a:p>
@@ -25744,7 +25744,7 @@
         <p:txBody>
           <a:bodyPr/>
           <a:p>
-            <a:fld id="{DAA4BF7F-F404-4115-9F22-EC222E60B759}" type="slidenum">
+            <a:fld id="{D2AA43F7-B32C-4ACC-B972-F9BF07AC2FE7}" type="slidenum">
               <a:t>&lt;#&gt;</a:t>
             </a:fld>
           </a:p>
@@ -25864,7 +25864,7 @@
         <p:txBody>
           <a:bodyPr/>
           <a:p>
-            <a:fld id="{3FC7DE2C-FBBE-4359-9212-81589DFDAD76}" type="slidenum">
+            <a:fld id="{CBA41404-B5A7-4C21-AEC1-E2CA87238FE4}" type="slidenum">
               <a:t>&lt;#&gt;</a:t>
             </a:fld>
           </a:p>
@@ -25984,7 +25984,7 @@
         <p:txBody>
           <a:bodyPr/>
           <a:p>
-            <a:fld id="{FAAEF790-9CD8-43DA-918E-2A632111B2E7}" type="slidenum">
+            <a:fld id="{7600F068-3803-4785-9268-C06F551CE0CC}" type="slidenum">
               <a:t>&lt;#&gt;</a:t>
             </a:fld>
           </a:p>
@@ -26206,7 +26206,7 @@
         <p:txBody>
           <a:bodyPr/>
           <a:p>
-            <a:fld id="{63B25327-1AFC-4F26-A6FF-767C7777538A}" type="slidenum">
+            <a:fld id="{5B5C9859-79D7-4989-97AC-1A045FCB42D6}" type="slidenum">
               <a:t>&lt;#&gt;</a:t>
             </a:fld>
           </a:p>
@@ -26428,7 +26428,7 @@
         <p:txBody>
           <a:bodyPr/>
           <a:p>
-            <a:fld id="{DE88F236-693E-456A-9AD1-53078F949A8D}" type="slidenum">
+            <a:fld id="{55198279-B27C-46B3-A6CC-3E4099AE2798}" type="slidenum">
               <a:t>&lt;#&gt;</a:t>
             </a:fld>
           </a:p>
@@ -26650,7 +26650,7 @@
         <p:txBody>
           <a:bodyPr/>
           <a:p>
-            <a:fld id="{C6545A6B-E646-47CB-B6C9-8EBB3F7E6115}" type="slidenum">
+            <a:fld id="{0B575D3E-D1D4-4E7E-95C4-9EF64C8A584F}" type="slidenum">
               <a:t>&lt;#&gt;</a:t>
             </a:fld>
           </a:p>
@@ -26719,7 +26719,7 @@
         <p:spPr>
           <a:xfrm>
             <a:off x="8746920" y="33900120"/>
-            <a:ext cx="8106120" cy="1945080"/>
+            <a:ext cx="8105760" cy="1944720"/>
           </a:xfrm>
           <a:prstGeom prst="rect">
             <a:avLst/>
@@ -26776,7 +26776,7 @@
         <p:spPr>
           <a:xfrm>
             <a:off x="18348120" y="33900120"/>
-            <a:ext cx="5972400" cy="1945080"/>
+            <a:ext cx="5972040" cy="1944720"/>
           </a:xfrm>
           <a:prstGeom prst="rect">
             <a:avLst/>
@@ -26811,7 +26811,7 @@
               </a:lnSpc>
               <a:buNone/>
             </a:pPr>
-            <a:fld id="{1F5F3D13-35F3-4319-9AB8-1E8B468A3F0C}" type="slidenum">
+            <a:fld id="{B0220439-476E-4F1A-8ECC-7A7204C44E04}" type="slidenum">
               <a:rPr b="0" lang="en-US" sz="5600" spc="-1" strike="noStrike">
                 <a:solidFill>
                   <a:srgbClr val="8b8b8b"/>
@@ -26839,7 +26839,7 @@
         <p:spPr>
           <a:xfrm>
             <a:off x="1280160" y="33900120"/>
-            <a:ext cx="5972400" cy="1945080"/>
+            <a:ext cx="5972040" cy="1944720"/>
           </a:xfrm>
           <a:prstGeom prst="rect">
             <a:avLst/>
@@ -26908,7 +26908,211 @@
               <a:rPr b="0" lang="en-US" sz="4400" spc="-1" strike="noStrike">
                 <a:latin typeface="Arial"/>
               </a:rPr>
-              <a:t>Click to edit the title text format</a:t>
+              <a:t>C</a:t>
+            </a:r>
+            <a:r>
+              <a:rPr b="0" lang="en-US" sz="4400" spc="-1" strike="noStrike">
+                <a:latin typeface="Arial"/>
+              </a:rPr>
+              <a:t>l</a:t>
+            </a:r>
+            <a:r>
+              <a:rPr b="0" lang="en-US" sz="4400" spc="-1" strike="noStrike">
+                <a:latin typeface="Arial"/>
+              </a:rPr>
+              <a:t>i</a:t>
+            </a:r>
+            <a:r>
+              <a:rPr b="0" lang="en-US" sz="4400" spc="-1" strike="noStrike">
+                <a:latin typeface="Arial"/>
+              </a:rPr>
+              <a:t>c</a:t>
+            </a:r>
+            <a:r>
+              <a:rPr b="0" lang="en-US" sz="4400" spc="-1" strike="noStrike">
+                <a:latin typeface="Arial"/>
+              </a:rPr>
+              <a:t>k</a:t>
+            </a:r>
+            <a:r>
+              <a:rPr b="0" lang="en-US" sz="4400" spc="-1" strike="noStrike">
+                <a:latin typeface="Arial"/>
+              </a:rPr>
+              <a:t> </a:t>
+            </a:r>
+            <a:r>
+              <a:rPr b="0" lang="en-US" sz="4400" spc="-1" strike="noStrike">
+                <a:latin typeface="Arial"/>
+              </a:rPr>
+              <a:t>t</a:t>
+            </a:r>
+            <a:r>
+              <a:rPr b="0" lang="en-US" sz="4400" spc="-1" strike="noStrike">
+                <a:latin typeface="Arial"/>
+              </a:rPr>
+              <a:t>o</a:t>
+            </a:r>
+            <a:r>
+              <a:rPr b="0" lang="en-US" sz="4400" spc="-1" strike="noStrike">
+                <a:latin typeface="Arial"/>
+              </a:rPr>
+              <a:t> </a:t>
+            </a:r>
+            <a:r>
+              <a:rPr b="0" lang="en-US" sz="4400" spc="-1" strike="noStrike">
+                <a:latin typeface="Arial"/>
+              </a:rPr>
+              <a:t>e</a:t>
+            </a:r>
+            <a:r>
+              <a:rPr b="0" lang="en-US" sz="4400" spc="-1" strike="noStrike">
+                <a:latin typeface="Arial"/>
+              </a:rPr>
+              <a:t>d</a:t>
+            </a:r>
+            <a:r>
+              <a:rPr b="0" lang="en-US" sz="4400" spc="-1" strike="noStrike">
+                <a:latin typeface="Arial"/>
+              </a:rPr>
+              <a:t>i</a:t>
+            </a:r>
+            <a:r>
+              <a:rPr b="0" lang="en-US" sz="4400" spc="-1" strike="noStrike">
+                <a:latin typeface="Arial"/>
+              </a:rPr>
+              <a:t>t</a:t>
+            </a:r>
+            <a:r>
+              <a:rPr b="0" lang="en-US" sz="4400" spc="-1" strike="noStrike">
+                <a:latin typeface="Arial"/>
+              </a:rPr>
+              <a:t> </a:t>
+            </a:r>
+            <a:r>
+              <a:rPr b="0" lang="en-US" sz="4400" spc="-1" strike="noStrike">
+                <a:latin typeface="Arial"/>
+              </a:rPr>
+              <a:t>t</a:t>
+            </a:r>
+            <a:r>
+              <a:rPr b="0" lang="en-US" sz="4400" spc="-1" strike="noStrike">
+                <a:latin typeface="Arial"/>
+              </a:rPr>
+              <a:t>h</a:t>
+            </a:r>
+            <a:r>
+              <a:rPr b="0" lang="en-US" sz="4400" spc="-1" strike="noStrike">
+                <a:latin typeface="Arial"/>
+              </a:rPr>
+              <a:t>e</a:t>
+            </a:r>
+            <a:r>
+              <a:rPr b="0" lang="en-US" sz="4400" spc="-1" strike="noStrike">
+                <a:latin typeface="Arial"/>
+              </a:rPr>
+              <a:t> </a:t>
+            </a:r>
+            <a:r>
+              <a:rPr b="0" lang="en-US" sz="4400" spc="-1" strike="noStrike">
+                <a:latin typeface="Arial"/>
+              </a:rPr>
+              <a:t>t</a:t>
+            </a:r>
+            <a:r>
+              <a:rPr b="0" lang="en-US" sz="4400" spc="-1" strike="noStrike">
+                <a:latin typeface="Arial"/>
+              </a:rPr>
+              <a:t>i</a:t>
+            </a:r>
+            <a:r>
+              <a:rPr b="0" lang="en-US" sz="4400" spc="-1" strike="noStrike">
+                <a:latin typeface="Arial"/>
+              </a:rPr>
+              <a:t>t</a:t>
+            </a:r>
+            <a:r>
+              <a:rPr b="0" lang="en-US" sz="4400" spc="-1" strike="noStrike">
+                <a:latin typeface="Arial"/>
+              </a:rPr>
+              <a:t>l</a:t>
+            </a:r>
+            <a:r>
+              <a:rPr b="0" lang="en-US" sz="4400" spc="-1" strike="noStrike">
+                <a:latin typeface="Arial"/>
+              </a:rPr>
+              <a:t>e</a:t>
+            </a:r>
+            <a:r>
+              <a:rPr b="0" lang="en-US" sz="4400" spc="-1" strike="noStrike">
+                <a:latin typeface="Arial"/>
+              </a:rPr>
+              <a:t> </a:t>
+            </a:r>
+            <a:r>
+              <a:rPr b="0" lang="en-US" sz="4400" spc="-1" strike="noStrike">
+                <a:latin typeface="Arial"/>
+              </a:rPr>
+              <a:t>t</a:t>
+            </a:r>
+            <a:r>
+              <a:rPr b="0" lang="en-US" sz="4400" spc="-1" strike="noStrike">
+                <a:latin typeface="Arial"/>
+              </a:rPr>
+              <a:t>e</a:t>
+            </a:r>
+            <a:r>
+              <a:rPr b="0" lang="en-US" sz="4400" spc="-1" strike="noStrike">
+                <a:latin typeface="Arial"/>
+              </a:rPr>
+              <a:t>x</a:t>
+            </a:r>
+            <a:r>
+              <a:rPr b="0" lang="en-US" sz="4400" spc="-1" strike="noStrike">
+                <a:latin typeface="Arial"/>
+              </a:rPr>
+              <a:t>t</a:t>
+            </a:r>
+            <a:r>
+              <a:rPr b="0" lang="en-US" sz="4400" spc="-1" strike="noStrike">
+                <a:latin typeface="Arial"/>
+              </a:rPr>
+              <a:t> </a:t>
+            </a:r>
+            <a:r>
+              <a:rPr b="0" lang="en-US" sz="4400" spc="-1" strike="noStrike">
+                <a:latin typeface="Arial"/>
+              </a:rPr>
+              <a:t>f</a:t>
+            </a:r>
+            <a:r>
+              <a:rPr b="0" lang="en-US" sz="4400" spc="-1" strike="noStrike">
+                <a:latin typeface="Arial"/>
+              </a:rPr>
+              <a:t>o</a:t>
+            </a:r>
+            <a:r>
+              <a:rPr b="0" lang="en-US" sz="4400" spc="-1" strike="noStrike">
+                <a:latin typeface="Arial"/>
+              </a:rPr>
+              <a:t>r</a:t>
+            </a:r>
+            <a:r>
+              <a:rPr b="0" lang="en-US" sz="4400" spc="-1" strike="noStrike">
+                <a:latin typeface="Arial"/>
+              </a:rPr>
+              <a:t>m</a:t>
+            </a:r>
+            <a:r>
+              <a:rPr b="0" lang="en-US" sz="4400" spc="-1" strike="noStrike">
+                <a:latin typeface="Arial"/>
+              </a:rPr>
+              <a:t>a</a:t>
+            </a:r>
+            <a:r>
+              <a:rPr b="0" lang="en-US" sz="4400" spc="-1" strike="noStrike">
+                <a:latin typeface="Arial"/>
+              </a:rPr>
+              <a:t>t</a:t>
             </a:r>
             <a:endParaRPr b="0" lang="en-US" sz="4400" spc="-1" strike="noStrike">
               <a:latin typeface="Arial"/>
@@ -27152,7 +27356,7 @@
         <p:spPr>
           <a:xfrm>
             <a:off x="456840" y="457200"/>
-            <a:ext cx="24687720" cy="35660520"/>
+            <a:ext cx="24687360" cy="35660160"/>
           </a:xfrm>
           <a:prstGeom prst="rect">
             <a:avLst/>
@@ -27180,7 +27384,7 @@
         <p:spPr>
           <a:xfrm>
             <a:off x="456840" y="457200"/>
-            <a:ext cx="24688080" cy="2131920"/>
+            <a:ext cx="24687720" cy="2131560"/>
           </a:xfrm>
           <a:prstGeom prst="rect">
             <a:avLst/>
@@ -27232,7 +27436,7 @@
         <p:spPr>
           <a:xfrm>
             <a:off x="456840" y="2658960"/>
-            <a:ext cx="24688080" cy="998280"/>
+            <a:ext cx="24687720" cy="997920"/>
           </a:xfrm>
           <a:prstGeom prst="rect">
             <a:avLst/>
@@ -27309,7 +27513,7 @@
         <p:spPr>
           <a:xfrm>
             <a:off x="9143640" y="27432000"/>
-            <a:ext cx="15543720" cy="8229240"/>
+            <a:ext cx="15543360" cy="8228880"/>
           </a:xfrm>
           <a:prstGeom prst="rect">
             <a:avLst/>
@@ -27327,8 +27531,8 @@
         </p:nvSpPr>
         <p:spPr>
           <a:xfrm>
-            <a:off x="15773040" y="15087600"/>
-            <a:ext cx="9371880" cy="2219040"/>
+            <a:off x="15773400" y="19888200"/>
+            <a:ext cx="9371520" cy="2218680"/>
           </a:xfrm>
           <a:prstGeom prst="rect">
             <a:avLst/>
@@ -27460,7 +27664,7 @@
         <p:spPr>
           <a:xfrm>
             <a:off x="457200" y="18288360"/>
-            <a:ext cx="11886840" cy="8228880"/>
+            <a:ext cx="11886480" cy="8228520"/>
           </a:xfrm>
           <a:prstGeom prst="rect">
             <a:avLst/>
@@ -27516,7 +27720,7 @@
         <p:spPr>
           <a:xfrm>
             <a:off x="914040" y="3657600"/>
-            <a:ext cx="13258440" cy="3605400"/>
+            <a:ext cx="13258080" cy="3605040"/>
           </a:xfrm>
           <a:prstGeom prst="rect">
             <a:avLst/>
@@ -27547,7 +27751,11 @@
             </a:pPr>
             <a:r>
               <a:rPr b="0" lang="en-US" sz="2400" spc="-1" strike="noStrike">
+                <a:solidFill>
+                  <a:srgbClr val="000000"/>
+                </a:solidFill>
                 <a:latin typeface="Arial"/>
+                <a:ea typeface="DejaVu Sans"/>
               </a:rPr>
               <a:t>Abstract:</a:t>
             </a:r>
@@ -27564,7 +27772,11 @@
             </a:pPr>
             <a:r>
               <a:rPr b="0" lang="en-US" sz="2400" spc="-1" strike="noStrike">
+                <a:solidFill>
+                  <a:srgbClr val="000000"/>
+                </a:solidFill>
                 <a:latin typeface="Arial"/>
+                <a:ea typeface="DejaVu Sans"/>
               </a:rPr>
               <a:t>Embedded controllers and analog acquisition ICs have. The objective of this project was to discover the fundamentals of signal acquisition and processing, in a situation requiring extremely precise hardware requirements in order to achieve both common mode signal rejection and extremely high gain. Because this is a medical device, considerations of safety had to be made as well. The final product is a printed circuit board designed around the Texas Instruments INA82x that handles differential gain, with input resistance to limit the shock hazard were a fault to occur. The amplified input signal is processed so that a microcontroller is able to determine what command the signal is closest to.</a:t>
             </a:r>
@@ -27583,7 +27795,7 @@
         <p:spPr>
           <a:xfrm>
             <a:off x="457200" y="9144360"/>
-            <a:ext cx="11886840" cy="8228880"/>
+            <a:ext cx="11886480" cy="8228520"/>
           </a:xfrm>
           <a:prstGeom prst="rect">
             <a:avLst/>
@@ -27637,8 +27849,8 @@
           <p:nvPr/>
         </p:nvGraphicFramePr>
         <p:xfrm>
-          <a:off x="14630040" y="8237520"/>
-          <a:ext cx="10174680" cy="6392520"/>
+          <a:off x="14969880" y="8695440"/>
+          <a:ext cx="10174320" cy="6392160"/>
         </p:xfrm>
         <a:graphic>
           <a:graphicData uri="http://schemas.openxmlformats.org/drawingml/2006/chart">
@@ -27654,8 +27866,8 @@
         </p:nvSpPr>
         <p:spPr>
           <a:xfrm>
-            <a:off x="14630040" y="2743200"/>
-            <a:ext cx="10058400" cy="5493960"/>
+            <a:off x="15544440" y="2964600"/>
+            <a:ext cx="9601560" cy="5493600"/>
           </a:xfrm>
           <a:prstGeom prst="rect">
             <a:avLst/>
@@ -27663,7 +27875,7 @@
           <a:noFill/>
           <a:ln w="76320">
             <a:solidFill>
-              <a:srgbClr val="3465a4"/>
+              <a:srgbClr val="3faf46"/>
             </a:solidFill>
             <a:round/>
           </a:ln>
@@ -27709,8 +27921,8 @@
         </p:nvSpPr>
         <p:spPr>
           <a:xfrm>
-            <a:off x="14859000" y="4800600"/>
-            <a:ext cx="1371600" cy="1371600"/>
+            <a:off x="15773400" y="5022000"/>
+            <a:ext cx="1371240" cy="1371240"/>
           </a:xfrm>
           <a:prstGeom prst="rect">
             <a:avLst/>
@@ -27718,7 +27930,7 @@
           <a:noFill/>
           <a:ln w="57240">
             <a:solidFill>
-              <a:srgbClr val="3465a4"/>
+              <a:srgbClr val="3faf46"/>
             </a:solidFill>
             <a:round/>
           </a:ln>
@@ -27734,9 +27946,19 @@
             <a:noAutofit/>
           </a:bodyPr>
           <a:p>
+            <a:pPr>
+              <a:lnSpc>
+                <a:spcPct val="100000"/>
+              </a:lnSpc>
+              <a:buNone/>
+            </a:pPr>
             <a:r>
               <a:rPr b="0" lang="en-US" sz="2400" spc="-1" strike="noStrike">
+                <a:solidFill>
+                  <a:srgbClr val="000000"/>
+                </a:solidFill>
                 <a:latin typeface="Arial"/>
+                <a:ea typeface="DejaVu Sans"/>
               </a:rPr>
               <a:t>Surface EMG Pads</a:t>
             </a:r>
@@ -27754,8 +27976,8 @@
         </p:nvSpPr>
         <p:spPr>
           <a:xfrm>
-            <a:off x="16687800" y="3657600"/>
-            <a:ext cx="2286000" cy="3886200"/>
+            <a:off x="17602200" y="3879000"/>
+            <a:ext cx="2285640" cy="3885840"/>
           </a:xfrm>
           <a:prstGeom prst="rect">
             <a:avLst/>
@@ -27763,7 +27985,7 @@
           <a:noFill/>
           <a:ln w="57240">
             <a:solidFill>
-              <a:srgbClr val="3465a4"/>
+              <a:srgbClr val="3faf46"/>
             </a:solidFill>
             <a:round/>
           </a:ln>
@@ -27779,9 +28001,19 @@
             <a:noAutofit/>
           </a:bodyPr>
           <a:p>
+            <a:pPr>
+              <a:lnSpc>
+                <a:spcPct val="100000"/>
+              </a:lnSpc>
+              <a:buNone/>
+            </a:pPr>
             <a:r>
               <a:rPr b="0" lang="en-US" sz="2400" spc="-1" strike="noStrike">
+                <a:solidFill>
+                  <a:srgbClr val="000000"/>
+                </a:solidFill>
                 <a:latin typeface="Arial"/>
+                <a:ea typeface="DejaVu Sans"/>
               </a:rPr>
               <a:t>Amplifier</a:t>
             </a:r>
@@ -27799,8 +28031,8 @@
         </p:nvSpPr>
         <p:spPr>
           <a:xfrm>
-            <a:off x="19659600" y="2971800"/>
-            <a:ext cx="2286000" cy="5029200"/>
+            <a:off x="20574000" y="3193200"/>
+            <a:ext cx="2285640" cy="5028840"/>
           </a:xfrm>
           <a:prstGeom prst="rect">
             <a:avLst/>
@@ -27808,7 +28040,7 @@
           <a:noFill/>
           <a:ln w="57240">
             <a:solidFill>
-              <a:srgbClr val="3465a4"/>
+              <a:srgbClr val="3faf46"/>
             </a:solidFill>
             <a:round/>
           </a:ln>
@@ -27824,9 +28056,19 @@
             <a:noAutofit/>
           </a:bodyPr>
           <a:p>
+            <a:pPr>
+              <a:lnSpc>
+                <a:spcPct val="100000"/>
+              </a:lnSpc>
+              <a:buNone/>
+            </a:pPr>
             <a:r>
               <a:rPr b="0" lang="en-US" sz="2400" spc="-1" strike="noStrike">
+                <a:solidFill>
+                  <a:srgbClr val="000000"/>
+                </a:solidFill>
                 <a:latin typeface="Arial"/>
+                <a:ea typeface="DejaVu Sans"/>
               </a:rPr>
               <a:t>Microcontroller (Teensy 4.1)</a:t>
             </a:r>
@@ -27844,8 +28086,8 @@
         </p:nvSpPr>
         <p:spPr>
           <a:xfrm>
-            <a:off x="23088600" y="4800600"/>
-            <a:ext cx="1371600" cy="1371600"/>
+            <a:off x="23546160" y="5022000"/>
+            <a:ext cx="1371240" cy="1371240"/>
           </a:xfrm>
           <a:prstGeom prst="rect">
             <a:avLst/>
@@ -27853,7 +28095,7 @@
           <a:noFill/>
           <a:ln w="57240">
             <a:solidFill>
-              <a:srgbClr val="3465a4"/>
+              <a:srgbClr val="3faf46"/>
             </a:solidFill>
             <a:round/>
           </a:ln>
@@ -27869,9 +28111,19 @@
             <a:noAutofit/>
           </a:bodyPr>
           <a:p>
+            <a:pPr>
+              <a:lnSpc>
+                <a:spcPct val="100000"/>
+              </a:lnSpc>
+              <a:buNone/>
+            </a:pPr>
             <a:r>
               <a:rPr b="0" lang="en-US" sz="2400" spc="-1" strike="noStrike">
+                <a:solidFill>
+                  <a:srgbClr val="000000"/>
+                </a:solidFill>
                 <a:latin typeface="Arial"/>
+                <a:ea typeface="DejaVu Sans"/>
               </a:rPr>
               <a:t>Robotic Hand</a:t>
             </a:r>
@@ -27889,8 +28141,8 @@
         </p:nvSpPr>
         <p:spPr>
           <a:xfrm>
-            <a:off x="19888200" y="5257800"/>
-            <a:ext cx="1828800" cy="1143000"/>
+            <a:off x="20802600" y="5479200"/>
+            <a:ext cx="1828440" cy="1142640"/>
           </a:xfrm>
           <a:prstGeom prst="rect">
             <a:avLst/>
@@ -27898,7 +28150,7 @@
           <a:noFill/>
           <a:ln w="38160">
             <a:solidFill>
-              <a:srgbClr val="3465a4"/>
+              <a:srgbClr val="3faf46"/>
             </a:solidFill>
             <a:round/>
           </a:ln>
@@ -27914,9 +28166,19 @@
             <a:noAutofit/>
           </a:bodyPr>
           <a:p>
+            <a:pPr>
+              <a:lnSpc>
+                <a:spcPct val="100000"/>
+              </a:lnSpc>
+              <a:buNone/>
+            </a:pPr>
             <a:r>
               <a:rPr b="0" lang="en-US" sz="1800" spc="-1" strike="noStrike">
+                <a:solidFill>
+                  <a:srgbClr val="000000"/>
+                </a:solidFill>
                 <a:latin typeface="Arial"/>
+                <a:ea typeface="DejaVu Sans"/>
               </a:rPr>
               <a:t>Normalize, Rectify, and Amplify ADC Input</a:t>
             </a:r>
@@ -27934,8 +28196,8 @@
         </p:nvSpPr>
         <p:spPr>
           <a:xfrm>
-            <a:off x="19888200" y="6629400"/>
-            <a:ext cx="1828800" cy="1143000"/>
+            <a:off x="20802600" y="6850800"/>
+            <a:ext cx="1828440" cy="1142640"/>
           </a:xfrm>
           <a:prstGeom prst="rect">
             <a:avLst/>
@@ -27943,7 +28205,7 @@
           <a:noFill/>
           <a:ln w="38160">
             <a:solidFill>
-              <a:srgbClr val="3465a4"/>
+              <a:srgbClr val="f10d0c"/>
             </a:solidFill>
             <a:round/>
           </a:ln>
@@ -27959,11 +28221,21 @@
             <a:noAutofit/>
           </a:bodyPr>
           <a:p>
+            <a:pPr>
+              <a:lnSpc>
+                <a:spcPct val="100000"/>
+              </a:lnSpc>
+              <a:buNone/>
+            </a:pPr>
             <a:r>
               <a:rPr b="0" lang="en-US" sz="1800" spc="-1" strike="noStrike">
+                <a:solidFill>
+                  <a:srgbClr val="000000"/>
+                </a:solidFill>
                 <a:latin typeface="Arial"/>
+                <a:ea typeface="DejaVu Sans"/>
               </a:rPr>
-              <a:t>Detect Peaks and Compare to Known Positions</a:t>
+              <a:t>Finger Detection Algorithm</a:t>
             </a:r>
             <a:endParaRPr b="0" lang="en-US" sz="1800" spc="-1" strike="noStrike">
               <a:latin typeface="Arial"/>
@@ -27979,8 +28251,8 @@
         </p:nvSpPr>
         <p:spPr>
           <a:xfrm>
-            <a:off x="19888200" y="3886200"/>
-            <a:ext cx="1828800" cy="1143000"/>
+            <a:off x="20802600" y="4107600"/>
+            <a:ext cx="1828440" cy="1142640"/>
           </a:xfrm>
           <a:prstGeom prst="rect">
             <a:avLst/>
@@ -27988,7 +28260,7 @@
           <a:noFill/>
           <a:ln w="38160">
             <a:solidFill>
-              <a:srgbClr val="3465a4"/>
+              <a:srgbClr val="3faf46"/>
             </a:solidFill>
             <a:round/>
           </a:ln>
@@ -28004,23 +28276,21 @@
             <a:noAutofit/>
           </a:bodyPr>
           <a:p>
+            <a:pPr>
+              <a:lnSpc>
+                <a:spcPct val="100000"/>
+              </a:lnSpc>
+              <a:buNone/>
+            </a:pPr>
             <a:r>
               <a:rPr b="0" lang="en-US" sz="1800" spc="-1" strike="noStrike">
+                <a:solidFill>
+                  <a:srgbClr val="000000"/>
+                </a:solidFill>
                 <a:latin typeface="Arial"/>
+                <a:ea typeface="DejaVu Sans"/>
               </a:rPr>
-              <a:t>Capture 1000 </a:t>
-            </a:r>
-            <a:r>
-              <a:rPr b="0" lang="en-US" sz="1800" spc="-1" strike="noStrike">
-                <a:latin typeface="Arial"/>
-              </a:rPr>
-              <a:t>Samples at 40kHz </a:t>
-            </a:r>
-            <a:r>
-              <a:rPr b="0" lang="en-US" sz="1800" spc="-1" strike="noStrike">
-                <a:latin typeface="Arial"/>
-              </a:rPr>
-              <a:t>with ADC</a:t>
+              <a:t>Capture 1000 Samples at 40kHz with ADC</a:t>
             </a:r>
             <a:endParaRPr b="0" lang="en-US" sz="1800" spc="-1" strike="noStrike">
               <a:latin typeface="Arial"/>
@@ -28036,8 +28306,95 @@
         </p:nvSpPr>
         <p:spPr>
           <a:xfrm>
-            <a:off x="20802600" y="6400800"/>
-            <a:ext cx="0" cy="228600"/>
+            <a:off x="21717000" y="6622200"/>
+            <a:ext cx="360" cy="228600"/>
+          </a:xfrm>
+          <a:prstGeom prst="line">
+            <a:avLst/>
+          </a:prstGeom>
+          <a:ln w="38160">
+            <a:solidFill>
+              <a:srgbClr val="3faf46"/>
+            </a:solidFill>
+            <a:round/>
+            <a:tailEnd len="med" type="triangle" w="med"/>
+          </a:ln>
+        </p:spPr>
+        <p:style>
+          <a:lnRef idx="0"/>
+          <a:fillRef idx="0"/>
+          <a:effectRef idx="0"/>
+          <a:fontRef idx="minor"/>
+        </p:style>
+      </p:sp>
+      <p:sp>
+        <p:nvSpPr>
+          <p:cNvPr id="59" name=""/>
+          <p:cNvSpPr/>
+          <p:nvPr/>
+        </p:nvSpPr>
+        <p:spPr>
+          <a:xfrm>
+            <a:off x="21717000" y="5250600"/>
+            <a:ext cx="360" cy="228600"/>
+          </a:xfrm>
+          <a:prstGeom prst="line">
+            <a:avLst/>
+          </a:prstGeom>
+          <a:ln w="38160">
+            <a:solidFill>
+              <a:srgbClr val="3faf46"/>
+            </a:solidFill>
+            <a:round/>
+            <a:tailEnd len="med" type="triangle" w="med"/>
+          </a:ln>
+        </p:spPr>
+        <p:style>
+          <a:lnRef idx="0"/>
+          <a:fillRef idx="0"/>
+          <a:effectRef idx="0"/>
+          <a:fontRef idx="minor"/>
+        </p:style>
+      </p:sp>
+      <p:sp>
+        <p:nvSpPr>
+          <p:cNvPr id="60" name=""/>
+          <p:cNvSpPr/>
+          <p:nvPr/>
+        </p:nvSpPr>
+        <p:spPr>
+          <a:xfrm>
+            <a:off x="17145000" y="5707800"/>
+            <a:ext cx="457200" cy="360"/>
+          </a:xfrm>
+          <a:prstGeom prst="line">
+            <a:avLst/>
+          </a:prstGeom>
+          <a:ln w="38160">
+            <a:solidFill>
+              <a:srgbClr val="3faf46"/>
+            </a:solidFill>
+            <a:round/>
+            <a:tailEnd len="med" type="triangle" w="med"/>
+          </a:ln>
+        </p:spPr>
+        <p:style>
+          <a:lnRef idx="0"/>
+          <a:fillRef idx="0"/>
+          <a:effectRef idx="0"/>
+          <a:fontRef idx="minor"/>
+        </p:style>
+      </p:sp>
+      <p:sp>
+        <p:nvSpPr>
+          <p:cNvPr id="61" name=""/>
+          <p:cNvSpPr/>
+          <p:nvPr/>
+        </p:nvSpPr>
+        <p:spPr>
+          <a:xfrm>
+            <a:off x="0" y="0"/>
+            <a:ext cx="360" cy="360"/>
           </a:xfrm>
           <a:prstGeom prst="line">
             <a:avLst/>
@@ -28059,19 +28416,19 @@
       </p:sp>
       <p:sp>
         <p:nvSpPr>
-          <p:cNvPr id="59" name=""/>
+          <p:cNvPr id="62" name=""/>
           <p:cNvSpPr/>
           <p:nvPr/>
         </p:nvSpPr>
         <p:spPr>
           <a:xfrm>
-            <a:off x="20802600" y="5029200"/>
-            <a:ext cx="0" cy="228600"/>
+            <a:off x="0" y="0"/>
+            <a:ext cx="360" cy="360"/>
           </a:xfrm>
           <a:prstGeom prst="line">
             <a:avLst/>
           </a:prstGeom>
-          <a:ln w="38160">
+          <a:ln w="57240">
             <a:solidFill>
               <a:srgbClr val="3465a4"/>
             </a:solidFill>
@@ -28088,89 +28445,14 @@
       </p:sp>
       <p:sp>
         <p:nvSpPr>
-          <p:cNvPr id="60" name=""/>
-          <p:cNvSpPr/>
-          <p:nvPr/>
-        </p:nvSpPr>
-        <p:spPr>
-          <a:xfrm>
-            <a:off x="16230600" y="5486400"/>
-            <a:ext cx="457200" cy="0"/>
-          </a:xfrm>
-          <a:prstGeom prst="line">
-            <a:avLst/>
-          </a:prstGeom>
-          <a:ln w="38160">
-            <a:solidFill>
-              <a:srgbClr val="3465a4"/>
-            </a:solidFill>
-            <a:round/>
-            <a:tailEnd len="med" type="triangle" w="med"/>
-          </a:ln>
-        </p:spPr>
-        <p:style>
-          <a:lnRef idx="0"/>
-          <a:fillRef idx="0"/>
-          <a:effectRef idx="0"/>
-          <a:fontRef idx="minor"/>
-        </p:style>
-      </p:sp>
-      <p:cxnSp>
-        <p:nvCxnSpPr>
-          <p:cNvPr id="61" name=""/>
-          <p:cNvCxnSpPr/>
-          <p:nvPr/>
-        </p:nvCxnSpPr>
-        <p:spPr>
-          <a:xfrm>
-            <a:off x="0" y="0"/>
-            <a:ext cx="360" cy="360"/>
-          </a:xfrm>
-          <a:prstGeom prst="line">
-            <a:avLst/>
-          </a:prstGeom>
-          <a:ln w="38160">
-            <a:solidFill>
-              <a:srgbClr val="3465a4"/>
-            </a:solidFill>
-            <a:round/>
-            <a:tailEnd len="med" type="triangle" w="med"/>
-          </a:ln>
-        </p:spPr>
-      </p:cxnSp>
-      <p:cxnSp>
-        <p:nvCxnSpPr>
-          <p:cNvPr id="62" name=""/>
-          <p:cNvCxnSpPr/>
-          <p:nvPr/>
-        </p:nvCxnSpPr>
-        <p:spPr>
-          <a:xfrm>
-            <a:off x="0" y="0"/>
-            <a:ext cx="360" cy="360"/>
-          </a:xfrm>
-          <a:prstGeom prst="line">
-            <a:avLst/>
-          </a:prstGeom>
-          <a:ln w="57240">
-            <a:solidFill>
-              <a:srgbClr val="3465a4"/>
-            </a:solidFill>
-            <a:round/>
-            <a:tailEnd len="med" type="triangle" w="med"/>
-          </a:ln>
-        </p:spPr>
-      </p:cxnSp>
-      <p:sp>
-        <p:nvSpPr>
           <p:cNvPr id="63" name=""/>
           <p:cNvSpPr/>
           <p:nvPr/>
         </p:nvSpPr>
         <p:spPr>
           <a:xfrm>
-            <a:off x="16916400" y="4343400"/>
-            <a:ext cx="1828800" cy="1143000"/>
+            <a:off x="17830800" y="4564800"/>
+            <a:ext cx="1828440" cy="1142640"/>
           </a:xfrm>
           <a:prstGeom prst="rect">
             <a:avLst/>
@@ -28178,7 +28460,7 @@
           <a:noFill/>
           <a:ln w="38160">
             <a:solidFill>
-              <a:srgbClr val="3465a4"/>
+              <a:srgbClr val="3faf46"/>
             </a:solidFill>
             <a:round/>
           </a:ln>
@@ -28194,9 +28476,19 @@
             <a:noAutofit/>
           </a:bodyPr>
           <a:p>
+            <a:pPr>
+              <a:lnSpc>
+                <a:spcPct val="100000"/>
+              </a:lnSpc>
+              <a:buNone/>
+            </a:pPr>
             <a:r>
               <a:rPr b="0" lang="en-US" sz="1800" spc="-1" strike="noStrike">
+                <a:solidFill>
+                  <a:srgbClr val="000000"/>
+                </a:solidFill>
                 <a:latin typeface="Arial"/>
+                <a:ea typeface="DejaVu Sans"/>
               </a:rPr>
               <a:t>Protected Inputs to Instrumentation Amplifier IC</a:t>
             </a:r>
@@ -28214,8 +28506,8 @@
         </p:nvSpPr>
         <p:spPr>
           <a:xfrm>
-            <a:off x="16892280" y="5791320"/>
-            <a:ext cx="1828800" cy="1143000"/>
+            <a:off x="17806680" y="6012720"/>
+            <a:ext cx="1828440" cy="1142640"/>
           </a:xfrm>
           <a:prstGeom prst="rect">
             <a:avLst/>
@@ -28223,7 +28515,7 @@
           <a:noFill/>
           <a:ln w="38160">
             <a:solidFill>
-              <a:srgbClr val="3465a4"/>
+              <a:srgbClr val="3faf46"/>
             </a:solidFill>
             <a:round/>
           </a:ln>
@@ -28239,9 +28531,19 @@
             <a:noAutofit/>
           </a:bodyPr>
           <a:p>
+            <a:pPr>
+              <a:lnSpc>
+                <a:spcPct val="100000"/>
+              </a:lnSpc>
+              <a:buNone/>
+            </a:pPr>
             <a:r>
               <a:rPr b="0" lang="en-US" sz="1800" spc="-1" strike="noStrike">
+                <a:solidFill>
+                  <a:srgbClr val="000000"/>
+                </a:solidFill>
                 <a:latin typeface="Arial"/>
+                <a:ea typeface="DejaVu Sans"/>
               </a:rPr>
               <a:t>AC Coupled and Buffered Output</a:t>
             </a:r>
@@ -28259,15 +28561,73 @@
         </p:nvSpPr>
         <p:spPr>
           <a:xfrm>
-            <a:off x="17830800" y="5486400"/>
-            <a:ext cx="0" cy="304920"/>
+            <a:off x="18745200" y="5707800"/>
+            <a:ext cx="360" cy="304920"/>
           </a:xfrm>
           <a:prstGeom prst="line">
             <a:avLst/>
           </a:prstGeom>
           <a:ln w="38160">
             <a:solidFill>
-              <a:srgbClr val="3465a4"/>
+              <a:srgbClr val="3faf46"/>
+            </a:solidFill>
+            <a:round/>
+            <a:tailEnd len="med" type="triangle" w="med"/>
+          </a:ln>
+        </p:spPr>
+        <p:style>
+          <a:lnRef idx="0"/>
+          <a:fillRef idx="0"/>
+          <a:effectRef idx="0"/>
+          <a:fontRef idx="minor"/>
+        </p:style>
+      </p:sp>
+      <p:sp>
+        <p:nvSpPr>
+          <p:cNvPr id="66" name=""/>
+          <p:cNvSpPr/>
+          <p:nvPr/>
+        </p:nvSpPr>
+        <p:spPr>
+          <a:xfrm>
+            <a:off x="19888200" y="5707800"/>
+            <a:ext cx="685800" cy="0"/>
+          </a:xfrm>
+          <a:prstGeom prst="line">
+            <a:avLst/>
+          </a:prstGeom>
+          <a:ln w="38160">
+            <a:solidFill>
+              <a:srgbClr val="3faf46"/>
+            </a:solidFill>
+            <a:round/>
+            <a:tailEnd len="med" type="triangle" w="med"/>
+          </a:ln>
+        </p:spPr>
+        <p:style>
+          <a:lnRef idx="0"/>
+          <a:fillRef idx="0"/>
+          <a:effectRef idx="0"/>
+          <a:fontRef idx="minor"/>
+        </p:style>
+      </p:sp>
+      <p:sp>
+        <p:nvSpPr>
+          <p:cNvPr id="67" name=""/>
+          <p:cNvSpPr/>
+          <p:nvPr/>
+        </p:nvSpPr>
+        <p:spPr>
+          <a:xfrm>
+            <a:off x="22860000" y="5707800"/>
+            <a:ext cx="685800" cy="0"/>
+          </a:xfrm>
+          <a:prstGeom prst="line">
+            <a:avLst/>
+          </a:prstGeom>
+          <a:ln w="38160">
+            <a:solidFill>
+              <a:srgbClr val="3faf46"/>
             </a:solidFill>
             <a:round/>
             <a:tailEnd len="med" type="triangle" w="med"/>

</xml_diff>

<commit_message>
Started to implement autothresholding. Created first draft of presentation material, with probe gain measurements
</commit_message>
<xml_diff>
--- a/PresentationMaterial/lastname-firstname_poster.pptx
+++ b/PresentationMaterial/lastname-firstname_poster.pptx
@@ -12,7 +12,7 @@
 </p:presentation>
 </file>
 
-<file path=ppt/charts/chart5.xml><?xml version="1.0" encoding="utf-8"?>
+<file path=ppt/charts/chart15.xml><?xml version="1.0" encoding="utf-8"?>
 <c:chartSpace xmlns:c="http://schemas.openxmlformats.org/drawingml/2006/chart" xmlns:a="http://schemas.openxmlformats.org/drawingml/2006/main" xmlns:r="http://schemas.openxmlformats.org/officeDocument/2006/relationships">
   <c:lang val="en-US"/>
   <c:roundedCorners val="0"/>
@@ -49,8 +49,8 @@
         <c:manualLayout>
           <c:xMode val="edge"/>
           <c:yMode val="edge"/>
-          <c:x val="0.153982238262039"/>
-          <c:y val="0.0114884270991722"/>
+          <c:x val="0.15398768664638"/>
+          <c:y val="0.0115453931065555"/>
         </c:manualLayout>
       </c:layout>
       <c:overlay val="0"/>
@@ -68,10 +68,10 @@
           <c:layoutTarget val="inner"/>
           <c:xMode val="edge"/>
           <c:yMode val="edge"/>
-          <c:x val="0.0938683083890599"/>
-          <c:y val="0.115447429182857"/>
-          <c:w val="0.879276792980222"/>
-          <c:h val="0.745565129244805"/>
+          <c:x val="0.0938716297501946"/>
+          <c:y val="0.115453931065555"/>
+          <c:w val="0.879237138206779"/>
+          <c:h val="0.745550799729669"/>
         </c:manualLayout>
       </c:layout>
       <c:scatterChart>
@@ -24209,11 +24209,11 @@
           </c:yVal>
           <c:smooth val="0"/>
         </c:ser>
-        <c:axId val="326879"/>
-        <c:axId val="75212568"/>
+        <c:axId val="7445876"/>
+        <c:axId val="70153172"/>
       </c:scatterChart>
       <c:valAx>
-        <c:axId val="326879"/>
+        <c:axId val="7445876"/>
         <c:scaling>
           <c:orientation val="minMax"/>
           <c:max val="5"/>
@@ -24282,12 +24282,12 @@
             </a:pPr>
           </a:p>
         </c:txPr>
-        <c:crossAx val="75212568"/>
+        <c:crossAx val="70153172"/>
         <c:crosses val="max"/>
         <c:crossBetween val="midCat"/>
       </c:valAx>
       <c:valAx>
-        <c:axId val="75212568"/>
+        <c:axId val="70153172"/>
         <c:scaling>
           <c:orientation val="minMax"/>
         </c:scaling>
@@ -24364,7 +24364,7 @@
             </a:pPr>
           </a:p>
         </c:txPr>
-        <c:crossAx val="326879"/>
+        <c:crossAx val="7445876"/>
         <c:crosses val="autoZero"/>
         <c:crossBetween val="midCat"/>
       </c:valAx>
@@ -24407,6 +24407,581 @@
               </a:solidFill>
               <a:latin typeface="Arial"/>
               <a:ea typeface="DejaVu Sans"/>
+            </a:defRPr>
+          </a:pPr>
+        </a:p>
+      </c:txPr>
+    </c:legend>
+    <c:plotVisOnly val="1"/>
+    <c:dispBlanksAs val="span"/>
+  </c:chart>
+  <c:spPr>
+    <a:solidFill>
+      <a:srgbClr val="ffffff"/>
+    </a:solidFill>
+    <a:ln w="0">
+      <a:noFill/>
+    </a:ln>
+  </c:spPr>
+</c:chartSpace>
+</file>
+
+<file path=ppt/charts/chart16.xml><?xml version="1.0" encoding="utf-8"?>
+<c:chartSpace xmlns:c="http://schemas.openxmlformats.org/drawingml/2006/chart" xmlns:a="http://schemas.openxmlformats.org/drawingml/2006/main" xmlns:r="http://schemas.openxmlformats.org/officeDocument/2006/relationships">
+  <c:lang val="en-US"/>
+  <c:roundedCorners val="0"/>
+  <c:chart>
+    <c:title>
+      <c:tx>
+        <c:rich>
+          <a:bodyPr rot="0"/>
+          <a:lstStyle/>
+          <a:p>
+            <a:pPr>
+              <a:defRPr b="0" sz="3200" spc="-1" strike="noStrike">
+                <a:latin typeface="Arial"/>
+              </a:defRPr>
+            </a:pPr>
+            <a:r>
+              <a:rPr b="0" sz="3200" spc="-1" strike="noStrike">
+                <a:latin typeface="Arial"/>
+              </a:rPr>
+              <a:t>Gain Comparison of Probe Board Revisions</a:t>
+            </a:r>
+          </a:p>
+        </c:rich>
+      </c:tx>
+      <c:layout>
+        <c:manualLayout>
+          <c:xMode val="edge"/>
+          <c:yMode val="edge"/>
+          <c:x val="0.104743153749776"/>
+          <c:y val="0.0380560780368313"/>
+        </c:manualLayout>
+      </c:layout>
+      <c:overlay val="0"/>
+      <c:spPr>
+        <a:noFill/>
+        <a:ln w="0">
+          <a:noFill/>
+        </a:ln>
+      </c:spPr>
+    </c:title>
+    <c:autoTitleDeleted val="0"/>
+    <c:plotArea>
+      <c:layout>
+        <c:manualLayout>
+          <c:layoutTarget val="inner"/>
+          <c:xMode val="edge"/>
+          <c:yMode val="edge"/>
+          <c:x val="0.102520015044866"/>
+          <c:y val="0.161810009595475"/>
+          <c:w val="0.848422975659556"/>
+          <c:h val="0.706529973233675"/>
+        </c:manualLayout>
+      </c:layout>
+      <c:scatterChart>
+        <c:scatterStyle val="lineMarker"/>
+        <c:varyColors val="0"/>
+        <c:ser>
+          <c:idx val="0"/>
+          <c:order val="0"/>
+          <c:tx>
+            <c:strRef>
+              <c:f>label 1</c:f>
+              <c:strCache>
+                <c:ptCount val="1"/>
+                <c:pt idx="0">
+                  <c:v>Revision 1 Hardware</c:v>
+                </c:pt>
+              </c:strCache>
+            </c:strRef>
+          </c:tx>
+          <c:spPr>
+            <a:solidFill>
+              <a:srgbClr val="579d1c"/>
+            </a:solidFill>
+            <a:ln w="28800">
+              <a:solidFill>
+                <a:srgbClr val="579d1c"/>
+              </a:solidFill>
+              <a:round/>
+            </a:ln>
+          </c:spPr>
+          <c:marker>
+            <c:symbol val="triangle"/>
+            <c:size val="8"/>
+            <c:spPr>
+              <a:solidFill>
+                <a:srgbClr val="579d1c"/>
+              </a:solidFill>
+            </c:spPr>
+          </c:marker>
+          <c:dLbls>
+            <c:txPr>
+              <a:bodyPr wrap="none"/>
+              <a:lstStyle/>
+              <a:p>
+                <a:pPr>
+                  <a:defRPr b="0" sz="1000" spc="-1" strike="noStrike">
+                    <a:latin typeface="Arial"/>
+                  </a:defRPr>
+                </a:pPr>
+              </a:p>
+            </c:txPr>
+            <c:showLegendKey val="0"/>
+            <c:showVal val="0"/>
+            <c:showCatName val="0"/>
+            <c:showSerName val="0"/>
+            <c:showPercent val="0"/>
+            <c:separator> </c:separator>
+            <c:showLeaderLines val="1"/>
+            <c:extLst>
+              <c:ext xmlns:c15="http://schemas.microsoft.com/office/drawing/2012/chart" uri="{CE6537A1-D6FC-4f65-9D91-7224C49458BB}">
+                <c15:showLeaderLines val="1"/>
+              </c:ext>
+            </c:extLst>
+          </c:dLbls>
+          <c:xVal>
+            <c:numRef>
+              <c:f>0</c:f>
+              <c:numCache>
+                <c:formatCode>General</c:formatCode>
+                <c:ptCount val="14"/>
+                <c:pt idx="0">
+                  <c:v>110</c:v>
+                </c:pt>
+                <c:pt idx="1">
+                  <c:v>150</c:v>
+                </c:pt>
+                <c:pt idx="2">
+                  <c:v>230</c:v>
+                </c:pt>
+                <c:pt idx="3">
+                  <c:v>340</c:v>
+                </c:pt>
+                <c:pt idx="4">
+                  <c:v>690</c:v>
+                </c:pt>
+                <c:pt idx="5">
+                  <c:v>990</c:v>
+                </c:pt>
+                <c:pt idx="6">
+                  <c:v>1410</c:v>
+                </c:pt>
+                <c:pt idx="7">
+                  <c:v>2020</c:v>
+                </c:pt>
+                <c:pt idx="8">
+                  <c:v>2900</c:v>
+                </c:pt>
+                <c:pt idx="9">
+                  <c:v>4160</c:v>
+                </c:pt>
+                <c:pt idx="10">
+                  <c:v>5990</c:v>
+                </c:pt>
+                <c:pt idx="11">
+                  <c:v>8620</c:v>
+                </c:pt>
+                <c:pt idx="12">
+                  <c:v>12400</c:v>
+                </c:pt>
+                <c:pt idx="13">
+                  <c:v>17780</c:v>
+                </c:pt>
+              </c:numCache>
+            </c:numRef>
+          </c:xVal>
+          <c:yVal>
+            <c:numRef>
+              <c:f>1</c:f>
+              <c:numCache>
+                <c:formatCode>General</c:formatCode>
+                <c:ptCount val="14"/>
+                <c:pt idx="0">
+                  <c:v>-7.5</c:v>
+                </c:pt>
+                <c:pt idx="1">
+                  <c:v>-7.7</c:v>
+                </c:pt>
+                <c:pt idx="2">
+                  <c:v>-7.6</c:v>
+                </c:pt>
+                <c:pt idx="3">
+                  <c:v>-7.8</c:v>
+                </c:pt>
+                <c:pt idx="4">
+                  <c:v>-7.9</c:v>
+                </c:pt>
+                <c:pt idx="5">
+                  <c:v>-8.4</c:v>
+                </c:pt>
+                <c:pt idx="6">
+                  <c:v>-8.8</c:v>
+                </c:pt>
+                <c:pt idx="7">
+                  <c:v>-9.6</c:v>
+                </c:pt>
+                <c:pt idx="8">
+                  <c:v>-11.1</c:v>
+                </c:pt>
+                <c:pt idx="9">
+                  <c:v>-13</c:v>
+                </c:pt>
+                <c:pt idx="10">
+                  <c:v>-15.4</c:v>
+                </c:pt>
+                <c:pt idx="11">
+                  <c:v>-18.4</c:v>
+                </c:pt>
+                <c:pt idx="12">
+                  <c:v>-21.2</c:v>
+                </c:pt>
+                <c:pt idx="13">
+                  <c:v>-24.4</c:v>
+                </c:pt>
+              </c:numCache>
+            </c:numRef>
+          </c:yVal>
+          <c:smooth val="0"/>
+        </c:ser>
+        <c:ser>
+          <c:idx val="1"/>
+          <c:order val="1"/>
+          <c:tx>
+            <c:strRef>
+              <c:f>label 3</c:f>
+              <c:strCache>
+                <c:ptCount val="1"/>
+                <c:pt idx="0">
+                  <c:v>Revision 2 Hardware</c:v>
+                </c:pt>
+              </c:strCache>
+            </c:strRef>
+          </c:tx>
+          <c:spPr>
+            <a:solidFill>
+              <a:srgbClr val="83caff"/>
+            </a:solidFill>
+            <a:ln w="28800">
+              <a:solidFill>
+                <a:srgbClr val="83caff"/>
+              </a:solidFill>
+              <a:round/>
+            </a:ln>
+          </c:spPr>
+          <c:marker>
+            <c:symbol val="triangle"/>
+            <c:size val="8"/>
+            <c:spPr>
+              <a:solidFill>
+                <a:srgbClr val="83caff"/>
+              </a:solidFill>
+            </c:spPr>
+          </c:marker>
+          <c:dLbls>
+            <c:txPr>
+              <a:bodyPr wrap="none"/>
+              <a:lstStyle/>
+              <a:p>
+                <a:pPr>
+                  <a:defRPr b="0" sz="1000" spc="-1" strike="noStrike">
+                    <a:latin typeface="Arial"/>
+                  </a:defRPr>
+                </a:pPr>
+              </a:p>
+            </c:txPr>
+            <c:showLegendKey val="0"/>
+            <c:showVal val="0"/>
+            <c:showCatName val="0"/>
+            <c:showSerName val="0"/>
+            <c:showPercent val="0"/>
+            <c:separator> </c:separator>
+            <c:showLeaderLines val="1"/>
+            <c:extLst>
+              <c:ext xmlns:c15="http://schemas.microsoft.com/office/drawing/2012/chart" uri="{CE6537A1-D6FC-4f65-9D91-7224C49458BB}">
+                <c15:showLeaderLines val="1"/>
+              </c:ext>
+            </c:extLst>
+          </c:dLbls>
+          <c:xVal>
+            <c:numRef>
+              <c:f>2</c:f>
+              <c:numCache>
+                <c:formatCode>General</c:formatCode>
+                <c:ptCount val="14"/>
+                <c:pt idx="0">
+                  <c:v>100</c:v>
+                </c:pt>
+                <c:pt idx="1">
+                  <c:v>122</c:v>
+                </c:pt>
+                <c:pt idx="2">
+                  <c:v>244</c:v>
+                </c:pt>
+                <c:pt idx="3">
+                  <c:v>580</c:v>
+                </c:pt>
+                <c:pt idx="4">
+                  <c:v>1579</c:v>
+                </c:pt>
+                <c:pt idx="5">
+                  <c:v>3326</c:v>
+                </c:pt>
+                <c:pt idx="6">
+                  <c:v>5142</c:v>
+                </c:pt>
+                <c:pt idx="7">
+                  <c:v>8530</c:v>
+                </c:pt>
+                <c:pt idx="8">
+                  <c:v>11795</c:v>
+                </c:pt>
+                <c:pt idx="9">
+                  <c:v>13733</c:v>
+                </c:pt>
+                <c:pt idx="10">
+                  <c:v>16556</c:v>
+                </c:pt>
+                <c:pt idx="11">
+                  <c:v>18219</c:v>
+                </c:pt>
+                <c:pt idx="12">
+                  <c:v>19402</c:v>
+                </c:pt>
+              </c:numCache>
+            </c:numRef>
+          </c:xVal>
+          <c:yVal>
+            <c:numRef>
+              <c:f>3</c:f>
+              <c:numCache>
+                <c:formatCode>General</c:formatCode>
+                <c:ptCount val="14"/>
+                <c:pt idx="0">
+                  <c:v>-7.1</c:v>
+                </c:pt>
+                <c:pt idx="1">
+                  <c:v>-7.1</c:v>
+                </c:pt>
+                <c:pt idx="2">
+                  <c:v>-7</c:v>
+                </c:pt>
+                <c:pt idx="3">
+                  <c:v>-7.1</c:v>
+                </c:pt>
+                <c:pt idx="4">
+                  <c:v>-7.2</c:v>
+                </c:pt>
+                <c:pt idx="5">
+                  <c:v>-6.9</c:v>
+                </c:pt>
+                <c:pt idx="6">
+                  <c:v>-6.7</c:v>
+                </c:pt>
+                <c:pt idx="7">
+                  <c:v>-6.9</c:v>
+                </c:pt>
+                <c:pt idx="8">
+                  <c:v>-7.7</c:v>
+                </c:pt>
+                <c:pt idx="9">
+                  <c:v>-8.3</c:v>
+                </c:pt>
+                <c:pt idx="10">
+                  <c:v>-9.2</c:v>
+                </c:pt>
+                <c:pt idx="11">
+                  <c:v>-9.7</c:v>
+                </c:pt>
+                <c:pt idx="12">
+                  <c:v>-10.1</c:v>
+                </c:pt>
+              </c:numCache>
+            </c:numRef>
+          </c:yVal>
+          <c:smooth val="0"/>
+        </c:ser>
+        <c:axId val="44869986"/>
+        <c:axId val="46518068"/>
+      </c:scatterChart>
+      <c:valAx>
+        <c:axId val="44869986"/>
+        <c:scaling>
+          <c:logBase val="10"/>
+          <c:orientation val="minMax"/>
+        </c:scaling>
+        <c:delete val="0"/>
+        <c:axPos val="b"/>
+        <c:majorGridlines>
+          <c:spPr>
+            <a:ln w="0">
+              <a:solidFill>
+                <a:srgbClr val="b3b3b3"/>
+              </a:solidFill>
+            </a:ln>
+          </c:spPr>
+        </c:majorGridlines>
+        <c:title>
+          <c:tx>
+            <c:rich>
+              <a:bodyPr rot="0"/>
+              <a:lstStyle/>
+              <a:p>
+                <a:pPr>
+                  <a:defRPr b="0" sz="2400" spc="-1" strike="noStrike">
+                    <a:latin typeface="Arial"/>
+                  </a:defRPr>
+                </a:pPr>
+                <a:r>
+                  <a:rPr b="0" sz="2400" spc="-1" strike="noStrike">
+                    <a:latin typeface="Arial"/>
+                  </a:rPr>
+                  <a:t>Frequency (Hz)</a:t>
+                </a:r>
+              </a:p>
+            </c:rich>
+          </c:tx>
+          <c:overlay val="0"/>
+          <c:spPr>
+            <a:noFill/>
+            <a:ln w="0">
+              <a:noFill/>
+            </a:ln>
+          </c:spPr>
+        </c:title>
+        <c:numFmt formatCode="General" sourceLinked="0"/>
+        <c:majorTickMark val="out"/>
+        <c:minorTickMark val="none"/>
+        <c:tickLblPos val="nextTo"/>
+        <c:spPr>
+          <a:ln w="0">
+            <a:solidFill>
+              <a:srgbClr val="b3b3b3"/>
+            </a:solidFill>
+          </a:ln>
+        </c:spPr>
+        <c:txPr>
+          <a:bodyPr/>
+          <a:lstStyle/>
+          <a:p>
+            <a:pPr>
+              <a:defRPr b="0" sz="1800" spc="-1" strike="noStrike">
+                <a:latin typeface="Arial"/>
+              </a:defRPr>
+            </a:pPr>
+          </a:p>
+        </c:txPr>
+        <c:crossAx val="46518068"/>
+        <c:crosses val="min"/>
+        <c:crossBetween val="between"/>
+      </c:valAx>
+      <c:valAx>
+        <c:axId val="46518068"/>
+        <c:scaling>
+          <c:orientation val="minMax"/>
+        </c:scaling>
+        <c:delete val="0"/>
+        <c:axPos val="l"/>
+        <c:majorGridlines>
+          <c:spPr>
+            <a:ln w="0">
+              <a:solidFill>
+                <a:srgbClr val="b3b3b3"/>
+              </a:solidFill>
+            </a:ln>
+          </c:spPr>
+        </c:majorGridlines>
+        <c:title>
+          <c:tx>
+            <c:rich>
+              <a:bodyPr rot="-5400000"/>
+              <a:lstStyle/>
+              <a:p>
+                <a:pPr>
+                  <a:defRPr b="0" sz="2400" spc="-1" strike="noStrike">
+                    <a:latin typeface="Arial"/>
+                  </a:defRPr>
+                </a:pPr>
+                <a:r>
+                  <a:rPr b="0" sz="2400" spc="-1" strike="noStrike">
+                    <a:latin typeface="Arial"/>
+                  </a:rPr>
+                  <a:t>Magnitude (dB)</a:t>
+                </a:r>
+              </a:p>
+            </c:rich>
+          </c:tx>
+          <c:overlay val="0"/>
+          <c:spPr>
+            <a:noFill/>
+            <a:ln w="0">
+              <a:noFill/>
+            </a:ln>
+          </c:spPr>
+        </c:title>
+        <c:numFmt formatCode="General" sourceLinked="0"/>
+        <c:majorTickMark val="out"/>
+        <c:minorTickMark val="none"/>
+        <c:tickLblPos val="nextTo"/>
+        <c:spPr>
+          <a:ln w="0">
+            <a:solidFill>
+              <a:srgbClr val="b3b3b3"/>
+            </a:solidFill>
+          </a:ln>
+        </c:spPr>
+        <c:txPr>
+          <a:bodyPr/>
+          <a:lstStyle/>
+          <a:p>
+            <a:pPr>
+              <a:defRPr b="0" sz="1800" spc="-1" strike="noStrike">
+                <a:latin typeface="Arial"/>
+              </a:defRPr>
+            </a:pPr>
+          </a:p>
+        </c:txPr>
+        <c:crossAx val="44869986"/>
+        <c:crosses val="autoZero"/>
+        <c:crossBetween val="between"/>
+      </c:valAx>
+      <c:spPr>
+        <a:noFill/>
+        <a:ln w="0">
+          <a:solidFill>
+            <a:srgbClr val="b3b3b3"/>
+          </a:solidFill>
+        </a:ln>
+      </c:spPr>
+    </c:plotArea>
+    <c:legend>
+      <c:legendPos val="b"/>
+      <c:layout>
+        <c:manualLayout>
+          <c:xMode val="edge"/>
+          <c:yMode val="edge"/>
+          <c:x val="0.179862623555034"/>
+          <c:y val="0.183585858585859"/>
+          <c:w val="0.708426872172893"/>
+          <c:h val="0.0640909090909091"/>
+        </c:manualLayout>
+      </c:layout>
+      <c:overlay val="0"/>
+      <c:spPr>
+        <a:noFill/>
+        <a:ln w="0">
+          <a:noFill/>
+        </a:ln>
+      </c:spPr>
+      <c:txPr>
+        <a:bodyPr/>
+        <a:lstStyle/>
+        <a:p>
+          <a:pPr>
+            <a:defRPr b="0" sz="2400" spc="-1" strike="noStrike">
+              <a:latin typeface="Arial"/>
             </a:defRPr>
           </a:pPr>
         </a:p>
@@ -24477,7 +25052,7 @@
         <p:txBody>
           <a:bodyPr/>
           <a:p>
-            <a:fld id="{7AF58379-2C68-4F27-846F-735F044034F9}" type="slidenum">
+            <a:fld id="{7E10A4D3-6ED4-4C95-A1DA-C43BE688B6EB}" type="slidenum">
               <a:t>&lt;#&gt;</a:t>
             </a:fld>
           </a:p>
@@ -24665,7 +25240,7 @@
         <p:txBody>
           <a:bodyPr/>
           <a:p>
-            <a:fld id="{32ACD39E-2151-4A19-8CB5-53C5658A40BB}" type="slidenum">
+            <a:fld id="{55B078AD-A934-4EB4-8101-F3E3D656360B}" type="slidenum">
               <a:t>&lt;#&gt;</a:t>
             </a:fld>
           </a:p>
@@ -24921,7 +25496,7 @@
         <p:txBody>
           <a:bodyPr/>
           <a:p>
-            <a:fld id="{4BA37677-B9D8-4CF1-8F7E-F2607641BC2E}" type="slidenum">
+            <a:fld id="{4D5E1C09-4207-4D22-A3AF-4A6F021F39F3}" type="slidenum">
               <a:t>&lt;#&gt;</a:t>
             </a:fld>
           </a:p>
@@ -25245,7 +25820,7 @@
         <p:txBody>
           <a:bodyPr/>
           <a:p>
-            <a:fld id="{AC9981DA-DE8B-4E70-B08B-E46B4ED4F275}" type="slidenum">
+            <a:fld id="{0D182EF4-2F0A-470A-A1A5-E07A55483FE5}" type="slidenum">
               <a:t>&lt;#&gt;</a:t>
             </a:fld>
           </a:p>
@@ -25402,7 +25977,7 @@
         <p:txBody>
           <a:bodyPr/>
           <a:p>
-            <a:fld id="{88AFADC8-1BF3-48CA-B21A-C6A654058717}" type="slidenum">
+            <a:fld id="{B60C7EF4-1C26-4A8B-BE71-B43F1A480D3C}" type="slidenum">
               <a:t>&lt;#&gt;</a:t>
             </a:fld>
           </a:p>
@@ -25556,7 +26131,7 @@
         <p:txBody>
           <a:bodyPr/>
           <a:p>
-            <a:fld id="{A898D03A-B410-4292-AC9E-39EA909B1310}" type="slidenum">
+            <a:fld id="{FEC7F6A1-ECA8-4562-A86D-81D2E3E5A07B}" type="slidenum">
               <a:t>&lt;#&gt;</a:t>
             </a:fld>
           </a:p>
@@ -25744,7 +26319,7 @@
         <p:txBody>
           <a:bodyPr/>
           <a:p>
-            <a:fld id="{D2AA43F7-B32C-4ACC-B972-F9BF07AC2FE7}" type="slidenum">
+            <a:fld id="{36C4B8B9-AEDE-4F60-A18F-53F17F748252}" type="slidenum">
               <a:t>&lt;#&gt;</a:t>
             </a:fld>
           </a:p>
@@ -25864,7 +26439,7 @@
         <p:txBody>
           <a:bodyPr/>
           <a:p>
-            <a:fld id="{CBA41404-B5A7-4C21-AEC1-E2CA87238FE4}" type="slidenum">
+            <a:fld id="{CC3CDDC1-0345-4230-8550-F453382C43B5}" type="slidenum">
               <a:t>&lt;#&gt;</a:t>
             </a:fld>
           </a:p>
@@ -25984,7 +26559,7 @@
         <p:txBody>
           <a:bodyPr/>
           <a:p>
-            <a:fld id="{7600F068-3803-4785-9268-C06F551CE0CC}" type="slidenum">
+            <a:fld id="{31980E02-8AC7-4C4D-86D2-1429BE934ED5}" type="slidenum">
               <a:t>&lt;#&gt;</a:t>
             </a:fld>
           </a:p>
@@ -26206,7 +26781,7 @@
         <p:txBody>
           <a:bodyPr/>
           <a:p>
-            <a:fld id="{5B5C9859-79D7-4989-97AC-1A045FCB42D6}" type="slidenum">
+            <a:fld id="{535E3C7C-F611-4143-BFBD-787A8D83571A}" type="slidenum">
               <a:t>&lt;#&gt;</a:t>
             </a:fld>
           </a:p>
@@ -26428,7 +27003,7 @@
         <p:txBody>
           <a:bodyPr/>
           <a:p>
-            <a:fld id="{55198279-B27C-46B3-A6CC-3E4099AE2798}" type="slidenum">
+            <a:fld id="{FC2A84A8-BCC5-4B68-A738-2BDD0946B129}" type="slidenum">
               <a:t>&lt;#&gt;</a:t>
             </a:fld>
           </a:p>
@@ -26650,7 +27225,7 @@
         <p:txBody>
           <a:bodyPr/>
           <a:p>
-            <a:fld id="{0B575D3E-D1D4-4E7E-95C4-9EF64C8A584F}" type="slidenum">
+            <a:fld id="{43D33AC7-AD50-4C17-A97F-48896812943F}" type="slidenum">
               <a:t>&lt;#&gt;</a:t>
             </a:fld>
           </a:p>
@@ -26719,7 +27294,7 @@
         <p:spPr>
           <a:xfrm>
             <a:off x="8746920" y="33900120"/>
-            <a:ext cx="8105760" cy="1944720"/>
+            <a:ext cx="8105400" cy="1944360"/>
           </a:xfrm>
           <a:prstGeom prst="rect">
             <a:avLst/>
@@ -26776,7 +27351,7 @@
         <p:spPr>
           <a:xfrm>
             <a:off x="18348120" y="33900120"/>
-            <a:ext cx="5972040" cy="1944720"/>
+            <a:ext cx="5971680" cy="1944360"/>
           </a:xfrm>
           <a:prstGeom prst="rect">
             <a:avLst/>
@@ -26811,7 +27386,7 @@
               </a:lnSpc>
               <a:buNone/>
             </a:pPr>
-            <a:fld id="{B0220439-476E-4F1A-8ECC-7A7204C44E04}" type="slidenum">
+            <a:fld id="{4758A136-DBDC-42CF-9061-767E6FF7C0D1}" type="slidenum">
               <a:rPr b="0" lang="en-US" sz="5600" spc="-1" strike="noStrike">
                 <a:solidFill>
                   <a:srgbClr val="8b8b8b"/>
@@ -26839,7 +27414,7 @@
         <p:spPr>
           <a:xfrm>
             <a:off x="1280160" y="33900120"/>
-            <a:ext cx="5972040" cy="1944720"/>
+            <a:ext cx="5971680" cy="1944360"/>
           </a:xfrm>
           <a:prstGeom prst="rect">
             <a:avLst/>
@@ -27356,7 +27931,7 @@
         <p:spPr>
           <a:xfrm>
             <a:off x="456840" y="457200"/>
-            <a:ext cx="24687360" cy="35660160"/>
+            <a:ext cx="24687000" cy="35659800"/>
           </a:xfrm>
           <a:prstGeom prst="rect">
             <a:avLst/>
@@ -27384,7 +27959,7 @@
         <p:spPr>
           <a:xfrm>
             <a:off x="456840" y="457200"/>
-            <a:ext cx="24687720" cy="2131560"/>
+            <a:ext cx="24687360" cy="2131200"/>
           </a:xfrm>
           <a:prstGeom prst="rect">
             <a:avLst/>
@@ -27436,7 +28011,7 @@
         <p:spPr>
           <a:xfrm>
             <a:off x="456840" y="2658960"/>
-            <a:ext cx="24687720" cy="997920"/>
+            <a:ext cx="24687360" cy="997560"/>
           </a:xfrm>
           <a:prstGeom prst="rect">
             <a:avLst/>
@@ -27500,39 +28075,16 @@
           </a:p>
         </p:txBody>
       </p:sp>
-      <p:pic>
-        <p:nvPicPr>
-          <p:cNvPr id="44" name="" descr=""/>
-          <p:cNvPicPr/>
-          <p:nvPr/>
-        </p:nvPicPr>
-        <p:blipFill>
-          <a:blip r:embed="rId1"/>
-          <a:stretch/>
-        </p:blipFill>
-        <p:spPr>
-          <a:xfrm>
-            <a:off x="9143640" y="27432000"/>
-            <a:ext cx="15543360" cy="8228880"/>
-          </a:xfrm>
-          <a:prstGeom prst="rect">
-            <a:avLst/>
-          </a:prstGeom>
-          <a:ln w="0">
-            <a:noFill/>
-          </a:ln>
-        </p:spPr>
-      </p:pic>
       <p:sp>
         <p:nvSpPr>
-          <p:cNvPr id="45" name=""/>
+          <p:cNvPr id="44" name=""/>
           <p:cNvSpPr/>
           <p:nvPr/>
         </p:nvSpPr>
         <p:spPr>
           <a:xfrm>
-            <a:off x="15773400" y="19888200"/>
-            <a:ext cx="9371520" cy="2218680"/>
+            <a:off x="2743200" y="32071680"/>
+            <a:ext cx="9371160" cy="2218320"/>
           </a:xfrm>
           <a:prstGeom prst="rect">
             <a:avLst/>
@@ -27657,14 +28209,14 @@
       </p:sp>
       <p:sp>
         <p:nvSpPr>
-          <p:cNvPr id="46" name=""/>
+          <p:cNvPr id="45" name=""/>
           <p:cNvSpPr/>
           <p:nvPr/>
         </p:nvSpPr>
         <p:spPr>
           <a:xfrm>
-            <a:off x="457200" y="18288360"/>
-            <a:ext cx="11886480" cy="8228520"/>
+            <a:off x="456840" y="10058400"/>
+            <a:ext cx="12344760" cy="5486400"/>
           </a:xfrm>
           <a:prstGeom prst="rect">
             <a:avLst/>
@@ -27713,14 +28265,14 @@
       </p:sp>
       <p:sp>
         <p:nvSpPr>
-          <p:cNvPr id="47" name=""/>
+          <p:cNvPr id="46" name=""/>
           <p:cNvSpPr/>
           <p:nvPr/>
         </p:nvSpPr>
         <p:spPr>
           <a:xfrm>
-            <a:off x="914040" y="3657600"/>
-            <a:ext cx="13258080" cy="3605040"/>
+            <a:off x="456840" y="3657600"/>
+            <a:ext cx="13714920" cy="6400800"/>
           </a:xfrm>
           <a:prstGeom prst="rect">
             <a:avLst/>
@@ -27750,16 +28302,16 @@
               <a:buNone/>
             </a:pPr>
             <a:r>
-              <a:rPr b="0" lang="en-US" sz="2400" spc="-1" strike="noStrike">
+              <a:rPr b="1" lang="en-US" sz="3200" spc="-1" strike="noStrike">
                 <a:solidFill>
                   <a:srgbClr val="000000"/>
                 </a:solidFill>
                 <a:latin typeface="Arial"/>
                 <a:ea typeface="DejaVu Sans"/>
               </a:rPr>
-              <a:t>Abstract:</a:t>
+              <a:t>Abstract</a:t>
             </a:r>
-            <a:endParaRPr b="0" lang="en-US" sz="2400" spc="-1" strike="noStrike">
+            <a:endParaRPr b="0" lang="en-US" sz="3200" spc="-1" strike="noStrike">
               <a:latin typeface="Arial"/>
             </a:endParaRPr>
           </a:p>
@@ -27778,7 +28330,7 @@
                 <a:latin typeface="Arial"/>
                 <a:ea typeface="DejaVu Sans"/>
               </a:rPr>
-              <a:t>Embedded controllers and analog acquisition ICs have. The objective of this project was to discover the fundamentals of signal acquisition and processing, in a situation requiring extremely precise hardware requirements in order to achieve both common mode signal rejection and extremely high gain. Because this is a medical device, considerations of safety had to be made as well. The final product is a printed circuit board designed around the Texas Instruments INA82x that handles differential gain, with input resistance to limit the shock hazard were a fault to occur. The amplified input signal is processed so that a microcontroller is able to determine what command the signal is closest to.</a:t>
+              <a:t>The objective of this project was to discover the fundamentals of signal acquisition and processing, in a situation requiring extremely precise hardware requirements in order to achieve both common mode signal rejection and extremely high gain. Because this is a medical device, considerations of safety had to be made as well. The final product is a printed circuit board designed around the Texas Instruments INA82x that handles differential gain, with input resistance to limit the shock hazard were a fault to occur. The amplified input signal is processed so that a microcontroller is able to determine what command the signal is closest to.</a:t>
             </a:r>
             <a:endParaRPr b="0" lang="en-US" sz="2400" spc="-1" strike="noStrike">
               <a:latin typeface="Arial"/>
@@ -27786,6 +28338,22 @@
           </a:p>
         </p:txBody>
       </p:sp>
+      <p:graphicFrame>
+        <p:nvGraphicFramePr>
+          <p:cNvPr id="47" name=""/>
+          <p:cNvGraphicFramePr/>
+          <p:nvPr/>
+        </p:nvGraphicFramePr>
+        <p:xfrm>
+          <a:off x="14969880" y="8695440"/>
+          <a:ext cx="10173960" cy="6391800"/>
+        </p:xfrm>
+        <a:graphic>
+          <a:graphicData uri="http://schemas.openxmlformats.org/drawingml/2006/chart">
+            <c:chart xmlns:c="http://schemas.openxmlformats.org/drawingml/2006/chart" xmlns:r="http://schemas.openxmlformats.org/officeDocument/2006/relationships" r:id="rId1"/>
+          </a:graphicData>
+        </a:graphic>
+      </p:graphicFrame>
       <p:sp>
         <p:nvSpPr>
           <p:cNvPr id="48" name=""/>
@@ -27794,80 +28362,8 @@
         </p:nvSpPr>
         <p:spPr>
           <a:xfrm>
-            <a:off x="457200" y="9144360"/>
-            <a:ext cx="11886480" cy="8228520"/>
-          </a:xfrm>
-          <a:prstGeom prst="rect">
-            <a:avLst/>
-          </a:prstGeom>
-          <a:solidFill>
-            <a:srgbClr val="729fcf"/>
-          </a:solidFill>
-          <a:ln w="0">
-            <a:solidFill>
-              <a:srgbClr val="3465a4"/>
-            </a:solidFill>
-          </a:ln>
-        </p:spPr>
-        <p:style>
-          <a:lnRef idx="0"/>
-          <a:fillRef idx="0"/>
-          <a:effectRef idx="0"/>
-          <a:fontRef idx="minor"/>
-        </p:style>
-        <p:txBody>
-          <a:bodyPr lIns="90000" rIns="90000" tIns="45000" bIns="45000" anchor="ctr">
-            <a:noAutofit/>
-          </a:bodyPr>
-          <a:p>
-            <a:pPr algn="ctr">
-              <a:lnSpc>
-                <a:spcPct val="100000"/>
-              </a:lnSpc>
-              <a:buNone/>
-            </a:pPr>
-            <a:r>
-              <a:rPr b="0" lang="en-US" sz="4800" spc="-1" strike="noStrike">
-                <a:solidFill>
-                  <a:srgbClr val="000000"/>
-                </a:solidFill>
-                <a:latin typeface="Arial"/>
-                <a:ea typeface="DejaVu Sans"/>
-              </a:rPr>
-              <a:t>Picture Showing Conductive Paths through Human tissue, juxtaposed with LTSPICE model</a:t>
-            </a:r>
-            <a:endParaRPr b="0" lang="en-US" sz="4800" spc="-1" strike="noStrike">
-              <a:latin typeface="Arial"/>
-            </a:endParaRPr>
-          </a:p>
-        </p:txBody>
-      </p:sp>
-      <p:graphicFrame>
-        <p:nvGraphicFramePr>
-          <p:cNvPr id="49" name=""/>
-          <p:cNvGraphicFramePr/>
-          <p:nvPr/>
-        </p:nvGraphicFramePr>
-        <p:xfrm>
-          <a:off x="14969880" y="8695440"/>
-          <a:ext cx="10174320" cy="6392160"/>
-        </p:xfrm>
-        <a:graphic>
-          <a:graphicData uri="http://schemas.openxmlformats.org/drawingml/2006/chart">
-            <c:chart xmlns:c="http://schemas.openxmlformats.org/drawingml/2006/chart" xmlns:r="http://schemas.openxmlformats.org/officeDocument/2006/relationships" r:id="rId2"/>
-          </a:graphicData>
-        </a:graphic>
-      </p:graphicFrame>
-      <p:sp>
-        <p:nvSpPr>
-          <p:cNvPr id="50" name=""/>
-          <p:cNvSpPr/>
-          <p:nvPr/>
-        </p:nvSpPr>
-        <p:spPr>
-          <a:xfrm>
             <a:off x="15544440" y="2964600"/>
-            <a:ext cx="9601560" cy="5493600"/>
+            <a:ext cx="9601200" cy="5493240"/>
           </a:xfrm>
           <a:prstGeom prst="rect">
             <a:avLst/>
@@ -27915,14 +28411,14 @@
       </p:sp>
       <p:sp>
         <p:nvSpPr>
-          <p:cNvPr id="51" name=""/>
+          <p:cNvPr id="49" name=""/>
           <p:cNvSpPr/>
           <p:nvPr/>
         </p:nvSpPr>
         <p:spPr>
           <a:xfrm>
             <a:off x="15773400" y="5022000"/>
-            <a:ext cx="1371240" cy="1371240"/>
+            <a:ext cx="1370880" cy="1370880"/>
           </a:xfrm>
           <a:prstGeom prst="rect">
             <a:avLst/>
@@ -27970,14 +28466,14 @@
       </p:sp>
       <p:sp>
         <p:nvSpPr>
-          <p:cNvPr id="52" name=""/>
+          <p:cNvPr id="50" name=""/>
           <p:cNvSpPr/>
           <p:nvPr/>
         </p:nvSpPr>
         <p:spPr>
           <a:xfrm>
             <a:off x="17602200" y="3879000"/>
-            <a:ext cx="2285640" cy="3885840"/>
+            <a:ext cx="2285280" cy="3885480"/>
           </a:xfrm>
           <a:prstGeom prst="rect">
             <a:avLst/>
@@ -28025,14 +28521,14 @@
       </p:sp>
       <p:sp>
         <p:nvSpPr>
-          <p:cNvPr id="53" name=""/>
+          <p:cNvPr id="51" name=""/>
           <p:cNvSpPr/>
           <p:nvPr/>
         </p:nvSpPr>
         <p:spPr>
           <a:xfrm>
             <a:off x="20574000" y="3193200"/>
-            <a:ext cx="2285640" cy="5028840"/>
+            <a:ext cx="2285280" cy="5028480"/>
           </a:xfrm>
           <a:prstGeom prst="rect">
             <a:avLst/>
@@ -28080,14 +28576,14 @@
       </p:sp>
       <p:sp>
         <p:nvSpPr>
-          <p:cNvPr id="54" name=""/>
+          <p:cNvPr id="52" name=""/>
           <p:cNvSpPr/>
           <p:nvPr/>
         </p:nvSpPr>
         <p:spPr>
           <a:xfrm>
             <a:off x="23546160" y="5022000"/>
-            <a:ext cx="1371240" cy="1371240"/>
+            <a:ext cx="1370880" cy="1370880"/>
           </a:xfrm>
           <a:prstGeom prst="rect">
             <a:avLst/>
@@ -28135,14 +28631,14 @@
       </p:sp>
       <p:sp>
         <p:nvSpPr>
-          <p:cNvPr id="55" name=""/>
+          <p:cNvPr id="53" name=""/>
           <p:cNvSpPr/>
           <p:nvPr/>
         </p:nvSpPr>
         <p:spPr>
           <a:xfrm>
             <a:off x="20802600" y="5479200"/>
-            <a:ext cx="1828440" cy="1142640"/>
+            <a:ext cx="1828080" cy="1194840"/>
           </a:xfrm>
           <a:prstGeom prst="rect">
             <a:avLst/>
@@ -28184,20 +28680,21 @@
             </a:r>
             <a:endParaRPr b="0" lang="en-US" sz="1800" spc="-1" strike="noStrike">
               <a:latin typeface="Arial"/>
+              <a:ea typeface="Noto Sans CJK SC"/>
             </a:endParaRPr>
           </a:p>
         </p:txBody>
       </p:sp>
       <p:sp>
         <p:nvSpPr>
-          <p:cNvPr id="56" name=""/>
+          <p:cNvPr id="54" name=""/>
           <p:cNvSpPr/>
           <p:nvPr/>
         </p:nvSpPr>
         <p:spPr>
           <a:xfrm>
             <a:off x="20802600" y="6850800"/>
-            <a:ext cx="1828440" cy="1142640"/>
+            <a:ext cx="1828080" cy="1142280"/>
           </a:xfrm>
           <a:prstGeom prst="rect">
             <a:avLst/>
@@ -28245,14 +28742,14 @@
       </p:sp>
       <p:sp>
         <p:nvSpPr>
-          <p:cNvPr id="57" name=""/>
+          <p:cNvPr id="55" name=""/>
           <p:cNvSpPr/>
           <p:nvPr/>
         </p:nvSpPr>
         <p:spPr>
           <a:xfrm>
             <a:off x="20802600" y="4107600"/>
-            <a:ext cx="1828440" cy="1142640"/>
+            <a:ext cx="1828080" cy="1142280"/>
           </a:xfrm>
           <a:prstGeom prst="rect">
             <a:avLst/>
@@ -28300,14 +28797,14 @@
       </p:sp>
       <p:sp>
         <p:nvSpPr>
-          <p:cNvPr id="58" name=""/>
+          <p:cNvPr id="56" name=""/>
           <p:cNvSpPr/>
           <p:nvPr/>
         </p:nvSpPr>
         <p:spPr>
           <a:xfrm>
-            <a:off x="21717000" y="6622200"/>
-            <a:ext cx="360" cy="228600"/>
+            <a:off x="21704400" y="6674040"/>
+            <a:ext cx="12960" cy="176760"/>
           </a:xfrm>
           <a:prstGeom prst="line">
             <a:avLst/>
@@ -28329,7 +28826,7 @@
       </p:sp>
       <p:sp>
         <p:nvSpPr>
-          <p:cNvPr id="59" name=""/>
+          <p:cNvPr id="57" name=""/>
           <p:cNvSpPr/>
           <p:nvPr/>
         </p:nvSpPr>
@@ -28358,7 +28855,7 @@
       </p:sp>
       <p:sp>
         <p:nvSpPr>
-          <p:cNvPr id="60" name=""/>
+          <p:cNvPr id="58" name=""/>
           <p:cNvSpPr/>
           <p:nvPr/>
         </p:nvSpPr>
@@ -28387,7 +28884,7 @@
       </p:sp>
       <p:sp>
         <p:nvSpPr>
-          <p:cNvPr id="61" name=""/>
+          <p:cNvPr id="59" name=""/>
           <p:cNvSpPr/>
           <p:nvPr/>
         </p:nvSpPr>
@@ -28416,7 +28913,7 @@
       </p:sp>
       <p:sp>
         <p:nvSpPr>
-          <p:cNvPr id="62" name=""/>
+          <p:cNvPr id="60" name=""/>
           <p:cNvSpPr/>
           <p:nvPr/>
         </p:nvSpPr>
@@ -28445,14 +28942,14 @@
       </p:sp>
       <p:sp>
         <p:nvSpPr>
-          <p:cNvPr id="63" name=""/>
+          <p:cNvPr id="61" name=""/>
           <p:cNvSpPr/>
           <p:nvPr/>
         </p:nvSpPr>
         <p:spPr>
           <a:xfrm>
             <a:off x="17830800" y="4564800"/>
-            <a:ext cx="1828440" cy="1142640"/>
+            <a:ext cx="1828080" cy="1226520"/>
           </a:xfrm>
           <a:prstGeom prst="rect">
             <a:avLst/>
@@ -28500,14 +28997,14 @@
       </p:sp>
       <p:sp>
         <p:nvSpPr>
-          <p:cNvPr id="64" name=""/>
+          <p:cNvPr id="62" name=""/>
           <p:cNvSpPr/>
           <p:nvPr/>
         </p:nvSpPr>
         <p:spPr>
           <a:xfrm>
             <a:off x="17806680" y="6012720"/>
-            <a:ext cx="1828440" cy="1142640"/>
+            <a:ext cx="1828080" cy="1142280"/>
           </a:xfrm>
           <a:prstGeom prst="rect">
             <a:avLst/>
@@ -28555,14 +29052,72 @@
       </p:sp>
       <p:sp>
         <p:nvSpPr>
+          <p:cNvPr id="63" name=""/>
+          <p:cNvSpPr/>
+          <p:nvPr/>
+        </p:nvSpPr>
+        <p:spPr>
+          <a:xfrm>
+            <a:off x="18739080" y="5797800"/>
+            <a:ext cx="6480" cy="214920"/>
+          </a:xfrm>
+          <a:prstGeom prst="line">
+            <a:avLst/>
+          </a:prstGeom>
+          <a:ln w="38160">
+            <a:solidFill>
+              <a:srgbClr val="3faf46"/>
+            </a:solidFill>
+            <a:round/>
+            <a:tailEnd len="med" type="triangle" w="med"/>
+          </a:ln>
+        </p:spPr>
+        <p:style>
+          <a:lnRef idx="0"/>
+          <a:fillRef idx="0"/>
+          <a:effectRef idx="0"/>
+          <a:fontRef idx="minor"/>
+        </p:style>
+      </p:sp>
+      <p:sp>
+        <p:nvSpPr>
+          <p:cNvPr id="64" name=""/>
+          <p:cNvSpPr/>
+          <p:nvPr/>
+        </p:nvSpPr>
+        <p:spPr>
+          <a:xfrm>
+            <a:off x="19888200" y="5707800"/>
+            <a:ext cx="685800" cy="360"/>
+          </a:xfrm>
+          <a:prstGeom prst="line">
+            <a:avLst/>
+          </a:prstGeom>
+          <a:ln w="38160">
+            <a:solidFill>
+              <a:srgbClr val="3faf46"/>
+            </a:solidFill>
+            <a:round/>
+            <a:tailEnd len="med" type="triangle" w="med"/>
+          </a:ln>
+        </p:spPr>
+        <p:style>
+          <a:lnRef idx="0"/>
+          <a:fillRef idx="0"/>
+          <a:effectRef idx="0"/>
+          <a:fontRef idx="minor"/>
+        </p:style>
+      </p:sp>
+      <p:sp>
+        <p:nvSpPr>
           <p:cNvPr id="65" name=""/>
           <p:cNvSpPr/>
           <p:nvPr/>
         </p:nvSpPr>
         <p:spPr>
           <a:xfrm>
-            <a:off x="18745200" y="5707800"/>
-            <a:ext cx="360" cy="304920"/>
+            <a:off x="22860000" y="5707800"/>
+            <a:ext cx="685800" cy="360"/>
           </a:xfrm>
           <a:prstGeom prst="line">
             <a:avLst/>
@@ -28590,18 +29145,17 @@
         </p:nvSpPr>
         <p:spPr>
           <a:xfrm>
-            <a:off x="19888200" y="5707800"/>
-            <a:ext cx="685800" cy="0"/>
+            <a:off x="13716000" y="15544800"/>
+            <a:ext cx="10972800" cy="5486400"/>
           </a:xfrm>
-          <a:prstGeom prst="line">
+          <a:prstGeom prst="rect">
             <a:avLst/>
           </a:prstGeom>
-          <a:ln w="38160">
-            <a:solidFill>
-              <a:srgbClr val="3faf46"/>
-            </a:solidFill>
-            <a:round/>
-            <a:tailEnd len="med" type="triangle" w="med"/>
+          <a:solidFill>
+            <a:srgbClr val="ffffff"/>
+          </a:solidFill>
+          <a:ln w="0">
+            <a:noFill/>
           </a:ln>
         </p:spPr>
         <p:style>
@@ -28610,6 +29164,32 @@
           <a:effectRef idx="0"/>
           <a:fontRef idx="minor"/>
         </p:style>
+        <p:txBody>
+          <a:bodyPr lIns="90000" rIns="90000" tIns="45000" bIns="45000" anchor="t">
+            <a:noAutofit/>
+          </a:bodyPr>
+          <a:p>
+            <a:pPr marL="228600">
+              <a:lnSpc>
+                <a:spcPct val="115000"/>
+              </a:lnSpc>
+              <a:buNone/>
+            </a:pPr>
+            <a:r>
+              <a:rPr b="1" lang="en-US" sz="3200" spc="-1" strike="noStrike">
+                <a:solidFill>
+                  <a:srgbClr val="000000"/>
+                </a:solidFill>
+                <a:latin typeface="Arial"/>
+                <a:ea typeface="DejaVu Sans"/>
+              </a:rPr>
+              <a:t>Software/Hardware Overview</a:t>
+            </a:r>
+            <a:endParaRPr b="1" lang="en-US" sz="3200" spc="-1" strike="noStrike">
+              <a:latin typeface="Arial"/>
+            </a:endParaRPr>
+          </a:p>
+        </p:txBody>
       </p:sp>
       <p:sp>
         <p:nvSpPr>
@@ -28619,18 +29199,19 @@
         </p:nvSpPr>
         <p:spPr>
           <a:xfrm>
-            <a:off x="22860000" y="5707800"/>
-            <a:ext cx="685800" cy="0"/>
+            <a:off x="456840" y="15545880"/>
+            <a:ext cx="12344760" cy="5486400"/>
           </a:xfrm>
-          <a:prstGeom prst="line">
+          <a:prstGeom prst="rect">
             <a:avLst/>
           </a:prstGeom>
-          <a:ln w="38160">
+          <a:solidFill>
+            <a:srgbClr val="729fcf"/>
+          </a:solidFill>
+          <a:ln w="0">
             <a:solidFill>
-              <a:srgbClr val="3faf46"/>
+              <a:srgbClr val="3465a4"/>
             </a:solidFill>
-            <a:round/>
-            <a:tailEnd len="med" type="triangle" w="med"/>
           </a:ln>
         </p:spPr>
         <p:style>
@@ -28639,7 +29220,242 @@
           <a:effectRef idx="0"/>
           <a:fontRef idx="minor"/>
         </p:style>
+        <p:txBody>
+          <a:bodyPr lIns="90000" rIns="90000" tIns="45000" bIns="45000" anchor="ctr">
+            <a:noAutofit/>
+          </a:bodyPr>
+          <a:p>
+            <a:pPr algn="ctr">
+              <a:lnSpc>
+                <a:spcPct val="100000"/>
+              </a:lnSpc>
+              <a:buNone/>
+            </a:pPr>
+            <a:r>
+              <a:rPr b="0" lang="en-US" sz="4800" spc="-1" strike="noStrike">
+                <a:solidFill>
+                  <a:srgbClr val="000000"/>
+                </a:solidFill>
+                <a:latin typeface="Arial"/>
+                <a:ea typeface="DejaVu Sans"/>
+              </a:rPr>
+              <a:t>Picture of Probes on Arm, or many smaller pictures of physical setup</a:t>
+            </a:r>
+            <a:endParaRPr b="0" lang="en-US" sz="4800" spc="-1" strike="noStrike">
+              <a:latin typeface="Arial"/>
+            </a:endParaRPr>
+          </a:p>
+        </p:txBody>
       </p:sp>
+      <p:sp>
+        <p:nvSpPr>
+          <p:cNvPr id="68" name=""/>
+          <p:cNvSpPr/>
+          <p:nvPr/>
+        </p:nvSpPr>
+        <p:spPr>
+          <a:xfrm>
+            <a:off x="456840" y="29260800"/>
+            <a:ext cx="24460560" cy="5029200"/>
+          </a:xfrm>
+          <a:prstGeom prst="rect">
+            <a:avLst/>
+          </a:prstGeom>
+          <a:solidFill>
+            <a:srgbClr val="ffffff"/>
+          </a:solidFill>
+          <a:ln w="0">
+            <a:noFill/>
+          </a:ln>
+        </p:spPr>
+        <p:style>
+          <a:lnRef idx="0"/>
+          <a:fillRef idx="0"/>
+          <a:effectRef idx="0"/>
+          <a:fontRef idx="minor"/>
+        </p:style>
+        <p:txBody>
+          <a:bodyPr lIns="90000" rIns="90000" tIns="45000" bIns="45000" anchor="t">
+            <a:noAutofit/>
+          </a:bodyPr>
+          <a:p>
+            <a:pPr marL="228600">
+              <a:lnSpc>
+                <a:spcPct val="115000"/>
+              </a:lnSpc>
+              <a:buNone/>
+            </a:pPr>
+            <a:r>
+              <a:rPr b="1" lang="en-US" sz="3200" spc="-1" strike="noStrike">
+                <a:solidFill>
+                  <a:srgbClr val="000000"/>
+                </a:solidFill>
+                <a:latin typeface="Arial"/>
+                <a:ea typeface="DejaVu Sans"/>
+              </a:rPr>
+              <a:t>Conclusion</a:t>
+            </a:r>
+            <a:endParaRPr b="1" lang="en-US" sz="3200" spc="-1" strike="noStrike">
+              <a:latin typeface="Arial"/>
+            </a:endParaRPr>
+          </a:p>
+          <a:p>
+            <a:pPr marL="228600">
+              <a:lnSpc>
+                <a:spcPct val="115000"/>
+              </a:lnSpc>
+              <a:buNone/>
+            </a:pPr>
+            <a:r>
+              <a:rPr b="0" lang="en-US" sz="2400" spc="-1" strike="noStrike">
+                <a:solidFill>
+                  <a:srgbClr val="000000"/>
+                </a:solidFill>
+                <a:latin typeface="Arial"/>
+                <a:ea typeface="DejaVu Sans"/>
+              </a:rPr>
+              <a:t>Compare amplifier characteristics between discrete inamp, breadboarded ina129, and assembled hardware. Design tradeoffs made, such as removing 60hz HP filter. Nature of </a:t>
+            </a:r>
+            <a:r>
+              <a:rPr b="0" lang="en-US" sz="2400" spc="-1" strike="noStrike">
+                <a:solidFill>
+                  <a:srgbClr val="000000"/>
+                </a:solidFill>
+                <a:latin typeface="Arial"/>
+                <a:ea typeface="DejaVu Sans"/>
+              </a:rPr>
+              <a:t>MUAPs, long spacing and frequency components. Power supply noise rejection and grounding issues with amplifier. Conclude with what went right what went wrong, what to </a:t>
+            </a:r>
+            <a:r>
+              <a:rPr b="0" lang="en-US" sz="2400" spc="-1" strike="noStrike">
+                <a:solidFill>
+                  <a:srgbClr val="000000"/>
+                </a:solidFill>
+                <a:latin typeface="Arial"/>
+                <a:ea typeface="DejaVu Sans"/>
+              </a:rPr>
+              <a:t>improve next time</a:t>
+            </a:r>
+            <a:endParaRPr b="1" lang="en-US" sz="2400" spc="-1" strike="noStrike">
+              <a:latin typeface="Arial"/>
+            </a:endParaRPr>
+          </a:p>
+        </p:txBody>
+      </p:sp>
+      <p:pic>
+        <p:nvPicPr>
+          <p:cNvPr id="69" name="" descr=""/>
+          <p:cNvPicPr/>
+          <p:nvPr/>
+        </p:nvPicPr>
+        <p:blipFill>
+          <a:blip r:embed="rId2"/>
+          <a:stretch/>
+        </p:blipFill>
+        <p:spPr>
+          <a:xfrm>
+            <a:off x="456840" y="21032280"/>
+            <a:ext cx="14630760" cy="8228520"/>
+          </a:xfrm>
+          <a:prstGeom prst="rect">
+            <a:avLst/>
+          </a:prstGeom>
+          <a:ln w="0">
+            <a:noFill/>
+          </a:ln>
+        </p:spPr>
+      </p:pic>
+      <p:sp>
+        <p:nvSpPr>
+          <p:cNvPr id="70" name=""/>
+          <p:cNvSpPr/>
+          <p:nvPr/>
+        </p:nvSpPr>
+        <p:spPr>
+          <a:xfrm>
+            <a:off x="456840" y="34290000"/>
+            <a:ext cx="24687000" cy="1827000"/>
+          </a:xfrm>
+          <a:prstGeom prst="rect">
+            <a:avLst/>
+          </a:prstGeom>
+          <a:solidFill>
+            <a:srgbClr val="ffffff"/>
+          </a:solidFill>
+          <a:ln w="0">
+            <a:noFill/>
+          </a:ln>
+        </p:spPr>
+        <p:style>
+          <a:lnRef idx="0"/>
+          <a:fillRef idx="0"/>
+          <a:effectRef idx="0"/>
+          <a:fontRef idx="minor"/>
+        </p:style>
+        <p:txBody>
+          <a:bodyPr lIns="90000" rIns="90000" tIns="45000" bIns="45000" anchor="t">
+            <a:noAutofit/>
+          </a:bodyPr>
+          <a:p>
+            <a:pPr marL="228600">
+              <a:lnSpc>
+                <a:spcPct val="115000"/>
+              </a:lnSpc>
+              <a:buNone/>
+            </a:pPr>
+            <a:r>
+              <a:rPr b="1" lang="en-US" sz="3200" spc="-1" strike="noStrike">
+                <a:solidFill>
+                  <a:srgbClr val="000000"/>
+                </a:solidFill>
+                <a:latin typeface="Arial"/>
+                <a:ea typeface="DejaVu Sans"/>
+              </a:rPr>
+              <a:t>References and Inspiration</a:t>
+            </a:r>
+            <a:endParaRPr b="1" lang="en-US" sz="3200" spc="-1" strike="noStrike">
+              <a:latin typeface="Arial"/>
+            </a:endParaRPr>
+          </a:p>
+          <a:p>
+            <a:pPr marL="228600">
+              <a:lnSpc>
+                <a:spcPct val="115000"/>
+              </a:lnSpc>
+              <a:buNone/>
+            </a:pPr>
+            <a:r>
+              <a:rPr b="0" lang="en-US" sz="2400" spc="-1" strike="noStrike">
+                <a:solidFill>
+                  <a:srgbClr val="000000"/>
+                </a:solidFill>
+                <a:latin typeface="Arial"/>
+                <a:ea typeface="DejaVu Sans"/>
+              </a:rPr>
+              <a:t>https://people.ece.cornell.edu/land/courses/ece4760/FinalProjects/f2016/mh2298_jyh37_sv376/mh2298_jyh37_sv376/mh2298_jyh37_sv376/index.html</a:t>
+            </a:r>
+            <a:endParaRPr b="1" lang="en-US" sz="2400" spc="-1" strike="noStrike">
+              <a:latin typeface="Arial"/>
+            </a:endParaRPr>
+          </a:p>
+        </p:txBody>
+      </p:sp>
+      <p:graphicFrame>
+        <p:nvGraphicFramePr>
+          <p:cNvPr id="71" name=""/>
+          <p:cNvGraphicFramePr/>
+          <p:nvPr/>
+        </p:nvGraphicFramePr>
+        <p:xfrm>
+          <a:off x="15087600" y="21031200"/>
+          <a:ext cx="10056240" cy="8229600"/>
+        </p:xfrm>
+        <a:graphic>
+          <a:graphicData uri="http://schemas.openxmlformats.org/drawingml/2006/chart">
+            <c:chart xmlns:c="http://schemas.openxmlformats.org/drawingml/2006/chart" xmlns:r="http://schemas.openxmlformats.org/officeDocument/2006/relationships" r:id="rId3"/>
+          </a:graphicData>
+        </a:graphic>
+      </p:graphicFrame>
     </p:spTree>
   </p:cSld>
   <mc:AlternateContent>

</xml_diff>

<commit_message>
Updated Presentation material in order to make it standard size for printing. Significant changes to layout but not much new material
</commit_message>
<xml_diff>
--- a/PresentationMaterial/lastname-firstname_poster.pptx
+++ b/PresentationMaterial/lastname-firstname_poster.pptx
@@ -7,12 +7,12 @@
   <p:sldIdLst>
     <p:sldId id="256" r:id="rId3"/>
   </p:sldIdLst>
-  <p:sldSz cx="25603200" cy="36576000"/>
+  <p:sldSz cx="32918400" cy="21945600"/>
   <p:notesSz cx="7772400" cy="10058400"/>
 </p:presentation>
 </file>
 
-<file path=ppt/charts/chart15.xml><?xml version="1.0" encoding="utf-8"?>
+<file path=ppt/charts/chart29.xml><?xml version="1.0" encoding="utf-8"?>
 <c:chartSpace xmlns:c="http://schemas.openxmlformats.org/drawingml/2006/chart" xmlns:a="http://schemas.openxmlformats.org/drawingml/2006/main" xmlns:r="http://schemas.openxmlformats.org/officeDocument/2006/relationships">
   <c:lang val="en-US"/>
   <c:roundedCorners val="0"/>
@@ -49,8 +49,8 @@
         <c:manualLayout>
           <c:xMode val="edge"/>
           <c:yMode val="edge"/>
-          <c:x val="0.15398768664638"/>
-          <c:y val="0.0115453931065555"/>
+          <c:x val="0.160145150799356"/>
+          <c:y val="0.001874625074985"/>
         </c:manualLayout>
       </c:layout>
       <c:overlay val="0"/>
@@ -68,10 +68,10 @@
           <c:layoutTarget val="inner"/>
           <c:xMode val="edge"/>
           <c:yMode val="edge"/>
-          <c:x val="0.0938716297501946"/>
-          <c:y val="0.115453931065555"/>
-          <c:w val="0.879237138206779"/>
-          <c:h val="0.745550799729669"/>
+          <c:x val="0.0938749513463784"/>
+          <c:y val="0.115460433680653"/>
+          <c:w val="0.879197480627013"/>
+          <c:h val="0.745536468600394"/>
         </c:manualLayout>
       </c:layout>
       <c:scatterChart>
@@ -24209,11 +24209,11 @@
           </c:yVal>
           <c:smooth val="0"/>
         </c:ser>
-        <c:axId val="7445876"/>
-        <c:axId val="70153172"/>
+        <c:axId val="96562310"/>
+        <c:axId val="75028648"/>
       </c:scatterChart>
       <c:valAx>
-        <c:axId val="7445876"/>
+        <c:axId val="96562310"/>
         <c:scaling>
           <c:orientation val="minMax"/>
           <c:max val="5"/>
@@ -24248,6 +24248,14 @@
               </a:p>
             </c:rich>
           </c:tx>
+          <c:layout>
+            <c:manualLayout>
+              <c:xMode val="edge"/>
+              <c:yMode val="edge"/>
+              <c:x val="0.44907740234843"/>
+              <c:y val="0.890371925614877"/>
+            </c:manualLayout>
+          </c:layout>
           <c:overlay val="0"/>
           <c:spPr>
             <a:noFill/>
@@ -24282,12 +24290,12 @@
             </a:pPr>
           </a:p>
         </c:txPr>
-        <c:crossAx val="70153172"/>
+        <c:crossAx val="75028648"/>
         <c:crosses val="max"/>
         <c:crossBetween val="midCat"/>
       </c:valAx>
       <c:valAx>
-        <c:axId val="70153172"/>
+        <c:axId val="75028648"/>
         <c:scaling>
           <c:orientation val="minMax"/>
         </c:scaling>
@@ -24364,7 +24372,7 @@
             </a:pPr>
           </a:p>
         </c:txPr>
-        <c:crossAx val="7445876"/>
+        <c:crossAx val="96562310"/>
         <c:crosses val="autoZero"/>
         <c:crossBetween val="midCat"/>
       </c:valAx>
@@ -24426,7 +24434,7 @@
 </c:chartSpace>
 </file>
 
-<file path=ppt/charts/chart16.xml><?xml version="1.0" encoding="utf-8"?>
+<file path=ppt/charts/chart30.xml><?xml version="1.0" encoding="utf-8"?>
 <c:chartSpace xmlns:c="http://schemas.openxmlformats.org/drawingml/2006/chart" xmlns:a="http://schemas.openxmlformats.org/drawingml/2006/main" xmlns:r="http://schemas.openxmlformats.org/officeDocument/2006/relationships">
   <c:lang val="en-US"/>
   <c:roundedCorners val="0"/>
@@ -24439,12 +24447,20 @@
           <a:p>
             <a:pPr>
               <a:defRPr b="0" sz="3200" spc="-1" strike="noStrike">
+                <a:solidFill>
+                  <a:srgbClr val="000000"/>
+                </a:solidFill>
                 <a:latin typeface="Arial"/>
+                <a:ea typeface="DejaVu Sans"/>
               </a:defRPr>
             </a:pPr>
             <a:r>
               <a:rPr b="0" sz="3200" spc="-1" strike="noStrike">
+                <a:solidFill>
+                  <a:srgbClr val="000000"/>
+                </a:solidFill>
                 <a:latin typeface="Arial"/>
+                <a:ea typeface="DejaVu Sans"/>
               </a:rPr>
               <a:t>Gain Comparison of Probe Board Revisions</a:t>
             </a:r>
@@ -24455,8 +24471,8 @@
         <c:manualLayout>
           <c:xMode val="edge"/>
           <c:yMode val="edge"/>
-          <c:x val="0.104743153749776"/>
-          <c:y val="0.0380560780368313"/>
+          <c:x val="0.149635411317654"/>
+          <c:y val="0.0262373719020278"/>
         </c:manualLayout>
       </c:layout>
       <c:overlay val="0"/>
@@ -24474,10 +24490,10 @@
           <c:layoutTarget val="inner"/>
           <c:xMode val="edge"/>
           <c:yMode val="edge"/>
-          <c:x val="0.102520015044866"/>
-          <c:y val="0.161810009595475"/>
-          <c:w val="0.848422975659556"/>
-          <c:h val="0.706529973233675"/>
+          <c:x val="0.0945224238274564"/>
+          <c:y val="0.136005726556908"/>
+          <c:w val="0.872577884286203"/>
+          <c:h val="0.731997136721546"/>
         </c:manualLayout>
       </c:layout>
       <c:scatterChart>
@@ -24488,7 +24504,7 @@
           <c:order val="0"/>
           <c:tx>
             <c:strRef>
-              <c:f>label 1</c:f>
+              <c:f>label 0</c:f>
               <c:strCache>
                 <c:ptCount val="1"/>
                 <c:pt idx="0">
@@ -24499,11 +24515,11 @@
           </c:tx>
           <c:spPr>
             <a:solidFill>
-              <a:srgbClr val="579d1c"/>
+              <a:srgbClr val="2a6099"/>
             </a:solidFill>
             <a:ln w="28800">
               <a:solidFill>
-                <a:srgbClr val="579d1c"/>
+                <a:srgbClr val="2a6099"/>
               </a:solidFill>
               <a:round/>
             </a:ln>
@@ -24513,7 +24529,7 @@
             <c:size val="8"/>
             <c:spPr>
               <a:solidFill>
-                <a:srgbClr val="579d1c"/>
+                <a:srgbClr val="2a6099"/>
               </a:solidFill>
             </c:spPr>
           </c:marker>
@@ -24524,11 +24540,16 @@
               <a:p>
                 <a:pPr>
                   <a:defRPr b="0" sz="1000" spc="-1" strike="noStrike">
+                    <a:solidFill>
+                      <a:srgbClr val="000000"/>
+                    </a:solidFill>
                     <a:latin typeface="Arial"/>
+                    <a:ea typeface="DejaVu Sans"/>
                   </a:defRPr>
                 </a:pPr>
               </a:p>
             </c:txPr>
+            <c:dLblPos val="r"/>
             <c:showLegendKey val="0"/>
             <c:showVal val="0"/>
             <c:showCatName val="0"/>
@@ -24544,7 +24565,7 @@
           </c:dLbls>
           <c:xVal>
             <c:numRef>
-              <c:f>0</c:f>
+              <c:f>1</c:f>
               <c:numCache>
                 <c:formatCode>General</c:formatCode>
                 <c:ptCount val="14"/>
@@ -24595,7 +24616,7 @@
           </c:xVal>
           <c:yVal>
             <c:numRef>
-              <c:f>1</c:f>
+              <c:f>0</c:f>
               <c:numCache>
                 <c:formatCode>General</c:formatCode>
                 <c:ptCount val="14"/>
@@ -24651,7 +24672,7 @@
           <c:order val="1"/>
           <c:tx>
             <c:strRef>
-              <c:f>label 3</c:f>
+              <c:f>label 2</c:f>
               <c:strCache>
                 <c:ptCount val="1"/>
                 <c:pt idx="0">
@@ -24662,11 +24683,11 @@
           </c:tx>
           <c:spPr>
             <a:solidFill>
-              <a:srgbClr val="83caff"/>
+              <a:srgbClr val="ff420e"/>
             </a:solidFill>
             <a:ln w="28800">
               <a:solidFill>
-                <a:srgbClr val="83caff"/>
+                <a:srgbClr val="ff420e"/>
               </a:solidFill>
               <a:round/>
             </a:ln>
@@ -24676,7 +24697,7 @@
             <c:size val="8"/>
             <c:spPr>
               <a:solidFill>
-                <a:srgbClr val="83caff"/>
+                <a:srgbClr val="ff420e"/>
               </a:solidFill>
             </c:spPr>
           </c:marker>
@@ -24687,11 +24708,16 @@
               <a:p>
                 <a:pPr>
                   <a:defRPr b="0" sz="1000" spc="-1" strike="noStrike">
+                    <a:solidFill>
+                      <a:srgbClr val="000000"/>
+                    </a:solidFill>
                     <a:latin typeface="Arial"/>
+                    <a:ea typeface="DejaVu Sans"/>
                   </a:defRPr>
                 </a:pPr>
               </a:p>
             </c:txPr>
+            <c:dLblPos val="r"/>
             <c:showLegendKey val="0"/>
             <c:showVal val="0"/>
             <c:showCatName val="0"/>
@@ -24707,59 +24733,59 @@
           </c:dLbls>
           <c:xVal>
             <c:numRef>
+              <c:f>3</c:f>
+              <c:numCache>
+                <c:formatCode>General</c:formatCode>
+                <c:ptCount val="14"/>
+                <c:pt idx="0">
+                  <c:v>100</c:v>
+                </c:pt>
+                <c:pt idx="1">
+                  <c:v>122</c:v>
+                </c:pt>
+                <c:pt idx="2">
+                  <c:v>244</c:v>
+                </c:pt>
+                <c:pt idx="3">
+                  <c:v>580</c:v>
+                </c:pt>
+                <c:pt idx="4">
+                  <c:v>1579</c:v>
+                </c:pt>
+                <c:pt idx="5">
+                  <c:v>3326</c:v>
+                </c:pt>
+                <c:pt idx="6">
+                  <c:v>5142</c:v>
+                </c:pt>
+                <c:pt idx="7">
+                  <c:v>8530</c:v>
+                </c:pt>
+                <c:pt idx="8">
+                  <c:v>11795</c:v>
+                </c:pt>
+                <c:pt idx="9">
+                  <c:v>13733</c:v>
+                </c:pt>
+                <c:pt idx="10">
+                  <c:v>16556</c:v>
+                </c:pt>
+                <c:pt idx="11">
+                  <c:v>18219</c:v>
+                </c:pt>
+                <c:pt idx="12">
+                  <c:v>19402</c:v>
+                </c:pt>
+              </c:numCache>
+            </c:numRef>
+          </c:xVal>
+          <c:yVal>
+            <c:numRef>
               <c:f>2</c:f>
               <c:numCache>
                 <c:formatCode>General</c:formatCode>
                 <c:ptCount val="14"/>
                 <c:pt idx="0">
-                  <c:v>100</c:v>
-                </c:pt>
-                <c:pt idx="1">
-                  <c:v>122</c:v>
-                </c:pt>
-                <c:pt idx="2">
-                  <c:v>244</c:v>
-                </c:pt>
-                <c:pt idx="3">
-                  <c:v>580</c:v>
-                </c:pt>
-                <c:pt idx="4">
-                  <c:v>1579</c:v>
-                </c:pt>
-                <c:pt idx="5">
-                  <c:v>3326</c:v>
-                </c:pt>
-                <c:pt idx="6">
-                  <c:v>5142</c:v>
-                </c:pt>
-                <c:pt idx="7">
-                  <c:v>8530</c:v>
-                </c:pt>
-                <c:pt idx="8">
-                  <c:v>11795</c:v>
-                </c:pt>
-                <c:pt idx="9">
-                  <c:v>13733</c:v>
-                </c:pt>
-                <c:pt idx="10">
-                  <c:v>16556</c:v>
-                </c:pt>
-                <c:pt idx="11">
-                  <c:v>18219</c:v>
-                </c:pt>
-                <c:pt idx="12">
-                  <c:v>19402</c:v>
-                </c:pt>
-              </c:numCache>
-            </c:numRef>
-          </c:xVal>
-          <c:yVal>
-            <c:numRef>
-              <c:f>3</c:f>
-              <c:numCache>
-                <c:formatCode>General</c:formatCode>
-                <c:ptCount val="14"/>
-                <c:pt idx="0">
                   <c:v>-7.1</c:v>
                 </c:pt>
                 <c:pt idx="1">
@@ -24803,11 +24829,11 @@
           </c:yVal>
           <c:smooth val="0"/>
         </c:ser>
-        <c:axId val="44869986"/>
-        <c:axId val="46518068"/>
+        <c:axId val="94780799"/>
+        <c:axId val="20979725"/>
       </c:scatterChart>
       <c:valAx>
-        <c:axId val="44869986"/>
+        <c:axId val="94780799"/>
         <c:scaling>
           <c:logBase val="10"/>
           <c:orientation val="minMax"/>
@@ -24831,12 +24857,20 @@
               <a:p>
                 <a:pPr>
                   <a:defRPr b="0" sz="2400" spc="-1" strike="noStrike">
+                    <a:solidFill>
+                      <a:srgbClr val="000000"/>
+                    </a:solidFill>
                     <a:latin typeface="Arial"/>
+                    <a:ea typeface="DejaVu Sans"/>
                   </a:defRPr>
                 </a:pPr>
                 <a:r>
                   <a:rPr b="0" sz="2400" spc="-1" strike="noStrike">
+                    <a:solidFill>
+                      <a:srgbClr val="000000"/>
+                    </a:solidFill>
                     <a:latin typeface="Arial"/>
+                    <a:ea typeface="DejaVu Sans"/>
                   </a:rPr>
                   <a:t>Frequency (Hz)</a:t>
                 </a:r>
@@ -24868,17 +24902,21 @@
           <a:p>
             <a:pPr>
               <a:defRPr b="0" sz="1800" spc="-1" strike="noStrike">
+                <a:solidFill>
+                  <a:srgbClr val="000000"/>
+                </a:solidFill>
                 <a:latin typeface="Arial"/>
+                <a:ea typeface="DejaVu Sans"/>
               </a:defRPr>
             </a:pPr>
           </a:p>
         </c:txPr>
-        <c:crossAx val="46518068"/>
+        <c:crossAx val="20979725"/>
         <c:crosses val="min"/>
-        <c:crossBetween val="between"/>
+        <c:crossBetween val="midCat"/>
       </c:valAx>
       <c:valAx>
-        <c:axId val="46518068"/>
+        <c:axId val="20979725"/>
         <c:scaling>
           <c:orientation val="minMax"/>
         </c:scaling>
@@ -24901,12 +24939,20 @@
               <a:p>
                 <a:pPr>
                   <a:defRPr b="0" sz="2400" spc="-1" strike="noStrike">
+                    <a:solidFill>
+                      <a:srgbClr val="000000"/>
+                    </a:solidFill>
                     <a:latin typeface="Arial"/>
+                    <a:ea typeface="DejaVu Sans"/>
                   </a:defRPr>
                 </a:pPr>
                 <a:r>
                   <a:rPr b="0" sz="2400" spc="-1" strike="noStrike">
+                    <a:solidFill>
+                      <a:srgbClr val="000000"/>
+                    </a:solidFill>
                     <a:latin typeface="Arial"/>
+                    <a:ea typeface="DejaVu Sans"/>
                   </a:rPr>
                   <a:t>Magnitude (dB)</a:t>
                 </a:r>
@@ -24938,14 +24984,18 @@
           <a:p>
             <a:pPr>
               <a:defRPr b="0" sz="1800" spc="-1" strike="noStrike">
+                <a:solidFill>
+                  <a:srgbClr val="000000"/>
+                </a:solidFill>
                 <a:latin typeface="Arial"/>
+                <a:ea typeface="DejaVu Sans"/>
               </a:defRPr>
             </a:pPr>
           </a:p>
         </c:txPr>
-        <c:crossAx val="44869986"/>
+        <c:crossAx val="94780799"/>
         <c:crosses val="autoZero"/>
-        <c:crossBetween val="between"/>
+        <c:crossBetween val="midCat"/>
       </c:valAx>
       <c:spPr>
         <a:noFill/>
@@ -24981,7 +25031,11 @@
         <a:p>
           <a:pPr>
             <a:defRPr b="0" sz="2400" spc="-1" strike="noStrike">
+              <a:solidFill>
+                <a:srgbClr val="000000"/>
+              </a:solidFill>
               <a:latin typeface="Arial"/>
+              <a:ea typeface="DejaVu Sans"/>
             </a:defRPr>
           </a:pPr>
         </a:p>
@@ -25052,7 +25106,7 @@
         <p:txBody>
           <a:bodyPr/>
           <a:p>
-            <a:fld id="{7E10A4D3-6ED4-4C95-A1DA-C43BE688B6EB}" type="slidenum">
+            <a:fld id="{30E7B53F-11DC-45D1-AFF4-ED0173EB2824}" type="slidenum">
               <a:t>&lt;#&gt;</a:t>
             </a:fld>
           </a:p>
@@ -25113,8 +25167,8 @@
         </p:nvSpPr>
         <p:spPr>
           <a:xfrm>
-            <a:off x="1280160" y="1459080"/>
-            <a:ext cx="23042520" cy="6107760"/>
+            <a:off x="1645920" y="875160"/>
+            <a:ext cx="29626200" cy="3664440"/>
           </a:xfrm>
           <a:prstGeom prst="rect">
             <a:avLst/>
@@ -25129,10 +25183,13 @@
             <a:noAutofit/>
           </a:bodyPr>
           <a:p>
-            <a:pPr algn="ctr">
+            <a:pPr indent="0" algn="ctr">
               <a:buNone/>
             </a:pPr>
-            <a:endParaRPr b="0" lang="en-US" sz="4400" spc="-1" strike="noStrike">
+            <a:endParaRPr b="0" lang="en-US" sz="3770" spc="-1" strike="noStrike">
+              <a:solidFill>
+                <a:srgbClr val="000000"/>
+              </a:solidFill>
               <a:latin typeface="Arial"/>
             </a:endParaRPr>
           </a:p>
@@ -25150,8 +25207,8 @@
         </p:nvSpPr>
         <p:spPr>
           <a:xfrm>
-            <a:off x="1280160" y="8558640"/>
-            <a:ext cx="23042520" cy="10118520"/>
+            <a:off x="1645920" y="5135040"/>
+            <a:ext cx="29626200" cy="6071040"/>
           </a:xfrm>
           <a:prstGeom prst="rect">
             <a:avLst/>
@@ -25166,7 +25223,16 @@
             <a:normAutofit/>
           </a:bodyPr>
           <a:p>
-            <a:endParaRPr b="0" lang="en-US" sz="3200" spc="-1" strike="noStrike">
+            <a:pPr indent="0">
+              <a:spcBef>
+                <a:spcPts val="1213"/>
+              </a:spcBef>
+              <a:buNone/>
+            </a:pPr>
+            <a:endParaRPr b="0" lang="en-US" sz="2740" spc="-1" strike="noStrike">
+              <a:solidFill>
+                <a:srgbClr val="000000"/>
+              </a:solidFill>
               <a:latin typeface="Arial"/>
             </a:endParaRPr>
           </a:p>
@@ -25184,8 +25250,8 @@
         </p:nvSpPr>
         <p:spPr>
           <a:xfrm>
-            <a:off x="1280160" y="19638720"/>
-            <a:ext cx="23042520" cy="10118520"/>
+            <a:off x="1645920" y="11783160"/>
+            <a:ext cx="29626200" cy="6071040"/>
           </a:xfrm>
           <a:prstGeom prst="rect">
             <a:avLst/>
@@ -25200,7 +25266,16 @@
             <a:normAutofit/>
           </a:bodyPr>
           <a:p>
-            <a:endParaRPr b="0" lang="en-US" sz="3200" spc="-1" strike="noStrike">
+            <a:pPr indent="0">
+              <a:spcBef>
+                <a:spcPts val="1213"/>
+              </a:spcBef>
+              <a:buNone/>
+            </a:pPr>
+            <a:endParaRPr b="0" lang="en-US" sz="2740" spc="-1" strike="noStrike">
+              <a:solidFill>
+                <a:srgbClr val="000000"/>
+              </a:solidFill>
               <a:latin typeface="Arial"/>
             </a:endParaRPr>
           </a:p>
@@ -25240,7 +25315,7 @@
         <p:txBody>
           <a:bodyPr/>
           <a:p>
-            <a:fld id="{55B078AD-A934-4EB4-8101-F3E3D656360B}" type="slidenum">
+            <a:fld id="{708FAAB8-29F6-4C94-9D0E-A841D8B995B8}" type="slidenum">
               <a:t>&lt;#&gt;</a:t>
             </a:fld>
           </a:p>
@@ -25301,8 +25376,8 @@
         </p:nvSpPr>
         <p:spPr>
           <a:xfrm>
-            <a:off x="1280160" y="1459080"/>
-            <a:ext cx="23042520" cy="6107760"/>
+            <a:off x="1645920" y="875160"/>
+            <a:ext cx="29626200" cy="3664440"/>
           </a:xfrm>
           <a:prstGeom prst="rect">
             <a:avLst/>
@@ -25317,10 +25392,13 @@
             <a:noAutofit/>
           </a:bodyPr>
           <a:p>
-            <a:pPr algn="ctr">
+            <a:pPr indent="0" algn="ctr">
               <a:buNone/>
             </a:pPr>
-            <a:endParaRPr b="0" lang="en-US" sz="4400" spc="-1" strike="noStrike">
+            <a:endParaRPr b="0" lang="en-US" sz="3770" spc="-1" strike="noStrike">
+              <a:solidFill>
+                <a:srgbClr val="000000"/>
+              </a:solidFill>
               <a:latin typeface="Arial"/>
             </a:endParaRPr>
           </a:p>
@@ -25338,8 +25416,8 @@
         </p:nvSpPr>
         <p:spPr>
           <a:xfrm>
-            <a:off x="1280160" y="8558640"/>
-            <a:ext cx="11244600" cy="10118520"/>
+            <a:off x="1645920" y="5135040"/>
+            <a:ext cx="14457240" cy="6071040"/>
           </a:xfrm>
           <a:prstGeom prst="rect">
             <a:avLst/>
@@ -25354,7 +25432,16 @@
             <a:normAutofit/>
           </a:bodyPr>
           <a:p>
-            <a:endParaRPr b="0" lang="en-US" sz="3200" spc="-1" strike="noStrike">
+            <a:pPr indent="0">
+              <a:spcBef>
+                <a:spcPts val="1213"/>
+              </a:spcBef>
+              <a:buNone/>
+            </a:pPr>
+            <a:endParaRPr b="0" lang="en-US" sz="2740" spc="-1" strike="noStrike">
+              <a:solidFill>
+                <a:srgbClr val="000000"/>
+              </a:solidFill>
               <a:latin typeface="Arial"/>
             </a:endParaRPr>
           </a:p>
@@ -25372,8 +25459,8 @@
         </p:nvSpPr>
         <p:spPr>
           <a:xfrm>
-            <a:off x="13087440" y="8558640"/>
-            <a:ext cx="11244600" cy="10118520"/>
+            <a:off x="16826400" y="5135040"/>
+            <a:ext cx="14457240" cy="6071040"/>
           </a:xfrm>
           <a:prstGeom prst="rect">
             <a:avLst/>
@@ -25388,7 +25475,16 @@
             <a:normAutofit/>
           </a:bodyPr>
           <a:p>
-            <a:endParaRPr b="0" lang="en-US" sz="3200" spc="-1" strike="noStrike">
+            <a:pPr indent="0">
+              <a:spcBef>
+                <a:spcPts val="1213"/>
+              </a:spcBef>
+              <a:buNone/>
+            </a:pPr>
+            <a:endParaRPr b="0" lang="en-US" sz="2740" spc="-1" strike="noStrike">
+              <a:solidFill>
+                <a:srgbClr val="000000"/>
+              </a:solidFill>
               <a:latin typeface="Arial"/>
             </a:endParaRPr>
           </a:p>
@@ -25406,8 +25502,8 @@
         </p:nvSpPr>
         <p:spPr>
           <a:xfrm>
-            <a:off x="1280160" y="19638720"/>
-            <a:ext cx="11244600" cy="10118520"/>
+            <a:off x="1645920" y="11783160"/>
+            <a:ext cx="14457240" cy="6071040"/>
           </a:xfrm>
           <a:prstGeom prst="rect">
             <a:avLst/>
@@ -25422,7 +25518,16 @@
             <a:normAutofit/>
           </a:bodyPr>
           <a:p>
-            <a:endParaRPr b="0" lang="en-US" sz="3200" spc="-1" strike="noStrike">
+            <a:pPr indent="0">
+              <a:spcBef>
+                <a:spcPts val="1213"/>
+              </a:spcBef>
+              <a:buNone/>
+            </a:pPr>
+            <a:endParaRPr b="0" lang="en-US" sz="2740" spc="-1" strike="noStrike">
+              <a:solidFill>
+                <a:srgbClr val="000000"/>
+              </a:solidFill>
               <a:latin typeface="Arial"/>
             </a:endParaRPr>
           </a:p>
@@ -25440,8 +25545,8 @@
         </p:nvSpPr>
         <p:spPr>
           <a:xfrm>
-            <a:off x="13087440" y="19638720"/>
-            <a:ext cx="11244600" cy="10118520"/>
+            <a:off x="16826400" y="11783160"/>
+            <a:ext cx="14457240" cy="6071040"/>
           </a:xfrm>
           <a:prstGeom prst="rect">
             <a:avLst/>
@@ -25456,7 +25561,16 @@
             <a:normAutofit/>
           </a:bodyPr>
           <a:p>
-            <a:endParaRPr b="0" lang="en-US" sz="3200" spc="-1" strike="noStrike">
+            <a:pPr indent="0">
+              <a:spcBef>
+                <a:spcPts val="1213"/>
+              </a:spcBef>
+              <a:buNone/>
+            </a:pPr>
+            <a:endParaRPr b="0" lang="en-US" sz="2740" spc="-1" strike="noStrike">
+              <a:solidFill>
+                <a:srgbClr val="000000"/>
+              </a:solidFill>
               <a:latin typeface="Arial"/>
             </a:endParaRPr>
           </a:p>
@@ -25496,7 +25610,7 @@
         <p:txBody>
           <a:bodyPr/>
           <a:p>
-            <a:fld id="{4D5E1C09-4207-4D22-A3AF-4A6F021F39F3}" type="slidenum">
+            <a:fld id="{9254C501-7145-44C3-9853-7874A5F68D26}" type="slidenum">
               <a:t>&lt;#&gt;</a:t>
             </a:fld>
           </a:p>
@@ -25557,8 +25671,8 @@
         </p:nvSpPr>
         <p:spPr>
           <a:xfrm>
-            <a:off x="1280160" y="1459080"/>
-            <a:ext cx="23042520" cy="6107760"/>
+            <a:off x="1645920" y="875160"/>
+            <a:ext cx="29626200" cy="3664440"/>
           </a:xfrm>
           <a:prstGeom prst="rect">
             <a:avLst/>
@@ -25573,10 +25687,13 @@
             <a:noAutofit/>
           </a:bodyPr>
           <a:p>
-            <a:pPr algn="ctr">
+            <a:pPr indent="0" algn="ctr">
               <a:buNone/>
             </a:pPr>
-            <a:endParaRPr b="0" lang="en-US" sz="4400" spc="-1" strike="noStrike">
+            <a:endParaRPr b="0" lang="en-US" sz="3770" spc="-1" strike="noStrike">
+              <a:solidFill>
+                <a:srgbClr val="000000"/>
+              </a:solidFill>
               <a:latin typeface="Arial"/>
             </a:endParaRPr>
           </a:p>
@@ -25594,8 +25711,8 @@
         </p:nvSpPr>
         <p:spPr>
           <a:xfrm>
-            <a:off x="1280160" y="8558640"/>
-            <a:ext cx="7419600" cy="10118520"/>
+            <a:off x="1645920" y="5135040"/>
+            <a:ext cx="9539280" cy="6071040"/>
           </a:xfrm>
           <a:prstGeom prst="rect">
             <a:avLst/>
@@ -25610,7 +25727,16 @@
             <a:normAutofit/>
           </a:bodyPr>
           <a:p>
-            <a:endParaRPr b="0" lang="en-US" sz="3200" spc="-1" strike="noStrike">
+            <a:pPr indent="0">
+              <a:spcBef>
+                <a:spcPts val="1213"/>
+              </a:spcBef>
+              <a:buNone/>
+            </a:pPr>
+            <a:endParaRPr b="0" lang="en-US" sz="2740" spc="-1" strike="noStrike">
+              <a:solidFill>
+                <a:srgbClr val="000000"/>
+              </a:solidFill>
               <a:latin typeface="Arial"/>
             </a:endParaRPr>
           </a:p>
@@ -25628,8 +25754,8 @@
         </p:nvSpPr>
         <p:spPr>
           <a:xfrm>
-            <a:off x="9071280" y="8558640"/>
-            <a:ext cx="7419600" cy="10118520"/>
+            <a:off x="11662560" y="5135040"/>
+            <a:ext cx="9539280" cy="6071040"/>
           </a:xfrm>
           <a:prstGeom prst="rect">
             <a:avLst/>
@@ -25644,7 +25770,16 @@
             <a:normAutofit/>
           </a:bodyPr>
           <a:p>
-            <a:endParaRPr b="0" lang="en-US" sz="3200" spc="-1" strike="noStrike">
+            <a:pPr indent="0">
+              <a:spcBef>
+                <a:spcPts val="1213"/>
+              </a:spcBef>
+              <a:buNone/>
+            </a:pPr>
+            <a:endParaRPr b="0" lang="en-US" sz="2740" spc="-1" strike="noStrike">
+              <a:solidFill>
+                <a:srgbClr val="000000"/>
+              </a:solidFill>
               <a:latin typeface="Arial"/>
             </a:endParaRPr>
           </a:p>
@@ -25662,8 +25797,8 @@
         </p:nvSpPr>
         <p:spPr>
           <a:xfrm>
-            <a:off x="16862040" y="8558640"/>
-            <a:ext cx="7419600" cy="10118520"/>
+            <a:off x="21679200" y="5135040"/>
+            <a:ext cx="9539280" cy="6071040"/>
           </a:xfrm>
           <a:prstGeom prst="rect">
             <a:avLst/>
@@ -25678,7 +25813,16 @@
             <a:normAutofit/>
           </a:bodyPr>
           <a:p>
-            <a:endParaRPr b="0" lang="en-US" sz="3200" spc="-1" strike="noStrike">
+            <a:pPr indent="0">
+              <a:spcBef>
+                <a:spcPts val="1213"/>
+              </a:spcBef>
+              <a:buNone/>
+            </a:pPr>
+            <a:endParaRPr b="0" lang="en-US" sz="2740" spc="-1" strike="noStrike">
+              <a:solidFill>
+                <a:srgbClr val="000000"/>
+              </a:solidFill>
               <a:latin typeface="Arial"/>
             </a:endParaRPr>
           </a:p>
@@ -25696,8 +25840,8 @@
         </p:nvSpPr>
         <p:spPr>
           <a:xfrm>
-            <a:off x="1280160" y="19638720"/>
-            <a:ext cx="7419600" cy="10118520"/>
+            <a:off x="1645920" y="11783160"/>
+            <a:ext cx="9539280" cy="6071040"/>
           </a:xfrm>
           <a:prstGeom prst="rect">
             <a:avLst/>
@@ -25712,7 +25856,16 @@
             <a:normAutofit/>
           </a:bodyPr>
           <a:p>
-            <a:endParaRPr b="0" lang="en-US" sz="3200" spc="-1" strike="noStrike">
+            <a:pPr indent="0">
+              <a:spcBef>
+                <a:spcPts val="1213"/>
+              </a:spcBef>
+              <a:buNone/>
+            </a:pPr>
+            <a:endParaRPr b="0" lang="en-US" sz="2740" spc="-1" strike="noStrike">
+              <a:solidFill>
+                <a:srgbClr val="000000"/>
+              </a:solidFill>
               <a:latin typeface="Arial"/>
             </a:endParaRPr>
           </a:p>
@@ -25730,8 +25883,8 @@
         </p:nvSpPr>
         <p:spPr>
           <a:xfrm>
-            <a:off x="9071280" y="19638720"/>
-            <a:ext cx="7419600" cy="10118520"/>
+            <a:off x="11662560" y="11783160"/>
+            <a:ext cx="9539280" cy="6071040"/>
           </a:xfrm>
           <a:prstGeom prst="rect">
             <a:avLst/>
@@ -25746,7 +25899,16 @@
             <a:normAutofit/>
           </a:bodyPr>
           <a:p>
-            <a:endParaRPr b="0" lang="en-US" sz="3200" spc="-1" strike="noStrike">
+            <a:pPr indent="0">
+              <a:spcBef>
+                <a:spcPts val="1213"/>
+              </a:spcBef>
+              <a:buNone/>
+            </a:pPr>
+            <a:endParaRPr b="0" lang="en-US" sz="2740" spc="-1" strike="noStrike">
+              <a:solidFill>
+                <a:srgbClr val="000000"/>
+              </a:solidFill>
               <a:latin typeface="Arial"/>
             </a:endParaRPr>
           </a:p>
@@ -25764,8 +25926,8 @@
         </p:nvSpPr>
         <p:spPr>
           <a:xfrm>
-            <a:off x="16862040" y="19638720"/>
-            <a:ext cx="7419600" cy="10118520"/>
+            <a:off x="21679200" y="11783160"/>
+            <a:ext cx="9539280" cy="6071040"/>
           </a:xfrm>
           <a:prstGeom prst="rect">
             <a:avLst/>
@@ -25780,7 +25942,16 @@
             <a:normAutofit/>
           </a:bodyPr>
           <a:p>
-            <a:endParaRPr b="0" lang="en-US" sz="3200" spc="-1" strike="noStrike">
+            <a:pPr indent="0">
+              <a:spcBef>
+                <a:spcPts val="1213"/>
+              </a:spcBef>
+              <a:buNone/>
+            </a:pPr>
+            <a:endParaRPr b="0" lang="en-US" sz="2740" spc="-1" strike="noStrike">
+              <a:solidFill>
+                <a:srgbClr val="000000"/>
+              </a:solidFill>
               <a:latin typeface="Arial"/>
             </a:endParaRPr>
           </a:p>
@@ -25820,7 +25991,7 @@
         <p:txBody>
           <a:bodyPr/>
           <a:p>
-            <a:fld id="{0D182EF4-2F0A-470A-A1A5-E07A55483FE5}" type="slidenum">
+            <a:fld id="{3E6F19D4-14C5-41E9-AC61-54009A2E87D9}" type="slidenum">
               <a:t>&lt;#&gt;</a:t>
             </a:fld>
           </a:p>
@@ -25881,8 +26052,8 @@
         </p:nvSpPr>
         <p:spPr>
           <a:xfrm>
-            <a:off x="1280160" y="1459080"/>
-            <a:ext cx="23042520" cy="6107760"/>
+            <a:off x="1645920" y="875160"/>
+            <a:ext cx="29626200" cy="3664440"/>
           </a:xfrm>
           <a:prstGeom prst="rect">
             <a:avLst/>
@@ -25897,10 +26068,13 @@
             <a:noAutofit/>
           </a:bodyPr>
           <a:p>
-            <a:pPr algn="ctr">
+            <a:pPr indent="0" algn="ctr">
               <a:buNone/>
             </a:pPr>
-            <a:endParaRPr b="0" lang="en-US" sz="4400" spc="-1" strike="noStrike">
+            <a:endParaRPr b="0" lang="en-US" sz="3770" spc="-1" strike="noStrike">
+              <a:solidFill>
+                <a:srgbClr val="000000"/>
+              </a:solidFill>
               <a:latin typeface="Arial"/>
             </a:endParaRPr>
           </a:p>
@@ -25918,8 +26092,8 @@
         </p:nvSpPr>
         <p:spPr>
           <a:xfrm>
-            <a:off x="1280160" y="8558640"/>
-            <a:ext cx="23042520" cy="21213360"/>
+            <a:off x="1645920" y="5135040"/>
+            <a:ext cx="29626200" cy="12727800"/>
           </a:xfrm>
           <a:prstGeom prst="rect">
             <a:avLst/>
@@ -25934,10 +26108,13 @@
             <a:noAutofit/>
           </a:bodyPr>
           <a:p>
-            <a:pPr algn="ctr">
+            <a:pPr indent="0" algn="ctr">
               <a:buNone/>
             </a:pPr>
             <a:endParaRPr b="0" lang="en-US" sz="3200" spc="-1" strike="noStrike">
+              <a:solidFill>
+                <a:srgbClr val="000000"/>
+              </a:solidFill>
               <a:latin typeface="Arial"/>
             </a:endParaRPr>
           </a:p>
@@ -25977,7 +26154,7 @@
         <p:txBody>
           <a:bodyPr/>
           <a:p>
-            <a:fld id="{B60C7EF4-1C26-4A8B-BE71-B43F1A480D3C}" type="slidenum">
+            <a:fld id="{DCE77414-A71F-4520-9BD7-E5A3DF7A0EC8}" type="slidenum">
               <a:t>&lt;#&gt;</a:t>
             </a:fld>
           </a:p>
@@ -26038,8 +26215,8 @@
         </p:nvSpPr>
         <p:spPr>
           <a:xfrm>
-            <a:off x="1280160" y="1459080"/>
-            <a:ext cx="23042520" cy="6107760"/>
+            <a:off x="1645920" y="875160"/>
+            <a:ext cx="29626200" cy="3664440"/>
           </a:xfrm>
           <a:prstGeom prst="rect">
             <a:avLst/>
@@ -26054,10 +26231,13 @@
             <a:noAutofit/>
           </a:bodyPr>
           <a:p>
-            <a:pPr algn="ctr">
+            <a:pPr indent="0" algn="ctr">
               <a:buNone/>
             </a:pPr>
-            <a:endParaRPr b="0" lang="en-US" sz="4400" spc="-1" strike="noStrike">
+            <a:endParaRPr b="0" lang="en-US" sz="3770" spc="-1" strike="noStrike">
+              <a:solidFill>
+                <a:srgbClr val="000000"/>
+              </a:solidFill>
               <a:latin typeface="Arial"/>
             </a:endParaRPr>
           </a:p>
@@ -26075,8 +26255,8 @@
         </p:nvSpPr>
         <p:spPr>
           <a:xfrm>
-            <a:off x="1280160" y="8558640"/>
-            <a:ext cx="23042520" cy="21213360"/>
+            <a:off x="1645920" y="5135040"/>
+            <a:ext cx="29626200" cy="12727800"/>
           </a:xfrm>
           <a:prstGeom prst="rect">
             <a:avLst/>
@@ -26091,7 +26271,16 @@
             <a:normAutofit/>
           </a:bodyPr>
           <a:p>
-            <a:endParaRPr b="0" lang="en-US" sz="3200" spc="-1" strike="noStrike">
+            <a:pPr indent="0">
+              <a:spcBef>
+                <a:spcPts val="1213"/>
+              </a:spcBef>
+              <a:buNone/>
+            </a:pPr>
+            <a:endParaRPr b="0" lang="en-US" sz="2740" spc="-1" strike="noStrike">
+              <a:solidFill>
+                <a:srgbClr val="000000"/>
+              </a:solidFill>
               <a:latin typeface="Arial"/>
             </a:endParaRPr>
           </a:p>
@@ -26131,7 +26320,7 @@
         <p:txBody>
           <a:bodyPr/>
           <a:p>
-            <a:fld id="{FEC7F6A1-ECA8-4562-A86D-81D2E3E5A07B}" type="slidenum">
+            <a:fld id="{D23EBBCA-EC80-4777-A9F9-EC6EDE19C153}" type="slidenum">
               <a:t>&lt;#&gt;</a:t>
             </a:fld>
           </a:p>
@@ -26192,8 +26381,8 @@
         </p:nvSpPr>
         <p:spPr>
           <a:xfrm>
-            <a:off x="1280160" y="1459080"/>
-            <a:ext cx="23042520" cy="6107760"/>
+            <a:off x="1645920" y="875160"/>
+            <a:ext cx="29626200" cy="3664440"/>
           </a:xfrm>
           <a:prstGeom prst="rect">
             <a:avLst/>
@@ -26208,10 +26397,13 @@
             <a:noAutofit/>
           </a:bodyPr>
           <a:p>
-            <a:pPr algn="ctr">
+            <a:pPr indent="0" algn="ctr">
               <a:buNone/>
             </a:pPr>
-            <a:endParaRPr b="0" lang="en-US" sz="4400" spc="-1" strike="noStrike">
+            <a:endParaRPr b="0" lang="en-US" sz="3770" spc="-1" strike="noStrike">
+              <a:solidFill>
+                <a:srgbClr val="000000"/>
+              </a:solidFill>
               <a:latin typeface="Arial"/>
             </a:endParaRPr>
           </a:p>
@@ -26229,8 +26421,8 @@
         </p:nvSpPr>
         <p:spPr>
           <a:xfrm>
-            <a:off x="1280160" y="8558640"/>
-            <a:ext cx="11244600" cy="21213360"/>
+            <a:off x="1645920" y="5135040"/>
+            <a:ext cx="14457240" cy="12727800"/>
           </a:xfrm>
           <a:prstGeom prst="rect">
             <a:avLst/>
@@ -26245,7 +26437,16 @@
             <a:normAutofit/>
           </a:bodyPr>
           <a:p>
-            <a:endParaRPr b="0" lang="en-US" sz="3200" spc="-1" strike="noStrike">
+            <a:pPr indent="0">
+              <a:spcBef>
+                <a:spcPts val="1213"/>
+              </a:spcBef>
+              <a:buNone/>
+            </a:pPr>
+            <a:endParaRPr b="0" lang="en-US" sz="2740" spc="-1" strike="noStrike">
+              <a:solidFill>
+                <a:srgbClr val="000000"/>
+              </a:solidFill>
               <a:latin typeface="Arial"/>
             </a:endParaRPr>
           </a:p>
@@ -26263,8 +26464,8 @@
         </p:nvSpPr>
         <p:spPr>
           <a:xfrm>
-            <a:off x="13087440" y="8558640"/>
-            <a:ext cx="11244600" cy="21213360"/>
+            <a:off x="16826400" y="5135040"/>
+            <a:ext cx="14457240" cy="12727800"/>
           </a:xfrm>
           <a:prstGeom prst="rect">
             <a:avLst/>
@@ -26279,7 +26480,16 @@
             <a:normAutofit/>
           </a:bodyPr>
           <a:p>
-            <a:endParaRPr b="0" lang="en-US" sz="3200" spc="-1" strike="noStrike">
+            <a:pPr indent="0">
+              <a:spcBef>
+                <a:spcPts val="1213"/>
+              </a:spcBef>
+              <a:buNone/>
+            </a:pPr>
+            <a:endParaRPr b="0" lang="en-US" sz="2740" spc="-1" strike="noStrike">
+              <a:solidFill>
+                <a:srgbClr val="000000"/>
+              </a:solidFill>
               <a:latin typeface="Arial"/>
             </a:endParaRPr>
           </a:p>
@@ -26319,7 +26529,7 @@
         <p:txBody>
           <a:bodyPr/>
           <a:p>
-            <a:fld id="{36C4B8B9-AEDE-4F60-A18F-53F17F748252}" type="slidenum">
+            <a:fld id="{9BE94192-A5A5-4E8D-9170-F449DD63FF20}" type="slidenum">
               <a:t>&lt;#&gt;</a:t>
             </a:fld>
           </a:p>
@@ -26380,8 +26590,8 @@
         </p:nvSpPr>
         <p:spPr>
           <a:xfrm>
-            <a:off x="1280160" y="1459080"/>
-            <a:ext cx="23042520" cy="6107760"/>
+            <a:off x="1645920" y="875160"/>
+            <a:ext cx="29626200" cy="3664440"/>
           </a:xfrm>
           <a:prstGeom prst="rect">
             <a:avLst/>
@@ -26396,10 +26606,13 @@
             <a:noAutofit/>
           </a:bodyPr>
           <a:p>
-            <a:pPr algn="ctr">
+            <a:pPr indent="0" algn="ctr">
               <a:buNone/>
             </a:pPr>
-            <a:endParaRPr b="0" lang="en-US" sz="4400" spc="-1" strike="noStrike">
+            <a:endParaRPr b="0" lang="en-US" sz="3770" spc="-1" strike="noStrike">
+              <a:solidFill>
+                <a:srgbClr val="000000"/>
+              </a:solidFill>
               <a:latin typeface="Arial"/>
             </a:endParaRPr>
           </a:p>
@@ -26439,7 +26652,7 @@
         <p:txBody>
           <a:bodyPr/>
           <a:p>
-            <a:fld id="{CC3CDDC1-0345-4230-8550-F453382C43B5}" type="slidenum">
+            <a:fld id="{4C3FB8D4-2DD8-4890-AAFD-1DBCDE9CC4EC}" type="slidenum">
               <a:t>&lt;#&gt;</a:t>
             </a:fld>
           </a:p>
@@ -26500,8 +26713,8 @@
         </p:nvSpPr>
         <p:spPr>
           <a:xfrm>
-            <a:off x="1280160" y="1459080"/>
-            <a:ext cx="23042520" cy="28313280"/>
+            <a:off x="1645920" y="875160"/>
+            <a:ext cx="29626200" cy="16987320"/>
           </a:xfrm>
           <a:prstGeom prst="rect">
             <a:avLst/>
@@ -26516,10 +26729,11 @@
             <a:noAutofit/>
           </a:bodyPr>
           <a:p>
-            <a:pPr algn="ctr">
-              <a:buNone/>
-            </a:pPr>
+            <a:pPr algn="ctr"/>
             <a:endParaRPr b="0" lang="en-US" sz="3200" spc="-1" strike="noStrike">
+              <a:solidFill>
+                <a:srgbClr val="000000"/>
+              </a:solidFill>
               <a:latin typeface="Arial"/>
             </a:endParaRPr>
           </a:p>
@@ -26559,7 +26773,7 @@
         <p:txBody>
           <a:bodyPr/>
           <a:p>
-            <a:fld id="{31980E02-8AC7-4C4D-86D2-1429BE934ED5}" type="slidenum">
+            <a:fld id="{B0A395B6-C2D6-41AC-BCCF-B76B5B32FC15}" type="slidenum">
               <a:t>&lt;#&gt;</a:t>
             </a:fld>
           </a:p>
@@ -26620,8 +26834,8 @@
         </p:nvSpPr>
         <p:spPr>
           <a:xfrm>
-            <a:off x="1280160" y="1459080"/>
-            <a:ext cx="23042520" cy="6107760"/>
+            <a:off x="1645920" y="875160"/>
+            <a:ext cx="29626200" cy="3664440"/>
           </a:xfrm>
           <a:prstGeom prst="rect">
             <a:avLst/>
@@ -26636,10 +26850,13 @@
             <a:noAutofit/>
           </a:bodyPr>
           <a:p>
-            <a:pPr algn="ctr">
+            <a:pPr indent="0" algn="ctr">
               <a:buNone/>
             </a:pPr>
-            <a:endParaRPr b="0" lang="en-US" sz="4400" spc="-1" strike="noStrike">
+            <a:endParaRPr b="0" lang="en-US" sz="3770" spc="-1" strike="noStrike">
+              <a:solidFill>
+                <a:srgbClr val="000000"/>
+              </a:solidFill>
               <a:latin typeface="Arial"/>
             </a:endParaRPr>
           </a:p>
@@ -26657,8 +26874,8 @@
         </p:nvSpPr>
         <p:spPr>
           <a:xfrm>
-            <a:off x="1280160" y="8558640"/>
-            <a:ext cx="11244600" cy="10118520"/>
+            <a:off x="1645920" y="5135040"/>
+            <a:ext cx="14457240" cy="6071040"/>
           </a:xfrm>
           <a:prstGeom prst="rect">
             <a:avLst/>
@@ -26673,7 +26890,16 @@
             <a:normAutofit/>
           </a:bodyPr>
           <a:p>
-            <a:endParaRPr b="0" lang="en-US" sz="3200" spc="-1" strike="noStrike">
+            <a:pPr indent="0">
+              <a:spcBef>
+                <a:spcPts val="1213"/>
+              </a:spcBef>
+              <a:buNone/>
+            </a:pPr>
+            <a:endParaRPr b="0" lang="en-US" sz="2740" spc="-1" strike="noStrike">
+              <a:solidFill>
+                <a:srgbClr val="000000"/>
+              </a:solidFill>
               <a:latin typeface="Arial"/>
             </a:endParaRPr>
           </a:p>
@@ -26691,8 +26917,8 @@
         </p:nvSpPr>
         <p:spPr>
           <a:xfrm>
-            <a:off x="13087440" y="8558640"/>
-            <a:ext cx="11244600" cy="21213360"/>
+            <a:off x="16826400" y="5135040"/>
+            <a:ext cx="14457240" cy="12727800"/>
           </a:xfrm>
           <a:prstGeom prst="rect">
             <a:avLst/>
@@ -26707,7 +26933,16 @@
             <a:normAutofit/>
           </a:bodyPr>
           <a:p>
-            <a:endParaRPr b="0" lang="en-US" sz="3200" spc="-1" strike="noStrike">
+            <a:pPr indent="0">
+              <a:spcBef>
+                <a:spcPts val="1213"/>
+              </a:spcBef>
+              <a:buNone/>
+            </a:pPr>
+            <a:endParaRPr b="0" lang="en-US" sz="2740" spc="-1" strike="noStrike">
+              <a:solidFill>
+                <a:srgbClr val="000000"/>
+              </a:solidFill>
               <a:latin typeface="Arial"/>
             </a:endParaRPr>
           </a:p>
@@ -26725,8 +26960,8 @@
         </p:nvSpPr>
         <p:spPr>
           <a:xfrm>
-            <a:off x="1280160" y="19638720"/>
-            <a:ext cx="11244600" cy="10118520"/>
+            <a:off x="1645920" y="11783160"/>
+            <a:ext cx="14457240" cy="6071040"/>
           </a:xfrm>
           <a:prstGeom prst="rect">
             <a:avLst/>
@@ -26741,7 +26976,16 @@
             <a:normAutofit/>
           </a:bodyPr>
           <a:p>
-            <a:endParaRPr b="0" lang="en-US" sz="3200" spc="-1" strike="noStrike">
+            <a:pPr indent="0">
+              <a:spcBef>
+                <a:spcPts val="1213"/>
+              </a:spcBef>
+              <a:buNone/>
+            </a:pPr>
+            <a:endParaRPr b="0" lang="en-US" sz="2740" spc="-1" strike="noStrike">
+              <a:solidFill>
+                <a:srgbClr val="000000"/>
+              </a:solidFill>
               <a:latin typeface="Arial"/>
             </a:endParaRPr>
           </a:p>
@@ -26781,7 +27025,7 @@
         <p:txBody>
           <a:bodyPr/>
           <a:p>
-            <a:fld id="{535E3C7C-F611-4143-BFBD-787A8D83571A}" type="slidenum">
+            <a:fld id="{32B38547-FEC1-4906-930C-3209EEB96C4E}" type="slidenum">
               <a:t>&lt;#&gt;</a:t>
             </a:fld>
           </a:p>
@@ -26842,8 +27086,8 @@
         </p:nvSpPr>
         <p:spPr>
           <a:xfrm>
-            <a:off x="1280160" y="1459080"/>
-            <a:ext cx="23042520" cy="6107760"/>
+            <a:off x="1645920" y="875160"/>
+            <a:ext cx="29626200" cy="3664440"/>
           </a:xfrm>
           <a:prstGeom prst="rect">
             <a:avLst/>
@@ -26858,10 +27102,13 @@
             <a:noAutofit/>
           </a:bodyPr>
           <a:p>
-            <a:pPr algn="ctr">
+            <a:pPr indent="0" algn="ctr">
               <a:buNone/>
             </a:pPr>
-            <a:endParaRPr b="0" lang="en-US" sz="4400" spc="-1" strike="noStrike">
+            <a:endParaRPr b="0" lang="en-US" sz="3770" spc="-1" strike="noStrike">
+              <a:solidFill>
+                <a:srgbClr val="000000"/>
+              </a:solidFill>
               <a:latin typeface="Arial"/>
             </a:endParaRPr>
           </a:p>
@@ -26879,8 +27126,8 @@
         </p:nvSpPr>
         <p:spPr>
           <a:xfrm>
-            <a:off x="1280160" y="8558640"/>
-            <a:ext cx="11244600" cy="21213360"/>
+            <a:off x="1645920" y="5135040"/>
+            <a:ext cx="14457240" cy="12727800"/>
           </a:xfrm>
           <a:prstGeom prst="rect">
             <a:avLst/>
@@ -26895,7 +27142,16 @@
             <a:normAutofit/>
           </a:bodyPr>
           <a:p>
-            <a:endParaRPr b="0" lang="en-US" sz="3200" spc="-1" strike="noStrike">
+            <a:pPr indent="0">
+              <a:spcBef>
+                <a:spcPts val="1213"/>
+              </a:spcBef>
+              <a:buNone/>
+            </a:pPr>
+            <a:endParaRPr b="0" lang="en-US" sz="2740" spc="-1" strike="noStrike">
+              <a:solidFill>
+                <a:srgbClr val="000000"/>
+              </a:solidFill>
               <a:latin typeface="Arial"/>
             </a:endParaRPr>
           </a:p>
@@ -26913,8 +27169,8 @@
         </p:nvSpPr>
         <p:spPr>
           <a:xfrm>
-            <a:off x="13087440" y="8558640"/>
-            <a:ext cx="11244600" cy="10118520"/>
+            <a:off x="16826400" y="5135040"/>
+            <a:ext cx="14457240" cy="6071040"/>
           </a:xfrm>
           <a:prstGeom prst="rect">
             <a:avLst/>
@@ -26929,7 +27185,16 @@
             <a:normAutofit/>
           </a:bodyPr>
           <a:p>
-            <a:endParaRPr b="0" lang="en-US" sz="3200" spc="-1" strike="noStrike">
+            <a:pPr indent="0">
+              <a:spcBef>
+                <a:spcPts val="1213"/>
+              </a:spcBef>
+              <a:buNone/>
+            </a:pPr>
+            <a:endParaRPr b="0" lang="en-US" sz="2740" spc="-1" strike="noStrike">
+              <a:solidFill>
+                <a:srgbClr val="000000"/>
+              </a:solidFill>
               <a:latin typeface="Arial"/>
             </a:endParaRPr>
           </a:p>
@@ -26947,8 +27212,8 @@
         </p:nvSpPr>
         <p:spPr>
           <a:xfrm>
-            <a:off x="13087440" y="19638720"/>
-            <a:ext cx="11244600" cy="10118520"/>
+            <a:off x="16826400" y="11783160"/>
+            <a:ext cx="14457240" cy="6071040"/>
           </a:xfrm>
           <a:prstGeom prst="rect">
             <a:avLst/>
@@ -26963,7 +27228,16 @@
             <a:normAutofit/>
           </a:bodyPr>
           <a:p>
-            <a:endParaRPr b="0" lang="en-US" sz="3200" spc="-1" strike="noStrike">
+            <a:pPr indent="0">
+              <a:spcBef>
+                <a:spcPts val="1213"/>
+              </a:spcBef>
+              <a:buNone/>
+            </a:pPr>
+            <a:endParaRPr b="0" lang="en-US" sz="2740" spc="-1" strike="noStrike">
+              <a:solidFill>
+                <a:srgbClr val="000000"/>
+              </a:solidFill>
               <a:latin typeface="Arial"/>
             </a:endParaRPr>
           </a:p>
@@ -27003,7 +27277,7 @@
         <p:txBody>
           <a:bodyPr/>
           <a:p>
-            <a:fld id="{FC2A84A8-BCC5-4B68-A738-2BDD0946B129}" type="slidenum">
+            <a:fld id="{441E7945-B82A-451E-AE71-D7FB1E3347D9}" type="slidenum">
               <a:t>&lt;#&gt;</a:t>
             </a:fld>
           </a:p>
@@ -27064,8 +27338,8 @@
         </p:nvSpPr>
         <p:spPr>
           <a:xfrm>
-            <a:off x="1280160" y="1459080"/>
-            <a:ext cx="23042520" cy="6107760"/>
+            <a:off x="1645920" y="875160"/>
+            <a:ext cx="29626200" cy="3664440"/>
           </a:xfrm>
           <a:prstGeom prst="rect">
             <a:avLst/>
@@ -27080,10 +27354,13 @@
             <a:noAutofit/>
           </a:bodyPr>
           <a:p>
-            <a:pPr algn="ctr">
+            <a:pPr indent="0" algn="ctr">
               <a:buNone/>
             </a:pPr>
-            <a:endParaRPr b="0" lang="en-US" sz="4400" spc="-1" strike="noStrike">
+            <a:endParaRPr b="0" lang="en-US" sz="3770" spc="-1" strike="noStrike">
+              <a:solidFill>
+                <a:srgbClr val="000000"/>
+              </a:solidFill>
               <a:latin typeface="Arial"/>
             </a:endParaRPr>
           </a:p>
@@ -27101,8 +27378,8 @@
         </p:nvSpPr>
         <p:spPr>
           <a:xfrm>
-            <a:off x="1280160" y="8558640"/>
-            <a:ext cx="11244600" cy="10118520"/>
+            <a:off x="1645920" y="5135040"/>
+            <a:ext cx="14457240" cy="6071040"/>
           </a:xfrm>
           <a:prstGeom prst="rect">
             <a:avLst/>
@@ -27117,7 +27394,16 @@
             <a:normAutofit/>
           </a:bodyPr>
           <a:p>
-            <a:endParaRPr b="0" lang="en-US" sz="3200" spc="-1" strike="noStrike">
+            <a:pPr indent="0">
+              <a:spcBef>
+                <a:spcPts val="1213"/>
+              </a:spcBef>
+              <a:buNone/>
+            </a:pPr>
+            <a:endParaRPr b="0" lang="en-US" sz="2740" spc="-1" strike="noStrike">
+              <a:solidFill>
+                <a:srgbClr val="000000"/>
+              </a:solidFill>
               <a:latin typeface="Arial"/>
             </a:endParaRPr>
           </a:p>
@@ -27135,8 +27421,8 @@
         </p:nvSpPr>
         <p:spPr>
           <a:xfrm>
-            <a:off x="13087440" y="8558640"/>
-            <a:ext cx="11244600" cy="10118520"/>
+            <a:off x="16826400" y="5135040"/>
+            <a:ext cx="14457240" cy="6071040"/>
           </a:xfrm>
           <a:prstGeom prst="rect">
             <a:avLst/>
@@ -27151,7 +27437,16 @@
             <a:normAutofit/>
           </a:bodyPr>
           <a:p>
-            <a:endParaRPr b="0" lang="en-US" sz="3200" spc="-1" strike="noStrike">
+            <a:pPr indent="0">
+              <a:spcBef>
+                <a:spcPts val="1213"/>
+              </a:spcBef>
+              <a:buNone/>
+            </a:pPr>
+            <a:endParaRPr b="0" lang="en-US" sz="2740" spc="-1" strike="noStrike">
+              <a:solidFill>
+                <a:srgbClr val="000000"/>
+              </a:solidFill>
               <a:latin typeface="Arial"/>
             </a:endParaRPr>
           </a:p>
@@ -27169,8 +27464,8 @@
         </p:nvSpPr>
         <p:spPr>
           <a:xfrm>
-            <a:off x="1280160" y="19638720"/>
-            <a:ext cx="23042520" cy="10118520"/>
+            <a:off x="1645920" y="11783160"/>
+            <a:ext cx="29626200" cy="6071040"/>
           </a:xfrm>
           <a:prstGeom prst="rect">
             <a:avLst/>
@@ -27185,7 +27480,16 @@
             <a:normAutofit/>
           </a:bodyPr>
           <a:p>
-            <a:endParaRPr b="0" lang="en-US" sz="3200" spc="-1" strike="noStrike">
+            <a:pPr indent="0">
+              <a:spcBef>
+                <a:spcPts val="1213"/>
+              </a:spcBef>
+              <a:buNone/>
+            </a:pPr>
+            <a:endParaRPr b="0" lang="en-US" sz="2740" spc="-1" strike="noStrike">
+              <a:solidFill>
+                <a:srgbClr val="000000"/>
+              </a:solidFill>
               <a:latin typeface="Arial"/>
             </a:endParaRPr>
           </a:p>
@@ -27225,7 +27529,7 @@
         <p:txBody>
           <a:bodyPr/>
           <a:p>
-            <a:fld id="{43D33AC7-AD50-4C17-A97F-48896812943F}" type="slidenum">
+            <a:fld id="{773D85D8-C446-4F63-85D6-264054A1F148}" type="slidenum">
               <a:t>&lt;#&gt;</a:t>
             </a:fld>
           </a:p>
@@ -27293,8 +27597,8 @@
         </p:nvSpPr>
         <p:spPr>
           <a:xfrm>
-            <a:off x="8746920" y="33900120"/>
-            <a:ext cx="8105400" cy="1944360"/>
+            <a:off x="11246040" y="20339640"/>
+            <a:ext cx="10420920" cy="1166400"/>
           </a:xfrm>
           <a:prstGeom prst="rect">
             <a:avLst/>
@@ -27309,18 +27613,21 @@
             <a:noAutofit/>
           </a:bodyPr>
           <a:lstStyle>
-            <a:lvl1pPr algn="ctr">
+            <a:lvl1pPr indent="0" algn="ctr">
               <a:lnSpc>
                 <a:spcPct val="100000"/>
               </a:lnSpc>
               <a:buNone/>
               <a:defRPr b="0" lang="en-US" sz="1400" spc="-1" strike="noStrike">
+                <a:solidFill>
+                  <a:srgbClr val="000000"/>
+                </a:solidFill>
                 <a:latin typeface="Times New Roman"/>
               </a:defRPr>
             </a:lvl1pPr>
           </a:lstStyle>
           <a:p>
-            <a:pPr algn="ctr">
+            <a:pPr indent="0" algn="ctr">
               <a:lnSpc>
                 <a:spcPct val="100000"/>
               </a:lnSpc>
@@ -27328,11 +27635,17 @@
             </a:pPr>
             <a:r>
               <a:rPr b="0" lang="en-US" sz="1400" spc="-1" strike="noStrike">
+                <a:solidFill>
+                  <a:srgbClr val="000000"/>
+                </a:solidFill>
                 <a:latin typeface="Times New Roman"/>
               </a:rPr>
-              <a:t>&lt;footer&gt;</a:t>
+              <a:t> </a:t>
             </a:r>
             <a:endParaRPr b="0" lang="en-US" sz="1400" spc="-1" strike="noStrike">
+              <a:solidFill>
+                <a:srgbClr val="000000"/>
+              </a:solidFill>
               <a:latin typeface="Times New Roman"/>
             </a:endParaRPr>
           </a:p>
@@ -27350,8 +27663,8 @@
         </p:nvSpPr>
         <p:spPr>
           <a:xfrm>
-            <a:off x="18348120" y="33900120"/>
-            <a:ext cx="5971680" cy="1944360"/>
+            <a:off x="23590440" y="20339640"/>
+            <a:ext cx="7677360" cy="1166400"/>
           </a:xfrm>
           <a:prstGeom prst="rect">
             <a:avLst/>
@@ -27366,7 +27679,7 @@
             <a:noAutofit/>
           </a:bodyPr>
           <a:lstStyle>
-            <a:lvl1pPr algn="r">
+            <a:lvl1pPr indent="0" algn="r">
               <a:lnSpc>
                 <a:spcPct val="100000"/>
               </a:lnSpc>
@@ -27380,22 +27693,25 @@
             </a:lvl1pPr>
           </a:lstStyle>
           <a:p>
-            <a:pPr algn="r">
+            <a:pPr indent="0" algn="r">
               <a:lnSpc>
                 <a:spcPct val="100000"/>
               </a:lnSpc>
               <a:buNone/>
             </a:pPr>
-            <a:fld id="{4758A136-DBDC-42CF-9061-767E6FF7C0D1}" type="slidenum">
+            <a:fld id="{3B46400F-0B2E-475A-87D1-4F0D7E7CF85C}" type="slidenum">
               <a:rPr b="0" lang="en-US" sz="5600" spc="-1" strike="noStrike">
                 <a:solidFill>
                   <a:srgbClr val="8b8b8b"/>
                 </a:solidFill>
                 <a:latin typeface="Calibri"/>
               </a:rPr>
-              <a:t>&lt;number&gt;</a:t>
+              <a:t>1</a:t>
             </a:fld>
             <a:endParaRPr b="0" lang="en-US" sz="5600" spc="-1" strike="noStrike">
+              <a:solidFill>
+                <a:srgbClr val="000000"/>
+              </a:solidFill>
               <a:latin typeface="Times New Roman"/>
             </a:endParaRPr>
           </a:p>
@@ -27413,8 +27729,8 @@
         </p:nvSpPr>
         <p:spPr>
           <a:xfrm>
-            <a:off x="1280160" y="33900120"/>
-            <a:ext cx="5971680" cy="1944360"/>
+            <a:off x="1645920" y="20339640"/>
+            <a:ext cx="7677360" cy="1166400"/>
           </a:xfrm>
           <a:prstGeom prst="rect">
             <a:avLst/>
@@ -27429,20 +27745,33 @@
             <a:noAutofit/>
           </a:bodyPr>
           <a:lstStyle>
-            <a:lvl1pPr>
+            <a:lvl1pPr indent="0">
+              <a:buNone/>
               <a:defRPr b="0" lang="en-US" sz="1400" spc="-1" strike="noStrike">
+                <a:solidFill>
+                  <a:srgbClr val="000000"/>
+                </a:solidFill>
                 <a:latin typeface="Times New Roman"/>
               </a:defRPr>
             </a:lvl1pPr>
           </a:lstStyle>
           <a:p>
+            <a:pPr indent="0">
+              <a:buNone/>
+            </a:pPr>
             <a:r>
               <a:rPr b="0" lang="en-US" sz="1400" spc="-1" strike="noStrike">
+                <a:solidFill>
+                  <a:srgbClr val="000000"/>
+                </a:solidFill>
                 <a:latin typeface="Times New Roman"/>
               </a:rPr>
-              <a:t>&lt;date/time&gt;</a:t>
+              <a:t> </a:t>
             </a:r>
             <a:endParaRPr b="0" lang="en-US" sz="1400" spc="-1" strike="noStrike">
+              <a:solidFill>
+                <a:srgbClr val="000000"/>
+              </a:solidFill>
               <a:latin typeface="Times New Roman"/>
             </a:endParaRPr>
           </a:p>
@@ -27460,8 +27789,8 @@
         </p:nvSpPr>
         <p:spPr>
           <a:xfrm>
-            <a:off x="1280160" y="1459080"/>
-            <a:ext cx="23042520" cy="6107760"/>
+            <a:off x="1645920" y="875160"/>
+            <a:ext cx="29626200" cy="3664440"/>
           </a:xfrm>
           <a:prstGeom prst="rect">
             <a:avLst/>
@@ -27476,220 +27805,22 @@
             <a:noAutofit/>
           </a:bodyPr>
           <a:p>
-            <a:pPr algn="ctr">
+            <a:pPr indent="0" algn="ctr">
               <a:buNone/>
             </a:pPr>
             <a:r>
-              <a:rPr b="0" lang="en-US" sz="4400" spc="-1" strike="noStrike">
+              <a:rPr b="0" lang="en-US" sz="3770" spc="-1" strike="noStrike">
+                <a:solidFill>
+                  <a:srgbClr val="000000"/>
+                </a:solidFill>
                 <a:latin typeface="Arial"/>
               </a:rPr>
-              <a:t>C</a:t>
+              <a:t>Click to edit the title text format</a:t>
             </a:r>
-            <a:r>
-              <a:rPr b="0" lang="en-US" sz="4400" spc="-1" strike="noStrike">
-                <a:latin typeface="Arial"/>
-              </a:rPr>
-              <a:t>l</a:t>
-            </a:r>
-            <a:r>
-              <a:rPr b="0" lang="en-US" sz="4400" spc="-1" strike="noStrike">
-                <a:latin typeface="Arial"/>
-              </a:rPr>
-              <a:t>i</a:t>
-            </a:r>
-            <a:r>
-              <a:rPr b="0" lang="en-US" sz="4400" spc="-1" strike="noStrike">
-                <a:latin typeface="Arial"/>
-              </a:rPr>
-              <a:t>c</a:t>
-            </a:r>
-            <a:r>
-              <a:rPr b="0" lang="en-US" sz="4400" spc="-1" strike="noStrike">
-                <a:latin typeface="Arial"/>
-              </a:rPr>
-              <a:t>k</a:t>
-            </a:r>
-            <a:r>
-              <a:rPr b="0" lang="en-US" sz="4400" spc="-1" strike="noStrike">
-                <a:latin typeface="Arial"/>
-              </a:rPr>
-              <a:t> </a:t>
-            </a:r>
-            <a:r>
-              <a:rPr b="0" lang="en-US" sz="4400" spc="-1" strike="noStrike">
-                <a:latin typeface="Arial"/>
-              </a:rPr>
-              <a:t>t</a:t>
-            </a:r>
-            <a:r>
-              <a:rPr b="0" lang="en-US" sz="4400" spc="-1" strike="noStrike">
-                <a:latin typeface="Arial"/>
-              </a:rPr>
-              <a:t>o</a:t>
-            </a:r>
-            <a:r>
-              <a:rPr b="0" lang="en-US" sz="4400" spc="-1" strike="noStrike">
-                <a:latin typeface="Arial"/>
-              </a:rPr>
-              <a:t> </a:t>
-            </a:r>
-            <a:r>
-              <a:rPr b="0" lang="en-US" sz="4400" spc="-1" strike="noStrike">
-                <a:latin typeface="Arial"/>
-              </a:rPr>
-              <a:t>e</a:t>
-            </a:r>
-            <a:r>
-              <a:rPr b="0" lang="en-US" sz="4400" spc="-1" strike="noStrike">
-                <a:latin typeface="Arial"/>
-              </a:rPr>
-              <a:t>d</a:t>
-            </a:r>
-            <a:r>
-              <a:rPr b="0" lang="en-US" sz="4400" spc="-1" strike="noStrike">
-                <a:latin typeface="Arial"/>
-              </a:rPr>
-              <a:t>i</a:t>
-            </a:r>
-            <a:r>
-              <a:rPr b="0" lang="en-US" sz="4400" spc="-1" strike="noStrike">
-                <a:latin typeface="Arial"/>
-              </a:rPr>
-              <a:t>t</a:t>
-            </a:r>
-            <a:r>
-              <a:rPr b="0" lang="en-US" sz="4400" spc="-1" strike="noStrike">
-                <a:latin typeface="Arial"/>
-              </a:rPr>
-              <a:t> </a:t>
-            </a:r>
-            <a:r>
-              <a:rPr b="0" lang="en-US" sz="4400" spc="-1" strike="noStrike">
-                <a:latin typeface="Arial"/>
-              </a:rPr>
-              <a:t>t</a:t>
-            </a:r>
-            <a:r>
-              <a:rPr b="0" lang="en-US" sz="4400" spc="-1" strike="noStrike">
-                <a:latin typeface="Arial"/>
-              </a:rPr>
-              <a:t>h</a:t>
-            </a:r>
-            <a:r>
-              <a:rPr b="0" lang="en-US" sz="4400" spc="-1" strike="noStrike">
-                <a:latin typeface="Arial"/>
-              </a:rPr>
-              <a:t>e</a:t>
-            </a:r>
-            <a:r>
-              <a:rPr b="0" lang="en-US" sz="4400" spc="-1" strike="noStrike">
-                <a:latin typeface="Arial"/>
-              </a:rPr>
-              <a:t> </a:t>
-            </a:r>
-            <a:r>
-              <a:rPr b="0" lang="en-US" sz="4400" spc="-1" strike="noStrike">
-                <a:latin typeface="Arial"/>
-              </a:rPr>
-              <a:t>t</a:t>
-            </a:r>
-            <a:r>
-              <a:rPr b="0" lang="en-US" sz="4400" spc="-1" strike="noStrike">
-                <a:latin typeface="Arial"/>
-              </a:rPr>
-              <a:t>i</a:t>
-            </a:r>
-            <a:r>
-              <a:rPr b="0" lang="en-US" sz="4400" spc="-1" strike="noStrike">
-                <a:latin typeface="Arial"/>
-              </a:rPr>
-              <a:t>t</a:t>
-            </a:r>
-            <a:r>
-              <a:rPr b="0" lang="en-US" sz="4400" spc="-1" strike="noStrike">
-                <a:latin typeface="Arial"/>
-              </a:rPr>
-              <a:t>l</a:t>
-            </a:r>
-            <a:r>
-              <a:rPr b="0" lang="en-US" sz="4400" spc="-1" strike="noStrike">
-                <a:latin typeface="Arial"/>
-              </a:rPr>
-              <a:t>e</a:t>
-            </a:r>
-            <a:r>
-              <a:rPr b="0" lang="en-US" sz="4400" spc="-1" strike="noStrike">
-                <a:latin typeface="Arial"/>
-              </a:rPr>
-              <a:t> </a:t>
-            </a:r>
-            <a:r>
-              <a:rPr b="0" lang="en-US" sz="4400" spc="-1" strike="noStrike">
-                <a:latin typeface="Arial"/>
-              </a:rPr>
-              <a:t>t</a:t>
-            </a:r>
-            <a:r>
-              <a:rPr b="0" lang="en-US" sz="4400" spc="-1" strike="noStrike">
-                <a:latin typeface="Arial"/>
-              </a:rPr>
-              <a:t>e</a:t>
-            </a:r>
-            <a:r>
-              <a:rPr b="0" lang="en-US" sz="4400" spc="-1" strike="noStrike">
-                <a:latin typeface="Arial"/>
-              </a:rPr>
-              <a:t>x</a:t>
-            </a:r>
-            <a:r>
-              <a:rPr b="0" lang="en-US" sz="4400" spc="-1" strike="noStrike">
-                <a:latin typeface="Arial"/>
-              </a:rPr>
-              <a:t>t</a:t>
-            </a:r>
-            <a:r>
-              <a:rPr b="0" lang="en-US" sz="4400" spc="-1" strike="noStrike">
-                <a:latin typeface="Arial"/>
-              </a:rPr>
-              <a:t> </a:t>
-            </a:r>
-            <a:r>
-              <a:rPr b="0" lang="en-US" sz="4400" spc="-1" strike="noStrike">
-                <a:latin typeface="Arial"/>
-              </a:rPr>
-              <a:t>f</a:t>
-            </a:r>
-            <a:r>
-              <a:rPr b="0" lang="en-US" sz="4400" spc="-1" strike="noStrike">
-                <a:latin typeface="Arial"/>
-              </a:rPr>
-              <a:t>o</a:t>
-            </a:r>
-            <a:r>
-              <a:rPr b="0" lang="en-US" sz="4400" spc="-1" strike="noStrike">
-                <a:latin typeface="Arial"/>
-              </a:rPr>
-              <a:t>r</a:t>
-            </a:r>
-            <a:r>
-              <a:rPr b="0" lang="en-US" sz="4400" spc="-1" strike="noStrike">
-                <a:latin typeface="Arial"/>
-              </a:rPr>
-              <a:t>m</a:t>
-            </a:r>
-            <a:r>
-              <a:rPr b="0" lang="en-US" sz="4400" spc="-1" strike="noStrike">
-                <a:latin typeface="Arial"/>
-              </a:rPr>
-              <a:t>a</a:t>
-            </a:r>
-            <a:r>
-              <a:rPr b="0" lang="en-US" sz="4400" spc="-1" strike="noStrike">
-                <a:latin typeface="Arial"/>
-              </a:rPr>
-              <a:t>t</a:t>
-            </a:r>
-            <a:endParaRPr b="0" lang="en-US" sz="4400" spc="-1" strike="noStrike">
+            <a:endParaRPr b="0" lang="en-US" sz="3770" spc="-1" strike="noStrike">
+              <a:solidFill>
+                <a:srgbClr val="000000"/>
+              </a:solidFill>
               <a:latin typeface="Arial"/>
             </a:endParaRPr>
           </a:p>
@@ -27707,8 +27838,8 @@
         </p:nvSpPr>
         <p:spPr>
           <a:xfrm>
-            <a:off x="1280160" y="8558640"/>
-            <a:ext cx="23042520" cy="21213360"/>
+            <a:off x="1645920" y="5135040"/>
+            <a:ext cx="29626200" cy="12727800"/>
           </a:xfrm>
           <a:prstGeom prst="rect">
             <a:avLst/>
@@ -27725,7 +27856,7 @@
           <a:p>
             <a:pPr marL="432000" indent="-324000">
               <a:spcBef>
-                <a:spcPts val="1417"/>
+                <a:spcPts val="1213"/>
               </a:spcBef>
               <a:buClr>
                 <a:srgbClr val="000000"/>
@@ -27735,19 +27866,25 @@
               <a:buChar char=""/>
             </a:pPr>
             <a:r>
-              <a:rPr b="0" lang="en-US" sz="3200" spc="-1" strike="noStrike">
+              <a:rPr b="0" lang="en-US" sz="2740" spc="-1" strike="noStrike">
+                <a:solidFill>
+                  <a:srgbClr val="000000"/>
+                </a:solidFill>
                 <a:latin typeface="Arial"/>
               </a:rPr>
               <a:t>Click to edit the outline text format</a:t>
             </a:r>
-            <a:endParaRPr b="0" lang="en-US" sz="3200" spc="-1" strike="noStrike">
+            <a:endParaRPr b="0" lang="en-US" sz="2740" spc="-1" strike="noStrike">
+              <a:solidFill>
+                <a:srgbClr val="000000"/>
+              </a:solidFill>
               <a:latin typeface="Arial"/>
             </a:endParaRPr>
           </a:p>
           <a:p>
             <a:pPr lvl="1" marL="864000" indent="-324000">
               <a:spcBef>
-                <a:spcPts val="1134"/>
+                <a:spcPts val="969"/>
               </a:spcBef>
               <a:buClr>
                 <a:srgbClr val="000000"/>
@@ -27757,19 +27894,25 @@
               <a:buChar char=""/>
             </a:pPr>
             <a:r>
-              <a:rPr b="0" lang="en-US" sz="2800" spc="-1" strike="noStrike">
+              <a:rPr b="0" lang="en-US" sz="2400" spc="-1" strike="noStrike">
+                <a:solidFill>
+                  <a:srgbClr val="000000"/>
+                </a:solidFill>
                 <a:latin typeface="Arial"/>
               </a:rPr>
               <a:t>Second Outline Level</a:t>
             </a:r>
-            <a:endParaRPr b="0" lang="en-US" sz="2800" spc="-1" strike="noStrike">
+            <a:endParaRPr b="0" lang="en-US" sz="2400" spc="-1" strike="noStrike">
+              <a:solidFill>
+                <a:srgbClr val="000000"/>
+              </a:solidFill>
               <a:latin typeface="Arial"/>
             </a:endParaRPr>
           </a:p>
           <a:p>
             <a:pPr lvl="2" marL="1296000" indent="-288000">
               <a:spcBef>
-                <a:spcPts val="850"/>
+                <a:spcPts val="729"/>
               </a:spcBef>
               <a:buClr>
                 <a:srgbClr val="000000"/>
@@ -27779,19 +27922,25 @@
               <a:buChar char=""/>
             </a:pPr>
             <a:r>
-              <a:rPr b="0" lang="en-US" sz="2400" spc="-1" strike="noStrike">
+              <a:rPr b="0" lang="en-US" sz="2060" spc="-1" strike="noStrike">
+                <a:solidFill>
+                  <a:srgbClr val="000000"/>
+                </a:solidFill>
                 <a:latin typeface="Arial"/>
               </a:rPr>
               <a:t>Third Outline Level</a:t>
             </a:r>
-            <a:endParaRPr b="0" lang="en-US" sz="2400" spc="-1" strike="noStrike">
+            <a:endParaRPr b="0" lang="en-US" sz="2060" spc="-1" strike="noStrike">
+              <a:solidFill>
+                <a:srgbClr val="000000"/>
+              </a:solidFill>
               <a:latin typeface="Arial"/>
             </a:endParaRPr>
           </a:p>
           <a:p>
             <a:pPr lvl="3" marL="1728000" indent="-216000">
               <a:spcBef>
-                <a:spcPts val="567"/>
+                <a:spcPts val="485"/>
               </a:spcBef>
               <a:buClr>
                 <a:srgbClr val="000000"/>
@@ -27801,19 +27950,25 @@
               <a:buChar char=""/>
             </a:pPr>
             <a:r>
-              <a:rPr b="0" lang="en-US" sz="2000" spc="-1" strike="noStrike">
+              <a:rPr b="0" lang="en-US" sz="1710" spc="-1" strike="noStrike">
+                <a:solidFill>
+                  <a:srgbClr val="000000"/>
+                </a:solidFill>
                 <a:latin typeface="Arial"/>
               </a:rPr>
               <a:t>Fourth Outline Level</a:t>
             </a:r>
-            <a:endParaRPr b="0" lang="en-US" sz="2000" spc="-1" strike="noStrike">
+            <a:endParaRPr b="0" lang="en-US" sz="1710" spc="-1" strike="noStrike">
+              <a:solidFill>
+                <a:srgbClr val="000000"/>
+              </a:solidFill>
               <a:latin typeface="Arial"/>
             </a:endParaRPr>
           </a:p>
           <a:p>
             <a:pPr lvl="4" marL="2160000" indent="-216000">
               <a:spcBef>
-                <a:spcPts val="283"/>
+                <a:spcPts val="241"/>
               </a:spcBef>
               <a:buClr>
                 <a:srgbClr val="000000"/>
@@ -27823,19 +27978,25 @@
               <a:buChar char=""/>
             </a:pPr>
             <a:r>
-              <a:rPr b="0" lang="en-US" sz="2000" spc="-1" strike="noStrike">
+              <a:rPr b="0" lang="en-US" sz="1710" spc="-1" strike="noStrike">
+                <a:solidFill>
+                  <a:srgbClr val="000000"/>
+                </a:solidFill>
                 <a:latin typeface="Arial"/>
               </a:rPr>
               <a:t>Fifth Outline Level</a:t>
             </a:r>
-            <a:endParaRPr b="0" lang="en-US" sz="2000" spc="-1" strike="noStrike">
+            <a:endParaRPr b="0" lang="en-US" sz="1710" spc="-1" strike="noStrike">
+              <a:solidFill>
+                <a:srgbClr val="000000"/>
+              </a:solidFill>
               <a:latin typeface="Arial"/>
             </a:endParaRPr>
           </a:p>
           <a:p>
             <a:pPr lvl="5" marL="2592000" indent="-216000">
               <a:spcBef>
-                <a:spcPts val="283"/>
+                <a:spcPts val="241"/>
               </a:spcBef>
               <a:buClr>
                 <a:srgbClr val="000000"/>
@@ -27845,19 +28006,25 @@
               <a:buChar char=""/>
             </a:pPr>
             <a:r>
-              <a:rPr b="0" lang="en-US" sz="2000" spc="-1" strike="noStrike">
+              <a:rPr b="0" lang="en-US" sz="1710" spc="-1" strike="noStrike">
+                <a:solidFill>
+                  <a:srgbClr val="000000"/>
+                </a:solidFill>
                 <a:latin typeface="Arial"/>
               </a:rPr>
               <a:t>Sixth Outline Level</a:t>
             </a:r>
-            <a:endParaRPr b="0" lang="en-US" sz="2000" spc="-1" strike="noStrike">
+            <a:endParaRPr b="0" lang="en-US" sz="1710" spc="-1" strike="noStrike">
+              <a:solidFill>
+                <a:srgbClr val="000000"/>
+              </a:solidFill>
               <a:latin typeface="Arial"/>
             </a:endParaRPr>
           </a:p>
           <a:p>
             <a:pPr lvl="6" marL="3024000" indent="-216000">
               <a:spcBef>
-                <a:spcPts val="283"/>
+                <a:spcPts val="241"/>
               </a:spcBef>
               <a:buClr>
                 <a:srgbClr val="000000"/>
@@ -27867,12 +28034,18 @@
               <a:buChar char=""/>
             </a:pPr>
             <a:r>
-              <a:rPr b="0" lang="en-US" sz="2000" spc="-1" strike="noStrike">
+              <a:rPr b="0" lang="en-US" sz="1710" spc="-1" strike="noStrike">
+                <a:solidFill>
+                  <a:srgbClr val="000000"/>
+                </a:solidFill>
                 <a:latin typeface="Arial"/>
               </a:rPr>
               <a:t>Seventh Outline Level</a:t>
             </a:r>
-            <a:endParaRPr b="0" lang="en-US" sz="2000" spc="-1" strike="noStrike">
+            <a:endParaRPr b="0" lang="en-US" sz="1710" spc="-1" strike="noStrike">
+              <a:solidFill>
+                <a:srgbClr val="000000"/>
+              </a:solidFill>
               <a:latin typeface="Arial"/>
             </a:endParaRPr>
           </a:p>
@@ -27930,8 +28103,8 @@
         </p:nvSpPr>
         <p:spPr>
           <a:xfrm>
-            <a:off x="456840" y="457200"/>
-            <a:ext cx="24687000" cy="35659800"/>
+            <a:off x="457200" y="457200"/>
+            <a:ext cx="32004000" cy="21031200"/>
           </a:xfrm>
           <a:prstGeom prst="rect">
             <a:avLst/>
@@ -27949,6 +28122,19 @@
           <a:effectRef idx="0"/>
           <a:fontRef idx="minor"/>
         </p:style>
+        <p:txBody>
+          <a:bodyPr lIns="90000" rIns="90000" tIns="45000" bIns="45000" anchor="t">
+            <a:noAutofit/>
+          </a:bodyPr>
+          <a:p>
+            <a:endParaRPr b="0" lang="en-US" sz="1800" spc="-1" strike="noStrike">
+              <a:solidFill>
+                <a:srgbClr val="000000"/>
+              </a:solidFill>
+              <a:latin typeface="Arial"/>
+            </a:endParaRPr>
+          </a:p>
+        </p:txBody>
       </p:sp>
       <p:sp>
         <p:nvSpPr>
@@ -27958,8 +28144,8 @@
         </p:nvSpPr>
         <p:spPr>
           <a:xfrm>
-            <a:off x="456840" y="457200"/>
-            <a:ext cx="24687360" cy="2131200"/>
+            <a:off x="228600" y="321840"/>
+            <a:ext cx="32461200" cy="1278360"/>
           </a:xfrm>
           <a:prstGeom prst="rect">
             <a:avLst/>
@@ -27984,19 +28170,21 @@
               <a:lnSpc>
                 <a:spcPct val="100000"/>
               </a:lnSpc>
-              <a:buNone/>
             </a:pPr>
             <a:r>
-              <a:rPr b="0" lang="en-US" sz="7200" spc="-1" strike="noStrike">
+              <a:rPr b="0" lang="en-US" sz="7100" spc="-1" strike="noStrike">
                 <a:solidFill>
                   <a:srgbClr val="000000"/>
                 </a:solidFill>
                 <a:latin typeface="Arial"/>
                 <a:ea typeface="DejaVu Sans"/>
               </a:rPr>
-              <a:t>Motorized Robotic Hand Controlled by Surface Electromyography (sEMG)</a:t>
+              <a:t>Motorized Robotic Hand Controlled Hand by Surface Electromyography (sEMG)</a:t>
             </a:r>
-            <a:endParaRPr b="0" lang="en-US" sz="7200" spc="-1" strike="noStrike">
+            <a:endParaRPr b="0" lang="en-US" sz="7100" spc="-1" strike="noStrike">
+              <a:solidFill>
+                <a:srgbClr val="000000"/>
+              </a:solidFill>
               <a:latin typeface="Arial"/>
             </a:endParaRPr>
           </a:p>
@@ -28010,8 +28198,8 @@
         </p:nvSpPr>
         <p:spPr>
           <a:xfrm>
-            <a:off x="456840" y="2658960"/>
-            <a:ext cx="24687360" cy="997560"/>
+            <a:off x="586800" y="1595160"/>
+            <a:ext cx="31740480" cy="598320"/>
           </a:xfrm>
           <a:prstGeom prst="rect">
             <a:avLst/>
@@ -28036,7 +28224,6 @@
               <a:lnSpc>
                 <a:spcPct val="100000"/>
               </a:lnSpc>
-              <a:buNone/>
             </a:pPr>
             <a:r>
               <a:rPr b="0" lang="en-US" sz="3200" spc="-1" strike="noStrike">
@@ -28046,19 +28233,8 @@
                 <a:latin typeface="Arial"/>
                 <a:ea typeface="DejaVu Sans"/>
               </a:rPr>
-              <a:t>Jay E. Bernstein, David J. Mora, Juan R. Ortiz</a:t>
+              <a:t>Authors: Jay E. Bernstein, David J. Mora, Juan R. Ortiz; </a:t>
             </a:r>
-            <a:endParaRPr b="0" lang="en-US" sz="3200" spc="-1" strike="noStrike">
-              <a:latin typeface="Arial"/>
-            </a:endParaRPr>
-          </a:p>
-          <a:p>
-            <a:pPr>
-              <a:lnSpc>
-                <a:spcPct val="100000"/>
-              </a:lnSpc>
-              <a:buNone/>
-            </a:pPr>
             <a:r>
               <a:rPr b="0" lang="en-US" sz="3200" spc="-1" strike="noStrike">
                 <a:solidFill>
@@ -28070,6 +28246,22 @@
               <a:t>Advised by Dr. Norali Pernalete</a:t>
             </a:r>
             <a:endParaRPr b="0" lang="en-US" sz="3200" spc="-1" strike="noStrike">
+              <a:solidFill>
+                <a:srgbClr val="000000"/>
+              </a:solidFill>
+              <a:latin typeface="Arial"/>
+            </a:endParaRPr>
+          </a:p>
+          <a:p>
+            <a:pPr>
+              <a:lnSpc>
+                <a:spcPct val="100000"/>
+              </a:lnSpc>
+            </a:pPr>
+            <a:endParaRPr b="0" lang="en-US" sz="3200" spc="-1" strike="noStrike">
+              <a:solidFill>
+                <a:srgbClr val="000000"/>
+              </a:solidFill>
               <a:latin typeface="Arial"/>
             </a:endParaRPr>
           </a:p>
@@ -28083,8 +28275,8 @@
         </p:nvSpPr>
         <p:spPr>
           <a:xfrm>
-            <a:off x="2743200" y="32071680"/>
-            <a:ext cx="9371160" cy="2218320"/>
+            <a:off x="3526560" y="19242720"/>
+            <a:ext cx="12048120" cy="1330560"/>
           </a:xfrm>
           <a:prstGeom prst="rect">
             <a:avLst/>
@@ -28109,7 +28301,6 @@
               <a:lnSpc>
                 <a:spcPct val="100000"/>
               </a:lnSpc>
-              <a:buNone/>
             </a:pPr>
             <a:r>
               <a:rPr b="0" lang="en-US" sz="1800" spc="-1" strike="noStrike">
@@ -28202,6 +28393,9 @@
               <a:t>32Point = 0.5 inch High</a:t>
             </a:r>
             <a:endParaRPr b="0" lang="en-US" sz="3200" spc="-1" strike="noStrike">
+              <a:solidFill>
+                <a:srgbClr val="000000"/>
+              </a:solidFill>
               <a:latin typeface="Arial"/>
             </a:endParaRPr>
           </a:p>
@@ -28215,8 +28409,8 @@
         </p:nvSpPr>
         <p:spPr>
           <a:xfrm>
-            <a:off x="456840" y="10058400"/>
-            <a:ext cx="12344760" cy="5486400"/>
+            <a:off x="13845600" y="5943600"/>
+            <a:ext cx="7642800" cy="5029200"/>
           </a:xfrm>
           <a:prstGeom prst="rect">
             <a:avLst/>
@@ -28245,7 +28439,6 @@
               <a:lnSpc>
                 <a:spcPct val="100000"/>
               </a:lnSpc>
-              <a:buNone/>
             </a:pPr>
             <a:r>
               <a:rPr b="0" lang="en-US" sz="4800" spc="-1" strike="noStrike">
@@ -28258,6 +28451,9 @@
               <a:t>Picture of Complete Project Here</a:t>
             </a:r>
             <a:endParaRPr b="0" lang="en-US" sz="4800" spc="-1" strike="noStrike">
+              <a:solidFill>
+                <a:srgbClr val="000000"/>
+              </a:solidFill>
               <a:latin typeface="Arial"/>
             </a:endParaRPr>
           </a:p>
@@ -28271,8 +28467,8 @@
         </p:nvSpPr>
         <p:spPr>
           <a:xfrm>
-            <a:off x="456840" y="3657600"/>
-            <a:ext cx="13714920" cy="6400800"/>
+            <a:off x="586800" y="2194560"/>
+            <a:ext cx="17633160" cy="3840120"/>
           </a:xfrm>
           <a:prstGeom prst="rect">
             <a:avLst/>
@@ -28299,7 +28495,6 @@
               <a:lnSpc>
                 <a:spcPct val="115000"/>
               </a:lnSpc>
-              <a:buNone/>
             </a:pPr>
             <a:r>
               <a:rPr b="1" lang="en-US" sz="3200" spc="-1" strike="noStrike">
@@ -28312,6 +28507,9 @@
               <a:t>Abstract</a:t>
             </a:r>
             <a:endParaRPr b="0" lang="en-US" sz="3200" spc="-1" strike="noStrike">
+              <a:solidFill>
+                <a:srgbClr val="000000"/>
+              </a:solidFill>
               <a:latin typeface="Arial"/>
             </a:endParaRPr>
           </a:p>
@@ -28320,7 +28518,6 @@
               <a:lnSpc>
                 <a:spcPct val="115000"/>
               </a:lnSpc>
-              <a:buNone/>
             </a:pPr>
             <a:r>
               <a:rPr b="0" lang="en-US" sz="2400" spc="-1" strike="noStrike">
@@ -28333,6 +28530,9 @@
               <a:t>The objective of this project was to discover the fundamentals of signal acquisition and processing, in a situation requiring extremely precise hardware requirements in order to achieve both common mode signal rejection and extremely high gain. Because this is a medical device, considerations of safety had to be made as well. The final product is a printed circuit board designed around the Texas Instruments INA82x that handles differential gain, with input resistance to limit the shock hazard were a fault to occur. The amplified input signal is processed so that a microcontroller is able to determine what command the signal is closest to.</a:t>
             </a:r>
             <a:endParaRPr b="0" lang="en-US" sz="2400" spc="-1" strike="noStrike">
+              <a:solidFill>
+                <a:srgbClr val="000000"/>
+              </a:solidFill>
               <a:latin typeface="Arial"/>
             </a:endParaRPr>
           </a:p>
@@ -28345,8 +28545,8 @@
           <p:nvPr/>
         </p:nvGraphicFramePr>
         <p:xfrm>
-          <a:off x="14969880" y="8695440"/>
-          <a:ext cx="10173960" cy="6391800"/>
+          <a:off x="21945600" y="7086600"/>
+          <a:ext cx="10515600" cy="4800600"/>
         </p:xfrm>
         <a:graphic>
           <a:graphicData uri="http://schemas.openxmlformats.org/drawingml/2006/chart">
@@ -28362,8 +28562,8 @@
         </p:nvSpPr>
         <p:spPr>
           <a:xfrm>
-            <a:off x="15544440" y="2964600"/>
-            <a:ext cx="9601200" cy="5493240"/>
+            <a:off x="21488400" y="1600200"/>
+            <a:ext cx="10972800" cy="4114800"/>
           </a:xfrm>
           <a:prstGeom prst="rect">
             <a:avLst/>
@@ -28391,7 +28591,6 @@
               <a:lnSpc>
                 <a:spcPct val="100000"/>
               </a:lnSpc>
-              <a:buNone/>
             </a:pPr>
             <a:r>
               <a:rPr b="0" lang="en-US" sz="3200" spc="-1" strike="noStrike">
@@ -28404,6 +28603,9 @@
               <a:t>Block Diagram</a:t>
             </a:r>
             <a:endParaRPr b="0" lang="en-US" sz="3200" spc="-1" strike="noStrike">
+              <a:solidFill>
+                <a:srgbClr val="000000"/>
+              </a:solidFill>
               <a:latin typeface="Arial"/>
             </a:endParaRPr>
           </a:p>
@@ -28417,8 +28619,8 @@
         </p:nvSpPr>
         <p:spPr>
           <a:xfrm>
-            <a:off x="15773400" y="5022000"/>
-            <a:ext cx="1370880" cy="1370880"/>
+            <a:off x="21717000" y="3200400"/>
+            <a:ext cx="1761840" cy="914400"/>
           </a:xfrm>
           <a:prstGeom prst="rect">
             <a:avLst/>
@@ -28446,7 +28648,6 @@
               <a:lnSpc>
                 <a:spcPct val="100000"/>
               </a:lnSpc>
-              <a:buNone/>
             </a:pPr>
             <a:r>
               <a:rPr b="0" lang="en-US" sz="2400" spc="-1" strike="noStrike">
@@ -28459,6 +28660,9 @@
               <a:t>Surface EMG Pads</a:t>
             </a:r>
             <a:endParaRPr b="0" lang="en-US" sz="2400" spc="-1" strike="noStrike">
+              <a:solidFill>
+                <a:srgbClr val="000000"/>
+              </a:solidFill>
               <a:latin typeface="Arial"/>
             </a:endParaRPr>
           </a:p>
@@ -28472,8 +28676,8 @@
         </p:nvSpPr>
         <p:spPr>
           <a:xfrm>
-            <a:off x="17602200" y="3879000"/>
-            <a:ext cx="2285280" cy="3885480"/>
+            <a:off x="24003000" y="2057400"/>
+            <a:ext cx="2709000" cy="3200400"/>
           </a:xfrm>
           <a:prstGeom prst="rect">
             <a:avLst/>
@@ -28501,7 +28705,6 @@
               <a:lnSpc>
                 <a:spcPct val="100000"/>
               </a:lnSpc>
-              <a:buNone/>
             </a:pPr>
             <a:r>
               <a:rPr b="0" lang="en-US" sz="2400" spc="-1" strike="noStrike">
@@ -28514,6 +28717,9 @@
               <a:t>Amplifier</a:t>
             </a:r>
             <a:endParaRPr b="0" lang="en-US" sz="2400" spc="-1" strike="noStrike">
+              <a:solidFill>
+                <a:srgbClr val="000000"/>
+              </a:solidFill>
               <a:latin typeface="Arial"/>
             </a:endParaRPr>
           </a:p>
@@ -28527,8 +28733,8 @@
         </p:nvSpPr>
         <p:spPr>
           <a:xfrm>
-            <a:off x="20574000" y="3193200"/>
-            <a:ext cx="2285280" cy="5028480"/>
+            <a:off x="27203400" y="1828800"/>
+            <a:ext cx="3200400" cy="3657600"/>
           </a:xfrm>
           <a:prstGeom prst="rect">
             <a:avLst/>
@@ -28556,7 +28762,6 @@
               <a:lnSpc>
                 <a:spcPct val="100000"/>
               </a:lnSpc>
-              <a:buNone/>
             </a:pPr>
             <a:r>
               <a:rPr b="0" lang="en-US" sz="2400" spc="-1" strike="noStrike">
@@ -28566,9 +28771,12 @@
                 <a:latin typeface="Arial"/>
                 <a:ea typeface="DejaVu Sans"/>
               </a:rPr>
-              <a:t>Microcontroller (Teensy 4.1)</a:t>
+              <a:t>MCU (Teensy 4.1)</a:t>
             </a:r>
             <a:endParaRPr b="0" lang="en-US" sz="2400" spc="-1" strike="noStrike">
+              <a:solidFill>
+                <a:srgbClr val="000000"/>
+              </a:solidFill>
               <a:latin typeface="Arial"/>
             </a:endParaRPr>
           </a:p>
@@ -28582,8 +28790,8 @@
         </p:nvSpPr>
         <p:spPr>
           <a:xfrm>
-            <a:off x="23546160" y="5022000"/>
-            <a:ext cx="1370880" cy="1370880"/>
+            <a:off x="30861000" y="3200400"/>
+            <a:ext cx="1371600" cy="822600"/>
           </a:xfrm>
           <a:prstGeom prst="rect">
             <a:avLst/>
@@ -28611,7 +28819,6 @@
               <a:lnSpc>
                 <a:spcPct val="100000"/>
               </a:lnSpc>
-              <a:buNone/>
             </a:pPr>
             <a:r>
               <a:rPr b="0" lang="en-US" sz="2400" spc="-1" strike="noStrike">
@@ -28624,6 +28831,9 @@
               <a:t>Robotic Hand</a:t>
             </a:r>
             <a:endParaRPr b="0" lang="en-US" sz="2400" spc="-1" strike="noStrike">
+              <a:solidFill>
+                <a:srgbClr val="000000"/>
+              </a:solidFill>
               <a:latin typeface="Arial"/>
             </a:endParaRPr>
           </a:p>
@@ -28637,8 +28847,8 @@
         </p:nvSpPr>
         <p:spPr>
           <a:xfrm>
-            <a:off x="20802600" y="5479200"/>
-            <a:ext cx="1828080" cy="1194840"/>
+            <a:off x="27432000" y="3337560"/>
+            <a:ext cx="2677680" cy="777240"/>
           </a:xfrm>
           <a:prstGeom prst="rect">
             <a:avLst/>
@@ -28666,7 +28876,6 @@
               <a:lnSpc>
                 <a:spcPct val="100000"/>
               </a:lnSpc>
-              <a:buNone/>
             </a:pPr>
             <a:r>
               <a:rPr b="0" lang="en-US" sz="1800" spc="-1" strike="noStrike">
@@ -28679,8 +28888,10 @@
               <a:t>Normalize, Rectify, and Amplify ADC Input</a:t>
             </a:r>
             <a:endParaRPr b="0" lang="en-US" sz="1800" spc="-1" strike="noStrike">
+              <a:solidFill>
+                <a:srgbClr val="000000"/>
+              </a:solidFill>
               <a:latin typeface="Arial"/>
-              <a:ea typeface="Noto Sans CJK SC"/>
             </a:endParaRPr>
           </a:p>
         </p:txBody>
@@ -28693,8 +28904,8 @@
         </p:nvSpPr>
         <p:spPr>
           <a:xfrm>
-            <a:off x="20802600" y="6850800"/>
-            <a:ext cx="1828080" cy="1142280"/>
+            <a:off x="27432000" y="4572360"/>
+            <a:ext cx="2677680" cy="685440"/>
           </a:xfrm>
           <a:prstGeom prst="rect">
             <a:avLst/>
@@ -28722,7 +28933,6 @@
               <a:lnSpc>
                 <a:spcPct val="100000"/>
               </a:lnSpc>
-              <a:buNone/>
             </a:pPr>
             <a:r>
               <a:rPr b="0" lang="en-US" sz="1800" spc="-1" strike="noStrike">
@@ -28735,6 +28945,9 @@
               <a:t>Finger Detection Algorithm</a:t>
             </a:r>
             <a:endParaRPr b="0" lang="en-US" sz="1800" spc="-1" strike="noStrike">
+              <a:solidFill>
+                <a:srgbClr val="000000"/>
+              </a:solidFill>
               <a:latin typeface="Arial"/>
             </a:endParaRPr>
           </a:p>
@@ -28748,8 +28961,8 @@
         </p:nvSpPr>
         <p:spPr>
           <a:xfrm>
-            <a:off x="20802600" y="4107600"/>
-            <a:ext cx="1828080" cy="1142280"/>
+            <a:off x="27432000" y="2286360"/>
+            <a:ext cx="2677680" cy="685440"/>
           </a:xfrm>
           <a:prstGeom prst="rect">
             <a:avLst/>
@@ -28777,7 +28990,6 @@
               <a:lnSpc>
                 <a:spcPct val="100000"/>
               </a:lnSpc>
-              <a:buNone/>
             </a:pPr>
             <a:r>
               <a:rPr b="0" lang="en-US" sz="1800" spc="-1" strike="noStrike">
@@ -28790,6 +29002,9 @@
               <a:t>Capture 1000 Samples at 40kHz with ADC</a:t>
             </a:r>
             <a:endParaRPr b="0" lang="en-US" sz="1800" spc="-1" strike="noStrike">
+              <a:solidFill>
+                <a:srgbClr val="000000"/>
+              </a:solidFill>
               <a:latin typeface="Arial"/>
             </a:endParaRPr>
           </a:p>
@@ -28803,8 +29018,8 @@
         </p:nvSpPr>
         <p:spPr>
           <a:xfrm>
-            <a:off x="21704400" y="6674040"/>
-            <a:ext cx="12960" cy="176760"/>
+            <a:off x="28803600" y="4114800"/>
+            <a:ext cx="0" cy="457560"/>
           </a:xfrm>
           <a:prstGeom prst="line">
             <a:avLst/>
@@ -28823,6 +29038,19 @@
           <a:effectRef idx="0"/>
           <a:fontRef idx="minor"/>
         </p:style>
+        <p:txBody>
+          <a:bodyPr lIns="90000" rIns="90000" tIns="45000" bIns="45000" anchor="t" anchorCtr="1">
+            <a:noAutofit/>
+          </a:bodyPr>
+          <a:p>
+            <a:endParaRPr b="0" lang="en-US" sz="1800" spc="-1" strike="noStrike">
+              <a:solidFill>
+                <a:srgbClr val="000000"/>
+              </a:solidFill>
+              <a:latin typeface="Arial"/>
+            </a:endParaRPr>
+          </a:p>
+        </p:txBody>
       </p:sp>
       <p:sp>
         <p:nvSpPr>
@@ -28832,8 +29060,8 @@
         </p:nvSpPr>
         <p:spPr>
           <a:xfrm>
-            <a:off x="21717000" y="5250600"/>
-            <a:ext cx="360" cy="228600"/>
+            <a:off x="28803600" y="2971800"/>
+            <a:ext cx="0" cy="365760"/>
           </a:xfrm>
           <a:prstGeom prst="line">
             <a:avLst/>
@@ -28852,6 +29080,19 @@
           <a:effectRef idx="0"/>
           <a:fontRef idx="minor"/>
         </p:style>
+        <p:txBody>
+          <a:bodyPr lIns="90000" rIns="90000" tIns="45000" bIns="45000" anchor="t" anchorCtr="1">
+            <a:noAutofit/>
+          </a:bodyPr>
+          <a:p>
+            <a:endParaRPr b="0" lang="en-US" sz="1800" spc="-1" strike="noStrike">
+              <a:solidFill>
+                <a:srgbClr val="000000"/>
+              </a:solidFill>
+              <a:latin typeface="Arial"/>
+            </a:endParaRPr>
+          </a:p>
+        </p:txBody>
       </p:sp>
       <p:sp>
         <p:nvSpPr>
@@ -28861,8 +29102,8 @@
         </p:nvSpPr>
         <p:spPr>
           <a:xfrm>
-            <a:off x="17145000" y="5707800"/>
-            <a:ext cx="457200" cy="360"/>
+            <a:off x="23478840" y="3657600"/>
+            <a:ext cx="587880" cy="0"/>
           </a:xfrm>
           <a:prstGeom prst="line">
             <a:avLst/>
@@ -28881,6 +29122,19 @@
           <a:effectRef idx="0"/>
           <a:fontRef idx="minor"/>
         </p:style>
+        <p:txBody>
+          <a:bodyPr lIns="90000" rIns="90000" tIns="-45000" bIns="-45000" anchor="t" anchorCtr="1">
+            <a:noAutofit/>
+          </a:bodyPr>
+          <a:p>
+            <a:endParaRPr b="0" lang="en-US" sz="1800" spc="-1" strike="noStrike">
+              <a:solidFill>
+                <a:srgbClr val="000000"/>
+              </a:solidFill>
+              <a:latin typeface="Arial"/>
+            </a:endParaRPr>
+          </a:p>
+        </p:txBody>
       </p:sp>
       <p:sp>
         <p:nvSpPr>
@@ -28890,7 +29144,7 @@
         </p:nvSpPr>
         <p:spPr>
           <a:xfrm>
-            <a:off x="0" y="0"/>
+            <a:off x="360" y="360"/>
             <a:ext cx="360" cy="360"/>
           </a:xfrm>
           <a:prstGeom prst="line">
@@ -28910,6 +29164,19 @@
           <a:effectRef idx="0"/>
           <a:fontRef idx="minor"/>
         </p:style>
+        <p:txBody>
+          <a:bodyPr lIns="90000" rIns="90000" tIns="-44640" bIns="-44640" anchor="t" anchorCtr="1">
+            <a:noAutofit/>
+          </a:bodyPr>
+          <a:p>
+            <a:endParaRPr b="0" lang="en-US" sz="1800" spc="-1" strike="noStrike">
+              <a:solidFill>
+                <a:srgbClr val="000000"/>
+              </a:solidFill>
+              <a:latin typeface="Arial"/>
+            </a:endParaRPr>
+          </a:p>
+        </p:txBody>
       </p:sp>
       <p:sp>
         <p:nvSpPr>
@@ -28919,7 +29186,7 @@
         </p:nvSpPr>
         <p:spPr>
           <a:xfrm>
-            <a:off x="0" y="0"/>
+            <a:off x="360" y="360"/>
             <a:ext cx="360" cy="360"/>
           </a:xfrm>
           <a:prstGeom prst="line">
@@ -28939,6 +29206,19 @@
           <a:effectRef idx="0"/>
           <a:fontRef idx="minor"/>
         </p:style>
+        <p:txBody>
+          <a:bodyPr lIns="90000" rIns="90000" tIns="-44640" bIns="-44640" anchor="t" anchorCtr="1">
+            <a:noAutofit/>
+          </a:bodyPr>
+          <a:p>
+            <a:endParaRPr b="0" lang="en-US" sz="1800" spc="-1" strike="noStrike">
+              <a:solidFill>
+                <a:srgbClr val="000000"/>
+              </a:solidFill>
+              <a:latin typeface="Arial"/>
+            </a:endParaRPr>
+          </a:p>
+        </p:txBody>
       </p:sp>
       <p:sp>
         <p:nvSpPr>
@@ -28948,8 +29228,8 @@
         </p:nvSpPr>
         <p:spPr>
           <a:xfrm>
-            <a:off x="17830800" y="4564800"/>
-            <a:ext cx="1828080" cy="1226520"/>
+            <a:off x="24231600" y="2743200"/>
+            <a:ext cx="2286000" cy="914400"/>
           </a:xfrm>
           <a:prstGeom prst="rect">
             <a:avLst/>
@@ -28977,7 +29257,6 @@
               <a:lnSpc>
                 <a:spcPct val="100000"/>
               </a:lnSpc>
-              <a:buNone/>
             </a:pPr>
             <a:r>
               <a:rPr b="0" lang="en-US" sz="1800" spc="-1" strike="noStrike">
@@ -28990,6 +29269,9 @@
               <a:t>Protected Inputs to Instrumentation Amplifier IC</a:t>
             </a:r>
             <a:endParaRPr b="0" lang="en-US" sz="1800" spc="-1" strike="noStrike">
+              <a:solidFill>
+                <a:srgbClr val="000000"/>
+              </a:solidFill>
               <a:latin typeface="Arial"/>
             </a:endParaRPr>
           </a:p>
@@ -29003,8 +29285,8 @@
         </p:nvSpPr>
         <p:spPr>
           <a:xfrm>
-            <a:off x="17806680" y="6012720"/>
-            <a:ext cx="1828080" cy="1142280"/>
+            <a:off x="24231600" y="3886200"/>
+            <a:ext cx="2286000" cy="914040"/>
           </a:xfrm>
           <a:prstGeom prst="rect">
             <a:avLst/>
@@ -29032,7 +29314,6 @@
               <a:lnSpc>
                 <a:spcPct val="100000"/>
               </a:lnSpc>
-              <a:buNone/>
             </a:pPr>
             <a:r>
               <a:rPr b="0" lang="en-US" sz="1800" spc="-1" strike="noStrike">
@@ -29045,6 +29326,9 @@
               <a:t>AC Coupled and Buffered Output</a:t>
             </a:r>
             <a:endParaRPr b="0" lang="en-US" sz="1800" spc="-1" strike="noStrike">
+              <a:solidFill>
+                <a:srgbClr val="000000"/>
+              </a:solidFill>
               <a:latin typeface="Arial"/>
             </a:endParaRPr>
           </a:p>
@@ -29058,8 +29342,8 @@
         </p:nvSpPr>
         <p:spPr>
           <a:xfrm>
-            <a:off x="18739080" y="5797800"/>
-            <a:ext cx="6480" cy="214920"/>
+            <a:off x="25374600" y="3657600"/>
+            <a:ext cx="0" cy="266760"/>
           </a:xfrm>
           <a:prstGeom prst="line">
             <a:avLst/>
@@ -29078,6 +29362,19 @@
           <a:effectRef idx="0"/>
           <a:fontRef idx="minor"/>
         </p:style>
+        <p:txBody>
+          <a:bodyPr lIns="90000" rIns="90000" tIns="45000" bIns="45000" anchor="t" anchorCtr="1">
+            <a:noAutofit/>
+          </a:bodyPr>
+          <a:p>
+            <a:endParaRPr b="0" lang="en-US" sz="1800" spc="-1" strike="noStrike">
+              <a:solidFill>
+                <a:srgbClr val="000000"/>
+              </a:solidFill>
+              <a:latin typeface="Arial"/>
+            </a:endParaRPr>
+          </a:p>
+        </p:txBody>
       </p:sp>
       <p:sp>
         <p:nvSpPr>
@@ -29087,8 +29384,8 @@
         </p:nvSpPr>
         <p:spPr>
           <a:xfrm>
-            <a:off x="19888200" y="5707800"/>
-            <a:ext cx="685800" cy="360"/>
+            <a:off x="26713080" y="3657600"/>
+            <a:ext cx="490320" cy="0"/>
           </a:xfrm>
           <a:prstGeom prst="line">
             <a:avLst/>
@@ -29107,6 +29404,19 @@
           <a:effectRef idx="0"/>
           <a:fontRef idx="minor"/>
         </p:style>
+        <p:txBody>
+          <a:bodyPr lIns="90000" rIns="90000" tIns="-45000" bIns="-45000" anchor="t" anchorCtr="1">
+            <a:noAutofit/>
+          </a:bodyPr>
+          <a:p>
+            <a:endParaRPr b="0" lang="en-US" sz="1800" spc="-1" strike="noStrike">
+              <a:solidFill>
+                <a:srgbClr val="000000"/>
+              </a:solidFill>
+              <a:latin typeface="Arial"/>
+            </a:endParaRPr>
+          </a:p>
+        </p:txBody>
       </p:sp>
       <p:sp>
         <p:nvSpPr>
@@ -29116,8 +29426,8 @@
         </p:nvSpPr>
         <p:spPr>
           <a:xfrm>
-            <a:off x="22860000" y="5707800"/>
-            <a:ext cx="685800" cy="360"/>
+            <a:off x="30403800" y="3657600"/>
+            <a:ext cx="457200" cy="0"/>
           </a:xfrm>
           <a:prstGeom prst="line">
             <a:avLst/>
@@ -29136,6 +29446,19 @@
           <a:effectRef idx="0"/>
           <a:fontRef idx="minor"/>
         </p:style>
+        <p:txBody>
+          <a:bodyPr lIns="90000" rIns="90000" tIns="-45000" bIns="-45000" anchor="t" anchorCtr="1">
+            <a:noAutofit/>
+          </a:bodyPr>
+          <a:p>
+            <a:endParaRPr b="0" lang="en-US" sz="1800" spc="-1" strike="noStrike">
+              <a:solidFill>
+                <a:srgbClr val="000000"/>
+              </a:solidFill>
+              <a:latin typeface="Arial"/>
+            </a:endParaRPr>
+          </a:p>
+        </p:txBody>
       </p:sp>
       <p:sp>
         <p:nvSpPr>
@@ -29145,8 +29468,8 @@
         </p:nvSpPr>
         <p:spPr>
           <a:xfrm>
-            <a:off x="13716000" y="15544800"/>
-            <a:ext cx="10972800" cy="5486400"/>
+            <a:off x="586800" y="6034680"/>
+            <a:ext cx="13129200" cy="4252320"/>
           </a:xfrm>
           <a:prstGeom prst="rect">
             <a:avLst/>
@@ -29173,7 +29496,6 @@
               <a:lnSpc>
                 <a:spcPct val="115000"/>
               </a:lnSpc>
-              <a:buNone/>
             </a:pPr>
             <a:r>
               <a:rPr b="1" lang="en-US" sz="3200" spc="-1" strike="noStrike">
@@ -29185,7 +29507,23 @@
               </a:rPr>
               <a:t>Software/Hardware Overview</a:t>
             </a:r>
-            <a:endParaRPr b="1" lang="en-US" sz="3200" spc="-1" strike="noStrike">
+            <a:endParaRPr b="0" lang="en-US" sz="3200" spc="-1" strike="noStrike">
+              <a:solidFill>
+                <a:srgbClr val="000000"/>
+              </a:solidFill>
+              <a:latin typeface="Arial"/>
+            </a:endParaRPr>
+          </a:p>
+          <a:p>
+            <a:pPr marL="228600">
+              <a:lnSpc>
+                <a:spcPct val="115000"/>
+              </a:lnSpc>
+            </a:pPr>
+            <a:endParaRPr b="0" lang="en-US" sz="2400" spc="-1" strike="noStrike">
+              <a:solidFill>
+                <a:srgbClr val="000000"/>
+              </a:solidFill>
               <a:latin typeface="Arial"/>
             </a:endParaRPr>
           </a:p>
@@ -29199,8 +29537,8 @@
         </p:nvSpPr>
         <p:spPr>
           <a:xfrm>
-            <a:off x="456840" y="15545880"/>
-            <a:ext cx="12344760" cy="5486400"/>
+            <a:off x="13845600" y="10972800"/>
+            <a:ext cx="7642800" cy="5988960"/>
           </a:xfrm>
           <a:prstGeom prst="rect">
             <a:avLst/>
@@ -29229,7 +29567,6 @@
               <a:lnSpc>
                 <a:spcPct val="100000"/>
               </a:lnSpc>
-              <a:buNone/>
             </a:pPr>
             <a:r>
               <a:rPr b="0" lang="en-US" sz="4800" spc="-1" strike="noStrike">
@@ -29242,6 +29579,9 @@
               <a:t>Picture of Probes on Arm, or many smaller pictures of physical setup</a:t>
             </a:r>
             <a:endParaRPr b="0" lang="en-US" sz="4800" spc="-1" strike="noStrike">
+              <a:solidFill>
+                <a:srgbClr val="000000"/>
+              </a:solidFill>
               <a:latin typeface="Arial"/>
             </a:endParaRPr>
           </a:p>
@@ -29255,8 +29595,8 @@
         </p:nvSpPr>
         <p:spPr>
           <a:xfrm>
-            <a:off x="456840" y="29260800"/>
-            <a:ext cx="24460560" cy="5029200"/>
+            <a:off x="586800" y="17373600"/>
+            <a:ext cx="31448880" cy="3200040"/>
           </a:xfrm>
           <a:prstGeom prst="rect">
             <a:avLst/>
@@ -29283,7 +29623,6 @@
               <a:lnSpc>
                 <a:spcPct val="115000"/>
               </a:lnSpc>
-              <a:buNone/>
             </a:pPr>
             <a:r>
               <a:rPr b="1" lang="en-US" sz="3200" spc="-1" strike="noStrike">
@@ -29295,7 +29634,10 @@
               </a:rPr>
               <a:t>Conclusion</a:t>
             </a:r>
-            <a:endParaRPr b="1" lang="en-US" sz="3200" spc="-1" strike="noStrike">
+            <a:endParaRPr b="0" lang="en-US" sz="3200" spc="-1" strike="noStrike">
+              <a:solidFill>
+                <a:srgbClr val="000000"/>
+              </a:solidFill>
               <a:latin typeface="Arial"/>
             </a:endParaRPr>
           </a:p>
@@ -29304,7 +29646,6 @@
               <a:lnSpc>
                 <a:spcPct val="115000"/>
               </a:lnSpc>
-              <a:buNone/>
             </a:pPr>
             <a:r>
               <a:rPr b="0" lang="en-US" sz="2400" spc="-1" strike="noStrike">
@@ -29314,67 +29655,27 @@
                 <a:latin typeface="Arial"/>
                 <a:ea typeface="DejaVu Sans"/>
               </a:rPr>
-              <a:t>Compare amplifier characteristics between discrete inamp, breadboarded ina129, and assembled hardware. Design tradeoffs made, such as removing 60hz HP filter. Nature of </a:t>
+              <a:t>Compare amplifier characteristics between discrete inamp, breadboarded ina129, and assembled hardware. Design tradeoffs made, such as removing 60hz HP filter. Nature of MUAPs, long spacing and frequency components. Power supply noise rejection and grounding issues with amplifier. Conclude with what went right what went wrong, what to improve next time</a:t>
             </a:r>
-            <a:r>
-              <a:rPr b="0" lang="en-US" sz="2400" spc="-1" strike="noStrike">
-                <a:solidFill>
-                  <a:srgbClr val="000000"/>
-                </a:solidFill>
-                <a:latin typeface="Arial"/>
-                <a:ea typeface="DejaVu Sans"/>
-              </a:rPr>
-              <a:t>MUAPs, long spacing and frequency components. Power supply noise rejection and grounding issues with amplifier. Conclude with what went right what went wrong, what to </a:t>
-            </a:r>
-            <a:r>
-              <a:rPr b="0" lang="en-US" sz="2400" spc="-1" strike="noStrike">
-                <a:solidFill>
-                  <a:srgbClr val="000000"/>
-                </a:solidFill>
-                <a:latin typeface="Arial"/>
-                <a:ea typeface="DejaVu Sans"/>
-              </a:rPr>
-              <a:t>improve next time</a:t>
-            </a:r>
-            <a:endParaRPr b="1" lang="en-US" sz="2400" spc="-1" strike="noStrike">
+            <a:endParaRPr b="0" lang="en-US" sz="2400" spc="-1" strike="noStrike">
+              <a:solidFill>
+                <a:srgbClr val="000000"/>
+              </a:solidFill>
               <a:latin typeface="Arial"/>
             </a:endParaRPr>
           </a:p>
         </p:txBody>
       </p:sp>
-      <p:pic>
-        <p:nvPicPr>
-          <p:cNvPr id="69" name="" descr=""/>
-          <p:cNvPicPr/>
-          <p:nvPr/>
-        </p:nvPicPr>
-        <p:blipFill>
-          <a:blip r:embed="rId2"/>
-          <a:stretch/>
-        </p:blipFill>
-        <p:spPr>
-          <a:xfrm>
-            <a:off x="456840" y="21032280"/>
-            <a:ext cx="14630760" cy="8228520"/>
-          </a:xfrm>
-          <a:prstGeom prst="rect">
-            <a:avLst/>
-          </a:prstGeom>
-          <a:ln w="0">
-            <a:noFill/>
-          </a:ln>
-        </p:spPr>
-      </p:pic>
       <p:sp>
         <p:nvSpPr>
-          <p:cNvPr id="70" name=""/>
+          <p:cNvPr id="69" name=""/>
           <p:cNvSpPr/>
           <p:nvPr/>
         </p:nvSpPr>
         <p:spPr>
           <a:xfrm>
-            <a:off x="456840" y="34290000"/>
-            <a:ext cx="24687000" cy="1827000"/>
+            <a:off x="586800" y="20574000"/>
+            <a:ext cx="31740120" cy="1096200"/>
           </a:xfrm>
           <a:prstGeom prst="rect">
             <a:avLst/>
@@ -29401,7 +29702,6 @@
               <a:lnSpc>
                 <a:spcPct val="115000"/>
               </a:lnSpc>
-              <a:buNone/>
             </a:pPr>
             <a:r>
               <a:rPr b="1" lang="en-US" sz="3200" spc="-1" strike="noStrike">
@@ -29413,7 +29713,10 @@
               </a:rPr>
               <a:t>References and Inspiration</a:t>
             </a:r>
-            <a:endParaRPr b="1" lang="en-US" sz="3200" spc="-1" strike="noStrike">
+            <a:endParaRPr b="0" lang="en-US" sz="3200" spc="-1" strike="noStrike">
+              <a:solidFill>
+                <a:srgbClr val="000000"/>
+              </a:solidFill>
               <a:latin typeface="Arial"/>
             </a:endParaRPr>
           </a:p>
@@ -29422,7 +29725,6 @@
               <a:lnSpc>
                 <a:spcPct val="115000"/>
               </a:lnSpc>
-              <a:buNone/>
             </a:pPr>
             <a:r>
               <a:rPr b="0" lang="en-US" sz="2400" spc="-1" strike="noStrike">
@@ -29434,7 +29736,10 @@
               </a:rPr>
               <a:t>https://people.ece.cornell.edu/land/courses/ece4760/FinalProjects/f2016/mh2298_jyh37_sv376/mh2298_jyh37_sv376/mh2298_jyh37_sv376/index.html</a:t>
             </a:r>
-            <a:endParaRPr b="1" lang="en-US" sz="2400" spc="-1" strike="noStrike">
+            <a:endParaRPr b="0" lang="en-US" sz="2400" spc="-1" strike="noStrike">
+              <a:solidFill>
+                <a:srgbClr val="000000"/>
+              </a:solidFill>
               <a:latin typeface="Arial"/>
             </a:endParaRPr>
           </a:p>
@@ -29442,20 +29747,255 @@
       </p:sp>
       <p:graphicFrame>
         <p:nvGraphicFramePr>
-          <p:cNvPr id="71" name=""/>
+          <p:cNvPr id="70" name=""/>
           <p:cNvGraphicFramePr/>
           <p:nvPr/>
         </p:nvGraphicFramePr>
         <p:xfrm>
-          <a:off x="15087600" y="21031200"/>
-          <a:ext cx="10056240" cy="8229600"/>
+          <a:off x="21945600" y="11887200"/>
+          <a:ext cx="10515600" cy="4952880"/>
         </p:xfrm>
         <a:graphic>
           <a:graphicData uri="http://schemas.openxmlformats.org/drawingml/2006/chart">
-            <c:chart xmlns:c="http://schemas.openxmlformats.org/drawingml/2006/chart" xmlns:r="http://schemas.openxmlformats.org/officeDocument/2006/relationships" r:id="rId3"/>
+            <c:chart xmlns:c="http://schemas.openxmlformats.org/drawingml/2006/chart" xmlns:r="http://schemas.openxmlformats.org/officeDocument/2006/relationships" r:id="rId2"/>
           </a:graphicData>
         </a:graphic>
       </p:graphicFrame>
+      <p:pic>
+        <p:nvPicPr>
+          <p:cNvPr id="71" name="" descr=""/>
+          <p:cNvPicPr/>
+          <p:nvPr/>
+        </p:nvPicPr>
+        <p:blipFill>
+          <a:blip r:embed="rId3"/>
+          <a:stretch/>
+        </p:blipFill>
+        <p:spPr>
+          <a:xfrm>
+            <a:off x="457200" y="10287000"/>
+            <a:ext cx="13258800" cy="6616440"/>
+          </a:xfrm>
+          <a:prstGeom prst="rect">
+            <a:avLst/>
+          </a:prstGeom>
+          <a:ln w="0">
+            <a:noFill/>
+          </a:ln>
+        </p:spPr>
+      </p:pic>
+      <p:sp>
+        <p:nvSpPr>
+          <p:cNvPr id="72" name=""/>
+          <p:cNvSpPr/>
+          <p:nvPr/>
+        </p:nvSpPr>
+        <p:spPr>
+          <a:xfrm>
+            <a:off x="21488400" y="5715000"/>
+            <a:ext cx="10972800" cy="1051920"/>
+          </a:xfrm>
+          <a:prstGeom prst="rect">
+            <a:avLst/>
+          </a:prstGeom>
+          <a:solidFill>
+            <a:srgbClr val="ffffff"/>
+          </a:solidFill>
+          <a:ln w="0">
+            <a:noFill/>
+          </a:ln>
+        </p:spPr>
+        <p:style>
+          <a:lnRef idx="0"/>
+          <a:fillRef idx="0"/>
+          <a:effectRef idx="0"/>
+          <a:fontRef idx="minor"/>
+        </p:style>
+        <p:txBody>
+          <a:bodyPr lIns="90000" rIns="90000" tIns="45000" bIns="45000" anchor="t">
+            <a:noAutofit/>
+          </a:bodyPr>
+          <a:p>
+            <a:pPr marL="228600">
+              <a:lnSpc>
+                <a:spcPct val="115000"/>
+              </a:lnSpc>
+            </a:pPr>
+            <a:r>
+              <a:rPr b="0" lang="en-US" sz="1800" spc="-1" strike="noStrike">
+                <a:solidFill>
+                  <a:srgbClr val="000000"/>
+                </a:solidFill>
+                <a:latin typeface="Arial"/>
+                <a:ea typeface="DejaVu Sans"/>
+              </a:rPr>
+              <a:t>Block Diagram showing the acquisition and processing chain for the EMG signals. Muscle activations are sent into the amplifier, which is conditioned so that the onboard ADC of the Teensy can acquire it properly. A 40kHz periodic sample is taken, processed slightly, and used to make a decision on the activation </a:t>
+            </a:r>
+            <a:r>
+              <a:rPr b="0" lang="en-US" sz="1800" spc="-1" strike="noStrike">
+                <a:solidFill>
+                  <a:srgbClr val="000000"/>
+                </a:solidFill>
+                <a:latin typeface="Arial"/>
+                <a:ea typeface="DejaVu Sans"/>
+              </a:rPr>
+              <a:t>of the robotic hand</a:t>
+            </a:r>
+            <a:endParaRPr b="0" lang="en-US" sz="1800" spc="-1" strike="noStrike">
+              <a:solidFill>
+                <a:srgbClr val="000000"/>
+              </a:solidFill>
+              <a:latin typeface="Arial"/>
+            </a:endParaRPr>
+          </a:p>
+        </p:txBody>
+      </p:sp>
+      <p:sp>
+        <p:nvSpPr>
+          <p:cNvPr id="73" name=""/>
+          <p:cNvSpPr/>
+          <p:nvPr/>
+        </p:nvSpPr>
+        <p:spPr>
+          <a:xfrm>
+            <a:off x="457200" y="16903440"/>
+            <a:ext cx="13258800" cy="698760"/>
+          </a:xfrm>
+          <a:prstGeom prst="rect">
+            <a:avLst/>
+          </a:prstGeom>
+          <a:solidFill>
+            <a:srgbClr val="ffffff"/>
+          </a:solidFill>
+          <a:ln w="0">
+            <a:noFill/>
+          </a:ln>
+        </p:spPr>
+        <p:style>
+          <a:lnRef idx="0"/>
+          <a:fillRef idx="0"/>
+          <a:effectRef idx="0"/>
+          <a:fontRef idx="minor"/>
+        </p:style>
+        <p:txBody>
+          <a:bodyPr lIns="90000" rIns="90000" tIns="45000" bIns="45000" anchor="t">
+            <a:noAutofit/>
+          </a:bodyPr>
+          <a:p>
+            <a:pPr marL="228600">
+              <a:lnSpc>
+                <a:spcPct val="115000"/>
+              </a:lnSpc>
+            </a:pPr>
+            <a:r>
+              <a:rPr b="0" lang="en-US" sz="1800" spc="-1" strike="noStrike">
+                <a:solidFill>
+                  <a:srgbClr val="000000"/>
+                </a:solidFill>
+                <a:latin typeface="Arial"/>
+                <a:ea typeface="DejaVu Sans"/>
+              </a:rPr>
+              <a:t>A render of the </a:t>
+            </a:r>
+            <a:r>
+              <a:rPr b="0" lang="en-US" sz="1800" spc="-1" strike="noStrike">
+                <a:solidFill>
+                  <a:srgbClr val="000000"/>
+                </a:solidFill>
+                <a:latin typeface="Arial"/>
+                <a:ea typeface="DejaVu Sans"/>
+              </a:rPr>
+              <a:t>revision 2 hardware </a:t>
+            </a:r>
+            <a:r>
+              <a:rPr b="0" lang="en-US" sz="1800" spc="-1" strike="noStrike">
+                <a:solidFill>
+                  <a:srgbClr val="000000"/>
+                </a:solidFill>
+                <a:latin typeface="Arial"/>
+                <a:ea typeface="DejaVu Sans"/>
+              </a:rPr>
+              <a:t>board, altered from </a:t>
+            </a:r>
+            <a:r>
+              <a:rPr b="0" lang="en-US" sz="1800" spc="-1" strike="noStrike">
+                <a:solidFill>
+                  <a:srgbClr val="000000"/>
+                </a:solidFill>
+                <a:latin typeface="Arial"/>
+                <a:ea typeface="DejaVu Sans"/>
+              </a:rPr>
+              <a:t>the manufactured </a:t>
+            </a:r>
+            <a:r>
+              <a:rPr b="0" lang="en-US" sz="1800" spc="-1" strike="noStrike">
+                <a:solidFill>
+                  <a:srgbClr val="000000"/>
+                </a:solidFill>
+                <a:latin typeface="Arial"/>
+                <a:ea typeface="DejaVu Sans"/>
+              </a:rPr>
+              <a:t>version for clarity. </a:t>
+            </a:r>
+            <a:r>
+              <a:rPr b="0" lang="en-US" sz="1800" spc="-1" strike="noStrike">
+                <a:solidFill>
+                  <a:srgbClr val="000000"/>
+                </a:solidFill>
+                <a:latin typeface="Arial"/>
+                <a:ea typeface="DejaVu Sans"/>
+              </a:rPr>
+              <a:t>Large silkscreen text </a:t>
+            </a:r>
+            <a:r>
+              <a:rPr b="0" lang="en-US" sz="1800" spc="-1" strike="noStrike">
+                <a:solidFill>
+                  <a:srgbClr val="000000"/>
+                </a:solidFill>
+                <a:latin typeface="Arial"/>
+                <a:ea typeface="DejaVu Sans"/>
+              </a:rPr>
+              <a:t>is used to emphasize </a:t>
+            </a:r>
+            <a:r>
+              <a:rPr b="0" lang="en-US" sz="1800" spc="-1" strike="noStrike">
+                <a:solidFill>
+                  <a:srgbClr val="000000"/>
+                </a:solidFill>
+                <a:latin typeface="Arial"/>
+                <a:ea typeface="DejaVu Sans"/>
+              </a:rPr>
+              <a:t>the regions of the </a:t>
+            </a:r>
+            <a:r>
+              <a:rPr b="0" lang="en-US" sz="1800" spc="-1" strike="noStrike">
+                <a:solidFill>
+                  <a:srgbClr val="000000"/>
+                </a:solidFill>
+                <a:latin typeface="Arial"/>
+                <a:ea typeface="DejaVu Sans"/>
+              </a:rPr>
+              <a:t>board and their </a:t>
+            </a:r>
+            <a:r>
+              <a:rPr b="0" lang="en-US" sz="1800" spc="-1" strike="noStrike">
+                <a:solidFill>
+                  <a:srgbClr val="000000"/>
+                </a:solidFill>
+                <a:latin typeface="Arial"/>
+                <a:ea typeface="DejaVu Sans"/>
+              </a:rPr>
+              <a:t>operation</a:t>
+            </a:r>
+            <a:endParaRPr b="0" lang="en-US" sz="1800" spc="-1" strike="noStrike">
+              <a:solidFill>
+                <a:srgbClr val="000000"/>
+              </a:solidFill>
+              <a:latin typeface="Arial"/>
+            </a:endParaRPr>
+          </a:p>
+        </p:txBody>
+      </p:sp>
     </p:spTree>
   </p:cSld>
   <mc:AlternateContent>
@@ -29474,10 +30014,10 @@
   <a:themeElements>
     <a:clrScheme name="Office">
       <a:dk1>
-        <a:sysClr val="windowText" lastClr="000000"/>
+        <a:srgbClr val="000000"/>
       </a:dk1>
       <a:lt1>
-        <a:sysClr val="window" lastClr="FFFFFF"/>
+        <a:srgbClr val="ffffff"/>
       </a:lt1>
       <a:dk2>
         <a:srgbClr val="1f497d"/>
@@ -29575,7 +30115,7 @@
         </a:gradFill>
       </a:fillStyleLst>
       <a:lnStyleLst>
-        <a:ln w="9525" cap="flat" cmpd="sng" algn="ctr">
+        <a:ln w="6350" cap="flat" cmpd="sng" algn="ctr">
           <a:solidFill>
             <a:schemeClr val="phClr">
               <a:shade val="95000"/>
@@ -29585,14 +30125,14 @@
           <a:prstDash val="solid"/>
           <a:miter/>
         </a:ln>
-        <a:ln w="25400" cap="flat" cmpd="sng" algn="ctr">
+        <a:ln w="12700" cap="flat" cmpd="sng" algn="ctr">
           <a:solidFill>
             <a:schemeClr val="phClr"/>
           </a:solidFill>
           <a:prstDash val="solid"/>
           <a:miter/>
         </a:ln>
-        <a:ln w="38100" cap="flat" cmpd="sng" algn="ctr">
+        <a:ln w="19050" cap="flat" cmpd="sng" algn="ctr">
           <a:solidFill>
             <a:schemeClr val="phClr"/>
           </a:solidFill>
@@ -29602,22 +30142,10 @@
       </a:lnStyleLst>
       <a:effectStyleLst>
         <a:effectStyle>
-          <a:effectLst>
-            <a:outerShdw blurRad="40000" dist="20000" dir="5400000" rotWithShape="0">
-              <a:srgbClr val="000000">
-                <a:alpha val="38000"/>
-              </a:srgbClr>
-            </a:outerShdw>
-          </a:effectLst>
+          <a:effectLst/>
         </a:effectStyle>
         <a:effectStyle>
-          <a:effectLst>
-            <a:outerShdw blurRad="40000" dist="23000" dir="5400000" rotWithShape="0">
-              <a:srgbClr val="000000">
-                <a:alpha val="35000"/>
-              </a:srgbClr>
-            </a:outerShdw>
-          </a:effectLst>
+          <a:effectLst/>
         </a:effectStyle>
         <a:effectStyle>
           <a:effectLst>

</xml_diff>

<commit_message>
New cleaned up horizontal poster and pdf export for draft 2
</commit_message>
<xml_diff>
--- a/PresentationMaterial/lastname-firstname_poster.pptx
+++ b/PresentationMaterial/lastname-firstname_poster.pptx
@@ -12,7 +12,7 @@
 </p:presentation>
 </file>
 
-<file path=ppt/charts/chart29.xml><?xml version="1.0" encoding="utf-8"?>
+<file path=ppt/charts/chart21.xml><?xml version="1.0" encoding="utf-8"?>
 <c:chartSpace xmlns:c="http://schemas.openxmlformats.org/drawingml/2006/chart" xmlns:a="http://schemas.openxmlformats.org/drawingml/2006/main" xmlns:r="http://schemas.openxmlformats.org/officeDocument/2006/relationships">
   <c:lang val="en-US"/>
   <c:roundedCorners val="0"/>
@@ -49,8 +49,8 @@
         <c:manualLayout>
           <c:xMode val="edge"/>
           <c:yMode val="edge"/>
-          <c:x val="0.160145150799356"/>
-          <c:y val="0.001874625074985"/>
+          <c:x val="0.160150633344745"/>
+          <c:y val="0.00187476565429321"/>
         </c:manualLayout>
       </c:layout>
       <c:overlay val="0"/>
@@ -68,10 +68,10 @@
           <c:layoutTarget val="inner"/>
           <c:xMode val="edge"/>
           <c:yMode val="edge"/>
-          <c:x val="0.0938749513463784"/>
-          <c:y val="0.115460433680653"/>
-          <c:w val="0.879197480627013"/>
-          <c:h val="0.745536468600394"/>
+          <c:x val="0.0938440540351369"/>
+          <c:y val="0.115494225288736"/>
+          <c:w val="0.864737173654371"/>
+          <c:h val="0.745462726863657"/>
         </c:manualLayout>
       </c:layout>
       <c:scatterChart>
@@ -24209,11 +24209,11 @@
           </c:yVal>
           <c:smooth val="0"/>
         </c:ser>
-        <c:axId val="96562310"/>
-        <c:axId val="75028648"/>
+        <c:axId val="22258618"/>
+        <c:axId val="10017987"/>
       </c:scatterChart>
       <c:valAx>
-        <c:axId val="96562310"/>
+        <c:axId val="22258618"/>
         <c:scaling>
           <c:orientation val="minMax"/>
           <c:max val="5"/>
@@ -24252,8 +24252,8 @@
             <c:manualLayout>
               <c:xMode val="edge"/>
               <c:yMode val="edge"/>
-              <c:x val="0.44907740234843"/>
-              <c:y val="0.890371925614877"/>
+              <c:x val="0.449058541595344"/>
+              <c:y val="0.890363704536933"/>
             </c:manualLayout>
           </c:layout>
           <c:overlay val="0"/>
@@ -24290,12 +24290,12 @@
             </a:pPr>
           </a:p>
         </c:txPr>
-        <c:crossAx val="75028648"/>
+        <c:crossAx val="10017987"/>
         <c:crosses val="max"/>
         <c:crossBetween val="midCat"/>
       </c:valAx>
       <c:valAx>
-        <c:axId val="75028648"/>
+        <c:axId val="10017987"/>
         <c:scaling>
           <c:orientation val="minMax"/>
         </c:scaling>
@@ -24372,7 +24372,7 @@
             </a:pPr>
           </a:p>
         </c:txPr>
-        <c:crossAx val="96562310"/>
+        <c:crossAx val="22258618"/>
         <c:crosses val="autoZero"/>
         <c:crossBetween val="midCat"/>
       </c:valAx>
@@ -24434,7 +24434,7 @@
 </c:chartSpace>
 </file>
 
-<file path=ppt/charts/chart30.xml><?xml version="1.0" encoding="utf-8"?>
+<file path=ppt/charts/chart22.xml><?xml version="1.0" encoding="utf-8"?>
 <c:chartSpace xmlns:c="http://schemas.openxmlformats.org/drawingml/2006/chart" xmlns:a="http://schemas.openxmlformats.org/drawingml/2006/main" xmlns:r="http://schemas.openxmlformats.org/officeDocument/2006/relationships">
   <c:lang val="en-US"/>
   <c:roundedCorners val="0"/>
@@ -24471,8 +24471,8 @@
         <c:manualLayout>
           <c:xMode val="edge"/>
           <c:yMode val="edge"/>
-          <c:x val="0.149635411317654"/>
-          <c:y val="0.0262373719020278"/>
+          <c:x val="0.149640534063677"/>
+          <c:y val="0.0262392789649658"/>
         </c:manualLayout>
       </c:layout>
       <c:overlay val="0"/>
@@ -24491,9 +24491,9 @@
           <c:xMode val="edge"/>
           <c:yMode val="edge"/>
           <c:x val="0.0945224238274564"/>
-          <c:y val="0.136005726556908"/>
-          <c:w val="0.872577884286203"/>
-          <c:h val="0.731997136721546"/>
+          <c:y val="0.135993603721471"/>
+          <c:w val="0.872543649435125"/>
+          <c:h val="0.73193778165431"/>
         </c:manualLayout>
       </c:layout>
       <c:scatterChart>
@@ -24829,11 +24829,11 @@
           </c:yVal>
           <c:smooth val="0"/>
         </c:ser>
-        <c:axId val="94780799"/>
-        <c:axId val="20979725"/>
+        <c:axId val="25807283"/>
+        <c:axId val="2479636"/>
       </c:scatterChart>
       <c:valAx>
-        <c:axId val="94780799"/>
+        <c:axId val="25807283"/>
         <c:scaling>
           <c:logBase val="10"/>
           <c:orientation val="minMax"/>
@@ -24911,12 +24911,12 @@
             </a:pPr>
           </a:p>
         </c:txPr>
-        <c:crossAx val="20979725"/>
+        <c:crossAx val="2479636"/>
         <c:crosses val="min"/>
         <c:crossBetween val="midCat"/>
       </c:valAx>
       <c:valAx>
-        <c:axId val="20979725"/>
+        <c:axId val="2479636"/>
         <c:scaling>
           <c:orientation val="minMax"/>
         </c:scaling>
@@ -24993,7 +24993,7 @@
             </a:pPr>
           </a:p>
         </c:txPr>
-        <c:crossAx val="94780799"/>
+        <c:crossAx val="25807283"/>
         <c:crosses val="autoZero"/>
         <c:crossBetween val="midCat"/>
       </c:valAx>
@@ -25106,7 +25106,7 @@
         <p:txBody>
           <a:bodyPr/>
           <a:p>
-            <a:fld id="{30E7B53F-11DC-45D1-AFF4-ED0173EB2824}" type="slidenum">
+            <a:fld id="{B4758CC9-161E-47F7-9E93-D4D333500B31}" type="slidenum">
               <a:t>&lt;#&gt;</a:t>
             </a:fld>
           </a:p>
@@ -25167,7 +25167,7 @@
         </p:nvSpPr>
         <p:spPr>
           <a:xfrm>
-            <a:off x="1645920" y="875160"/>
+            <a:off x="1645920" y="875520"/>
             <a:ext cx="29626200" cy="3664440"/>
           </a:xfrm>
           <a:prstGeom prst="rect">
@@ -25186,7 +25186,7 @@
             <a:pPr indent="0" algn="ctr">
               <a:buNone/>
             </a:pPr>
-            <a:endParaRPr b="0" lang="en-US" sz="3770" spc="-1" strike="noStrike">
+            <a:endParaRPr b="0" lang="en-US" sz="4400" spc="-1" strike="noStrike">
               <a:solidFill>
                 <a:srgbClr val="000000"/>
               </a:solidFill>
@@ -25225,11 +25225,11 @@
           <a:p>
             <a:pPr indent="0">
               <a:spcBef>
-                <a:spcPts val="1213"/>
+                <a:spcPts val="1417"/>
               </a:spcBef>
               <a:buNone/>
             </a:pPr>
-            <a:endParaRPr b="0" lang="en-US" sz="2740" spc="-1" strike="noStrike">
+            <a:endParaRPr b="0" lang="en-US" sz="3200" spc="-1" strike="noStrike">
               <a:solidFill>
                 <a:srgbClr val="000000"/>
               </a:solidFill>
@@ -25268,11 +25268,11 @@
           <a:p>
             <a:pPr indent="0">
               <a:spcBef>
-                <a:spcPts val="1213"/>
+                <a:spcPts val="1417"/>
               </a:spcBef>
               <a:buNone/>
             </a:pPr>
-            <a:endParaRPr b="0" lang="en-US" sz="2740" spc="-1" strike="noStrike">
+            <a:endParaRPr b="0" lang="en-US" sz="3200" spc="-1" strike="noStrike">
               <a:solidFill>
                 <a:srgbClr val="000000"/>
               </a:solidFill>
@@ -25315,7 +25315,7 @@
         <p:txBody>
           <a:bodyPr/>
           <a:p>
-            <a:fld id="{708FAAB8-29F6-4C94-9D0E-A841D8B995B8}" type="slidenum">
+            <a:fld id="{D1E0C1F2-4493-44E2-BCC1-AAF24C587019}" type="slidenum">
               <a:t>&lt;#&gt;</a:t>
             </a:fld>
           </a:p>
@@ -25376,7 +25376,7 @@
         </p:nvSpPr>
         <p:spPr>
           <a:xfrm>
-            <a:off x="1645920" y="875160"/>
+            <a:off x="1645920" y="875520"/>
             <a:ext cx="29626200" cy="3664440"/>
           </a:xfrm>
           <a:prstGeom prst="rect">
@@ -25395,7 +25395,7 @@
             <a:pPr indent="0" algn="ctr">
               <a:buNone/>
             </a:pPr>
-            <a:endParaRPr b="0" lang="en-US" sz="3770" spc="-1" strike="noStrike">
+            <a:endParaRPr b="0" lang="en-US" sz="4400" spc="-1" strike="noStrike">
               <a:solidFill>
                 <a:srgbClr val="000000"/>
               </a:solidFill>
@@ -25434,11 +25434,11 @@
           <a:p>
             <a:pPr indent="0">
               <a:spcBef>
-                <a:spcPts val="1213"/>
+                <a:spcPts val="1417"/>
               </a:spcBef>
               <a:buNone/>
             </a:pPr>
-            <a:endParaRPr b="0" lang="en-US" sz="2740" spc="-1" strike="noStrike">
+            <a:endParaRPr b="0" lang="en-US" sz="3200" spc="-1" strike="noStrike">
               <a:solidFill>
                 <a:srgbClr val="000000"/>
               </a:solidFill>
@@ -25477,11 +25477,11 @@
           <a:p>
             <a:pPr indent="0">
               <a:spcBef>
-                <a:spcPts val="1213"/>
+                <a:spcPts val="1417"/>
               </a:spcBef>
               <a:buNone/>
             </a:pPr>
-            <a:endParaRPr b="0" lang="en-US" sz="2740" spc="-1" strike="noStrike">
+            <a:endParaRPr b="0" lang="en-US" sz="3200" spc="-1" strike="noStrike">
               <a:solidFill>
                 <a:srgbClr val="000000"/>
               </a:solidFill>
@@ -25520,11 +25520,11 @@
           <a:p>
             <a:pPr indent="0">
               <a:spcBef>
-                <a:spcPts val="1213"/>
+                <a:spcPts val="1417"/>
               </a:spcBef>
               <a:buNone/>
             </a:pPr>
-            <a:endParaRPr b="0" lang="en-US" sz="2740" spc="-1" strike="noStrike">
+            <a:endParaRPr b="0" lang="en-US" sz="3200" spc="-1" strike="noStrike">
               <a:solidFill>
                 <a:srgbClr val="000000"/>
               </a:solidFill>
@@ -25563,11 +25563,11 @@
           <a:p>
             <a:pPr indent="0">
               <a:spcBef>
-                <a:spcPts val="1213"/>
+                <a:spcPts val="1417"/>
               </a:spcBef>
               <a:buNone/>
             </a:pPr>
-            <a:endParaRPr b="0" lang="en-US" sz="2740" spc="-1" strike="noStrike">
+            <a:endParaRPr b="0" lang="en-US" sz="3200" spc="-1" strike="noStrike">
               <a:solidFill>
                 <a:srgbClr val="000000"/>
               </a:solidFill>
@@ -25610,7 +25610,7 @@
         <p:txBody>
           <a:bodyPr/>
           <a:p>
-            <a:fld id="{9254C501-7145-44C3-9853-7874A5F68D26}" type="slidenum">
+            <a:fld id="{24EFADC0-C45E-4158-9D7B-54C5E5C025CF}" type="slidenum">
               <a:t>&lt;#&gt;</a:t>
             </a:fld>
           </a:p>
@@ -25671,7 +25671,7 @@
         </p:nvSpPr>
         <p:spPr>
           <a:xfrm>
-            <a:off x="1645920" y="875160"/>
+            <a:off x="1645920" y="875520"/>
             <a:ext cx="29626200" cy="3664440"/>
           </a:xfrm>
           <a:prstGeom prst="rect">
@@ -25690,7 +25690,7 @@
             <a:pPr indent="0" algn="ctr">
               <a:buNone/>
             </a:pPr>
-            <a:endParaRPr b="0" lang="en-US" sz="3770" spc="-1" strike="noStrike">
+            <a:endParaRPr b="0" lang="en-US" sz="4400" spc="-1" strike="noStrike">
               <a:solidFill>
                 <a:srgbClr val="000000"/>
               </a:solidFill>
@@ -25729,11 +25729,11 @@
           <a:p>
             <a:pPr indent="0">
               <a:spcBef>
-                <a:spcPts val="1213"/>
+                <a:spcPts val="1417"/>
               </a:spcBef>
               <a:buNone/>
             </a:pPr>
-            <a:endParaRPr b="0" lang="en-US" sz="2740" spc="-1" strike="noStrike">
+            <a:endParaRPr b="0" lang="en-US" sz="3200" spc="-1" strike="noStrike">
               <a:solidFill>
                 <a:srgbClr val="000000"/>
               </a:solidFill>
@@ -25772,11 +25772,11 @@
           <a:p>
             <a:pPr indent="0">
               <a:spcBef>
-                <a:spcPts val="1213"/>
+                <a:spcPts val="1417"/>
               </a:spcBef>
               <a:buNone/>
             </a:pPr>
-            <a:endParaRPr b="0" lang="en-US" sz="2740" spc="-1" strike="noStrike">
+            <a:endParaRPr b="0" lang="en-US" sz="3200" spc="-1" strike="noStrike">
               <a:solidFill>
                 <a:srgbClr val="000000"/>
               </a:solidFill>
@@ -25815,11 +25815,11 @@
           <a:p>
             <a:pPr indent="0">
               <a:spcBef>
-                <a:spcPts val="1213"/>
+                <a:spcPts val="1417"/>
               </a:spcBef>
               <a:buNone/>
             </a:pPr>
-            <a:endParaRPr b="0" lang="en-US" sz="2740" spc="-1" strike="noStrike">
+            <a:endParaRPr b="0" lang="en-US" sz="3200" spc="-1" strike="noStrike">
               <a:solidFill>
                 <a:srgbClr val="000000"/>
               </a:solidFill>
@@ -25858,11 +25858,11 @@
           <a:p>
             <a:pPr indent="0">
               <a:spcBef>
-                <a:spcPts val="1213"/>
+                <a:spcPts val="1417"/>
               </a:spcBef>
               <a:buNone/>
             </a:pPr>
-            <a:endParaRPr b="0" lang="en-US" sz="2740" spc="-1" strike="noStrike">
+            <a:endParaRPr b="0" lang="en-US" sz="3200" spc="-1" strike="noStrike">
               <a:solidFill>
                 <a:srgbClr val="000000"/>
               </a:solidFill>
@@ -25901,11 +25901,11 @@
           <a:p>
             <a:pPr indent="0">
               <a:spcBef>
-                <a:spcPts val="1213"/>
+                <a:spcPts val="1417"/>
               </a:spcBef>
               <a:buNone/>
             </a:pPr>
-            <a:endParaRPr b="0" lang="en-US" sz="2740" spc="-1" strike="noStrike">
+            <a:endParaRPr b="0" lang="en-US" sz="3200" spc="-1" strike="noStrike">
               <a:solidFill>
                 <a:srgbClr val="000000"/>
               </a:solidFill>
@@ -25944,11 +25944,11 @@
           <a:p>
             <a:pPr indent="0">
               <a:spcBef>
-                <a:spcPts val="1213"/>
+                <a:spcPts val="1417"/>
               </a:spcBef>
               <a:buNone/>
             </a:pPr>
-            <a:endParaRPr b="0" lang="en-US" sz="2740" spc="-1" strike="noStrike">
+            <a:endParaRPr b="0" lang="en-US" sz="3200" spc="-1" strike="noStrike">
               <a:solidFill>
                 <a:srgbClr val="000000"/>
               </a:solidFill>
@@ -25991,7 +25991,7 @@
         <p:txBody>
           <a:bodyPr/>
           <a:p>
-            <a:fld id="{3E6F19D4-14C5-41E9-AC61-54009A2E87D9}" type="slidenum">
+            <a:fld id="{880618CB-FCCA-4C2F-894F-490079C3399B}" type="slidenum">
               <a:t>&lt;#&gt;</a:t>
             </a:fld>
           </a:p>
@@ -26052,7 +26052,7 @@
         </p:nvSpPr>
         <p:spPr>
           <a:xfrm>
-            <a:off x="1645920" y="875160"/>
+            <a:off x="1645920" y="875520"/>
             <a:ext cx="29626200" cy="3664440"/>
           </a:xfrm>
           <a:prstGeom prst="rect">
@@ -26071,7 +26071,7 @@
             <a:pPr indent="0" algn="ctr">
               <a:buNone/>
             </a:pPr>
-            <a:endParaRPr b="0" lang="en-US" sz="3770" spc="-1" strike="noStrike">
+            <a:endParaRPr b="0" lang="en-US" sz="4400" spc="-1" strike="noStrike">
               <a:solidFill>
                 <a:srgbClr val="000000"/>
               </a:solidFill>
@@ -26154,7 +26154,7 @@
         <p:txBody>
           <a:bodyPr/>
           <a:p>
-            <a:fld id="{DCE77414-A71F-4520-9BD7-E5A3DF7A0EC8}" type="slidenum">
+            <a:fld id="{7A34FB07-843B-4FC7-8EFE-4E18C32FBE31}" type="slidenum">
               <a:t>&lt;#&gt;</a:t>
             </a:fld>
           </a:p>
@@ -26215,7 +26215,7 @@
         </p:nvSpPr>
         <p:spPr>
           <a:xfrm>
-            <a:off x="1645920" y="875160"/>
+            <a:off x="1645920" y="875520"/>
             <a:ext cx="29626200" cy="3664440"/>
           </a:xfrm>
           <a:prstGeom prst="rect">
@@ -26234,7 +26234,7 @@
             <a:pPr indent="0" algn="ctr">
               <a:buNone/>
             </a:pPr>
-            <a:endParaRPr b="0" lang="en-US" sz="3770" spc="-1" strike="noStrike">
+            <a:endParaRPr b="0" lang="en-US" sz="4400" spc="-1" strike="noStrike">
               <a:solidFill>
                 <a:srgbClr val="000000"/>
               </a:solidFill>
@@ -26273,11 +26273,11 @@
           <a:p>
             <a:pPr indent="0">
               <a:spcBef>
-                <a:spcPts val="1213"/>
+                <a:spcPts val="1417"/>
               </a:spcBef>
               <a:buNone/>
             </a:pPr>
-            <a:endParaRPr b="0" lang="en-US" sz="2740" spc="-1" strike="noStrike">
+            <a:endParaRPr b="0" lang="en-US" sz="3200" spc="-1" strike="noStrike">
               <a:solidFill>
                 <a:srgbClr val="000000"/>
               </a:solidFill>
@@ -26320,7 +26320,7 @@
         <p:txBody>
           <a:bodyPr/>
           <a:p>
-            <a:fld id="{D23EBBCA-EC80-4777-A9F9-EC6EDE19C153}" type="slidenum">
+            <a:fld id="{33EAC72B-55A9-4F96-8E3B-6A87632BF9A4}" type="slidenum">
               <a:t>&lt;#&gt;</a:t>
             </a:fld>
           </a:p>
@@ -26381,7 +26381,7 @@
         </p:nvSpPr>
         <p:spPr>
           <a:xfrm>
-            <a:off x="1645920" y="875160"/>
+            <a:off x="1645920" y="875520"/>
             <a:ext cx="29626200" cy="3664440"/>
           </a:xfrm>
           <a:prstGeom prst="rect">
@@ -26400,7 +26400,7 @@
             <a:pPr indent="0" algn="ctr">
               <a:buNone/>
             </a:pPr>
-            <a:endParaRPr b="0" lang="en-US" sz="3770" spc="-1" strike="noStrike">
+            <a:endParaRPr b="0" lang="en-US" sz="4400" spc="-1" strike="noStrike">
               <a:solidFill>
                 <a:srgbClr val="000000"/>
               </a:solidFill>
@@ -26439,11 +26439,11 @@
           <a:p>
             <a:pPr indent="0">
               <a:spcBef>
-                <a:spcPts val="1213"/>
+                <a:spcPts val="1417"/>
               </a:spcBef>
               <a:buNone/>
             </a:pPr>
-            <a:endParaRPr b="0" lang="en-US" sz="2740" spc="-1" strike="noStrike">
+            <a:endParaRPr b="0" lang="en-US" sz="3200" spc="-1" strike="noStrike">
               <a:solidFill>
                 <a:srgbClr val="000000"/>
               </a:solidFill>
@@ -26482,11 +26482,11 @@
           <a:p>
             <a:pPr indent="0">
               <a:spcBef>
-                <a:spcPts val="1213"/>
+                <a:spcPts val="1417"/>
               </a:spcBef>
               <a:buNone/>
             </a:pPr>
-            <a:endParaRPr b="0" lang="en-US" sz="2740" spc="-1" strike="noStrike">
+            <a:endParaRPr b="0" lang="en-US" sz="3200" spc="-1" strike="noStrike">
               <a:solidFill>
                 <a:srgbClr val="000000"/>
               </a:solidFill>
@@ -26529,7 +26529,7 @@
         <p:txBody>
           <a:bodyPr/>
           <a:p>
-            <a:fld id="{9BE94192-A5A5-4E8D-9170-F449DD63FF20}" type="slidenum">
+            <a:fld id="{7E444854-C9BD-49E5-A37A-DB0E7C408681}" type="slidenum">
               <a:t>&lt;#&gt;</a:t>
             </a:fld>
           </a:p>
@@ -26590,7 +26590,7 @@
         </p:nvSpPr>
         <p:spPr>
           <a:xfrm>
-            <a:off x="1645920" y="875160"/>
+            <a:off x="1645920" y="875520"/>
             <a:ext cx="29626200" cy="3664440"/>
           </a:xfrm>
           <a:prstGeom prst="rect">
@@ -26609,7 +26609,7 @@
             <a:pPr indent="0" algn="ctr">
               <a:buNone/>
             </a:pPr>
-            <a:endParaRPr b="0" lang="en-US" sz="3770" spc="-1" strike="noStrike">
+            <a:endParaRPr b="0" lang="en-US" sz="4400" spc="-1" strike="noStrike">
               <a:solidFill>
                 <a:srgbClr val="000000"/>
               </a:solidFill>
@@ -26652,7 +26652,7 @@
         <p:txBody>
           <a:bodyPr/>
           <a:p>
-            <a:fld id="{4C3FB8D4-2DD8-4890-AAFD-1DBCDE9CC4EC}" type="slidenum">
+            <a:fld id="{1C2337FF-5E2F-4472-8C36-6999DFAE5BCF}" type="slidenum">
               <a:t>&lt;#&gt;</a:t>
             </a:fld>
           </a:p>
@@ -26713,7 +26713,7 @@
         </p:nvSpPr>
         <p:spPr>
           <a:xfrm>
-            <a:off x="1645920" y="875160"/>
+            <a:off x="1645920" y="875520"/>
             <a:ext cx="29626200" cy="16987320"/>
           </a:xfrm>
           <a:prstGeom prst="rect">
@@ -26773,7 +26773,7 @@
         <p:txBody>
           <a:bodyPr/>
           <a:p>
-            <a:fld id="{B0A395B6-C2D6-41AC-BCCF-B76B5B32FC15}" type="slidenum">
+            <a:fld id="{DE73ECFF-B62A-4FF3-B552-E8B8F3DC2C27}" type="slidenum">
               <a:t>&lt;#&gt;</a:t>
             </a:fld>
           </a:p>
@@ -26834,7 +26834,7 @@
         </p:nvSpPr>
         <p:spPr>
           <a:xfrm>
-            <a:off x="1645920" y="875160"/>
+            <a:off x="1645920" y="875520"/>
             <a:ext cx="29626200" cy="3664440"/>
           </a:xfrm>
           <a:prstGeom prst="rect">
@@ -26853,7 +26853,7 @@
             <a:pPr indent="0" algn="ctr">
               <a:buNone/>
             </a:pPr>
-            <a:endParaRPr b="0" lang="en-US" sz="3770" spc="-1" strike="noStrike">
+            <a:endParaRPr b="0" lang="en-US" sz="4400" spc="-1" strike="noStrike">
               <a:solidFill>
                 <a:srgbClr val="000000"/>
               </a:solidFill>
@@ -26892,11 +26892,11 @@
           <a:p>
             <a:pPr indent="0">
               <a:spcBef>
-                <a:spcPts val="1213"/>
+                <a:spcPts val="1417"/>
               </a:spcBef>
               <a:buNone/>
             </a:pPr>
-            <a:endParaRPr b="0" lang="en-US" sz="2740" spc="-1" strike="noStrike">
+            <a:endParaRPr b="0" lang="en-US" sz="3200" spc="-1" strike="noStrike">
               <a:solidFill>
                 <a:srgbClr val="000000"/>
               </a:solidFill>
@@ -26935,11 +26935,11 @@
           <a:p>
             <a:pPr indent="0">
               <a:spcBef>
-                <a:spcPts val="1213"/>
+                <a:spcPts val="1417"/>
               </a:spcBef>
               <a:buNone/>
             </a:pPr>
-            <a:endParaRPr b="0" lang="en-US" sz="2740" spc="-1" strike="noStrike">
+            <a:endParaRPr b="0" lang="en-US" sz="3200" spc="-1" strike="noStrike">
               <a:solidFill>
                 <a:srgbClr val="000000"/>
               </a:solidFill>
@@ -26978,11 +26978,11 @@
           <a:p>
             <a:pPr indent="0">
               <a:spcBef>
-                <a:spcPts val="1213"/>
+                <a:spcPts val="1417"/>
               </a:spcBef>
               <a:buNone/>
             </a:pPr>
-            <a:endParaRPr b="0" lang="en-US" sz="2740" spc="-1" strike="noStrike">
+            <a:endParaRPr b="0" lang="en-US" sz="3200" spc="-1" strike="noStrike">
               <a:solidFill>
                 <a:srgbClr val="000000"/>
               </a:solidFill>
@@ -27025,7 +27025,7 @@
         <p:txBody>
           <a:bodyPr/>
           <a:p>
-            <a:fld id="{32B38547-FEC1-4906-930C-3209EEB96C4E}" type="slidenum">
+            <a:fld id="{7224503C-EB71-477F-BEEA-5558C2942883}" type="slidenum">
               <a:t>&lt;#&gt;</a:t>
             </a:fld>
           </a:p>
@@ -27086,7 +27086,7 @@
         </p:nvSpPr>
         <p:spPr>
           <a:xfrm>
-            <a:off x="1645920" y="875160"/>
+            <a:off x="1645920" y="875520"/>
             <a:ext cx="29626200" cy="3664440"/>
           </a:xfrm>
           <a:prstGeom prst="rect">
@@ -27105,7 +27105,7 @@
             <a:pPr indent="0" algn="ctr">
               <a:buNone/>
             </a:pPr>
-            <a:endParaRPr b="0" lang="en-US" sz="3770" spc="-1" strike="noStrike">
+            <a:endParaRPr b="0" lang="en-US" sz="4400" spc="-1" strike="noStrike">
               <a:solidFill>
                 <a:srgbClr val="000000"/>
               </a:solidFill>
@@ -27144,11 +27144,11 @@
           <a:p>
             <a:pPr indent="0">
               <a:spcBef>
-                <a:spcPts val="1213"/>
+                <a:spcPts val="1417"/>
               </a:spcBef>
               <a:buNone/>
             </a:pPr>
-            <a:endParaRPr b="0" lang="en-US" sz="2740" spc="-1" strike="noStrike">
+            <a:endParaRPr b="0" lang="en-US" sz="3200" spc="-1" strike="noStrike">
               <a:solidFill>
                 <a:srgbClr val="000000"/>
               </a:solidFill>
@@ -27187,11 +27187,11 @@
           <a:p>
             <a:pPr indent="0">
               <a:spcBef>
-                <a:spcPts val="1213"/>
+                <a:spcPts val="1417"/>
               </a:spcBef>
               <a:buNone/>
             </a:pPr>
-            <a:endParaRPr b="0" lang="en-US" sz="2740" spc="-1" strike="noStrike">
+            <a:endParaRPr b="0" lang="en-US" sz="3200" spc="-1" strike="noStrike">
               <a:solidFill>
                 <a:srgbClr val="000000"/>
               </a:solidFill>
@@ -27230,11 +27230,11 @@
           <a:p>
             <a:pPr indent="0">
               <a:spcBef>
-                <a:spcPts val="1213"/>
+                <a:spcPts val="1417"/>
               </a:spcBef>
               <a:buNone/>
             </a:pPr>
-            <a:endParaRPr b="0" lang="en-US" sz="2740" spc="-1" strike="noStrike">
+            <a:endParaRPr b="0" lang="en-US" sz="3200" spc="-1" strike="noStrike">
               <a:solidFill>
                 <a:srgbClr val="000000"/>
               </a:solidFill>
@@ -27277,7 +27277,7 @@
         <p:txBody>
           <a:bodyPr/>
           <a:p>
-            <a:fld id="{441E7945-B82A-451E-AE71-D7FB1E3347D9}" type="slidenum">
+            <a:fld id="{59F69619-4481-4C16-AA4F-62327953A1EC}" type="slidenum">
               <a:t>&lt;#&gt;</a:t>
             </a:fld>
           </a:p>
@@ -27338,7 +27338,7 @@
         </p:nvSpPr>
         <p:spPr>
           <a:xfrm>
-            <a:off x="1645920" y="875160"/>
+            <a:off x="1645920" y="875520"/>
             <a:ext cx="29626200" cy="3664440"/>
           </a:xfrm>
           <a:prstGeom prst="rect">
@@ -27357,7 +27357,7 @@
             <a:pPr indent="0" algn="ctr">
               <a:buNone/>
             </a:pPr>
-            <a:endParaRPr b="0" lang="en-US" sz="3770" spc="-1" strike="noStrike">
+            <a:endParaRPr b="0" lang="en-US" sz="4400" spc="-1" strike="noStrike">
               <a:solidFill>
                 <a:srgbClr val="000000"/>
               </a:solidFill>
@@ -27396,11 +27396,11 @@
           <a:p>
             <a:pPr indent="0">
               <a:spcBef>
-                <a:spcPts val="1213"/>
+                <a:spcPts val="1417"/>
               </a:spcBef>
               <a:buNone/>
             </a:pPr>
-            <a:endParaRPr b="0" lang="en-US" sz="2740" spc="-1" strike="noStrike">
+            <a:endParaRPr b="0" lang="en-US" sz="3200" spc="-1" strike="noStrike">
               <a:solidFill>
                 <a:srgbClr val="000000"/>
               </a:solidFill>
@@ -27439,11 +27439,11 @@
           <a:p>
             <a:pPr indent="0">
               <a:spcBef>
-                <a:spcPts val="1213"/>
+                <a:spcPts val="1417"/>
               </a:spcBef>
               <a:buNone/>
             </a:pPr>
-            <a:endParaRPr b="0" lang="en-US" sz="2740" spc="-1" strike="noStrike">
+            <a:endParaRPr b="0" lang="en-US" sz="3200" spc="-1" strike="noStrike">
               <a:solidFill>
                 <a:srgbClr val="000000"/>
               </a:solidFill>
@@ -27482,11 +27482,11 @@
           <a:p>
             <a:pPr indent="0">
               <a:spcBef>
-                <a:spcPts val="1213"/>
+                <a:spcPts val="1417"/>
               </a:spcBef>
               <a:buNone/>
             </a:pPr>
-            <a:endParaRPr b="0" lang="en-US" sz="2740" spc="-1" strike="noStrike">
+            <a:endParaRPr b="0" lang="en-US" sz="3200" spc="-1" strike="noStrike">
               <a:solidFill>
                 <a:srgbClr val="000000"/>
               </a:solidFill>
@@ -27529,7 +27529,7 @@
         <p:txBody>
           <a:bodyPr/>
           <a:p>
-            <a:fld id="{773D85D8-C446-4F63-85D6-264054A1F148}" type="slidenum">
+            <a:fld id="{1A2A8CE4-1621-48E3-88BF-40101F2EFF05}" type="slidenum">
               <a:t>&lt;#&gt;</a:t>
             </a:fld>
           </a:p>
@@ -27598,7 +27598,7 @@
         <p:spPr>
           <a:xfrm>
             <a:off x="11246040" y="20339640"/>
-            <a:ext cx="10420920" cy="1166400"/>
+            <a:ext cx="10420560" cy="1166040"/>
           </a:xfrm>
           <a:prstGeom prst="rect">
             <a:avLst/>
@@ -27618,6 +27618,9 @@
                 <a:spcPct val="100000"/>
               </a:lnSpc>
               <a:buNone/>
+              <a:tabLst>
+                <a:tab algn="l" pos="0"/>
+              </a:tabLst>
               <a:defRPr b="0" lang="en-US" sz="1400" spc="-1" strike="noStrike">
                 <a:solidFill>
                   <a:srgbClr val="000000"/>
@@ -27632,6 +27635,9 @@
                 <a:spcPct val="100000"/>
               </a:lnSpc>
               <a:buNone/>
+              <a:tabLst>
+                <a:tab algn="l" pos="0"/>
+              </a:tabLst>
             </a:pPr>
             <a:r>
               <a:rPr b="0" lang="en-US" sz="1400" spc="-1" strike="noStrike">
@@ -27640,7 +27646,7 @@
                 </a:solidFill>
                 <a:latin typeface="Times New Roman"/>
               </a:rPr>
-              <a:t> </a:t>
+              <a:t>&lt;footer&gt;</a:t>
             </a:r>
             <a:endParaRPr b="0" lang="en-US" sz="1400" spc="-1" strike="noStrike">
               <a:solidFill>
@@ -27664,7 +27670,7 @@
         <p:spPr>
           <a:xfrm>
             <a:off x="23590440" y="20339640"/>
-            <a:ext cx="7677360" cy="1166400"/>
+            <a:ext cx="7677000" cy="1166040"/>
           </a:xfrm>
           <a:prstGeom prst="rect">
             <a:avLst/>
@@ -27684,6 +27690,9 @@
                 <a:spcPct val="100000"/>
               </a:lnSpc>
               <a:buNone/>
+              <a:tabLst>
+                <a:tab algn="l" pos="0"/>
+              </a:tabLst>
               <a:defRPr b="0" lang="en-US" sz="5600" spc="-1" strike="noStrike">
                 <a:solidFill>
                   <a:srgbClr val="8b8b8b"/>
@@ -27698,15 +27707,18 @@
                 <a:spcPct val="100000"/>
               </a:lnSpc>
               <a:buNone/>
+              <a:tabLst>
+                <a:tab algn="l" pos="0"/>
+              </a:tabLst>
             </a:pPr>
-            <a:fld id="{3B46400F-0B2E-475A-87D1-4F0D7E7CF85C}" type="slidenum">
+            <a:fld id="{85CA00E0-051F-4EDE-8820-8A4A0EE8842D}" type="slidenum">
               <a:rPr b="0" lang="en-US" sz="5600" spc="-1" strike="noStrike">
                 <a:solidFill>
                   <a:srgbClr val="8b8b8b"/>
                 </a:solidFill>
                 <a:latin typeface="Calibri"/>
               </a:rPr>
-              <a:t>1</a:t>
+              <a:t>&lt;number&gt;</a:t>
             </a:fld>
             <a:endParaRPr b="0" lang="en-US" sz="5600" spc="-1" strike="noStrike">
               <a:solidFill>
@@ -27730,7 +27742,7 @@
         <p:spPr>
           <a:xfrm>
             <a:off x="1645920" y="20339640"/>
-            <a:ext cx="7677360" cy="1166400"/>
+            <a:ext cx="7677000" cy="1166040"/>
           </a:xfrm>
           <a:prstGeom prst="rect">
             <a:avLst/>
@@ -27766,7 +27778,7 @@
                 </a:solidFill>
                 <a:latin typeface="Times New Roman"/>
               </a:rPr>
-              <a:t> </a:t>
+              <a:t>&lt;date/time&gt;</a:t>
             </a:r>
             <a:endParaRPr b="0" lang="en-US" sz="1400" spc="-1" strike="noStrike">
               <a:solidFill>
@@ -27789,7 +27801,7 @@
         </p:nvSpPr>
         <p:spPr>
           <a:xfrm>
-            <a:off x="1645920" y="875160"/>
+            <a:off x="1645920" y="875520"/>
             <a:ext cx="29626200" cy="3664440"/>
           </a:xfrm>
           <a:prstGeom prst="rect">
@@ -27809,7 +27821,7 @@
               <a:buNone/>
             </a:pPr>
             <a:r>
-              <a:rPr b="0" lang="en-US" sz="3770" spc="-1" strike="noStrike">
+              <a:rPr b="0" lang="en-US" sz="4400" spc="-1" strike="noStrike">
                 <a:solidFill>
                   <a:srgbClr val="000000"/>
                 </a:solidFill>
@@ -27817,7 +27829,7 @@
               </a:rPr>
               <a:t>Click to edit the title text format</a:t>
             </a:r>
-            <a:endParaRPr b="0" lang="en-US" sz="3770" spc="-1" strike="noStrike">
+            <a:endParaRPr b="0" lang="en-US" sz="4400" spc="-1" strike="noStrike">
               <a:solidFill>
                 <a:srgbClr val="000000"/>
               </a:solidFill>
@@ -27856,7 +27868,7 @@
           <a:p>
             <a:pPr marL="432000" indent="-324000">
               <a:spcBef>
-                <a:spcPts val="1213"/>
+                <a:spcPts val="1417"/>
               </a:spcBef>
               <a:buClr>
                 <a:srgbClr val="000000"/>
@@ -27866,7 +27878,7 @@
               <a:buChar char=""/>
             </a:pPr>
             <a:r>
-              <a:rPr b="0" lang="en-US" sz="2740" spc="-1" strike="noStrike">
+              <a:rPr b="0" lang="en-US" sz="3200" spc="-1" strike="noStrike">
                 <a:solidFill>
                   <a:srgbClr val="000000"/>
                 </a:solidFill>
@@ -27874,7 +27886,7 @@
               </a:rPr>
               <a:t>Click to edit the outline text format</a:t>
             </a:r>
-            <a:endParaRPr b="0" lang="en-US" sz="2740" spc="-1" strike="noStrike">
+            <a:endParaRPr b="0" lang="en-US" sz="3200" spc="-1" strike="noStrike">
               <a:solidFill>
                 <a:srgbClr val="000000"/>
               </a:solidFill>
@@ -27884,7 +27896,7 @@
           <a:p>
             <a:pPr lvl="1" marL="864000" indent="-324000">
               <a:spcBef>
-                <a:spcPts val="969"/>
+                <a:spcPts val="1134"/>
               </a:spcBef>
               <a:buClr>
                 <a:srgbClr val="000000"/>
@@ -27894,13 +27906,41 @@
               <a:buChar char=""/>
             </a:pPr>
             <a:r>
+              <a:rPr b="0" lang="en-US" sz="2800" spc="-1" strike="noStrike">
+                <a:solidFill>
+                  <a:srgbClr val="000000"/>
+                </a:solidFill>
+                <a:latin typeface="Arial"/>
+              </a:rPr>
+              <a:t>Second Outline Level</a:t>
+            </a:r>
+            <a:endParaRPr b="0" lang="en-US" sz="2800" spc="-1" strike="noStrike">
+              <a:solidFill>
+                <a:srgbClr val="000000"/>
+              </a:solidFill>
+              <a:latin typeface="Arial"/>
+            </a:endParaRPr>
+          </a:p>
+          <a:p>
+            <a:pPr lvl="2" marL="1296000" indent="-288000">
+              <a:spcBef>
+                <a:spcPts val="850"/>
+              </a:spcBef>
+              <a:buClr>
+                <a:srgbClr val="000000"/>
+              </a:buClr>
+              <a:buSzPct val="45000"/>
+              <a:buFont typeface="Wingdings" charset="2"/>
+              <a:buChar char=""/>
+            </a:pPr>
+            <a:r>
               <a:rPr b="0" lang="en-US" sz="2400" spc="-1" strike="noStrike">
                 <a:solidFill>
                   <a:srgbClr val="000000"/>
                 </a:solidFill>
                 <a:latin typeface="Arial"/>
               </a:rPr>
-              <a:t>Second Outline Level</a:t>
+              <a:t>Third Outline Level</a:t>
             </a:r>
             <a:endParaRPr b="0" lang="en-US" sz="2400" spc="-1" strike="noStrike">
               <a:solidFill>
@@ -27910,9 +27950,37 @@
             </a:endParaRPr>
           </a:p>
           <a:p>
-            <a:pPr lvl="2" marL="1296000" indent="-288000">
+            <a:pPr lvl="3" marL="1728000" indent="-216000">
               <a:spcBef>
-                <a:spcPts val="729"/>
+                <a:spcPts val="567"/>
+              </a:spcBef>
+              <a:buClr>
+                <a:srgbClr val="000000"/>
+              </a:buClr>
+              <a:buSzPct val="75000"/>
+              <a:buFont typeface="Symbol" charset="2"/>
+              <a:buChar char=""/>
+            </a:pPr>
+            <a:r>
+              <a:rPr b="0" lang="en-US" sz="2000" spc="-1" strike="noStrike">
+                <a:solidFill>
+                  <a:srgbClr val="000000"/>
+                </a:solidFill>
+                <a:latin typeface="Arial"/>
+              </a:rPr>
+              <a:t>Fourth Outline Level</a:t>
+            </a:r>
+            <a:endParaRPr b="0" lang="en-US" sz="2000" spc="-1" strike="noStrike">
+              <a:solidFill>
+                <a:srgbClr val="000000"/>
+              </a:solidFill>
+              <a:latin typeface="Arial"/>
+            </a:endParaRPr>
+          </a:p>
+          <a:p>
+            <a:pPr lvl="4" marL="2160000" indent="-216000">
+              <a:spcBef>
+                <a:spcPts val="283"/>
               </a:spcBef>
               <a:buClr>
                 <a:srgbClr val="000000"/>
@@ -27922,15 +27990,15 @@
               <a:buChar char=""/>
             </a:pPr>
             <a:r>
-              <a:rPr b="0" lang="en-US" sz="2060" spc="-1" strike="noStrike">
+              <a:rPr b="0" lang="en-US" sz="2000" spc="-1" strike="noStrike">
                 <a:solidFill>
                   <a:srgbClr val="000000"/>
                 </a:solidFill>
                 <a:latin typeface="Arial"/>
               </a:rPr>
-              <a:t>Third Outline Level</a:t>
+              <a:t>Fifth Outline Level</a:t>
             </a:r>
-            <a:endParaRPr b="0" lang="en-US" sz="2060" spc="-1" strike="noStrike">
+            <a:endParaRPr b="0" lang="en-US" sz="2000" spc="-1" strike="noStrike">
               <a:solidFill>
                 <a:srgbClr val="000000"/>
               </a:solidFill>
@@ -27938,37 +28006,9 @@
             </a:endParaRPr>
           </a:p>
           <a:p>
-            <a:pPr lvl="3" marL="1728000" indent="-216000">
+            <a:pPr lvl="5" marL="2592000" indent="-216000">
               <a:spcBef>
-                <a:spcPts val="485"/>
-              </a:spcBef>
-              <a:buClr>
-                <a:srgbClr val="000000"/>
-              </a:buClr>
-              <a:buSzPct val="75000"/>
-              <a:buFont typeface="Symbol" charset="2"/>
-              <a:buChar char=""/>
-            </a:pPr>
-            <a:r>
-              <a:rPr b="0" lang="en-US" sz="1710" spc="-1" strike="noStrike">
-                <a:solidFill>
-                  <a:srgbClr val="000000"/>
-                </a:solidFill>
-                <a:latin typeface="Arial"/>
-              </a:rPr>
-              <a:t>Fourth Outline Level</a:t>
-            </a:r>
-            <a:endParaRPr b="0" lang="en-US" sz="1710" spc="-1" strike="noStrike">
-              <a:solidFill>
-                <a:srgbClr val="000000"/>
-              </a:solidFill>
-              <a:latin typeface="Arial"/>
-            </a:endParaRPr>
-          </a:p>
-          <a:p>
-            <a:pPr lvl="4" marL="2160000" indent="-216000">
-              <a:spcBef>
-                <a:spcPts val="241"/>
+                <a:spcPts val="283"/>
               </a:spcBef>
               <a:buClr>
                 <a:srgbClr val="000000"/>
@@ -27978,15 +28018,15 @@
               <a:buChar char=""/>
             </a:pPr>
             <a:r>
-              <a:rPr b="0" lang="en-US" sz="1710" spc="-1" strike="noStrike">
+              <a:rPr b="0" lang="en-US" sz="2000" spc="-1" strike="noStrike">
                 <a:solidFill>
                   <a:srgbClr val="000000"/>
                 </a:solidFill>
                 <a:latin typeface="Arial"/>
               </a:rPr>
-              <a:t>Fifth Outline Level</a:t>
+              <a:t>Sixth Outline Level</a:t>
             </a:r>
-            <a:endParaRPr b="0" lang="en-US" sz="1710" spc="-1" strike="noStrike">
+            <a:endParaRPr b="0" lang="en-US" sz="2000" spc="-1" strike="noStrike">
               <a:solidFill>
                 <a:srgbClr val="000000"/>
               </a:solidFill>
@@ -27994,9 +28034,9 @@
             </a:endParaRPr>
           </a:p>
           <a:p>
-            <a:pPr lvl="5" marL="2592000" indent="-216000">
+            <a:pPr lvl="6" marL="3024000" indent="-216000">
               <a:spcBef>
-                <a:spcPts val="241"/>
+                <a:spcPts val="283"/>
               </a:spcBef>
               <a:buClr>
                 <a:srgbClr val="000000"/>
@@ -28006,35 +28046,7 @@
               <a:buChar char=""/>
             </a:pPr>
             <a:r>
-              <a:rPr b="0" lang="en-US" sz="1710" spc="-1" strike="noStrike">
-                <a:solidFill>
-                  <a:srgbClr val="000000"/>
-                </a:solidFill>
-                <a:latin typeface="Arial"/>
-              </a:rPr>
-              <a:t>Sixth Outline Level</a:t>
-            </a:r>
-            <a:endParaRPr b="0" lang="en-US" sz="1710" spc="-1" strike="noStrike">
-              <a:solidFill>
-                <a:srgbClr val="000000"/>
-              </a:solidFill>
-              <a:latin typeface="Arial"/>
-            </a:endParaRPr>
-          </a:p>
-          <a:p>
-            <a:pPr lvl="6" marL="3024000" indent="-216000">
-              <a:spcBef>
-                <a:spcPts val="241"/>
-              </a:spcBef>
-              <a:buClr>
-                <a:srgbClr val="000000"/>
-              </a:buClr>
-              <a:buSzPct val="45000"/>
-              <a:buFont typeface="Wingdings" charset="2"/>
-              <a:buChar char=""/>
-            </a:pPr>
-            <a:r>
-              <a:rPr b="0" lang="en-US" sz="1710" spc="-1" strike="noStrike">
+              <a:rPr b="0" lang="en-US" sz="2000" spc="-1" strike="noStrike">
                 <a:solidFill>
                   <a:srgbClr val="000000"/>
                 </a:solidFill>
@@ -28042,7 +28054,7 @@
               </a:rPr>
               <a:t>Seventh Outline Level</a:t>
             </a:r>
-            <a:endParaRPr b="0" lang="en-US" sz="1710" spc="-1" strike="noStrike">
+            <a:endParaRPr b="0" lang="en-US" sz="2000" spc="-1" strike="noStrike">
               <a:solidFill>
                 <a:srgbClr val="000000"/>
               </a:solidFill>
@@ -28104,7 +28116,7 @@
         <p:spPr>
           <a:xfrm>
             <a:off x="457200" y="457200"/>
-            <a:ext cx="32004000" cy="21031200"/>
+            <a:ext cx="32003640" cy="21030840"/>
           </a:xfrm>
           <a:prstGeom prst="rect">
             <a:avLst/>
@@ -28127,11 +28139,17 @@
             <a:noAutofit/>
           </a:bodyPr>
           <a:p>
+            <a:pPr>
+              <a:lnSpc>
+                <a:spcPct val="100000"/>
+              </a:lnSpc>
+            </a:pPr>
             <a:endParaRPr b="0" lang="en-US" sz="1800" spc="-1" strike="noStrike">
               <a:solidFill>
                 <a:srgbClr val="000000"/>
               </a:solidFill>
               <a:latin typeface="Arial"/>
+              <a:ea typeface="DejaVu Sans"/>
             </a:endParaRPr>
           </a:p>
         </p:txBody>
@@ -28145,7 +28163,7 @@
         <p:spPr>
           <a:xfrm>
             <a:off x="228600" y="321840"/>
-            <a:ext cx="32461200" cy="1278360"/>
+            <a:ext cx="32460840" cy="1278000"/>
           </a:xfrm>
           <a:prstGeom prst="rect">
             <a:avLst/>
@@ -28199,7 +28217,7 @@
         <p:spPr>
           <a:xfrm>
             <a:off x="586800" y="1595160"/>
-            <a:ext cx="31740480" cy="598320"/>
+            <a:ext cx="17701200" cy="597960"/>
           </a:xfrm>
           <a:prstGeom prst="rect">
             <a:avLst/>
@@ -28233,17 +28251,7 @@
                 <a:latin typeface="Arial"/>
                 <a:ea typeface="DejaVu Sans"/>
               </a:rPr>
-              <a:t>Authors: Jay E. Bernstein, David J. Mora, Juan R. Ortiz; </a:t>
-            </a:r>
-            <a:r>
-              <a:rPr b="0" lang="en-US" sz="3200" spc="-1" strike="noStrike">
-                <a:solidFill>
-                  <a:srgbClr val="000000"/>
-                </a:solidFill>
-                <a:latin typeface="Arial"/>
-                <a:ea typeface="DejaVu Sans"/>
-              </a:rPr>
-              <a:t>Advised by Dr. Norali Pernalete</a:t>
+              <a:t>Authors: Jay E. Bernstein, David J. Mora, Juan R. Ortiz; Advised by Dr. Norali Pernalete</a:t>
             </a:r>
             <a:endParaRPr b="0" lang="en-US" sz="3200" spc="-1" strike="noStrike">
               <a:solidFill>
@@ -28275,8 +28283,1511 @@
         </p:nvSpPr>
         <p:spPr>
           <a:xfrm>
-            <a:off x="3526560" y="19242720"/>
-            <a:ext cx="12048120" cy="1330560"/>
+            <a:off x="12801600" y="10744200"/>
+            <a:ext cx="8915400" cy="6172200"/>
+          </a:xfrm>
+          <a:prstGeom prst="rect">
+            <a:avLst/>
+          </a:prstGeom>
+          <a:solidFill>
+            <a:srgbClr val="729fcf"/>
+          </a:solidFill>
+          <a:ln w="0">
+            <a:solidFill>
+              <a:srgbClr val="3465a4"/>
+            </a:solidFill>
+          </a:ln>
+        </p:spPr>
+        <p:style>
+          <a:lnRef idx="0"/>
+          <a:fillRef idx="0"/>
+          <a:effectRef idx="0"/>
+          <a:fontRef idx="minor"/>
+        </p:style>
+        <p:txBody>
+          <a:bodyPr lIns="90000" rIns="90000" tIns="45000" bIns="45000" anchor="ctr">
+            <a:noAutofit/>
+          </a:bodyPr>
+          <a:p>
+            <a:pPr algn="ctr">
+              <a:lnSpc>
+                <a:spcPct val="100000"/>
+              </a:lnSpc>
+            </a:pPr>
+            <a:r>
+              <a:rPr b="0" lang="en-US" sz="4800" spc="-1" strike="noStrike">
+                <a:solidFill>
+                  <a:srgbClr val="000000"/>
+                </a:solidFill>
+                <a:latin typeface="Arial"/>
+                <a:ea typeface="DejaVu Sans"/>
+              </a:rPr>
+              <a:t>Picture of Complete Project Here</a:t>
+            </a:r>
+            <a:endParaRPr b="0" lang="en-US" sz="4800" spc="-1" strike="noStrike">
+              <a:solidFill>
+                <a:srgbClr val="000000"/>
+              </a:solidFill>
+              <a:latin typeface="Arial"/>
+            </a:endParaRPr>
+          </a:p>
+        </p:txBody>
+      </p:sp>
+      <p:sp>
+        <p:nvSpPr>
+          <p:cNvPr id="45" name=""/>
+          <p:cNvSpPr/>
+          <p:nvPr/>
+        </p:nvSpPr>
+        <p:spPr>
+          <a:xfrm>
+            <a:off x="426600" y="2194560"/>
+            <a:ext cx="20833200" cy="3749040"/>
+          </a:xfrm>
+          <a:prstGeom prst="rect">
+            <a:avLst/>
+          </a:prstGeom>
+          <a:solidFill>
+            <a:srgbClr val="ffffff"/>
+          </a:solidFill>
+          <a:ln w="0">
+            <a:noFill/>
+          </a:ln>
+        </p:spPr>
+        <p:style>
+          <a:lnRef idx="0"/>
+          <a:fillRef idx="0"/>
+          <a:effectRef idx="0"/>
+          <a:fontRef idx="minor"/>
+        </p:style>
+        <p:txBody>
+          <a:bodyPr lIns="90000" rIns="90000" tIns="45000" bIns="45000" anchor="t">
+            <a:noAutofit/>
+          </a:bodyPr>
+          <a:p>
+            <a:pPr marL="228600">
+              <a:lnSpc>
+                <a:spcPct val="115000"/>
+              </a:lnSpc>
+            </a:pPr>
+            <a:r>
+              <a:rPr b="1" lang="en-US" sz="3200" spc="-1" strike="noStrike">
+                <a:solidFill>
+                  <a:srgbClr val="000000"/>
+                </a:solidFill>
+                <a:latin typeface="Arial"/>
+                <a:ea typeface="DejaVu Sans"/>
+              </a:rPr>
+              <a:t>Abstract</a:t>
+            </a:r>
+            <a:endParaRPr b="0" lang="en-US" sz="3200" spc="-1" strike="noStrike">
+              <a:solidFill>
+                <a:srgbClr val="000000"/>
+              </a:solidFill>
+              <a:latin typeface="Arial"/>
+            </a:endParaRPr>
+          </a:p>
+          <a:p>
+            <a:pPr marL="228600">
+              <a:lnSpc>
+                <a:spcPct val="115000"/>
+              </a:lnSpc>
+            </a:pPr>
+            <a:r>
+              <a:rPr b="0" lang="en-US" sz="2400" spc="-1" strike="noStrike">
+                <a:solidFill>
+                  <a:srgbClr val="000000"/>
+                </a:solidFill>
+                <a:latin typeface="Arial"/>
+                <a:ea typeface="DejaVu Sans"/>
+              </a:rPr>
+              <a:t>The objective of this project was to discover the fundamentals of signal acquisition and processing, in a situation requiring extremely precise hardware requirements in order to achieve both common mode signal rejection and extremely high gain. Because this is a medical device, considerations of safety had to be made as well. The final product is a printed circuit board designed around the Texas Instruments INA82x that handles differential gain, with input resistance to limit the shock hazard were a fault to occur. The amplified input signal is processed so that a microcontroller is able to determine what command the signal is closest to.</a:t>
+            </a:r>
+            <a:endParaRPr b="0" lang="en-US" sz="2400" spc="-1" strike="noStrike">
+              <a:solidFill>
+                <a:srgbClr val="000000"/>
+              </a:solidFill>
+              <a:latin typeface="Arial"/>
+            </a:endParaRPr>
+          </a:p>
+        </p:txBody>
+      </p:sp>
+      <p:graphicFrame>
+        <p:nvGraphicFramePr>
+          <p:cNvPr id="46" name=""/>
+          <p:cNvGraphicFramePr/>
+          <p:nvPr/>
+        </p:nvGraphicFramePr>
+        <p:xfrm>
+          <a:off x="21945600" y="7086600"/>
+          <a:ext cx="10515240" cy="4800240"/>
+        </p:xfrm>
+        <a:graphic>
+          <a:graphicData uri="http://schemas.openxmlformats.org/drawingml/2006/chart">
+            <c:chart xmlns:c="http://schemas.openxmlformats.org/drawingml/2006/chart" xmlns:r="http://schemas.openxmlformats.org/officeDocument/2006/relationships" r:id="rId1"/>
+          </a:graphicData>
+        </a:graphic>
+      </p:graphicFrame>
+      <p:sp>
+        <p:nvSpPr>
+          <p:cNvPr id="47" name=""/>
+          <p:cNvSpPr/>
+          <p:nvPr/>
+        </p:nvSpPr>
+        <p:spPr>
+          <a:xfrm>
+            <a:off x="21488400" y="1600200"/>
+            <a:ext cx="10972440" cy="4114440"/>
+          </a:xfrm>
+          <a:prstGeom prst="rect">
+            <a:avLst/>
+          </a:prstGeom>
+          <a:noFill/>
+          <a:ln w="76320">
+            <a:solidFill>
+              <a:srgbClr val="3faf46"/>
+            </a:solidFill>
+            <a:round/>
+          </a:ln>
+        </p:spPr>
+        <p:style>
+          <a:lnRef idx="0"/>
+          <a:fillRef idx="0"/>
+          <a:effectRef idx="0"/>
+          <a:fontRef idx="minor"/>
+        </p:style>
+        <p:txBody>
+          <a:bodyPr lIns="127800" rIns="127800" tIns="82800" bIns="82800" anchor="t">
+            <a:noAutofit/>
+          </a:bodyPr>
+          <a:p>
+            <a:pPr>
+              <a:lnSpc>
+                <a:spcPct val="100000"/>
+              </a:lnSpc>
+            </a:pPr>
+            <a:r>
+              <a:rPr b="0" lang="en-US" sz="3200" spc="-1" strike="noStrike">
+                <a:solidFill>
+                  <a:srgbClr val="000000"/>
+                </a:solidFill>
+                <a:latin typeface="Arial"/>
+                <a:ea typeface="DejaVu Sans"/>
+              </a:rPr>
+              <a:t>Block Diagram</a:t>
+            </a:r>
+            <a:endParaRPr b="0" lang="en-US" sz="3200" spc="-1" strike="noStrike">
+              <a:solidFill>
+                <a:srgbClr val="000000"/>
+              </a:solidFill>
+              <a:latin typeface="Arial"/>
+            </a:endParaRPr>
+          </a:p>
+        </p:txBody>
+      </p:sp>
+      <p:sp>
+        <p:nvSpPr>
+          <p:cNvPr id="48" name=""/>
+          <p:cNvSpPr/>
+          <p:nvPr/>
+        </p:nvSpPr>
+        <p:spPr>
+          <a:xfrm>
+            <a:off x="21717000" y="3200400"/>
+            <a:ext cx="1761480" cy="914040"/>
+          </a:xfrm>
+          <a:prstGeom prst="rect">
+            <a:avLst/>
+          </a:prstGeom>
+          <a:noFill/>
+          <a:ln w="57240">
+            <a:solidFill>
+              <a:srgbClr val="3faf46"/>
+            </a:solidFill>
+            <a:round/>
+          </a:ln>
+        </p:spPr>
+        <p:style>
+          <a:lnRef idx="0"/>
+          <a:fillRef idx="0"/>
+          <a:effectRef idx="0"/>
+          <a:fontRef idx="minor"/>
+        </p:style>
+        <p:txBody>
+          <a:bodyPr lIns="118440" rIns="118440" tIns="73440" bIns="73440" anchor="t">
+            <a:noAutofit/>
+          </a:bodyPr>
+          <a:p>
+            <a:pPr>
+              <a:lnSpc>
+                <a:spcPct val="100000"/>
+              </a:lnSpc>
+            </a:pPr>
+            <a:r>
+              <a:rPr b="0" lang="en-US" sz="2400" spc="-1" strike="noStrike">
+                <a:solidFill>
+                  <a:srgbClr val="000000"/>
+                </a:solidFill>
+                <a:latin typeface="Arial"/>
+                <a:ea typeface="DejaVu Sans"/>
+              </a:rPr>
+              <a:t>Surface EMG Pads</a:t>
+            </a:r>
+            <a:endParaRPr b="0" lang="en-US" sz="2400" spc="-1" strike="noStrike">
+              <a:solidFill>
+                <a:srgbClr val="000000"/>
+              </a:solidFill>
+              <a:latin typeface="Arial"/>
+            </a:endParaRPr>
+          </a:p>
+        </p:txBody>
+      </p:sp>
+      <p:sp>
+        <p:nvSpPr>
+          <p:cNvPr id="49" name=""/>
+          <p:cNvSpPr/>
+          <p:nvPr/>
+        </p:nvSpPr>
+        <p:spPr>
+          <a:xfrm>
+            <a:off x="24066720" y="2286000"/>
+            <a:ext cx="2644920" cy="2743200"/>
+          </a:xfrm>
+          <a:prstGeom prst="rect">
+            <a:avLst/>
+          </a:prstGeom>
+          <a:noFill/>
+          <a:ln w="57240">
+            <a:solidFill>
+              <a:srgbClr val="3faf46"/>
+            </a:solidFill>
+            <a:round/>
+          </a:ln>
+        </p:spPr>
+        <p:style>
+          <a:lnRef idx="0"/>
+          <a:fillRef idx="0"/>
+          <a:effectRef idx="0"/>
+          <a:fontRef idx="minor"/>
+        </p:style>
+        <p:txBody>
+          <a:bodyPr lIns="118440" rIns="118440" tIns="73440" bIns="73440" anchor="t">
+            <a:noAutofit/>
+          </a:bodyPr>
+          <a:p>
+            <a:pPr>
+              <a:lnSpc>
+                <a:spcPct val="100000"/>
+              </a:lnSpc>
+            </a:pPr>
+            <a:r>
+              <a:rPr b="0" lang="en-US" sz="2400" spc="-1" strike="noStrike">
+                <a:solidFill>
+                  <a:srgbClr val="000000"/>
+                </a:solidFill>
+                <a:latin typeface="Arial"/>
+                <a:ea typeface="DejaVu Sans"/>
+              </a:rPr>
+              <a:t>Amplifier</a:t>
+            </a:r>
+            <a:endParaRPr b="0" lang="en-US" sz="2400" spc="-1" strike="noStrike">
+              <a:solidFill>
+                <a:srgbClr val="000000"/>
+              </a:solidFill>
+              <a:latin typeface="Arial"/>
+            </a:endParaRPr>
+          </a:p>
+        </p:txBody>
+      </p:sp>
+      <p:sp>
+        <p:nvSpPr>
+          <p:cNvPr id="50" name=""/>
+          <p:cNvSpPr/>
+          <p:nvPr/>
+        </p:nvSpPr>
+        <p:spPr>
+          <a:xfrm>
+            <a:off x="27203400" y="1828800"/>
+            <a:ext cx="3200040" cy="3657240"/>
+          </a:xfrm>
+          <a:prstGeom prst="rect">
+            <a:avLst/>
+          </a:prstGeom>
+          <a:noFill/>
+          <a:ln w="57240">
+            <a:solidFill>
+              <a:srgbClr val="3faf46"/>
+            </a:solidFill>
+            <a:round/>
+          </a:ln>
+        </p:spPr>
+        <p:style>
+          <a:lnRef idx="0"/>
+          <a:fillRef idx="0"/>
+          <a:effectRef idx="0"/>
+          <a:fontRef idx="minor"/>
+        </p:style>
+        <p:txBody>
+          <a:bodyPr lIns="118080" rIns="118080" tIns="73080" bIns="73080" anchor="t">
+            <a:noAutofit/>
+          </a:bodyPr>
+          <a:p>
+            <a:pPr>
+              <a:lnSpc>
+                <a:spcPct val="100000"/>
+              </a:lnSpc>
+            </a:pPr>
+            <a:r>
+              <a:rPr b="0" lang="en-US" sz="2400" spc="-1" strike="noStrike">
+                <a:solidFill>
+                  <a:srgbClr val="000000"/>
+                </a:solidFill>
+                <a:latin typeface="Arial"/>
+                <a:ea typeface="DejaVu Sans"/>
+              </a:rPr>
+              <a:t>MCU (Teensy 4.1)</a:t>
+            </a:r>
+            <a:endParaRPr b="0" lang="en-US" sz="2400" spc="-1" strike="noStrike">
+              <a:solidFill>
+                <a:srgbClr val="000000"/>
+              </a:solidFill>
+              <a:latin typeface="Arial"/>
+            </a:endParaRPr>
+          </a:p>
+        </p:txBody>
+      </p:sp>
+      <p:sp>
+        <p:nvSpPr>
+          <p:cNvPr id="51" name=""/>
+          <p:cNvSpPr/>
+          <p:nvPr/>
+        </p:nvSpPr>
+        <p:spPr>
+          <a:xfrm>
+            <a:off x="30861000" y="3200400"/>
+            <a:ext cx="1371240" cy="822240"/>
+          </a:xfrm>
+          <a:prstGeom prst="rect">
+            <a:avLst/>
+          </a:prstGeom>
+          <a:noFill/>
+          <a:ln w="57240">
+            <a:solidFill>
+              <a:srgbClr val="3faf46"/>
+            </a:solidFill>
+            <a:round/>
+          </a:ln>
+        </p:spPr>
+        <p:style>
+          <a:lnRef idx="0"/>
+          <a:fillRef idx="0"/>
+          <a:effectRef idx="0"/>
+          <a:fontRef idx="minor"/>
+        </p:style>
+        <p:txBody>
+          <a:bodyPr lIns="118800" rIns="118800" tIns="73800" bIns="73800" anchor="t">
+            <a:noAutofit/>
+          </a:bodyPr>
+          <a:p>
+            <a:pPr>
+              <a:lnSpc>
+                <a:spcPct val="100000"/>
+              </a:lnSpc>
+            </a:pPr>
+            <a:r>
+              <a:rPr b="0" lang="en-US" sz="2400" spc="-1" strike="noStrike">
+                <a:solidFill>
+                  <a:srgbClr val="000000"/>
+                </a:solidFill>
+                <a:latin typeface="Arial"/>
+                <a:ea typeface="DejaVu Sans"/>
+              </a:rPr>
+              <a:t>Robotic Hand</a:t>
+            </a:r>
+            <a:endParaRPr b="0" lang="en-US" sz="2400" spc="-1" strike="noStrike">
+              <a:solidFill>
+                <a:srgbClr val="000000"/>
+              </a:solidFill>
+              <a:latin typeface="Arial"/>
+            </a:endParaRPr>
+          </a:p>
+        </p:txBody>
+      </p:sp>
+      <p:sp>
+        <p:nvSpPr>
+          <p:cNvPr id="52" name=""/>
+          <p:cNvSpPr/>
+          <p:nvPr/>
+        </p:nvSpPr>
+        <p:spPr>
+          <a:xfrm>
+            <a:off x="27432000" y="3337560"/>
+            <a:ext cx="2677320" cy="776880"/>
+          </a:xfrm>
+          <a:prstGeom prst="rect">
+            <a:avLst/>
+          </a:prstGeom>
+          <a:noFill/>
+          <a:ln w="38160">
+            <a:solidFill>
+              <a:srgbClr val="3faf46"/>
+            </a:solidFill>
+            <a:round/>
+          </a:ln>
+        </p:spPr>
+        <p:style>
+          <a:lnRef idx="0"/>
+          <a:fillRef idx="0"/>
+          <a:effectRef idx="0"/>
+          <a:fontRef idx="minor"/>
+        </p:style>
+        <p:txBody>
+          <a:bodyPr lIns="109080" rIns="109080" tIns="64080" bIns="64080" anchor="t">
+            <a:noAutofit/>
+          </a:bodyPr>
+          <a:p>
+            <a:pPr>
+              <a:lnSpc>
+                <a:spcPct val="100000"/>
+              </a:lnSpc>
+            </a:pPr>
+            <a:r>
+              <a:rPr b="0" lang="en-US" sz="1800" spc="-1" strike="noStrike">
+                <a:solidFill>
+                  <a:srgbClr val="000000"/>
+                </a:solidFill>
+                <a:latin typeface="Arial"/>
+                <a:ea typeface="DejaVu Sans"/>
+              </a:rPr>
+              <a:t>Normalize, Rectify, and Amplify ADC Input</a:t>
+            </a:r>
+            <a:endParaRPr b="0" lang="en-US" sz="1800" spc="-1" strike="noStrike">
+              <a:solidFill>
+                <a:srgbClr val="000000"/>
+              </a:solidFill>
+              <a:latin typeface="Arial"/>
+            </a:endParaRPr>
+          </a:p>
+        </p:txBody>
+      </p:sp>
+      <p:sp>
+        <p:nvSpPr>
+          <p:cNvPr id="53" name=""/>
+          <p:cNvSpPr/>
+          <p:nvPr/>
+        </p:nvSpPr>
+        <p:spPr>
+          <a:xfrm>
+            <a:off x="27432000" y="4572360"/>
+            <a:ext cx="2677320" cy="685080"/>
+          </a:xfrm>
+          <a:prstGeom prst="rect">
+            <a:avLst/>
+          </a:prstGeom>
+          <a:noFill/>
+          <a:ln w="38160">
+            <a:solidFill>
+              <a:srgbClr val="f10d0c"/>
+            </a:solidFill>
+            <a:round/>
+          </a:ln>
+        </p:spPr>
+        <p:style>
+          <a:lnRef idx="0"/>
+          <a:fillRef idx="0"/>
+          <a:effectRef idx="0"/>
+          <a:fontRef idx="minor"/>
+        </p:style>
+        <p:txBody>
+          <a:bodyPr lIns="109080" rIns="109080" tIns="64080" bIns="64080" anchor="t">
+            <a:noAutofit/>
+          </a:bodyPr>
+          <a:p>
+            <a:pPr>
+              <a:lnSpc>
+                <a:spcPct val="100000"/>
+              </a:lnSpc>
+            </a:pPr>
+            <a:r>
+              <a:rPr b="0" lang="en-US" sz="1800" spc="-1" strike="noStrike">
+                <a:solidFill>
+                  <a:srgbClr val="000000"/>
+                </a:solidFill>
+                <a:latin typeface="Arial"/>
+                <a:ea typeface="DejaVu Sans"/>
+              </a:rPr>
+              <a:t>Finger Detection Algorithm</a:t>
+            </a:r>
+            <a:endParaRPr b="0" lang="en-US" sz="1800" spc="-1" strike="noStrike">
+              <a:solidFill>
+                <a:srgbClr val="000000"/>
+              </a:solidFill>
+              <a:latin typeface="Arial"/>
+            </a:endParaRPr>
+          </a:p>
+        </p:txBody>
+      </p:sp>
+      <p:sp>
+        <p:nvSpPr>
+          <p:cNvPr id="54" name=""/>
+          <p:cNvSpPr/>
+          <p:nvPr/>
+        </p:nvSpPr>
+        <p:spPr>
+          <a:xfrm>
+            <a:off x="27432000" y="2286360"/>
+            <a:ext cx="2677320" cy="685080"/>
+          </a:xfrm>
+          <a:prstGeom prst="rect">
+            <a:avLst/>
+          </a:prstGeom>
+          <a:noFill/>
+          <a:ln w="38160">
+            <a:solidFill>
+              <a:srgbClr val="3faf46"/>
+            </a:solidFill>
+            <a:round/>
+          </a:ln>
+        </p:spPr>
+        <p:style>
+          <a:lnRef idx="0"/>
+          <a:fillRef idx="0"/>
+          <a:effectRef idx="0"/>
+          <a:fontRef idx="minor"/>
+        </p:style>
+        <p:txBody>
+          <a:bodyPr lIns="109080" rIns="109080" tIns="64080" bIns="64080" anchor="t">
+            <a:noAutofit/>
+          </a:bodyPr>
+          <a:p>
+            <a:pPr>
+              <a:lnSpc>
+                <a:spcPct val="100000"/>
+              </a:lnSpc>
+            </a:pPr>
+            <a:r>
+              <a:rPr b="0" lang="en-US" sz="1800" spc="-1" strike="noStrike">
+                <a:solidFill>
+                  <a:srgbClr val="000000"/>
+                </a:solidFill>
+                <a:latin typeface="Arial"/>
+                <a:ea typeface="DejaVu Sans"/>
+              </a:rPr>
+              <a:t>Capture 1000 Samples at 40kHz with ADC</a:t>
+            </a:r>
+            <a:endParaRPr b="0" lang="en-US" sz="1800" spc="-1" strike="noStrike">
+              <a:solidFill>
+                <a:srgbClr val="000000"/>
+              </a:solidFill>
+              <a:latin typeface="Arial"/>
+            </a:endParaRPr>
+          </a:p>
+        </p:txBody>
+      </p:sp>
+      <p:sp>
+        <p:nvSpPr>
+          <p:cNvPr id="55" name=""/>
+          <p:cNvSpPr/>
+          <p:nvPr/>
+        </p:nvSpPr>
+        <p:spPr>
+          <a:xfrm>
+            <a:off x="28803600" y="4114800"/>
+            <a:ext cx="360" cy="457560"/>
+          </a:xfrm>
+          <a:prstGeom prst="line">
+            <a:avLst/>
+          </a:prstGeom>
+          <a:ln w="38160">
+            <a:solidFill>
+              <a:srgbClr val="3faf46"/>
+            </a:solidFill>
+            <a:round/>
+            <a:tailEnd len="med" type="triangle" w="med"/>
+          </a:ln>
+        </p:spPr>
+        <p:style>
+          <a:lnRef idx="0"/>
+          <a:fillRef idx="0"/>
+          <a:effectRef idx="0"/>
+          <a:fontRef idx="minor"/>
+        </p:style>
+        <p:txBody>
+          <a:bodyPr lIns="90000" rIns="90000" tIns="45000" bIns="45000" anchor="t" anchorCtr="1">
+            <a:noAutofit/>
+          </a:bodyPr>
+          <a:p>
+            <a:endParaRPr b="0" lang="en-US" sz="1800" spc="-1" strike="noStrike">
+              <a:solidFill>
+                <a:srgbClr val="000000"/>
+              </a:solidFill>
+              <a:latin typeface="Arial"/>
+              <a:ea typeface="DejaVu Sans"/>
+            </a:endParaRPr>
+          </a:p>
+        </p:txBody>
+      </p:sp>
+      <p:sp>
+        <p:nvSpPr>
+          <p:cNvPr id="56" name=""/>
+          <p:cNvSpPr/>
+          <p:nvPr/>
+        </p:nvSpPr>
+        <p:spPr>
+          <a:xfrm>
+            <a:off x="28803600" y="2971800"/>
+            <a:ext cx="360" cy="365760"/>
+          </a:xfrm>
+          <a:prstGeom prst="line">
+            <a:avLst/>
+          </a:prstGeom>
+          <a:ln w="38160">
+            <a:solidFill>
+              <a:srgbClr val="3faf46"/>
+            </a:solidFill>
+            <a:round/>
+            <a:tailEnd len="med" type="triangle" w="med"/>
+          </a:ln>
+        </p:spPr>
+        <p:style>
+          <a:lnRef idx="0"/>
+          <a:fillRef idx="0"/>
+          <a:effectRef idx="0"/>
+          <a:fontRef idx="minor"/>
+        </p:style>
+        <p:txBody>
+          <a:bodyPr lIns="90000" rIns="90000" tIns="45000" bIns="45000" anchor="t" anchorCtr="1">
+            <a:noAutofit/>
+          </a:bodyPr>
+          <a:p>
+            <a:endParaRPr b="0" lang="en-US" sz="1800" spc="-1" strike="noStrike">
+              <a:solidFill>
+                <a:srgbClr val="000000"/>
+              </a:solidFill>
+              <a:latin typeface="Arial"/>
+              <a:ea typeface="DejaVu Sans"/>
+            </a:endParaRPr>
+          </a:p>
+        </p:txBody>
+      </p:sp>
+      <p:sp>
+        <p:nvSpPr>
+          <p:cNvPr id="57" name=""/>
+          <p:cNvSpPr/>
+          <p:nvPr/>
+        </p:nvSpPr>
+        <p:spPr>
+          <a:xfrm>
+            <a:off x="23478840" y="3657600"/>
+            <a:ext cx="587880" cy="360"/>
+          </a:xfrm>
+          <a:prstGeom prst="line">
+            <a:avLst/>
+          </a:prstGeom>
+          <a:ln w="38160">
+            <a:solidFill>
+              <a:srgbClr val="3faf46"/>
+            </a:solidFill>
+            <a:round/>
+            <a:tailEnd len="med" type="triangle" w="med"/>
+          </a:ln>
+        </p:spPr>
+        <p:style>
+          <a:lnRef idx="0"/>
+          <a:fillRef idx="0"/>
+          <a:effectRef idx="0"/>
+          <a:fontRef idx="minor"/>
+        </p:style>
+        <p:txBody>
+          <a:bodyPr lIns="90000" rIns="90000" tIns="-45000" bIns="-45000" anchor="t" anchorCtr="1">
+            <a:noAutofit/>
+          </a:bodyPr>
+          <a:p>
+            <a:endParaRPr b="0" lang="en-US" sz="1800" spc="-1" strike="noStrike">
+              <a:solidFill>
+                <a:srgbClr val="000000"/>
+              </a:solidFill>
+              <a:latin typeface="Arial"/>
+              <a:ea typeface="DejaVu Sans"/>
+            </a:endParaRPr>
+          </a:p>
+        </p:txBody>
+      </p:sp>
+      <p:sp>
+        <p:nvSpPr>
+          <p:cNvPr id="58" name=""/>
+          <p:cNvSpPr/>
+          <p:nvPr/>
+        </p:nvSpPr>
+        <p:spPr>
+          <a:xfrm>
+            <a:off x="360" y="360"/>
+            <a:ext cx="360" cy="360"/>
+          </a:xfrm>
+          <a:prstGeom prst="line">
+            <a:avLst/>
+          </a:prstGeom>
+          <a:ln w="38160">
+            <a:solidFill>
+              <a:srgbClr val="3465a4"/>
+            </a:solidFill>
+            <a:round/>
+            <a:tailEnd len="med" type="triangle" w="med"/>
+          </a:ln>
+        </p:spPr>
+        <p:style>
+          <a:lnRef idx="0"/>
+          <a:fillRef idx="0"/>
+          <a:effectRef idx="0"/>
+          <a:fontRef idx="minor"/>
+        </p:style>
+        <p:txBody>
+          <a:bodyPr lIns="90000" rIns="90000" tIns="-44640" bIns="-44640" anchor="t" anchorCtr="1">
+            <a:noAutofit/>
+          </a:bodyPr>
+          <a:p>
+            <a:endParaRPr b="0" lang="en-US" sz="1800" spc="-1" strike="noStrike">
+              <a:solidFill>
+                <a:srgbClr val="000000"/>
+              </a:solidFill>
+              <a:latin typeface="Arial"/>
+              <a:ea typeface="DejaVu Sans"/>
+            </a:endParaRPr>
+          </a:p>
+        </p:txBody>
+      </p:sp>
+      <p:sp>
+        <p:nvSpPr>
+          <p:cNvPr id="59" name=""/>
+          <p:cNvSpPr/>
+          <p:nvPr/>
+        </p:nvSpPr>
+        <p:spPr>
+          <a:xfrm>
+            <a:off x="360" y="360"/>
+            <a:ext cx="360" cy="360"/>
+          </a:xfrm>
+          <a:prstGeom prst="line">
+            <a:avLst/>
+          </a:prstGeom>
+          <a:ln w="57240">
+            <a:solidFill>
+              <a:srgbClr val="3465a4"/>
+            </a:solidFill>
+            <a:round/>
+            <a:tailEnd len="med" type="triangle" w="med"/>
+          </a:ln>
+        </p:spPr>
+        <p:style>
+          <a:lnRef idx="0"/>
+          <a:fillRef idx="0"/>
+          <a:effectRef idx="0"/>
+          <a:fontRef idx="minor"/>
+        </p:style>
+        <p:txBody>
+          <a:bodyPr lIns="90000" rIns="90000" tIns="-44640" bIns="-44640" anchor="t" anchorCtr="1">
+            <a:noAutofit/>
+          </a:bodyPr>
+          <a:p>
+            <a:endParaRPr b="0" lang="en-US" sz="1800" spc="-1" strike="noStrike">
+              <a:solidFill>
+                <a:srgbClr val="000000"/>
+              </a:solidFill>
+              <a:latin typeface="Arial"/>
+              <a:ea typeface="DejaVu Sans"/>
+            </a:endParaRPr>
+          </a:p>
+        </p:txBody>
+      </p:sp>
+      <p:sp>
+        <p:nvSpPr>
+          <p:cNvPr id="60" name=""/>
+          <p:cNvSpPr/>
+          <p:nvPr/>
+        </p:nvSpPr>
+        <p:spPr>
+          <a:xfrm>
+            <a:off x="24231600" y="2743200"/>
+            <a:ext cx="2285640" cy="914040"/>
+          </a:xfrm>
+          <a:prstGeom prst="rect">
+            <a:avLst/>
+          </a:prstGeom>
+          <a:noFill/>
+          <a:ln w="38160">
+            <a:solidFill>
+              <a:srgbClr val="3faf46"/>
+            </a:solidFill>
+            <a:round/>
+          </a:ln>
+        </p:spPr>
+        <p:style>
+          <a:lnRef idx="0"/>
+          <a:fillRef idx="0"/>
+          <a:effectRef idx="0"/>
+          <a:fontRef idx="minor"/>
+        </p:style>
+        <p:txBody>
+          <a:bodyPr lIns="109080" rIns="109080" tIns="64080" bIns="64080" anchor="t">
+            <a:noAutofit/>
+          </a:bodyPr>
+          <a:p>
+            <a:pPr>
+              <a:lnSpc>
+                <a:spcPct val="100000"/>
+              </a:lnSpc>
+            </a:pPr>
+            <a:r>
+              <a:rPr b="0" lang="en-US" sz="1800" spc="-1" strike="noStrike">
+                <a:solidFill>
+                  <a:srgbClr val="000000"/>
+                </a:solidFill>
+                <a:latin typeface="Arial"/>
+                <a:ea typeface="DejaVu Sans"/>
+              </a:rPr>
+              <a:t>Protected Inputs to Instrumentation Amplifier IC</a:t>
+            </a:r>
+            <a:endParaRPr b="0" lang="en-US" sz="1800" spc="-1" strike="noStrike">
+              <a:solidFill>
+                <a:srgbClr val="000000"/>
+              </a:solidFill>
+              <a:latin typeface="Arial"/>
+            </a:endParaRPr>
+          </a:p>
+        </p:txBody>
+      </p:sp>
+      <p:sp>
+        <p:nvSpPr>
+          <p:cNvPr id="61" name=""/>
+          <p:cNvSpPr/>
+          <p:nvPr/>
+        </p:nvSpPr>
+        <p:spPr>
+          <a:xfrm>
+            <a:off x="24231600" y="3886200"/>
+            <a:ext cx="2285640" cy="913680"/>
+          </a:xfrm>
+          <a:prstGeom prst="rect">
+            <a:avLst/>
+          </a:prstGeom>
+          <a:noFill/>
+          <a:ln w="38160">
+            <a:solidFill>
+              <a:srgbClr val="3faf46"/>
+            </a:solidFill>
+            <a:round/>
+          </a:ln>
+        </p:spPr>
+        <p:style>
+          <a:lnRef idx="0"/>
+          <a:fillRef idx="0"/>
+          <a:effectRef idx="0"/>
+          <a:fontRef idx="minor"/>
+        </p:style>
+        <p:txBody>
+          <a:bodyPr lIns="109080" rIns="109080" tIns="64080" bIns="64080" anchor="t">
+            <a:noAutofit/>
+          </a:bodyPr>
+          <a:p>
+            <a:pPr>
+              <a:lnSpc>
+                <a:spcPct val="100000"/>
+              </a:lnSpc>
+            </a:pPr>
+            <a:r>
+              <a:rPr b="0" lang="en-US" sz="1800" spc="-1" strike="noStrike">
+                <a:solidFill>
+                  <a:srgbClr val="000000"/>
+                </a:solidFill>
+                <a:latin typeface="Arial"/>
+                <a:ea typeface="DejaVu Sans"/>
+              </a:rPr>
+              <a:t>AC Coupled and Buffered Output</a:t>
+            </a:r>
+            <a:endParaRPr b="0" lang="en-US" sz="1800" spc="-1" strike="noStrike">
+              <a:solidFill>
+                <a:srgbClr val="000000"/>
+              </a:solidFill>
+              <a:latin typeface="Arial"/>
+            </a:endParaRPr>
+          </a:p>
+        </p:txBody>
+      </p:sp>
+      <p:sp>
+        <p:nvSpPr>
+          <p:cNvPr id="62" name=""/>
+          <p:cNvSpPr/>
+          <p:nvPr/>
+        </p:nvSpPr>
+        <p:spPr>
+          <a:xfrm>
+            <a:off x="25374600" y="3657600"/>
+            <a:ext cx="360" cy="266760"/>
+          </a:xfrm>
+          <a:prstGeom prst="line">
+            <a:avLst/>
+          </a:prstGeom>
+          <a:ln w="38160">
+            <a:solidFill>
+              <a:srgbClr val="3faf46"/>
+            </a:solidFill>
+            <a:round/>
+            <a:tailEnd len="med" type="triangle" w="med"/>
+          </a:ln>
+        </p:spPr>
+        <p:style>
+          <a:lnRef idx="0"/>
+          <a:fillRef idx="0"/>
+          <a:effectRef idx="0"/>
+          <a:fontRef idx="minor"/>
+        </p:style>
+        <p:txBody>
+          <a:bodyPr lIns="90000" rIns="90000" tIns="45000" bIns="45000" anchor="t" anchorCtr="1">
+            <a:noAutofit/>
+          </a:bodyPr>
+          <a:p>
+            <a:endParaRPr b="0" lang="en-US" sz="1800" spc="-1" strike="noStrike">
+              <a:solidFill>
+                <a:srgbClr val="000000"/>
+              </a:solidFill>
+              <a:latin typeface="Arial"/>
+              <a:ea typeface="DejaVu Sans"/>
+            </a:endParaRPr>
+          </a:p>
+        </p:txBody>
+      </p:sp>
+      <p:sp>
+        <p:nvSpPr>
+          <p:cNvPr id="63" name=""/>
+          <p:cNvSpPr/>
+          <p:nvPr/>
+        </p:nvSpPr>
+        <p:spPr>
+          <a:xfrm>
+            <a:off x="26713080" y="3657600"/>
+            <a:ext cx="490320" cy="360"/>
+          </a:xfrm>
+          <a:prstGeom prst="line">
+            <a:avLst/>
+          </a:prstGeom>
+          <a:ln w="38160">
+            <a:solidFill>
+              <a:srgbClr val="3faf46"/>
+            </a:solidFill>
+            <a:round/>
+            <a:tailEnd len="med" type="triangle" w="med"/>
+          </a:ln>
+        </p:spPr>
+        <p:style>
+          <a:lnRef idx="0"/>
+          <a:fillRef idx="0"/>
+          <a:effectRef idx="0"/>
+          <a:fontRef idx="minor"/>
+        </p:style>
+        <p:txBody>
+          <a:bodyPr lIns="90000" rIns="90000" tIns="-45000" bIns="-45000" anchor="t" anchorCtr="1">
+            <a:noAutofit/>
+          </a:bodyPr>
+          <a:p>
+            <a:endParaRPr b="0" lang="en-US" sz="1800" spc="-1" strike="noStrike">
+              <a:solidFill>
+                <a:srgbClr val="000000"/>
+              </a:solidFill>
+              <a:latin typeface="Arial"/>
+              <a:ea typeface="DejaVu Sans"/>
+            </a:endParaRPr>
+          </a:p>
+        </p:txBody>
+      </p:sp>
+      <p:sp>
+        <p:nvSpPr>
+          <p:cNvPr id="64" name=""/>
+          <p:cNvSpPr/>
+          <p:nvPr/>
+        </p:nvSpPr>
+        <p:spPr>
+          <a:xfrm>
+            <a:off x="30403800" y="3657600"/>
+            <a:ext cx="457200" cy="360"/>
+          </a:xfrm>
+          <a:prstGeom prst="line">
+            <a:avLst/>
+          </a:prstGeom>
+          <a:ln w="38160">
+            <a:solidFill>
+              <a:srgbClr val="3faf46"/>
+            </a:solidFill>
+            <a:round/>
+            <a:tailEnd len="med" type="triangle" w="med"/>
+          </a:ln>
+        </p:spPr>
+        <p:style>
+          <a:lnRef idx="0"/>
+          <a:fillRef idx="0"/>
+          <a:effectRef idx="0"/>
+          <a:fontRef idx="minor"/>
+        </p:style>
+        <p:txBody>
+          <a:bodyPr lIns="90000" rIns="90000" tIns="-45000" bIns="-45000" anchor="t" anchorCtr="1">
+            <a:noAutofit/>
+          </a:bodyPr>
+          <a:p>
+            <a:endParaRPr b="0" lang="en-US" sz="1800" spc="-1" strike="noStrike">
+              <a:solidFill>
+                <a:srgbClr val="000000"/>
+              </a:solidFill>
+              <a:latin typeface="Arial"/>
+              <a:ea typeface="DejaVu Sans"/>
+            </a:endParaRPr>
+          </a:p>
+        </p:txBody>
+      </p:sp>
+      <p:sp>
+        <p:nvSpPr>
+          <p:cNvPr id="65" name=""/>
+          <p:cNvSpPr/>
+          <p:nvPr/>
+        </p:nvSpPr>
+        <p:spPr>
+          <a:xfrm>
+            <a:off x="457200" y="6034320"/>
+            <a:ext cx="11986200" cy="4480920"/>
+          </a:xfrm>
+          <a:prstGeom prst="rect">
+            <a:avLst/>
+          </a:prstGeom>
+          <a:solidFill>
+            <a:srgbClr val="ffffff"/>
+          </a:solidFill>
+          <a:ln w="0">
+            <a:noFill/>
+          </a:ln>
+        </p:spPr>
+        <p:style>
+          <a:lnRef idx="0"/>
+          <a:fillRef idx="0"/>
+          <a:effectRef idx="0"/>
+          <a:fontRef idx="minor"/>
+        </p:style>
+        <p:txBody>
+          <a:bodyPr lIns="90000" rIns="90000" tIns="45000" bIns="45000" anchor="t">
+            <a:noAutofit/>
+          </a:bodyPr>
+          <a:p>
+            <a:pPr marL="228600">
+              <a:lnSpc>
+                <a:spcPct val="115000"/>
+              </a:lnSpc>
+            </a:pPr>
+            <a:r>
+              <a:rPr b="1" lang="en-US" sz="3200" spc="-1" strike="noStrike">
+                <a:solidFill>
+                  <a:srgbClr val="000000"/>
+                </a:solidFill>
+                <a:latin typeface="Arial"/>
+                <a:ea typeface="DejaVu Sans"/>
+              </a:rPr>
+              <a:t>Software/Hardware Overview</a:t>
+            </a:r>
+            <a:endParaRPr b="0" lang="en-US" sz="3200" spc="-1" strike="noStrike">
+              <a:solidFill>
+                <a:srgbClr val="000000"/>
+              </a:solidFill>
+              <a:latin typeface="Arial"/>
+            </a:endParaRPr>
+          </a:p>
+          <a:p>
+            <a:pPr marL="228600">
+              <a:lnSpc>
+                <a:spcPct val="115000"/>
+              </a:lnSpc>
+            </a:pPr>
+            <a:endParaRPr b="0" lang="en-US" sz="2400" spc="-1" strike="noStrike">
+              <a:solidFill>
+                <a:srgbClr val="000000"/>
+              </a:solidFill>
+              <a:latin typeface="Arial"/>
+            </a:endParaRPr>
+          </a:p>
+        </p:txBody>
+      </p:sp>
+      <p:sp>
+        <p:nvSpPr>
+          <p:cNvPr id="66" name=""/>
+          <p:cNvSpPr/>
+          <p:nvPr/>
+        </p:nvSpPr>
+        <p:spPr>
+          <a:xfrm>
+            <a:off x="12801600" y="6172200"/>
+            <a:ext cx="8458200" cy="4388400"/>
+          </a:xfrm>
+          <a:prstGeom prst="rect">
+            <a:avLst/>
+          </a:prstGeom>
+          <a:solidFill>
+            <a:srgbClr val="729fcf"/>
+          </a:solidFill>
+          <a:ln w="0">
+            <a:solidFill>
+              <a:srgbClr val="3465a4"/>
+            </a:solidFill>
+          </a:ln>
+        </p:spPr>
+        <p:style>
+          <a:lnRef idx="0"/>
+          <a:fillRef idx="0"/>
+          <a:effectRef idx="0"/>
+          <a:fontRef idx="minor"/>
+        </p:style>
+        <p:txBody>
+          <a:bodyPr lIns="90000" rIns="90000" tIns="45000" bIns="45000" anchor="ctr">
+            <a:noAutofit/>
+          </a:bodyPr>
+          <a:p>
+            <a:pPr algn="ctr">
+              <a:lnSpc>
+                <a:spcPct val="100000"/>
+              </a:lnSpc>
+            </a:pPr>
+            <a:r>
+              <a:rPr b="0" lang="en-US" sz="4800" spc="-1" strike="noStrike">
+                <a:solidFill>
+                  <a:srgbClr val="000000"/>
+                </a:solidFill>
+                <a:latin typeface="Arial"/>
+                <a:ea typeface="DejaVu Sans"/>
+              </a:rPr>
+              <a:t>Illustration of Finger Detection/Thresholding</a:t>
+            </a:r>
+            <a:endParaRPr b="0" lang="en-US" sz="4800" spc="-1" strike="noStrike">
+              <a:solidFill>
+                <a:srgbClr val="000000"/>
+              </a:solidFill>
+              <a:latin typeface="Arial"/>
+            </a:endParaRPr>
+          </a:p>
+        </p:txBody>
+      </p:sp>
+      <p:sp>
+        <p:nvSpPr>
+          <p:cNvPr id="67" name=""/>
+          <p:cNvSpPr/>
+          <p:nvPr/>
+        </p:nvSpPr>
+        <p:spPr>
+          <a:xfrm>
+            <a:off x="457200" y="17602560"/>
+            <a:ext cx="22402800" cy="3885480"/>
+          </a:xfrm>
+          <a:prstGeom prst="rect">
+            <a:avLst/>
+          </a:prstGeom>
+          <a:solidFill>
+            <a:srgbClr val="ffffff"/>
+          </a:solidFill>
+          <a:ln w="0">
+            <a:noFill/>
+          </a:ln>
+        </p:spPr>
+        <p:style>
+          <a:lnRef idx="0"/>
+          <a:fillRef idx="0"/>
+          <a:effectRef idx="0"/>
+          <a:fontRef idx="minor"/>
+        </p:style>
+        <p:txBody>
+          <a:bodyPr lIns="90000" rIns="90000" tIns="45000" bIns="45000" anchor="t">
+            <a:noAutofit/>
+          </a:bodyPr>
+          <a:p>
+            <a:pPr marL="228600">
+              <a:lnSpc>
+                <a:spcPct val="115000"/>
+              </a:lnSpc>
+            </a:pPr>
+            <a:r>
+              <a:rPr b="1" lang="en-US" sz="3200" spc="-1" strike="noStrike">
+                <a:solidFill>
+                  <a:srgbClr val="000000"/>
+                </a:solidFill>
+                <a:latin typeface="Arial"/>
+                <a:ea typeface="DejaVu Sans"/>
+              </a:rPr>
+              <a:t>Conclusion</a:t>
+            </a:r>
+            <a:endParaRPr b="0" lang="en-US" sz="3200" spc="-1" strike="noStrike">
+              <a:solidFill>
+                <a:srgbClr val="000000"/>
+              </a:solidFill>
+              <a:latin typeface="Arial"/>
+            </a:endParaRPr>
+          </a:p>
+          <a:p>
+            <a:pPr marL="228600">
+              <a:lnSpc>
+                <a:spcPct val="115000"/>
+              </a:lnSpc>
+            </a:pPr>
+            <a:r>
+              <a:rPr b="0" lang="en-US" sz="2400" spc="-1" strike="noStrike">
+                <a:solidFill>
+                  <a:srgbClr val="000000"/>
+                </a:solidFill>
+                <a:latin typeface="Arial"/>
+                <a:ea typeface="DejaVu Sans"/>
+              </a:rPr>
+              <a:t>Compare amplifier characteristics between discrete inamp, breadboarded ina129, and assembled hardware. Design tradeoffs made, such as removing 60hz HP filter. Nature of MUAPs, long spacing and frequency components. Power supply noise rejection and grounding issues with amplifier. Conclude with what went right what went wrong, what to improve next time</a:t>
+            </a:r>
+            <a:endParaRPr b="0" lang="en-US" sz="2400" spc="-1" strike="noStrike">
+              <a:solidFill>
+                <a:srgbClr val="000000"/>
+              </a:solidFill>
+              <a:latin typeface="Arial"/>
+            </a:endParaRPr>
+          </a:p>
+        </p:txBody>
+      </p:sp>
+      <p:sp>
+        <p:nvSpPr>
+          <p:cNvPr id="68" name=""/>
+          <p:cNvSpPr/>
+          <p:nvPr/>
+        </p:nvSpPr>
+        <p:spPr>
+          <a:xfrm>
+            <a:off x="22860000" y="17601840"/>
+            <a:ext cx="9600840" cy="3886200"/>
+          </a:xfrm>
+          <a:prstGeom prst="rect">
+            <a:avLst/>
+          </a:prstGeom>
+          <a:solidFill>
+            <a:srgbClr val="ffffff"/>
+          </a:solidFill>
+          <a:ln w="0">
+            <a:noFill/>
+          </a:ln>
+        </p:spPr>
+        <p:style>
+          <a:lnRef idx="0"/>
+          <a:fillRef idx="0"/>
+          <a:effectRef idx="0"/>
+          <a:fontRef idx="minor"/>
+        </p:style>
+        <p:txBody>
+          <a:bodyPr lIns="90000" rIns="90000" tIns="45000" bIns="45000" anchor="t">
+            <a:noAutofit/>
+          </a:bodyPr>
+          <a:p>
+            <a:pPr marL="228600">
+              <a:lnSpc>
+                <a:spcPct val="115000"/>
+              </a:lnSpc>
+            </a:pPr>
+            <a:r>
+              <a:rPr b="1" lang="en-US" sz="2400" spc="-1" strike="noStrike">
+                <a:solidFill>
+                  <a:srgbClr val="000000"/>
+                </a:solidFill>
+                <a:latin typeface="Arial"/>
+                <a:ea typeface="DejaVu Sans"/>
+              </a:rPr>
+              <a:t>References and Inspiration</a:t>
+            </a:r>
+            <a:endParaRPr b="0" lang="en-US" sz="2400" spc="-1" strike="noStrike">
+              <a:solidFill>
+                <a:srgbClr val="000000"/>
+              </a:solidFill>
+              <a:latin typeface="Arial"/>
+            </a:endParaRPr>
+          </a:p>
+          <a:p>
+            <a:pPr marL="228600">
+              <a:lnSpc>
+                <a:spcPct val="115000"/>
+              </a:lnSpc>
+            </a:pPr>
+            <a:r>
+              <a:rPr b="0" lang="en-US" sz="2400" spc="-1" strike="noStrike">
+                <a:solidFill>
+                  <a:srgbClr val="000000"/>
+                </a:solidFill>
+                <a:latin typeface="Arial"/>
+                <a:ea typeface="DejaVu Sans"/>
+              </a:rPr>
+              <a:t>https://people.ece.cornell.edu/land/courses/ece4760/FinalProjects/f2016/mh2298_jyh37_sv376/mh2298_jyh37_sv376/mh2298_jyh37_sv376/index.html</a:t>
+            </a:r>
+            <a:endParaRPr b="0" lang="en-US" sz="2400" spc="-1" strike="noStrike">
+              <a:solidFill>
+                <a:srgbClr val="000000"/>
+              </a:solidFill>
+              <a:latin typeface="Arial"/>
+            </a:endParaRPr>
+          </a:p>
+        </p:txBody>
+      </p:sp>
+      <p:graphicFrame>
+        <p:nvGraphicFramePr>
+          <p:cNvPr id="69" name=""/>
+          <p:cNvGraphicFramePr/>
+          <p:nvPr/>
+        </p:nvGraphicFramePr>
+        <p:xfrm>
+          <a:off x="21945600" y="11887200"/>
+          <a:ext cx="10515240" cy="4952520"/>
+        </p:xfrm>
+        <a:graphic>
+          <a:graphicData uri="http://schemas.openxmlformats.org/drawingml/2006/chart">
+            <c:chart xmlns:c="http://schemas.openxmlformats.org/drawingml/2006/chart" xmlns:r="http://schemas.openxmlformats.org/officeDocument/2006/relationships" r:id="rId2"/>
+          </a:graphicData>
+        </a:graphic>
+      </p:graphicFrame>
+      <p:pic>
+        <p:nvPicPr>
+          <p:cNvPr id="70" name="" descr=""/>
+          <p:cNvPicPr/>
+          <p:nvPr/>
+        </p:nvPicPr>
+        <p:blipFill>
+          <a:blip r:embed="rId3"/>
+          <a:stretch/>
+        </p:blipFill>
+        <p:spPr>
+          <a:xfrm>
+            <a:off x="457200" y="10744200"/>
+            <a:ext cx="12115800" cy="6158880"/>
+          </a:xfrm>
+          <a:prstGeom prst="rect">
+            <a:avLst/>
+          </a:prstGeom>
+          <a:ln w="0">
+            <a:noFill/>
+          </a:ln>
+        </p:spPr>
+      </p:pic>
+      <p:sp>
+        <p:nvSpPr>
+          <p:cNvPr id="71" name=""/>
+          <p:cNvSpPr/>
+          <p:nvPr/>
+        </p:nvSpPr>
+        <p:spPr>
+          <a:xfrm>
+            <a:off x="21488400" y="5796360"/>
+            <a:ext cx="10972440" cy="1051560"/>
+          </a:xfrm>
+          <a:prstGeom prst="rect">
+            <a:avLst/>
+          </a:prstGeom>
+          <a:solidFill>
+            <a:srgbClr val="ffffff"/>
+          </a:solidFill>
+          <a:ln w="0">
+            <a:noFill/>
+          </a:ln>
+        </p:spPr>
+        <p:style>
+          <a:lnRef idx="0"/>
+          <a:fillRef idx="0"/>
+          <a:effectRef idx="0"/>
+          <a:fontRef idx="minor"/>
+        </p:style>
+        <p:txBody>
+          <a:bodyPr lIns="90000" rIns="90000" tIns="45000" bIns="45000" anchor="t">
+            <a:noAutofit/>
+          </a:bodyPr>
+          <a:p>
+            <a:pPr marL="228600">
+              <a:lnSpc>
+                <a:spcPct val="115000"/>
+              </a:lnSpc>
+            </a:pPr>
+            <a:r>
+              <a:rPr b="0" lang="en-US" sz="1800" spc="-1" strike="noStrike">
+                <a:solidFill>
+                  <a:srgbClr val="000000"/>
+                </a:solidFill>
+                <a:latin typeface="Arial"/>
+                <a:ea typeface="DejaVu Sans"/>
+              </a:rPr>
+              <a:t>Block Diagram showing the acquisition and processing chain for the EMG signals. Muscle activations are sent into the amplifier, which is conditioned so that the onboard ADC of the Teensy can acquire it properly. A 40kHz periodic sample is taken, processed slightly, and used to make a decision on the activation of the robotic hand</a:t>
+            </a:r>
+            <a:endParaRPr b="0" lang="en-US" sz="1800" spc="-1" strike="noStrike">
+              <a:solidFill>
+                <a:srgbClr val="000000"/>
+              </a:solidFill>
+              <a:latin typeface="Arial"/>
+            </a:endParaRPr>
+          </a:p>
+        </p:txBody>
+      </p:sp>
+      <p:sp>
+        <p:nvSpPr>
+          <p:cNvPr id="72" name=""/>
+          <p:cNvSpPr/>
+          <p:nvPr/>
+        </p:nvSpPr>
+        <p:spPr>
+          <a:xfrm>
+            <a:off x="457200" y="16903440"/>
+            <a:ext cx="12115800" cy="698400"/>
+          </a:xfrm>
+          <a:prstGeom prst="rect">
+            <a:avLst/>
+          </a:prstGeom>
+          <a:solidFill>
+            <a:srgbClr val="ffffff"/>
+          </a:solidFill>
+          <a:ln w="0">
+            <a:noFill/>
+          </a:ln>
+        </p:spPr>
+        <p:style>
+          <a:lnRef idx="0"/>
+          <a:fillRef idx="0"/>
+          <a:effectRef idx="0"/>
+          <a:fontRef idx="minor"/>
+        </p:style>
+        <p:txBody>
+          <a:bodyPr lIns="90000" rIns="90000" tIns="45000" bIns="45000" anchor="t">
+            <a:noAutofit/>
+          </a:bodyPr>
+          <a:p>
+            <a:pPr marL="228600">
+              <a:lnSpc>
+                <a:spcPct val="115000"/>
+              </a:lnSpc>
+            </a:pPr>
+            <a:r>
+              <a:rPr b="0" lang="en-US" sz="1800" spc="-1" strike="noStrike">
+                <a:solidFill>
+                  <a:srgbClr val="000000"/>
+                </a:solidFill>
+                <a:latin typeface="Arial"/>
+                <a:ea typeface="DejaVu Sans"/>
+              </a:rPr>
+              <a:t>A render of the revision 2 amplifier PCB, altered from the manufactured version for clarity. Large silkscreen text is used to emphasize the regions of the board and their operation</a:t>
+            </a:r>
+            <a:endParaRPr b="0" lang="en-US" sz="1800" spc="-1" strike="noStrike">
+              <a:solidFill>
+                <a:srgbClr val="000000"/>
+              </a:solidFill>
+              <a:latin typeface="Arial"/>
+            </a:endParaRPr>
+          </a:p>
+        </p:txBody>
+      </p:sp>
+      <p:sp>
+        <p:nvSpPr>
+          <p:cNvPr id="73" name=""/>
+          <p:cNvSpPr/>
+          <p:nvPr/>
+        </p:nvSpPr>
+        <p:spPr>
+          <a:xfrm>
+            <a:off x="4182840" y="4572000"/>
+            <a:ext cx="12047760" cy="2057400"/>
           </a:xfrm>
           <a:prstGeom prst="rect">
             <a:avLst/>
@@ -28393,1601 +29904,6 @@
               <a:t>32Point = 0.5 inch High</a:t>
             </a:r>
             <a:endParaRPr b="0" lang="en-US" sz="3200" spc="-1" strike="noStrike">
-              <a:solidFill>
-                <a:srgbClr val="000000"/>
-              </a:solidFill>
-              <a:latin typeface="Arial"/>
-            </a:endParaRPr>
-          </a:p>
-        </p:txBody>
-      </p:sp>
-      <p:sp>
-        <p:nvSpPr>
-          <p:cNvPr id="45" name=""/>
-          <p:cNvSpPr/>
-          <p:nvPr/>
-        </p:nvSpPr>
-        <p:spPr>
-          <a:xfrm>
-            <a:off x="13845600" y="5943600"/>
-            <a:ext cx="7642800" cy="5029200"/>
-          </a:xfrm>
-          <a:prstGeom prst="rect">
-            <a:avLst/>
-          </a:prstGeom>
-          <a:solidFill>
-            <a:srgbClr val="729fcf"/>
-          </a:solidFill>
-          <a:ln w="0">
-            <a:solidFill>
-              <a:srgbClr val="3465a4"/>
-            </a:solidFill>
-          </a:ln>
-        </p:spPr>
-        <p:style>
-          <a:lnRef idx="0"/>
-          <a:fillRef idx="0"/>
-          <a:effectRef idx="0"/>
-          <a:fontRef idx="minor"/>
-        </p:style>
-        <p:txBody>
-          <a:bodyPr lIns="90000" rIns="90000" tIns="45000" bIns="45000" anchor="ctr">
-            <a:noAutofit/>
-          </a:bodyPr>
-          <a:p>
-            <a:pPr algn="ctr">
-              <a:lnSpc>
-                <a:spcPct val="100000"/>
-              </a:lnSpc>
-            </a:pPr>
-            <a:r>
-              <a:rPr b="0" lang="en-US" sz="4800" spc="-1" strike="noStrike">
-                <a:solidFill>
-                  <a:srgbClr val="000000"/>
-                </a:solidFill>
-                <a:latin typeface="Arial"/>
-                <a:ea typeface="DejaVu Sans"/>
-              </a:rPr>
-              <a:t>Picture of Complete Project Here</a:t>
-            </a:r>
-            <a:endParaRPr b="0" lang="en-US" sz="4800" spc="-1" strike="noStrike">
-              <a:solidFill>
-                <a:srgbClr val="000000"/>
-              </a:solidFill>
-              <a:latin typeface="Arial"/>
-            </a:endParaRPr>
-          </a:p>
-        </p:txBody>
-      </p:sp>
-      <p:sp>
-        <p:nvSpPr>
-          <p:cNvPr id="46" name=""/>
-          <p:cNvSpPr/>
-          <p:nvPr/>
-        </p:nvSpPr>
-        <p:spPr>
-          <a:xfrm>
-            <a:off x="586800" y="2194560"/>
-            <a:ext cx="17633160" cy="3840120"/>
-          </a:xfrm>
-          <a:prstGeom prst="rect">
-            <a:avLst/>
-          </a:prstGeom>
-          <a:solidFill>
-            <a:srgbClr val="ffffff"/>
-          </a:solidFill>
-          <a:ln w="0">
-            <a:noFill/>
-          </a:ln>
-        </p:spPr>
-        <p:style>
-          <a:lnRef idx="0"/>
-          <a:fillRef idx="0"/>
-          <a:effectRef idx="0"/>
-          <a:fontRef idx="minor"/>
-        </p:style>
-        <p:txBody>
-          <a:bodyPr lIns="90000" rIns="90000" tIns="45000" bIns="45000" anchor="t">
-            <a:noAutofit/>
-          </a:bodyPr>
-          <a:p>
-            <a:pPr marL="228600">
-              <a:lnSpc>
-                <a:spcPct val="115000"/>
-              </a:lnSpc>
-            </a:pPr>
-            <a:r>
-              <a:rPr b="1" lang="en-US" sz="3200" spc="-1" strike="noStrike">
-                <a:solidFill>
-                  <a:srgbClr val="000000"/>
-                </a:solidFill>
-                <a:latin typeface="Arial"/>
-                <a:ea typeface="DejaVu Sans"/>
-              </a:rPr>
-              <a:t>Abstract</a:t>
-            </a:r>
-            <a:endParaRPr b="0" lang="en-US" sz="3200" spc="-1" strike="noStrike">
-              <a:solidFill>
-                <a:srgbClr val="000000"/>
-              </a:solidFill>
-              <a:latin typeface="Arial"/>
-            </a:endParaRPr>
-          </a:p>
-          <a:p>
-            <a:pPr marL="228600">
-              <a:lnSpc>
-                <a:spcPct val="115000"/>
-              </a:lnSpc>
-            </a:pPr>
-            <a:r>
-              <a:rPr b="0" lang="en-US" sz="2400" spc="-1" strike="noStrike">
-                <a:solidFill>
-                  <a:srgbClr val="000000"/>
-                </a:solidFill>
-                <a:latin typeface="Arial"/>
-                <a:ea typeface="DejaVu Sans"/>
-              </a:rPr>
-              <a:t>The objective of this project was to discover the fundamentals of signal acquisition and processing, in a situation requiring extremely precise hardware requirements in order to achieve both common mode signal rejection and extremely high gain. Because this is a medical device, considerations of safety had to be made as well. The final product is a printed circuit board designed around the Texas Instruments INA82x that handles differential gain, with input resistance to limit the shock hazard were a fault to occur. The amplified input signal is processed so that a microcontroller is able to determine what command the signal is closest to.</a:t>
-            </a:r>
-            <a:endParaRPr b="0" lang="en-US" sz="2400" spc="-1" strike="noStrike">
-              <a:solidFill>
-                <a:srgbClr val="000000"/>
-              </a:solidFill>
-              <a:latin typeface="Arial"/>
-            </a:endParaRPr>
-          </a:p>
-        </p:txBody>
-      </p:sp>
-      <p:graphicFrame>
-        <p:nvGraphicFramePr>
-          <p:cNvPr id="47" name=""/>
-          <p:cNvGraphicFramePr/>
-          <p:nvPr/>
-        </p:nvGraphicFramePr>
-        <p:xfrm>
-          <a:off x="21945600" y="7086600"/>
-          <a:ext cx="10515600" cy="4800600"/>
-        </p:xfrm>
-        <a:graphic>
-          <a:graphicData uri="http://schemas.openxmlformats.org/drawingml/2006/chart">
-            <c:chart xmlns:c="http://schemas.openxmlformats.org/drawingml/2006/chart" xmlns:r="http://schemas.openxmlformats.org/officeDocument/2006/relationships" r:id="rId1"/>
-          </a:graphicData>
-        </a:graphic>
-      </p:graphicFrame>
-      <p:sp>
-        <p:nvSpPr>
-          <p:cNvPr id="48" name=""/>
-          <p:cNvSpPr/>
-          <p:nvPr/>
-        </p:nvSpPr>
-        <p:spPr>
-          <a:xfrm>
-            <a:off x="21488400" y="1600200"/>
-            <a:ext cx="10972800" cy="4114800"/>
-          </a:xfrm>
-          <a:prstGeom prst="rect">
-            <a:avLst/>
-          </a:prstGeom>
-          <a:noFill/>
-          <a:ln w="76320">
-            <a:solidFill>
-              <a:srgbClr val="3faf46"/>
-            </a:solidFill>
-            <a:round/>
-          </a:ln>
-        </p:spPr>
-        <p:style>
-          <a:lnRef idx="0"/>
-          <a:fillRef idx="0"/>
-          <a:effectRef idx="0"/>
-          <a:fontRef idx="minor"/>
-        </p:style>
-        <p:txBody>
-          <a:bodyPr lIns="127800" rIns="127800" tIns="82800" bIns="82800" anchor="t">
-            <a:noAutofit/>
-          </a:bodyPr>
-          <a:p>
-            <a:pPr>
-              <a:lnSpc>
-                <a:spcPct val="100000"/>
-              </a:lnSpc>
-            </a:pPr>
-            <a:r>
-              <a:rPr b="0" lang="en-US" sz="3200" spc="-1" strike="noStrike">
-                <a:solidFill>
-                  <a:srgbClr val="000000"/>
-                </a:solidFill>
-                <a:latin typeface="Arial"/>
-                <a:ea typeface="DejaVu Sans"/>
-              </a:rPr>
-              <a:t>Block Diagram</a:t>
-            </a:r>
-            <a:endParaRPr b="0" lang="en-US" sz="3200" spc="-1" strike="noStrike">
-              <a:solidFill>
-                <a:srgbClr val="000000"/>
-              </a:solidFill>
-              <a:latin typeface="Arial"/>
-            </a:endParaRPr>
-          </a:p>
-        </p:txBody>
-      </p:sp>
-      <p:sp>
-        <p:nvSpPr>
-          <p:cNvPr id="49" name=""/>
-          <p:cNvSpPr/>
-          <p:nvPr/>
-        </p:nvSpPr>
-        <p:spPr>
-          <a:xfrm>
-            <a:off x="21717000" y="3200400"/>
-            <a:ext cx="1761840" cy="914400"/>
-          </a:xfrm>
-          <a:prstGeom prst="rect">
-            <a:avLst/>
-          </a:prstGeom>
-          <a:noFill/>
-          <a:ln w="57240">
-            <a:solidFill>
-              <a:srgbClr val="3faf46"/>
-            </a:solidFill>
-            <a:round/>
-          </a:ln>
-        </p:spPr>
-        <p:style>
-          <a:lnRef idx="0"/>
-          <a:fillRef idx="0"/>
-          <a:effectRef idx="0"/>
-          <a:fontRef idx="minor"/>
-        </p:style>
-        <p:txBody>
-          <a:bodyPr lIns="118440" rIns="118440" tIns="73440" bIns="73440" anchor="t">
-            <a:noAutofit/>
-          </a:bodyPr>
-          <a:p>
-            <a:pPr>
-              <a:lnSpc>
-                <a:spcPct val="100000"/>
-              </a:lnSpc>
-            </a:pPr>
-            <a:r>
-              <a:rPr b="0" lang="en-US" sz="2400" spc="-1" strike="noStrike">
-                <a:solidFill>
-                  <a:srgbClr val="000000"/>
-                </a:solidFill>
-                <a:latin typeface="Arial"/>
-                <a:ea typeface="DejaVu Sans"/>
-              </a:rPr>
-              <a:t>Surface EMG Pads</a:t>
-            </a:r>
-            <a:endParaRPr b="0" lang="en-US" sz="2400" spc="-1" strike="noStrike">
-              <a:solidFill>
-                <a:srgbClr val="000000"/>
-              </a:solidFill>
-              <a:latin typeface="Arial"/>
-            </a:endParaRPr>
-          </a:p>
-        </p:txBody>
-      </p:sp>
-      <p:sp>
-        <p:nvSpPr>
-          <p:cNvPr id="50" name=""/>
-          <p:cNvSpPr/>
-          <p:nvPr/>
-        </p:nvSpPr>
-        <p:spPr>
-          <a:xfrm>
-            <a:off x="24003000" y="2057400"/>
-            <a:ext cx="2709000" cy="3200400"/>
-          </a:xfrm>
-          <a:prstGeom prst="rect">
-            <a:avLst/>
-          </a:prstGeom>
-          <a:noFill/>
-          <a:ln w="57240">
-            <a:solidFill>
-              <a:srgbClr val="3faf46"/>
-            </a:solidFill>
-            <a:round/>
-          </a:ln>
-        </p:spPr>
-        <p:style>
-          <a:lnRef idx="0"/>
-          <a:fillRef idx="0"/>
-          <a:effectRef idx="0"/>
-          <a:fontRef idx="minor"/>
-        </p:style>
-        <p:txBody>
-          <a:bodyPr lIns="118440" rIns="118440" tIns="73440" bIns="73440" anchor="t">
-            <a:noAutofit/>
-          </a:bodyPr>
-          <a:p>
-            <a:pPr>
-              <a:lnSpc>
-                <a:spcPct val="100000"/>
-              </a:lnSpc>
-            </a:pPr>
-            <a:r>
-              <a:rPr b="0" lang="en-US" sz="2400" spc="-1" strike="noStrike">
-                <a:solidFill>
-                  <a:srgbClr val="000000"/>
-                </a:solidFill>
-                <a:latin typeface="Arial"/>
-                <a:ea typeface="DejaVu Sans"/>
-              </a:rPr>
-              <a:t>Amplifier</a:t>
-            </a:r>
-            <a:endParaRPr b="0" lang="en-US" sz="2400" spc="-1" strike="noStrike">
-              <a:solidFill>
-                <a:srgbClr val="000000"/>
-              </a:solidFill>
-              <a:latin typeface="Arial"/>
-            </a:endParaRPr>
-          </a:p>
-        </p:txBody>
-      </p:sp>
-      <p:sp>
-        <p:nvSpPr>
-          <p:cNvPr id="51" name=""/>
-          <p:cNvSpPr/>
-          <p:nvPr/>
-        </p:nvSpPr>
-        <p:spPr>
-          <a:xfrm>
-            <a:off x="27203400" y="1828800"/>
-            <a:ext cx="3200400" cy="3657600"/>
-          </a:xfrm>
-          <a:prstGeom prst="rect">
-            <a:avLst/>
-          </a:prstGeom>
-          <a:noFill/>
-          <a:ln w="57240">
-            <a:solidFill>
-              <a:srgbClr val="3faf46"/>
-            </a:solidFill>
-            <a:round/>
-          </a:ln>
-        </p:spPr>
-        <p:style>
-          <a:lnRef idx="0"/>
-          <a:fillRef idx="0"/>
-          <a:effectRef idx="0"/>
-          <a:fontRef idx="minor"/>
-        </p:style>
-        <p:txBody>
-          <a:bodyPr lIns="118080" rIns="118080" tIns="73080" bIns="73080" anchor="t">
-            <a:noAutofit/>
-          </a:bodyPr>
-          <a:p>
-            <a:pPr>
-              <a:lnSpc>
-                <a:spcPct val="100000"/>
-              </a:lnSpc>
-            </a:pPr>
-            <a:r>
-              <a:rPr b="0" lang="en-US" sz="2400" spc="-1" strike="noStrike">
-                <a:solidFill>
-                  <a:srgbClr val="000000"/>
-                </a:solidFill>
-                <a:latin typeface="Arial"/>
-                <a:ea typeface="DejaVu Sans"/>
-              </a:rPr>
-              <a:t>MCU (Teensy 4.1)</a:t>
-            </a:r>
-            <a:endParaRPr b="0" lang="en-US" sz="2400" spc="-1" strike="noStrike">
-              <a:solidFill>
-                <a:srgbClr val="000000"/>
-              </a:solidFill>
-              <a:latin typeface="Arial"/>
-            </a:endParaRPr>
-          </a:p>
-        </p:txBody>
-      </p:sp>
-      <p:sp>
-        <p:nvSpPr>
-          <p:cNvPr id="52" name=""/>
-          <p:cNvSpPr/>
-          <p:nvPr/>
-        </p:nvSpPr>
-        <p:spPr>
-          <a:xfrm>
-            <a:off x="30861000" y="3200400"/>
-            <a:ext cx="1371600" cy="822600"/>
-          </a:xfrm>
-          <a:prstGeom prst="rect">
-            <a:avLst/>
-          </a:prstGeom>
-          <a:noFill/>
-          <a:ln w="57240">
-            <a:solidFill>
-              <a:srgbClr val="3faf46"/>
-            </a:solidFill>
-            <a:round/>
-          </a:ln>
-        </p:spPr>
-        <p:style>
-          <a:lnRef idx="0"/>
-          <a:fillRef idx="0"/>
-          <a:effectRef idx="0"/>
-          <a:fontRef idx="minor"/>
-        </p:style>
-        <p:txBody>
-          <a:bodyPr lIns="118800" rIns="118800" tIns="73800" bIns="73800" anchor="t">
-            <a:noAutofit/>
-          </a:bodyPr>
-          <a:p>
-            <a:pPr>
-              <a:lnSpc>
-                <a:spcPct val="100000"/>
-              </a:lnSpc>
-            </a:pPr>
-            <a:r>
-              <a:rPr b="0" lang="en-US" sz="2400" spc="-1" strike="noStrike">
-                <a:solidFill>
-                  <a:srgbClr val="000000"/>
-                </a:solidFill>
-                <a:latin typeface="Arial"/>
-                <a:ea typeface="DejaVu Sans"/>
-              </a:rPr>
-              <a:t>Robotic Hand</a:t>
-            </a:r>
-            <a:endParaRPr b="0" lang="en-US" sz="2400" spc="-1" strike="noStrike">
-              <a:solidFill>
-                <a:srgbClr val="000000"/>
-              </a:solidFill>
-              <a:latin typeface="Arial"/>
-            </a:endParaRPr>
-          </a:p>
-        </p:txBody>
-      </p:sp>
-      <p:sp>
-        <p:nvSpPr>
-          <p:cNvPr id="53" name=""/>
-          <p:cNvSpPr/>
-          <p:nvPr/>
-        </p:nvSpPr>
-        <p:spPr>
-          <a:xfrm>
-            <a:off x="27432000" y="3337560"/>
-            <a:ext cx="2677680" cy="777240"/>
-          </a:xfrm>
-          <a:prstGeom prst="rect">
-            <a:avLst/>
-          </a:prstGeom>
-          <a:noFill/>
-          <a:ln w="38160">
-            <a:solidFill>
-              <a:srgbClr val="3faf46"/>
-            </a:solidFill>
-            <a:round/>
-          </a:ln>
-        </p:spPr>
-        <p:style>
-          <a:lnRef idx="0"/>
-          <a:fillRef idx="0"/>
-          <a:effectRef idx="0"/>
-          <a:fontRef idx="minor"/>
-        </p:style>
-        <p:txBody>
-          <a:bodyPr lIns="109080" rIns="109080" tIns="64080" bIns="64080" anchor="t">
-            <a:noAutofit/>
-          </a:bodyPr>
-          <a:p>
-            <a:pPr>
-              <a:lnSpc>
-                <a:spcPct val="100000"/>
-              </a:lnSpc>
-            </a:pPr>
-            <a:r>
-              <a:rPr b="0" lang="en-US" sz="1800" spc="-1" strike="noStrike">
-                <a:solidFill>
-                  <a:srgbClr val="000000"/>
-                </a:solidFill>
-                <a:latin typeface="Arial"/>
-                <a:ea typeface="DejaVu Sans"/>
-              </a:rPr>
-              <a:t>Normalize, Rectify, and Amplify ADC Input</a:t>
-            </a:r>
-            <a:endParaRPr b="0" lang="en-US" sz="1800" spc="-1" strike="noStrike">
-              <a:solidFill>
-                <a:srgbClr val="000000"/>
-              </a:solidFill>
-              <a:latin typeface="Arial"/>
-            </a:endParaRPr>
-          </a:p>
-        </p:txBody>
-      </p:sp>
-      <p:sp>
-        <p:nvSpPr>
-          <p:cNvPr id="54" name=""/>
-          <p:cNvSpPr/>
-          <p:nvPr/>
-        </p:nvSpPr>
-        <p:spPr>
-          <a:xfrm>
-            <a:off x="27432000" y="4572360"/>
-            <a:ext cx="2677680" cy="685440"/>
-          </a:xfrm>
-          <a:prstGeom prst="rect">
-            <a:avLst/>
-          </a:prstGeom>
-          <a:noFill/>
-          <a:ln w="38160">
-            <a:solidFill>
-              <a:srgbClr val="f10d0c"/>
-            </a:solidFill>
-            <a:round/>
-          </a:ln>
-        </p:spPr>
-        <p:style>
-          <a:lnRef idx="0"/>
-          <a:fillRef idx="0"/>
-          <a:effectRef idx="0"/>
-          <a:fontRef idx="minor"/>
-        </p:style>
-        <p:txBody>
-          <a:bodyPr lIns="109080" rIns="109080" tIns="64080" bIns="64080" anchor="t">
-            <a:noAutofit/>
-          </a:bodyPr>
-          <a:p>
-            <a:pPr>
-              <a:lnSpc>
-                <a:spcPct val="100000"/>
-              </a:lnSpc>
-            </a:pPr>
-            <a:r>
-              <a:rPr b="0" lang="en-US" sz="1800" spc="-1" strike="noStrike">
-                <a:solidFill>
-                  <a:srgbClr val="000000"/>
-                </a:solidFill>
-                <a:latin typeface="Arial"/>
-                <a:ea typeface="DejaVu Sans"/>
-              </a:rPr>
-              <a:t>Finger Detection Algorithm</a:t>
-            </a:r>
-            <a:endParaRPr b="0" lang="en-US" sz="1800" spc="-1" strike="noStrike">
-              <a:solidFill>
-                <a:srgbClr val="000000"/>
-              </a:solidFill>
-              <a:latin typeface="Arial"/>
-            </a:endParaRPr>
-          </a:p>
-        </p:txBody>
-      </p:sp>
-      <p:sp>
-        <p:nvSpPr>
-          <p:cNvPr id="55" name=""/>
-          <p:cNvSpPr/>
-          <p:nvPr/>
-        </p:nvSpPr>
-        <p:spPr>
-          <a:xfrm>
-            <a:off x="27432000" y="2286360"/>
-            <a:ext cx="2677680" cy="685440"/>
-          </a:xfrm>
-          <a:prstGeom prst="rect">
-            <a:avLst/>
-          </a:prstGeom>
-          <a:noFill/>
-          <a:ln w="38160">
-            <a:solidFill>
-              <a:srgbClr val="3faf46"/>
-            </a:solidFill>
-            <a:round/>
-          </a:ln>
-        </p:spPr>
-        <p:style>
-          <a:lnRef idx="0"/>
-          <a:fillRef idx="0"/>
-          <a:effectRef idx="0"/>
-          <a:fontRef idx="minor"/>
-        </p:style>
-        <p:txBody>
-          <a:bodyPr lIns="109080" rIns="109080" tIns="64080" bIns="64080" anchor="t">
-            <a:noAutofit/>
-          </a:bodyPr>
-          <a:p>
-            <a:pPr>
-              <a:lnSpc>
-                <a:spcPct val="100000"/>
-              </a:lnSpc>
-            </a:pPr>
-            <a:r>
-              <a:rPr b="0" lang="en-US" sz="1800" spc="-1" strike="noStrike">
-                <a:solidFill>
-                  <a:srgbClr val="000000"/>
-                </a:solidFill>
-                <a:latin typeface="Arial"/>
-                <a:ea typeface="DejaVu Sans"/>
-              </a:rPr>
-              <a:t>Capture 1000 Samples at 40kHz with ADC</a:t>
-            </a:r>
-            <a:endParaRPr b="0" lang="en-US" sz="1800" spc="-1" strike="noStrike">
-              <a:solidFill>
-                <a:srgbClr val="000000"/>
-              </a:solidFill>
-              <a:latin typeface="Arial"/>
-            </a:endParaRPr>
-          </a:p>
-        </p:txBody>
-      </p:sp>
-      <p:sp>
-        <p:nvSpPr>
-          <p:cNvPr id="56" name=""/>
-          <p:cNvSpPr/>
-          <p:nvPr/>
-        </p:nvSpPr>
-        <p:spPr>
-          <a:xfrm>
-            <a:off x="28803600" y="4114800"/>
-            <a:ext cx="0" cy="457560"/>
-          </a:xfrm>
-          <a:prstGeom prst="line">
-            <a:avLst/>
-          </a:prstGeom>
-          <a:ln w="38160">
-            <a:solidFill>
-              <a:srgbClr val="3faf46"/>
-            </a:solidFill>
-            <a:round/>
-            <a:tailEnd len="med" type="triangle" w="med"/>
-          </a:ln>
-        </p:spPr>
-        <p:style>
-          <a:lnRef idx="0"/>
-          <a:fillRef idx="0"/>
-          <a:effectRef idx="0"/>
-          <a:fontRef idx="minor"/>
-        </p:style>
-        <p:txBody>
-          <a:bodyPr lIns="90000" rIns="90000" tIns="45000" bIns="45000" anchor="t" anchorCtr="1">
-            <a:noAutofit/>
-          </a:bodyPr>
-          <a:p>
-            <a:endParaRPr b="0" lang="en-US" sz="1800" spc="-1" strike="noStrike">
-              <a:solidFill>
-                <a:srgbClr val="000000"/>
-              </a:solidFill>
-              <a:latin typeface="Arial"/>
-            </a:endParaRPr>
-          </a:p>
-        </p:txBody>
-      </p:sp>
-      <p:sp>
-        <p:nvSpPr>
-          <p:cNvPr id="57" name=""/>
-          <p:cNvSpPr/>
-          <p:nvPr/>
-        </p:nvSpPr>
-        <p:spPr>
-          <a:xfrm>
-            <a:off x="28803600" y="2971800"/>
-            <a:ext cx="0" cy="365760"/>
-          </a:xfrm>
-          <a:prstGeom prst="line">
-            <a:avLst/>
-          </a:prstGeom>
-          <a:ln w="38160">
-            <a:solidFill>
-              <a:srgbClr val="3faf46"/>
-            </a:solidFill>
-            <a:round/>
-            <a:tailEnd len="med" type="triangle" w="med"/>
-          </a:ln>
-        </p:spPr>
-        <p:style>
-          <a:lnRef idx="0"/>
-          <a:fillRef idx="0"/>
-          <a:effectRef idx="0"/>
-          <a:fontRef idx="minor"/>
-        </p:style>
-        <p:txBody>
-          <a:bodyPr lIns="90000" rIns="90000" tIns="45000" bIns="45000" anchor="t" anchorCtr="1">
-            <a:noAutofit/>
-          </a:bodyPr>
-          <a:p>
-            <a:endParaRPr b="0" lang="en-US" sz="1800" spc="-1" strike="noStrike">
-              <a:solidFill>
-                <a:srgbClr val="000000"/>
-              </a:solidFill>
-              <a:latin typeface="Arial"/>
-            </a:endParaRPr>
-          </a:p>
-        </p:txBody>
-      </p:sp>
-      <p:sp>
-        <p:nvSpPr>
-          <p:cNvPr id="58" name=""/>
-          <p:cNvSpPr/>
-          <p:nvPr/>
-        </p:nvSpPr>
-        <p:spPr>
-          <a:xfrm>
-            <a:off x="23478840" y="3657600"/>
-            <a:ext cx="587880" cy="0"/>
-          </a:xfrm>
-          <a:prstGeom prst="line">
-            <a:avLst/>
-          </a:prstGeom>
-          <a:ln w="38160">
-            <a:solidFill>
-              <a:srgbClr val="3faf46"/>
-            </a:solidFill>
-            <a:round/>
-            <a:tailEnd len="med" type="triangle" w="med"/>
-          </a:ln>
-        </p:spPr>
-        <p:style>
-          <a:lnRef idx="0"/>
-          <a:fillRef idx="0"/>
-          <a:effectRef idx="0"/>
-          <a:fontRef idx="minor"/>
-        </p:style>
-        <p:txBody>
-          <a:bodyPr lIns="90000" rIns="90000" tIns="-45000" bIns="-45000" anchor="t" anchorCtr="1">
-            <a:noAutofit/>
-          </a:bodyPr>
-          <a:p>
-            <a:endParaRPr b="0" lang="en-US" sz="1800" spc="-1" strike="noStrike">
-              <a:solidFill>
-                <a:srgbClr val="000000"/>
-              </a:solidFill>
-              <a:latin typeface="Arial"/>
-            </a:endParaRPr>
-          </a:p>
-        </p:txBody>
-      </p:sp>
-      <p:sp>
-        <p:nvSpPr>
-          <p:cNvPr id="59" name=""/>
-          <p:cNvSpPr/>
-          <p:nvPr/>
-        </p:nvSpPr>
-        <p:spPr>
-          <a:xfrm>
-            <a:off x="360" y="360"/>
-            <a:ext cx="360" cy="360"/>
-          </a:xfrm>
-          <a:prstGeom prst="line">
-            <a:avLst/>
-          </a:prstGeom>
-          <a:ln w="38160">
-            <a:solidFill>
-              <a:srgbClr val="3465a4"/>
-            </a:solidFill>
-            <a:round/>
-            <a:tailEnd len="med" type="triangle" w="med"/>
-          </a:ln>
-        </p:spPr>
-        <p:style>
-          <a:lnRef idx="0"/>
-          <a:fillRef idx="0"/>
-          <a:effectRef idx="0"/>
-          <a:fontRef idx="minor"/>
-        </p:style>
-        <p:txBody>
-          <a:bodyPr lIns="90000" rIns="90000" tIns="-44640" bIns="-44640" anchor="t" anchorCtr="1">
-            <a:noAutofit/>
-          </a:bodyPr>
-          <a:p>
-            <a:endParaRPr b="0" lang="en-US" sz="1800" spc="-1" strike="noStrike">
-              <a:solidFill>
-                <a:srgbClr val="000000"/>
-              </a:solidFill>
-              <a:latin typeface="Arial"/>
-            </a:endParaRPr>
-          </a:p>
-        </p:txBody>
-      </p:sp>
-      <p:sp>
-        <p:nvSpPr>
-          <p:cNvPr id="60" name=""/>
-          <p:cNvSpPr/>
-          <p:nvPr/>
-        </p:nvSpPr>
-        <p:spPr>
-          <a:xfrm>
-            <a:off x="360" y="360"/>
-            <a:ext cx="360" cy="360"/>
-          </a:xfrm>
-          <a:prstGeom prst="line">
-            <a:avLst/>
-          </a:prstGeom>
-          <a:ln w="57240">
-            <a:solidFill>
-              <a:srgbClr val="3465a4"/>
-            </a:solidFill>
-            <a:round/>
-            <a:tailEnd len="med" type="triangle" w="med"/>
-          </a:ln>
-        </p:spPr>
-        <p:style>
-          <a:lnRef idx="0"/>
-          <a:fillRef idx="0"/>
-          <a:effectRef idx="0"/>
-          <a:fontRef idx="minor"/>
-        </p:style>
-        <p:txBody>
-          <a:bodyPr lIns="90000" rIns="90000" tIns="-44640" bIns="-44640" anchor="t" anchorCtr="1">
-            <a:noAutofit/>
-          </a:bodyPr>
-          <a:p>
-            <a:endParaRPr b="0" lang="en-US" sz="1800" spc="-1" strike="noStrike">
-              <a:solidFill>
-                <a:srgbClr val="000000"/>
-              </a:solidFill>
-              <a:latin typeface="Arial"/>
-            </a:endParaRPr>
-          </a:p>
-        </p:txBody>
-      </p:sp>
-      <p:sp>
-        <p:nvSpPr>
-          <p:cNvPr id="61" name=""/>
-          <p:cNvSpPr/>
-          <p:nvPr/>
-        </p:nvSpPr>
-        <p:spPr>
-          <a:xfrm>
-            <a:off x="24231600" y="2743200"/>
-            <a:ext cx="2286000" cy="914400"/>
-          </a:xfrm>
-          <a:prstGeom prst="rect">
-            <a:avLst/>
-          </a:prstGeom>
-          <a:noFill/>
-          <a:ln w="38160">
-            <a:solidFill>
-              <a:srgbClr val="3faf46"/>
-            </a:solidFill>
-            <a:round/>
-          </a:ln>
-        </p:spPr>
-        <p:style>
-          <a:lnRef idx="0"/>
-          <a:fillRef idx="0"/>
-          <a:effectRef idx="0"/>
-          <a:fontRef idx="minor"/>
-        </p:style>
-        <p:txBody>
-          <a:bodyPr lIns="109080" rIns="109080" tIns="64080" bIns="64080" anchor="t">
-            <a:noAutofit/>
-          </a:bodyPr>
-          <a:p>
-            <a:pPr>
-              <a:lnSpc>
-                <a:spcPct val="100000"/>
-              </a:lnSpc>
-            </a:pPr>
-            <a:r>
-              <a:rPr b="0" lang="en-US" sz="1800" spc="-1" strike="noStrike">
-                <a:solidFill>
-                  <a:srgbClr val="000000"/>
-                </a:solidFill>
-                <a:latin typeface="Arial"/>
-                <a:ea typeface="DejaVu Sans"/>
-              </a:rPr>
-              <a:t>Protected Inputs to Instrumentation Amplifier IC</a:t>
-            </a:r>
-            <a:endParaRPr b="0" lang="en-US" sz="1800" spc="-1" strike="noStrike">
-              <a:solidFill>
-                <a:srgbClr val="000000"/>
-              </a:solidFill>
-              <a:latin typeface="Arial"/>
-            </a:endParaRPr>
-          </a:p>
-        </p:txBody>
-      </p:sp>
-      <p:sp>
-        <p:nvSpPr>
-          <p:cNvPr id="62" name=""/>
-          <p:cNvSpPr/>
-          <p:nvPr/>
-        </p:nvSpPr>
-        <p:spPr>
-          <a:xfrm>
-            <a:off x="24231600" y="3886200"/>
-            <a:ext cx="2286000" cy="914040"/>
-          </a:xfrm>
-          <a:prstGeom prst="rect">
-            <a:avLst/>
-          </a:prstGeom>
-          <a:noFill/>
-          <a:ln w="38160">
-            <a:solidFill>
-              <a:srgbClr val="3faf46"/>
-            </a:solidFill>
-            <a:round/>
-          </a:ln>
-        </p:spPr>
-        <p:style>
-          <a:lnRef idx="0"/>
-          <a:fillRef idx="0"/>
-          <a:effectRef idx="0"/>
-          <a:fontRef idx="minor"/>
-        </p:style>
-        <p:txBody>
-          <a:bodyPr lIns="109080" rIns="109080" tIns="64080" bIns="64080" anchor="t">
-            <a:noAutofit/>
-          </a:bodyPr>
-          <a:p>
-            <a:pPr>
-              <a:lnSpc>
-                <a:spcPct val="100000"/>
-              </a:lnSpc>
-            </a:pPr>
-            <a:r>
-              <a:rPr b="0" lang="en-US" sz="1800" spc="-1" strike="noStrike">
-                <a:solidFill>
-                  <a:srgbClr val="000000"/>
-                </a:solidFill>
-                <a:latin typeface="Arial"/>
-                <a:ea typeface="DejaVu Sans"/>
-              </a:rPr>
-              <a:t>AC Coupled and Buffered Output</a:t>
-            </a:r>
-            <a:endParaRPr b="0" lang="en-US" sz="1800" spc="-1" strike="noStrike">
-              <a:solidFill>
-                <a:srgbClr val="000000"/>
-              </a:solidFill>
-              <a:latin typeface="Arial"/>
-            </a:endParaRPr>
-          </a:p>
-        </p:txBody>
-      </p:sp>
-      <p:sp>
-        <p:nvSpPr>
-          <p:cNvPr id="63" name=""/>
-          <p:cNvSpPr/>
-          <p:nvPr/>
-        </p:nvSpPr>
-        <p:spPr>
-          <a:xfrm>
-            <a:off x="25374600" y="3657600"/>
-            <a:ext cx="0" cy="266760"/>
-          </a:xfrm>
-          <a:prstGeom prst="line">
-            <a:avLst/>
-          </a:prstGeom>
-          <a:ln w="38160">
-            <a:solidFill>
-              <a:srgbClr val="3faf46"/>
-            </a:solidFill>
-            <a:round/>
-            <a:tailEnd len="med" type="triangle" w="med"/>
-          </a:ln>
-        </p:spPr>
-        <p:style>
-          <a:lnRef idx="0"/>
-          <a:fillRef idx="0"/>
-          <a:effectRef idx="0"/>
-          <a:fontRef idx="minor"/>
-        </p:style>
-        <p:txBody>
-          <a:bodyPr lIns="90000" rIns="90000" tIns="45000" bIns="45000" anchor="t" anchorCtr="1">
-            <a:noAutofit/>
-          </a:bodyPr>
-          <a:p>
-            <a:endParaRPr b="0" lang="en-US" sz="1800" spc="-1" strike="noStrike">
-              <a:solidFill>
-                <a:srgbClr val="000000"/>
-              </a:solidFill>
-              <a:latin typeface="Arial"/>
-            </a:endParaRPr>
-          </a:p>
-        </p:txBody>
-      </p:sp>
-      <p:sp>
-        <p:nvSpPr>
-          <p:cNvPr id="64" name=""/>
-          <p:cNvSpPr/>
-          <p:nvPr/>
-        </p:nvSpPr>
-        <p:spPr>
-          <a:xfrm>
-            <a:off x="26713080" y="3657600"/>
-            <a:ext cx="490320" cy="0"/>
-          </a:xfrm>
-          <a:prstGeom prst="line">
-            <a:avLst/>
-          </a:prstGeom>
-          <a:ln w="38160">
-            <a:solidFill>
-              <a:srgbClr val="3faf46"/>
-            </a:solidFill>
-            <a:round/>
-            <a:tailEnd len="med" type="triangle" w="med"/>
-          </a:ln>
-        </p:spPr>
-        <p:style>
-          <a:lnRef idx="0"/>
-          <a:fillRef idx="0"/>
-          <a:effectRef idx="0"/>
-          <a:fontRef idx="minor"/>
-        </p:style>
-        <p:txBody>
-          <a:bodyPr lIns="90000" rIns="90000" tIns="-45000" bIns="-45000" anchor="t" anchorCtr="1">
-            <a:noAutofit/>
-          </a:bodyPr>
-          <a:p>
-            <a:endParaRPr b="0" lang="en-US" sz="1800" spc="-1" strike="noStrike">
-              <a:solidFill>
-                <a:srgbClr val="000000"/>
-              </a:solidFill>
-              <a:latin typeface="Arial"/>
-            </a:endParaRPr>
-          </a:p>
-        </p:txBody>
-      </p:sp>
-      <p:sp>
-        <p:nvSpPr>
-          <p:cNvPr id="65" name=""/>
-          <p:cNvSpPr/>
-          <p:nvPr/>
-        </p:nvSpPr>
-        <p:spPr>
-          <a:xfrm>
-            <a:off x="30403800" y="3657600"/>
-            <a:ext cx="457200" cy="0"/>
-          </a:xfrm>
-          <a:prstGeom prst="line">
-            <a:avLst/>
-          </a:prstGeom>
-          <a:ln w="38160">
-            <a:solidFill>
-              <a:srgbClr val="3faf46"/>
-            </a:solidFill>
-            <a:round/>
-            <a:tailEnd len="med" type="triangle" w="med"/>
-          </a:ln>
-        </p:spPr>
-        <p:style>
-          <a:lnRef idx="0"/>
-          <a:fillRef idx="0"/>
-          <a:effectRef idx="0"/>
-          <a:fontRef idx="minor"/>
-        </p:style>
-        <p:txBody>
-          <a:bodyPr lIns="90000" rIns="90000" tIns="-45000" bIns="-45000" anchor="t" anchorCtr="1">
-            <a:noAutofit/>
-          </a:bodyPr>
-          <a:p>
-            <a:endParaRPr b="0" lang="en-US" sz="1800" spc="-1" strike="noStrike">
-              <a:solidFill>
-                <a:srgbClr val="000000"/>
-              </a:solidFill>
-              <a:latin typeface="Arial"/>
-            </a:endParaRPr>
-          </a:p>
-        </p:txBody>
-      </p:sp>
-      <p:sp>
-        <p:nvSpPr>
-          <p:cNvPr id="66" name=""/>
-          <p:cNvSpPr/>
-          <p:nvPr/>
-        </p:nvSpPr>
-        <p:spPr>
-          <a:xfrm>
-            <a:off x="586800" y="6034680"/>
-            <a:ext cx="13129200" cy="4252320"/>
-          </a:xfrm>
-          <a:prstGeom prst="rect">
-            <a:avLst/>
-          </a:prstGeom>
-          <a:solidFill>
-            <a:srgbClr val="ffffff"/>
-          </a:solidFill>
-          <a:ln w="0">
-            <a:noFill/>
-          </a:ln>
-        </p:spPr>
-        <p:style>
-          <a:lnRef idx="0"/>
-          <a:fillRef idx="0"/>
-          <a:effectRef idx="0"/>
-          <a:fontRef idx="minor"/>
-        </p:style>
-        <p:txBody>
-          <a:bodyPr lIns="90000" rIns="90000" tIns="45000" bIns="45000" anchor="t">
-            <a:noAutofit/>
-          </a:bodyPr>
-          <a:p>
-            <a:pPr marL="228600">
-              <a:lnSpc>
-                <a:spcPct val="115000"/>
-              </a:lnSpc>
-            </a:pPr>
-            <a:r>
-              <a:rPr b="1" lang="en-US" sz="3200" spc="-1" strike="noStrike">
-                <a:solidFill>
-                  <a:srgbClr val="000000"/>
-                </a:solidFill>
-                <a:latin typeface="Arial"/>
-                <a:ea typeface="DejaVu Sans"/>
-              </a:rPr>
-              <a:t>Software/Hardware Overview</a:t>
-            </a:r>
-            <a:endParaRPr b="0" lang="en-US" sz="3200" spc="-1" strike="noStrike">
-              <a:solidFill>
-                <a:srgbClr val="000000"/>
-              </a:solidFill>
-              <a:latin typeface="Arial"/>
-            </a:endParaRPr>
-          </a:p>
-          <a:p>
-            <a:pPr marL="228600">
-              <a:lnSpc>
-                <a:spcPct val="115000"/>
-              </a:lnSpc>
-            </a:pPr>
-            <a:endParaRPr b="0" lang="en-US" sz="2400" spc="-1" strike="noStrike">
-              <a:solidFill>
-                <a:srgbClr val="000000"/>
-              </a:solidFill>
-              <a:latin typeface="Arial"/>
-            </a:endParaRPr>
-          </a:p>
-        </p:txBody>
-      </p:sp>
-      <p:sp>
-        <p:nvSpPr>
-          <p:cNvPr id="67" name=""/>
-          <p:cNvSpPr/>
-          <p:nvPr/>
-        </p:nvSpPr>
-        <p:spPr>
-          <a:xfrm>
-            <a:off x="13845600" y="10972800"/>
-            <a:ext cx="7642800" cy="5988960"/>
-          </a:xfrm>
-          <a:prstGeom prst="rect">
-            <a:avLst/>
-          </a:prstGeom>
-          <a:solidFill>
-            <a:srgbClr val="729fcf"/>
-          </a:solidFill>
-          <a:ln w="0">
-            <a:solidFill>
-              <a:srgbClr val="3465a4"/>
-            </a:solidFill>
-          </a:ln>
-        </p:spPr>
-        <p:style>
-          <a:lnRef idx="0"/>
-          <a:fillRef idx="0"/>
-          <a:effectRef idx="0"/>
-          <a:fontRef idx="minor"/>
-        </p:style>
-        <p:txBody>
-          <a:bodyPr lIns="90000" rIns="90000" tIns="45000" bIns="45000" anchor="ctr">
-            <a:noAutofit/>
-          </a:bodyPr>
-          <a:p>
-            <a:pPr algn="ctr">
-              <a:lnSpc>
-                <a:spcPct val="100000"/>
-              </a:lnSpc>
-            </a:pPr>
-            <a:r>
-              <a:rPr b="0" lang="en-US" sz="4800" spc="-1" strike="noStrike">
-                <a:solidFill>
-                  <a:srgbClr val="000000"/>
-                </a:solidFill>
-                <a:latin typeface="Arial"/>
-                <a:ea typeface="DejaVu Sans"/>
-              </a:rPr>
-              <a:t>Picture of Probes on Arm, or many smaller pictures of physical setup</a:t>
-            </a:r>
-            <a:endParaRPr b="0" lang="en-US" sz="4800" spc="-1" strike="noStrike">
-              <a:solidFill>
-                <a:srgbClr val="000000"/>
-              </a:solidFill>
-              <a:latin typeface="Arial"/>
-            </a:endParaRPr>
-          </a:p>
-        </p:txBody>
-      </p:sp>
-      <p:sp>
-        <p:nvSpPr>
-          <p:cNvPr id="68" name=""/>
-          <p:cNvSpPr/>
-          <p:nvPr/>
-        </p:nvSpPr>
-        <p:spPr>
-          <a:xfrm>
-            <a:off x="586800" y="17373600"/>
-            <a:ext cx="31448880" cy="3200040"/>
-          </a:xfrm>
-          <a:prstGeom prst="rect">
-            <a:avLst/>
-          </a:prstGeom>
-          <a:solidFill>
-            <a:srgbClr val="ffffff"/>
-          </a:solidFill>
-          <a:ln w="0">
-            <a:noFill/>
-          </a:ln>
-        </p:spPr>
-        <p:style>
-          <a:lnRef idx="0"/>
-          <a:fillRef idx="0"/>
-          <a:effectRef idx="0"/>
-          <a:fontRef idx="minor"/>
-        </p:style>
-        <p:txBody>
-          <a:bodyPr lIns="90000" rIns="90000" tIns="45000" bIns="45000" anchor="t">
-            <a:noAutofit/>
-          </a:bodyPr>
-          <a:p>
-            <a:pPr marL="228600">
-              <a:lnSpc>
-                <a:spcPct val="115000"/>
-              </a:lnSpc>
-            </a:pPr>
-            <a:r>
-              <a:rPr b="1" lang="en-US" sz="3200" spc="-1" strike="noStrike">
-                <a:solidFill>
-                  <a:srgbClr val="000000"/>
-                </a:solidFill>
-                <a:latin typeface="Arial"/>
-                <a:ea typeface="DejaVu Sans"/>
-              </a:rPr>
-              <a:t>Conclusion</a:t>
-            </a:r>
-            <a:endParaRPr b="0" lang="en-US" sz="3200" spc="-1" strike="noStrike">
-              <a:solidFill>
-                <a:srgbClr val="000000"/>
-              </a:solidFill>
-              <a:latin typeface="Arial"/>
-            </a:endParaRPr>
-          </a:p>
-          <a:p>
-            <a:pPr marL="228600">
-              <a:lnSpc>
-                <a:spcPct val="115000"/>
-              </a:lnSpc>
-            </a:pPr>
-            <a:r>
-              <a:rPr b="0" lang="en-US" sz="2400" spc="-1" strike="noStrike">
-                <a:solidFill>
-                  <a:srgbClr val="000000"/>
-                </a:solidFill>
-                <a:latin typeface="Arial"/>
-                <a:ea typeface="DejaVu Sans"/>
-              </a:rPr>
-              <a:t>Compare amplifier characteristics between discrete inamp, breadboarded ina129, and assembled hardware. Design tradeoffs made, such as removing 60hz HP filter. Nature of MUAPs, long spacing and frequency components. Power supply noise rejection and grounding issues with amplifier. Conclude with what went right what went wrong, what to improve next time</a:t>
-            </a:r>
-            <a:endParaRPr b="0" lang="en-US" sz="2400" spc="-1" strike="noStrike">
-              <a:solidFill>
-                <a:srgbClr val="000000"/>
-              </a:solidFill>
-              <a:latin typeface="Arial"/>
-            </a:endParaRPr>
-          </a:p>
-        </p:txBody>
-      </p:sp>
-      <p:sp>
-        <p:nvSpPr>
-          <p:cNvPr id="69" name=""/>
-          <p:cNvSpPr/>
-          <p:nvPr/>
-        </p:nvSpPr>
-        <p:spPr>
-          <a:xfrm>
-            <a:off x="586800" y="20574000"/>
-            <a:ext cx="31740120" cy="1096200"/>
-          </a:xfrm>
-          <a:prstGeom prst="rect">
-            <a:avLst/>
-          </a:prstGeom>
-          <a:solidFill>
-            <a:srgbClr val="ffffff"/>
-          </a:solidFill>
-          <a:ln w="0">
-            <a:noFill/>
-          </a:ln>
-        </p:spPr>
-        <p:style>
-          <a:lnRef idx="0"/>
-          <a:fillRef idx="0"/>
-          <a:effectRef idx="0"/>
-          <a:fontRef idx="minor"/>
-        </p:style>
-        <p:txBody>
-          <a:bodyPr lIns="90000" rIns="90000" tIns="45000" bIns="45000" anchor="t">
-            <a:noAutofit/>
-          </a:bodyPr>
-          <a:p>
-            <a:pPr marL="228600">
-              <a:lnSpc>
-                <a:spcPct val="115000"/>
-              </a:lnSpc>
-            </a:pPr>
-            <a:r>
-              <a:rPr b="1" lang="en-US" sz="3200" spc="-1" strike="noStrike">
-                <a:solidFill>
-                  <a:srgbClr val="000000"/>
-                </a:solidFill>
-                <a:latin typeface="Arial"/>
-                <a:ea typeface="DejaVu Sans"/>
-              </a:rPr>
-              <a:t>References and Inspiration</a:t>
-            </a:r>
-            <a:endParaRPr b="0" lang="en-US" sz="3200" spc="-1" strike="noStrike">
-              <a:solidFill>
-                <a:srgbClr val="000000"/>
-              </a:solidFill>
-              <a:latin typeface="Arial"/>
-            </a:endParaRPr>
-          </a:p>
-          <a:p>
-            <a:pPr marL="228600">
-              <a:lnSpc>
-                <a:spcPct val="115000"/>
-              </a:lnSpc>
-            </a:pPr>
-            <a:r>
-              <a:rPr b="0" lang="en-US" sz="2400" spc="-1" strike="noStrike">
-                <a:solidFill>
-                  <a:srgbClr val="000000"/>
-                </a:solidFill>
-                <a:latin typeface="Arial"/>
-                <a:ea typeface="DejaVu Sans"/>
-              </a:rPr>
-              <a:t>https://people.ece.cornell.edu/land/courses/ece4760/FinalProjects/f2016/mh2298_jyh37_sv376/mh2298_jyh37_sv376/mh2298_jyh37_sv376/index.html</a:t>
-            </a:r>
-            <a:endParaRPr b="0" lang="en-US" sz="2400" spc="-1" strike="noStrike">
-              <a:solidFill>
-                <a:srgbClr val="000000"/>
-              </a:solidFill>
-              <a:latin typeface="Arial"/>
-            </a:endParaRPr>
-          </a:p>
-        </p:txBody>
-      </p:sp>
-      <p:graphicFrame>
-        <p:nvGraphicFramePr>
-          <p:cNvPr id="70" name=""/>
-          <p:cNvGraphicFramePr/>
-          <p:nvPr/>
-        </p:nvGraphicFramePr>
-        <p:xfrm>
-          <a:off x="21945600" y="11887200"/>
-          <a:ext cx="10515600" cy="4952880"/>
-        </p:xfrm>
-        <a:graphic>
-          <a:graphicData uri="http://schemas.openxmlformats.org/drawingml/2006/chart">
-            <c:chart xmlns:c="http://schemas.openxmlformats.org/drawingml/2006/chart" xmlns:r="http://schemas.openxmlformats.org/officeDocument/2006/relationships" r:id="rId2"/>
-          </a:graphicData>
-        </a:graphic>
-      </p:graphicFrame>
-      <p:pic>
-        <p:nvPicPr>
-          <p:cNvPr id="71" name="" descr=""/>
-          <p:cNvPicPr/>
-          <p:nvPr/>
-        </p:nvPicPr>
-        <p:blipFill>
-          <a:blip r:embed="rId3"/>
-          <a:stretch/>
-        </p:blipFill>
-        <p:spPr>
-          <a:xfrm>
-            <a:off x="457200" y="10287000"/>
-            <a:ext cx="13258800" cy="6616440"/>
-          </a:xfrm>
-          <a:prstGeom prst="rect">
-            <a:avLst/>
-          </a:prstGeom>
-          <a:ln w="0">
-            <a:noFill/>
-          </a:ln>
-        </p:spPr>
-      </p:pic>
-      <p:sp>
-        <p:nvSpPr>
-          <p:cNvPr id="72" name=""/>
-          <p:cNvSpPr/>
-          <p:nvPr/>
-        </p:nvSpPr>
-        <p:spPr>
-          <a:xfrm>
-            <a:off x="21488400" y="5715000"/>
-            <a:ext cx="10972800" cy="1051920"/>
-          </a:xfrm>
-          <a:prstGeom prst="rect">
-            <a:avLst/>
-          </a:prstGeom>
-          <a:solidFill>
-            <a:srgbClr val="ffffff"/>
-          </a:solidFill>
-          <a:ln w="0">
-            <a:noFill/>
-          </a:ln>
-        </p:spPr>
-        <p:style>
-          <a:lnRef idx="0"/>
-          <a:fillRef idx="0"/>
-          <a:effectRef idx="0"/>
-          <a:fontRef idx="minor"/>
-        </p:style>
-        <p:txBody>
-          <a:bodyPr lIns="90000" rIns="90000" tIns="45000" bIns="45000" anchor="t">
-            <a:noAutofit/>
-          </a:bodyPr>
-          <a:p>
-            <a:pPr marL="228600">
-              <a:lnSpc>
-                <a:spcPct val="115000"/>
-              </a:lnSpc>
-            </a:pPr>
-            <a:r>
-              <a:rPr b="0" lang="en-US" sz="1800" spc="-1" strike="noStrike">
-                <a:solidFill>
-                  <a:srgbClr val="000000"/>
-                </a:solidFill>
-                <a:latin typeface="Arial"/>
-                <a:ea typeface="DejaVu Sans"/>
-              </a:rPr>
-              <a:t>Block Diagram showing the acquisition and processing chain for the EMG signals. Muscle activations are sent into the amplifier, which is conditioned so that the onboard ADC of the Teensy can acquire it properly. A 40kHz periodic sample is taken, processed slightly, and used to make a decision on the activation </a:t>
-            </a:r>
-            <a:r>
-              <a:rPr b="0" lang="en-US" sz="1800" spc="-1" strike="noStrike">
-                <a:solidFill>
-                  <a:srgbClr val="000000"/>
-                </a:solidFill>
-                <a:latin typeface="Arial"/>
-                <a:ea typeface="DejaVu Sans"/>
-              </a:rPr>
-              <a:t>of the robotic hand</a:t>
-            </a:r>
-            <a:endParaRPr b="0" lang="en-US" sz="1800" spc="-1" strike="noStrike">
-              <a:solidFill>
-                <a:srgbClr val="000000"/>
-              </a:solidFill>
-              <a:latin typeface="Arial"/>
-            </a:endParaRPr>
-          </a:p>
-        </p:txBody>
-      </p:sp>
-      <p:sp>
-        <p:nvSpPr>
-          <p:cNvPr id="73" name=""/>
-          <p:cNvSpPr/>
-          <p:nvPr/>
-        </p:nvSpPr>
-        <p:spPr>
-          <a:xfrm>
-            <a:off x="457200" y="16903440"/>
-            <a:ext cx="13258800" cy="698760"/>
-          </a:xfrm>
-          <a:prstGeom prst="rect">
-            <a:avLst/>
-          </a:prstGeom>
-          <a:solidFill>
-            <a:srgbClr val="ffffff"/>
-          </a:solidFill>
-          <a:ln w="0">
-            <a:noFill/>
-          </a:ln>
-        </p:spPr>
-        <p:style>
-          <a:lnRef idx="0"/>
-          <a:fillRef idx="0"/>
-          <a:effectRef idx="0"/>
-          <a:fontRef idx="minor"/>
-        </p:style>
-        <p:txBody>
-          <a:bodyPr lIns="90000" rIns="90000" tIns="45000" bIns="45000" anchor="t">
-            <a:noAutofit/>
-          </a:bodyPr>
-          <a:p>
-            <a:pPr marL="228600">
-              <a:lnSpc>
-                <a:spcPct val="115000"/>
-              </a:lnSpc>
-            </a:pPr>
-            <a:r>
-              <a:rPr b="0" lang="en-US" sz="1800" spc="-1" strike="noStrike">
-                <a:solidFill>
-                  <a:srgbClr val="000000"/>
-                </a:solidFill>
-                <a:latin typeface="Arial"/>
-                <a:ea typeface="DejaVu Sans"/>
-              </a:rPr>
-              <a:t>A render of the </a:t>
-            </a:r>
-            <a:r>
-              <a:rPr b="0" lang="en-US" sz="1800" spc="-1" strike="noStrike">
-                <a:solidFill>
-                  <a:srgbClr val="000000"/>
-                </a:solidFill>
-                <a:latin typeface="Arial"/>
-                <a:ea typeface="DejaVu Sans"/>
-              </a:rPr>
-              <a:t>revision 2 hardware </a:t>
-            </a:r>
-            <a:r>
-              <a:rPr b="0" lang="en-US" sz="1800" spc="-1" strike="noStrike">
-                <a:solidFill>
-                  <a:srgbClr val="000000"/>
-                </a:solidFill>
-                <a:latin typeface="Arial"/>
-                <a:ea typeface="DejaVu Sans"/>
-              </a:rPr>
-              <a:t>board, altered from </a:t>
-            </a:r>
-            <a:r>
-              <a:rPr b="0" lang="en-US" sz="1800" spc="-1" strike="noStrike">
-                <a:solidFill>
-                  <a:srgbClr val="000000"/>
-                </a:solidFill>
-                <a:latin typeface="Arial"/>
-                <a:ea typeface="DejaVu Sans"/>
-              </a:rPr>
-              <a:t>the manufactured </a:t>
-            </a:r>
-            <a:r>
-              <a:rPr b="0" lang="en-US" sz="1800" spc="-1" strike="noStrike">
-                <a:solidFill>
-                  <a:srgbClr val="000000"/>
-                </a:solidFill>
-                <a:latin typeface="Arial"/>
-                <a:ea typeface="DejaVu Sans"/>
-              </a:rPr>
-              <a:t>version for clarity. </a:t>
-            </a:r>
-            <a:r>
-              <a:rPr b="0" lang="en-US" sz="1800" spc="-1" strike="noStrike">
-                <a:solidFill>
-                  <a:srgbClr val="000000"/>
-                </a:solidFill>
-                <a:latin typeface="Arial"/>
-                <a:ea typeface="DejaVu Sans"/>
-              </a:rPr>
-              <a:t>Large silkscreen text </a:t>
-            </a:r>
-            <a:r>
-              <a:rPr b="0" lang="en-US" sz="1800" spc="-1" strike="noStrike">
-                <a:solidFill>
-                  <a:srgbClr val="000000"/>
-                </a:solidFill>
-                <a:latin typeface="Arial"/>
-                <a:ea typeface="DejaVu Sans"/>
-              </a:rPr>
-              <a:t>is used to emphasize </a:t>
-            </a:r>
-            <a:r>
-              <a:rPr b="0" lang="en-US" sz="1800" spc="-1" strike="noStrike">
-                <a:solidFill>
-                  <a:srgbClr val="000000"/>
-                </a:solidFill>
-                <a:latin typeface="Arial"/>
-                <a:ea typeface="DejaVu Sans"/>
-              </a:rPr>
-              <a:t>the regions of the </a:t>
-            </a:r>
-            <a:r>
-              <a:rPr b="0" lang="en-US" sz="1800" spc="-1" strike="noStrike">
-                <a:solidFill>
-                  <a:srgbClr val="000000"/>
-                </a:solidFill>
-                <a:latin typeface="Arial"/>
-                <a:ea typeface="DejaVu Sans"/>
-              </a:rPr>
-              <a:t>board and their </a:t>
-            </a:r>
-            <a:r>
-              <a:rPr b="0" lang="en-US" sz="1800" spc="-1" strike="noStrike">
-                <a:solidFill>
-                  <a:srgbClr val="000000"/>
-                </a:solidFill>
-                <a:latin typeface="Arial"/>
-                <a:ea typeface="DejaVu Sans"/>
-              </a:rPr>
-              <a:t>operation</a:t>
-            </a:r>
-            <a:endParaRPr b="0" lang="en-US" sz="1800" spc="-1" strike="noStrike">
               <a:solidFill>
                 <a:srgbClr val="000000"/>
               </a:solidFill>

</xml_diff>